<commit_message>
methode im vollem gange
</commit_message>
<xml_diff>
--- a/Latex/figures/images.pptx
+++ b/Latex/figures/images.pptx
@@ -6,6 +6,8 @@
   </p:sldMasterIdLst>
   <p:sldIdLst>
     <p:sldId id="256" r:id="rId2"/>
+    <p:sldId id="257" r:id="rId3"/>
+    <p:sldId id="258" r:id="rId4"/>
   </p:sldIdLst>
   <p:sldSz cx="12192000" cy="6858000"/>
   <p:notesSz cx="6858000" cy="9144000"/>
@@ -261,7 +263,7 @@
           <a:p>
             <a:fld id="{A2EF96EC-B110-4427-9456-97730D7A221B}" type="datetimeFigureOut">
               <a:rPr lang="en-DE" smtClean="0"/>
-              <a:t>07/11/2023</a:t>
+              <a:t>08/11/2023</a:t>
             </a:fld>
             <a:endParaRPr lang="en-DE"/>
           </a:p>
@@ -461,7 +463,7 @@
           <a:p>
             <a:fld id="{A2EF96EC-B110-4427-9456-97730D7A221B}" type="datetimeFigureOut">
               <a:rPr lang="en-DE" smtClean="0"/>
-              <a:t>07/11/2023</a:t>
+              <a:t>08/11/2023</a:t>
             </a:fld>
             <a:endParaRPr lang="en-DE"/>
           </a:p>
@@ -671,7 +673,7 @@
           <a:p>
             <a:fld id="{A2EF96EC-B110-4427-9456-97730D7A221B}" type="datetimeFigureOut">
               <a:rPr lang="en-DE" smtClean="0"/>
-              <a:t>07/11/2023</a:t>
+              <a:t>08/11/2023</a:t>
             </a:fld>
             <a:endParaRPr lang="en-DE"/>
           </a:p>
@@ -871,7 +873,7 @@
           <a:p>
             <a:fld id="{A2EF96EC-B110-4427-9456-97730D7A221B}" type="datetimeFigureOut">
               <a:rPr lang="en-DE" smtClean="0"/>
-              <a:t>07/11/2023</a:t>
+              <a:t>08/11/2023</a:t>
             </a:fld>
             <a:endParaRPr lang="en-DE"/>
           </a:p>
@@ -1147,7 +1149,7 @@
           <a:p>
             <a:fld id="{A2EF96EC-B110-4427-9456-97730D7A221B}" type="datetimeFigureOut">
               <a:rPr lang="en-DE" smtClean="0"/>
-              <a:t>07/11/2023</a:t>
+              <a:t>08/11/2023</a:t>
             </a:fld>
             <a:endParaRPr lang="en-DE"/>
           </a:p>
@@ -1415,7 +1417,7 @@
           <a:p>
             <a:fld id="{A2EF96EC-B110-4427-9456-97730D7A221B}" type="datetimeFigureOut">
               <a:rPr lang="en-DE" smtClean="0"/>
-              <a:t>07/11/2023</a:t>
+              <a:t>08/11/2023</a:t>
             </a:fld>
             <a:endParaRPr lang="en-DE"/>
           </a:p>
@@ -1830,7 +1832,7 @@
           <a:p>
             <a:fld id="{A2EF96EC-B110-4427-9456-97730D7A221B}" type="datetimeFigureOut">
               <a:rPr lang="en-DE" smtClean="0"/>
-              <a:t>07/11/2023</a:t>
+              <a:t>08/11/2023</a:t>
             </a:fld>
             <a:endParaRPr lang="en-DE"/>
           </a:p>
@@ -1972,7 +1974,7 @@
           <a:p>
             <a:fld id="{A2EF96EC-B110-4427-9456-97730D7A221B}" type="datetimeFigureOut">
               <a:rPr lang="en-DE" smtClean="0"/>
-              <a:t>07/11/2023</a:t>
+              <a:t>08/11/2023</a:t>
             </a:fld>
             <a:endParaRPr lang="en-DE"/>
           </a:p>
@@ -2085,7 +2087,7 @@
           <a:p>
             <a:fld id="{A2EF96EC-B110-4427-9456-97730D7A221B}" type="datetimeFigureOut">
               <a:rPr lang="en-DE" smtClean="0"/>
-              <a:t>07/11/2023</a:t>
+              <a:t>08/11/2023</a:t>
             </a:fld>
             <a:endParaRPr lang="en-DE"/>
           </a:p>
@@ -2398,7 +2400,7 @@
           <a:p>
             <a:fld id="{A2EF96EC-B110-4427-9456-97730D7A221B}" type="datetimeFigureOut">
               <a:rPr lang="en-DE" smtClean="0"/>
-              <a:t>07/11/2023</a:t>
+              <a:t>08/11/2023</a:t>
             </a:fld>
             <a:endParaRPr lang="en-DE"/>
           </a:p>
@@ -2687,7 +2689,7 @@
           <a:p>
             <a:fld id="{A2EF96EC-B110-4427-9456-97730D7A221B}" type="datetimeFigureOut">
               <a:rPr lang="en-DE" smtClean="0"/>
-              <a:t>07/11/2023</a:t>
+              <a:t>08/11/2023</a:t>
             </a:fld>
             <a:endParaRPr lang="en-DE"/>
           </a:p>
@@ -2930,7 +2932,7 @@
           <a:p>
             <a:fld id="{A2EF96EC-B110-4427-9456-97730D7A221B}" type="datetimeFigureOut">
               <a:rPr lang="en-DE" smtClean="0"/>
-              <a:t>07/11/2023</a:t>
+              <a:t>08/11/2023</a:t>
             </a:fld>
             <a:endParaRPr lang="en-DE"/>
           </a:p>
@@ -3347,210 +3349,4045 @@
           <a:chExt cx="0" cy="0"/>
         </a:xfrm>
       </p:grpSpPr>
-      <p:sp>
-        <p:nvSpPr>
-          <p:cNvPr id="4" name="Rectangle 3">
+      <p:grpSp>
+        <p:nvGrpSpPr>
+          <p:cNvPr id="50" name="Group 49">
             <a:extLst>
               <a:ext uri="{FF2B5EF4-FFF2-40B4-BE49-F238E27FC236}">
-                <a16:creationId xmlns:a16="http://schemas.microsoft.com/office/drawing/2014/main" id="{960D45CB-B020-C537-D360-B5F8330DE46F}"/>
+                <a16:creationId xmlns:a16="http://schemas.microsoft.com/office/drawing/2014/main" id="{D6E1E837-3E31-AF24-65E2-CF134FDA4997}"/>
               </a:ext>
             </a:extLst>
           </p:cNvPr>
-          <p:cNvSpPr/>
+          <p:cNvGrpSpPr/>
           <p:nvPr/>
-        </p:nvSpPr>
-        <p:spPr>
+        </p:nvGrpSpPr>
+        <p:grpSpPr>
           <a:xfrm>
-            <a:off x="2323322" y="2332653"/>
-            <a:ext cx="1642188" cy="597159"/>
+            <a:off x="1711569" y="1970394"/>
+            <a:ext cx="6392847" cy="2842924"/>
+            <a:chOff x="1711569" y="1970394"/>
+            <a:chExt cx="6392847" cy="2842924"/>
           </a:xfrm>
-          <a:prstGeom prst="rect">
-            <a:avLst/>
-          </a:prstGeom>
-        </p:spPr>
-        <p:style>
-          <a:lnRef idx="2">
-            <a:schemeClr val="accent1">
-              <a:shade val="15000"/>
-            </a:schemeClr>
-          </a:lnRef>
-          <a:fillRef idx="1">
-            <a:schemeClr val="accent1"/>
-          </a:fillRef>
-          <a:effectRef idx="0">
-            <a:schemeClr val="accent1"/>
-          </a:effectRef>
-          <a:fontRef idx="minor">
-            <a:schemeClr val="lt1"/>
-          </a:fontRef>
-        </p:style>
-        <p:txBody>
-          <a:bodyPr rtlCol="0" anchor="ctr"/>
-          <a:lstStyle/>
-          <a:p>
-            <a:pPr algn="ctr"/>
-            <a:r>
-              <a:rPr lang="en-US" dirty="0"/>
-              <a:t>Machine</a:t>
-            </a:r>
-            <a:endParaRPr lang="en-DE" dirty="0"/>
-          </a:p>
-        </p:txBody>
-      </p:sp>
-      <p:sp>
-        <p:nvSpPr>
-          <p:cNvPr id="5" name="Rectangle 4">
-            <a:extLst>
-              <a:ext uri="{FF2B5EF4-FFF2-40B4-BE49-F238E27FC236}">
-                <a16:creationId xmlns:a16="http://schemas.microsoft.com/office/drawing/2014/main" id="{AEBFAA1D-D85A-25EE-601C-E97719B6C8A7}"/>
-              </a:ext>
-            </a:extLst>
-          </p:cNvPr>
-          <p:cNvSpPr/>
-          <p:nvPr/>
-        </p:nvSpPr>
-        <p:spPr>
-          <a:xfrm>
-            <a:off x="4187292" y="2332652"/>
-            <a:ext cx="1642188" cy="597159"/>
-          </a:xfrm>
-          <a:prstGeom prst="rect">
-            <a:avLst/>
-          </a:prstGeom>
-        </p:spPr>
-        <p:style>
-          <a:lnRef idx="2">
-            <a:schemeClr val="accent1">
-              <a:shade val="15000"/>
-            </a:schemeClr>
-          </a:lnRef>
-          <a:fillRef idx="1">
-            <a:schemeClr val="accent1"/>
-          </a:fillRef>
-          <a:effectRef idx="0">
-            <a:schemeClr val="accent1"/>
-          </a:effectRef>
-          <a:fontRef idx="minor">
-            <a:schemeClr val="lt1"/>
-          </a:fontRef>
-        </p:style>
-        <p:txBody>
-          <a:bodyPr rtlCol="0" anchor="ctr"/>
-          <a:lstStyle/>
-          <a:p>
-            <a:pPr algn="ctr"/>
-            <a:r>
-              <a:rPr lang="en-US" dirty="0"/>
-              <a:t>Part</a:t>
-            </a:r>
-            <a:endParaRPr lang="en-DE" dirty="0"/>
-          </a:p>
-        </p:txBody>
-      </p:sp>
-      <p:sp>
-        <p:nvSpPr>
-          <p:cNvPr id="6" name="Rectangle 5">
-            <a:extLst>
-              <a:ext uri="{FF2B5EF4-FFF2-40B4-BE49-F238E27FC236}">
-                <a16:creationId xmlns:a16="http://schemas.microsoft.com/office/drawing/2014/main" id="{82E84FD8-F395-94D3-F303-6DC5981ACDDA}"/>
-              </a:ext>
-            </a:extLst>
-          </p:cNvPr>
-          <p:cNvSpPr/>
-          <p:nvPr/>
-        </p:nvSpPr>
-        <p:spPr>
-          <a:xfrm>
-            <a:off x="6051262" y="2332652"/>
-            <a:ext cx="1642188" cy="597159"/>
-          </a:xfrm>
-          <a:prstGeom prst="rect">
-            <a:avLst/>
-          </a:prstGeom>
-        </p:spPr>
-        <p:style>
-          <a:lnRef idx="2">
-            <a:schemeClr val="accent1">
-              <a:shade val="15000"/>
-            </a:schemeClr>
-          </a:lnRef>
-          <a:fillRef idx="1">
-            <a:schemeClr val="accent1"/>
-          </a:fillRef>
-          <a:effectRef idx="0">
-            <a:schemeClr val="accent1"/>
-          </a:effectRef>
-          <a:fontRef idx="minor">
-            <a:schemeClr val="lt1"/>
-          </a:fontRef>
-        </p:style>
-        <p:txBody>
-          <a:bodyPr rtlCol="0" anchor="ctr"/>
-          <a:lstStyle/>
-          <a:p>
-            <a:pPr algn="ctr"/>
-            <a:r>
-              <a:rPr lang="en-US" dirty="0"/>
-              <a:t>Material</a:t>
-            </a:r>
-            <a:endParaRPr lang="en-DE" dirty="0"/>
-          </a:p>
-        </p:txBody>
-      </p:sp>
-      <p:sp>
-        <p:nvSpPr>
-          <p:cNvPr id="2" name="Rectangle 1">
-            <a:extLst>
-              <a:ext uri="{FF2B5EF4-FFF2-40B4-BE49-F238E27FC236}">
-                <a16:creationId xmlns:a16="http://schemas.microsoft.com/office/drawing/2014/main" id="{E6CBC93D-FFDE-2E56-2290-7D6AE5C74DDE}"/>
-              </a:ext>
-            </a:extLst>
-          </p:cNvPr>
-          <p:cNvSpPr/>
-          <p:nvPr/>
-        </p:nvSpPr>
-        <p:spPr>
-          <a:xfrm>
-            <a:off x="4187292" y="3274406"/>
-            <a:ext cx="1642188" cy="597159"/>
-          </a:xfrm>
-          <a:prstGeom prst="rect">
-            <a:avLst/>
-          </a:prstGeom>
-        </p:spPr>
-        <p:style>
-          <a:lnRef idx="2">
-            <a:schemeClr val="accent1">
-              <a:shade val="15000"/>
-            </a:schemeClr>
-          </a:lnRef>
-          <a:fillRef idx="1">
-            <a:schemeClr val="accent1"/>
-          </a:fillRef>
-          <a:effectRef idx="0">
-            <a:schemeClr val="accent1"/>
-          </a:effectRef>
-          <a:fontRef idx="minor">
-            <a:schemeClr val="lt1"/>
-          </a:fontRef>
-        </p:style>
-        <p:txBody>
-          <a:bodyPr rtlCol="0" anchor="ctr"/>
-          <a:lstStyle/>
-          <a:p>
-            <a:pPr algn="ctr"/>
-            <a:r>
-              <a:rPr lang="en-US" dirty="0"/>
-              <a:t>Toolpath</a:t>
-            </a:r>
-            <a:endParaRPr lang="en-DE" dirty="0"/>
-          </a:p>
-        </p:txBody>
-      </p:sp>
+        </p:grpSpPr>
+        <p:sp>
+          <p:nvSpPr>
+            <p:cNvPr id="4" name="Rectangle 3">
+              <a:extLst>
+                <a:ext uri="{FF2B5EF4-FFF2-40B4-BE49-F238E27FC236}">
+                  <a16:creationId xmlns:a16="http://schemas.microsoft.com/office/drawing/2014/main" id="{960D45CB-B020-C537-D360-B5F8330DE46F}"/>
+                </a:ext>
+              </a:extLst>
+            </p:cNvPr>
+            <p:cNvSpPr/>
+            <p:nvPr/>
+          </p:nvSpPr>
+          <p:spPr>
+            <a:xfrm>
+              <a:off x="4298183" y="1970394"/>
+              <a:ext cx="1642188" cy="597159"/>
+            </a:xfrm>
+            <a:prstGeom prst="rect">
+              <a:avLst/>
+            </a:prstGeom>
+          </p:spPr>
+          <p:style>
+            <a:lnRef idx="2">
+              <a:schemeClr val="accent4">
+                <a:shade val="15000"/>
+              </a:schemeClr>
+            </a:lnRef>
+            <a:fillRef idx="1">
+              <a:schemeClr val="accent4"/>
+            </a:fillRef>
+            <a:effectRef idx="0">
+              <a:schemeClr val="accent4"/>
+            </a:effectRef>
+            <a:fontRef idx="minor">
+              <a:schemeClr val="lt1"/>
+            </a:fontRef>
+          </p:style>
+          <p:txBody>
+            <a:bodyPr rtlCol="0" anchor="ctr"/>
+            <a:lstStyle/>
+            <a:p>
+              <a:pPr algn="ctr"/>
+              <a:r>
+                <a:rPr lang="en-US" dirty="0">
+                  <a:ln w="0"/>
+                  <a:solidFill>
+                    <a:schemeClr val="tx1"/>
+                  </a:solidFill>
+                  <a:effectLst>
+                    <a:outerShdw blurRad="38100" dist="19050" dir="2700000" algn="tl" rotWithShape="0">
+                      <a:schemeClr val="dk1">
+                        <a:alpha val="40000"/>
+                      </a:schemeClr>
+                    </a:outerShdw>
+                  </a:effectLst>
+                </a:rPr>
+                <a:t>Machine</a:t>
+              </a:r>
+              <a:endParaRPr lang="en-DE" dirty="0">
+                <a:ln w="0"/>
+                <a:solidFill>
+                  <a:schemeClr val="tx1"/>
+                </a:solidFill>
+                <a:effectLst>
+                  <a:outerShdw blurRad="38100" dist="19050" dir="2700000" algn="tl" rotWithShape="0">
+                    <a:schemeClr val="dk1">
+                      <a:alpha val="40000"/>
+                    </a:schemeClr>
+                  </a:outerShdw>
+                </a:effectLst>
+              </a:endParaRPr>
+            </a:p>
+          </p:txBody>
+        </p:sp>
+        <p:sp>
+          <p:nvSpPr>
+            <p:cNvPr id="5" name="Rectangle 4">
+              <a:extLst>
+                <a:ext uri="{FF2B5EF4-FFF2-40B4-BE49-F238E27FC236}">
+                  <a16:creationId xmlns:a16="http://schemas.microsoft.com/office/drawing/2014/main" id="{AEBFAA1D-D85A-25EE-601C-E97719B6C8A7}"/>
+                </a:ext>
+              </a:extLst>
+            </p:cNvPr>
+            <p:cNvSpPr/>
+            <p:nvPr/>
+          </p:nvSpPr>
+          <p:spPr>
+            <a:xfrm>
+              <a:off x="6462228" y="1970394"/>
+              <a:ext cx="1642188" cy="597159"/>
+            </a:xfrm>
+            <a:prstGeom prst="rect">
+              <a:avLst/>
+            </a:prstGeom>
+          </p:spPr>
+          <p:style>
+            <a:lnRef idx="2">
+              <a:schemeClr val="accent4">
+                <a:shade val="15000"/>
+              </a:schemeClr>
+            </a:lnRef>
+            <a:fillRef idx="1">
+              <a:schemeClr val="accent4"/>
+            </a:fillRef>
+            <a:effectRef idx="0">
+              <a:schemeClr val="accent4"/>
+            </a:effectRef>
+            <a:fontRef idx="minor">
+              <a:schemeClr val="lt1"/>
+            </a:fontRef>
+          </p:style>
+          <p:txBody>
+            <a:bodyPr rtlCol="0" anchor="ctr"/>
+            <a:lstStyle/>
+            <a:p>
+              <a:pPr algn="ctr"/>
+              <a:r>
+                <a:rPr lang="en-US" dirty="0">
+                  <a:ln w="0"/>
+                  <a:solidFill>
+                    <a:schemeClr val="tx1"/>
+                  </a:solidFill>
+                  <a:effectLst>
+                    <a:outerShdw blurRad="38100" dist="19050" dir="2700000" algn="tl" rotWithShape="0">
+                      <a:schemeClr val="dk1">
+                        <a:alpha val="40000"/>
+                      </a:schemeClr>
+                    </a:outerShdw>
+                  </a:effectLst>
+                </a:rPr>
+                <a:t>Part</a:t>
+              </a:r>
+              <a:endParaRPr lang="en-DE" dirty="0">
+                <a:ln w="0"/>
+                <a:solidFill>
+                  <a:schemeClr val="tx1"/>
+                </a:solidFill>
+                <a:effectLst>
+                  <a:outerShdw blurRad="38100" dist="19050" dir="2700000" algn="tl" rotWithShape="0">
+                    <a:schemeClr val="dk1">
+                      <a:alpha val="40000"/>
+                    </a:schemeClr>
+                  </a:outerShdw>
+                </a:effectLst>
+              </a:endParaRPr>
+            </a:p>
+          </p:txBody>
+        </p:sp>
+        <p:sp>
+          <p:nvSpPr>
+            <p:cNvPr id="6" name="Rectangle 5">
+              <a:extLst>
+                <a:ext uri="{FF2B5EF4-FFF2-40B4-BE49-F238E27FC236}">
+                  <a16:creationId xmlns:a16="http://schemas.microsoft.com/office/drawing/2014/main" id="{82E84FD8-F395-94D3-F303-6DC5981ACDDA}"/>
+                </a:ext>
+              </a:extLst>
+            </p:cNvPr>
+            <p:cNvSpPr/>
+            <p:nvPr/>
+          </p:nvSpPr>
+          <p:spPr>
+            <a:xfrm>
+              <a:off x="6462228" y="3015537"/>
+              <a:ext cx="1642188" cy="597159"/>
+            </a:xfrm>
+            <a:prstGeom prst="rect">
+              <a:avLst/>
+            </a:prstGeom>
+          </p:spPr>
+          <p:style>
+            <a:lnRef idx="2">
+              <a:schemeClr val="accent4">
+                <a:shade val="15000"/>
+              </a:schemeClr>
+            </a:lnRef>
+            <a:fillRef idx="1">
+              <a:schemeClr val="accent4"/>
+            </a:fillRef>
+            <a:effectRef idx="0">
+              <a:schemeClr val="accent4"/>
+            </a:effectRef>
+            <a:fontRef idx="minor">
+              <a:schemeClr val="lt1"/>
+            </a:fontRef>
+          </p:style>
+          <p:txBody>
+            <a:bodyPr rtlCol="0" anchor="ctr"/>
+            <a:lstStyle/>
+            <a:p>
+              <a:pPr algn="ctr"/>
+              <a:r>
+                <a:rPr lang="en-US" dirty="0">
+                  <a:ln w="0"/>
+                  <a:solidFill>
+                    <a:schemeClr val="tx1"/>
+                  </a:solidFill>
+                  <a:effectLst>
+                    <a:outerShdw blurRad="38100" dist="19050" dir="2700000" algn="tl" rotWithShape="0">
+                      <a:schemeClr val="dk1">
+                        <a:alpha val="40000"/>
+                      </a:schemeClr>
+                    </a:outerShdw>
+                  </a:effectLst>
+                </a:rPr>
+                <a:t>Material</a:t>
+              </a:r>
+              <a:endParaRPr lang="en-DE" dirty="0">
+                <a:ln w="0"/>
+                <a:solidFill>
+                  <a:schemeClr val="tx1"/>
+                </a:solidFill>
+                <a:effectLst>
+                  <a:outerShdw blurRad="38100" dist="19050" dir="2700000" algn="tl" rotWithShape="0">
+                    <a:schemeClr val="dk1">
+                      <a:alpha val="40000"/>
+                    </a:schemeClr>
+                  </a:outerShdw>
+                </a:effectLst>
+              </a:endParaRPr>
+            </a:p>
+          </p:txBody>
+        </p:sp>
+        <p:sp>
+          <p:nvSpPr>
+            <p:cNvPr id="2" name="Rectangle 1">
+              <a:extLst>
+                <a:ext uri="{FF2B5EF4-FFF2-40B4-BE49-F238E27FC236}">
+                  <a16:creationId xmlns:a16="http://schemas.microsoft.com/office/drawing/2014/main" id="{E6CBC93D-FFDE-2E56-2290-7D6AE5C74DDE}"/>
+                </a:ext>
+              </a:extLst>
+            </p:cNvPr>
+            <p:cNvSpPr/>
+            <p:nvPr/>
+          </p:nvSpPr>
+          <p:spPr>
+            <a:xfrm>
+              <a:off x="4298183" y="3015538"/>
+              <a:ext cx="1642188" cy="597159"/>
+            </a:xfrm>
+            <a:prstGeom prst="rect">
+              <a:avLst/>
+            </a:prstGeom>
+          </p:spPr>
+          <p:style>
+            <a:lnRef idx="2">
+              <a:schemeClr val="accent1">
+                <a:shade val="15000"/>
+              </a:schemeClr>
+            </a:lnRef>
+            <a:fillRef idx="1">
+              <a:schemeClr val="accent1"/>
+            </a:fillRef>
+            <a:effectRef idx="0">
+              <a:schemeClr val="accent1"/>
+            </a:effectRef>
+            <a:fontRef idx="minor">
+              <a:schemeClr val="lt1"/>
+            </a:fontRef>
+          </p:style>
+          <p:txBody>
+            <a:bodyPr rtlCol="0" anchor="ctr"/>
+            <a:lstStyle/>
+            <a:p>
+              <a:pPr algn="ctr"/>
+              <a:r>
+                <a:rPr lang="en-US" dirty="0"/>
+                <a:t>Toolpath</a:t>
+              </a:r>
+              <a:endParaRPr lang="en-DE" dirty="0"/>
+            </a:p>
+          </p:txBody>
+        </p:sp>
+        <p:sp>
+          <p:nvSpPr>
+            <p:cNvPr id="3" name="Rectangle 2">
+              <a:extLst>
+                <a:ext uri="{FF2B5EF4-FFF2-40B4-BE49-F238E27FC236}">
+                  <a16:creationId xmlns:a16="http://schemas.microsoft.com/office/drawing/2014/main" id="{8C923BA5-7E29-4736-1C99-13DADC36139C}"/>
+                </a:ext>
+              </a:extLst>
+            </p:cNvPr>
+            <p:cNvSpPr/>
+            <p:nvPr/>
+          </p:nvSpPr>
+          <p:spPr>
+            <a:xfrm>
+              <a:off x="4298183" y="4216158"/>
+              <a:ext cx="1642188" cy="597159"/>
+            </a:xfrm>
+            <a:prstGeom prst="rect">
+              <a:avLst/>
+            </a:prstGeom>
+          </p:spPr>
+          <p:style>
+            <a:lnRef idx="2">
+              <a:schemeClr val="accent1">
+                <a:shade val="15000"/>
+              </a:schemeClr>
+            </a:lnRef>
+            <a:fillRef idx="1">
+              <a:schemeClr val="accent1"/>
+            </a:fillRef>
+            <a:effectRef idx="0">
+              <a:schemeClr val="accent1"/>
+            </a:effectRef>
+            <a:fontRef idx="minor">
+              <a:schemeClr val="lt1"/>
+            </a:fontRef>
+          </p:style>
+          <p:txBody>
+            <a:bodyPr rtlCol="0" anchor="ctr"/>
+            <a:lstStyle/>
+            <a:p>
+              <a:pPr algn="ctr"/>
+              <a:r>
+                <a:rPr lang="en-US" dirty="0"/>
+                <a:t>Process Parameters </a:t>
+              </a:r>
+              <a:endParaRPr lang="en-DE" dirty="0"/>
+            </a:p>
+          </p:txBody>
+        </p:sp>
+        <p:sp>
+          <p:nvSpPr>
+            <p:cNvPr id="8" name="Rectangle 7">
+              <a:extLst>
+                <a:ext uri="{FF2B5EF4-FFF2-40B4-BE49-F238E27FC236}">
+                  <a16:creationId xmlns:a16="http://schemas.microsoft.com/office/drawing/2014/main" id="{A19FD95C-5B40-C9A2-B81D-712D5623DC34}"/>
+                </a:ext>
+              </a:extLst>
+            </p:cNvPr>
+            <p:cNvSpPr/>
+            <p:nvPr/>
+          </p:nvSpPr>
+          <p:spPr>
+            <a:xfrm>
+              <a:off x="1711569" y="4216159"/>
+              <a:ext cx="2253941" cy="597159"/>
+            </a:xfrm>
+            <a:prstGeom prst="rect">
+              <a:avLst/>
+            </a:prstGeom>
+          </p:spPr>
+          <p:style>
+            <a:lnRef idx="2">
+              <a:schemeClr val="accent6">
+                <a:shade val="15000"/>
+              </a:schemeClr>
+            </a:lnRef>
+            <a:fillRef idx="1">
+              <a:schemeClr val="accent6"/>
+            </a:fillRef>
+            <a:effectRef idx="0">
+              <a:schemeClr val="accent6"/>
+            </a:effectRef>
+            <a:fontRef idx="minor">
+              <a:schemeClr val="lt1"/>
+            </a:fontRef>
+          </p:style>
+          <p:txBody>
+            <a:bodyPr rtlCol="0" anchor="ctr"/>
+            <a:lstStyle/>
+            <a:p>
+              <a:pPr algn="ctr"/>
+              <a:r>
+                <a:rPr lang="en-US" dirty="0">
+                  <a:ln w="0"/>
+                  <a:solidFill>
+                    <a:schemeClr val="tx1"/>
+                  </a:solidFill>
+                  <a:effectLst>
+                    <a:outerShdw blurRad="38100" dist="19050" dir="2700000" algn="tl" rotWithShape="0">
+                      <a:schemeClr val="dk1">
+                        <a:alpha val="40000"/>
+                      </a:schemeClr>
+                    </a:outerShdw>
+                  </a:effectLst>
+                </a:rPr>
+                <a:t>User-Defined </a:t>
+              </a:r>
+            </a:p>
+            <a:p>
+              <a:pPr algn="ctr"/>
+              <a:r>
+                <a:rPr lang="en-US" dirty="0">
+                  <a:ln w="0"/>
+                  <a:solidFill>
+                    <a:schemeClr val="tx1"/>
+                  </a:solidFill>
+                  <a:effectLst>
+                    <a:outerShdw blurRad="38100" dist="19050" dir="2700000" algn="tl" rotWithShape="0">
+                      <a:schemeClr val="dk1">
+                        <a:alpha val="40000"/>
+                      </a:schemeClr>
+                    </a:outerShdw>
+                  </a:effectLst>
+                </a:rPr>
+                <a:t>Weights</a:t>
+              </a:r>
+              <a:endParaRPr lang="en-DE" dirty="0">
+                <a:ln w="0"/>
+                <a:solidFill>
+                  <a:schemeClr val="tx1"/>
+                </a:solidFill>
+                <a:effectLst>
+                  <a:outerShdw blurRad="38100" dist="19050" dir="2700000" algn="tl" rotWithShape="0">
+                    <a:schemeClr val="dk1">
+                      <a:alpha val="40000"/>
+                    </a:schemeClr>
+                  </a:outerShdw>
+                </a:effectLst>
+              </a:endParaRPr>
+            </a:p>
+          </p:txBody>
+        </p:sp>
+        <p:sp>
+          <p:nvSpPr>
+            <p:cNvPr id="9" name="Rectangle 8">
+              <a:extLst>
+                <a:ext uri="{FF2B5EF4-FFF2-40B4-BE49-F238E27FC236}">
+                  <a16:creationId xmlns:a16="http://schemas.microsoft.com/office/drawing/2014/main" id="{30C7FD1F-3ADF-CC33-AD70-105175B331A1}"/>
+                </a:ext>
+              </a:extLst>
+            </p:cNvPr>
+            <p:cNvSpPr/>
+            <p:nvPr/>
+          </p:nvSpPr>
+          <p:spPr>
+            <a:xfrm>
+              <a:off x="6406363" y="4210088"/>
+              <a:ext cx="1642188" cy="597159"/>
+            </a:xfrm>
+            <a:prstGeom prst="rect">
+              <a:avLst/>
+            </a:prstGeom>
+          </p:spPr>
+          <p:style>
+            <a:lnRef idx="2">
+              <a:schemeClr val="accent2">
+                <a:shade val="15000"/>
+              </a:schemeClr>
+            </a:lnRef>
+            <a:fillRef idx="1">
+              <a:schemeClr val="accent2"/>
+            </a:fillRef>
+            <a:effectRef idx="0">
+              <a:schemeClr val="accent2"/>
+            </a:effectRef>
+            <a:fontRef idx="minor">
+              <a:schemeClr val="lt1"/>
+            </a:fontRef>
+          </p:style>
+          <p:txBody>
+            <a:bodyPr rtlCol="0" anchor="ctr"/>
+            <a:lstStyle/>
+            <a:p>
+              <a:pPr algn="ctr"/>
+              <a:r>
+                <a:rPr lang="en-US" dirty="0">
+                  <a:ln w="0"/>
+                  <a:solidFill>
+                    <a:schemeClr val="tx1"/>
+                  </a:solidFill>
+                  <a:effectLst>
+                    <a:outerShdw blurRad="38100" dist="19050" dir="2700000" algn="tl" rotWithShape="0">
+                      <a:schemeClr val="dk1">
+                        <a:alpha val="40000"/>
+                      </a:schemeClr>
+                    </a:outerShdw>
+                  </a:effectLst>
+                </a:rPr>
+                <a:t>Score</a:t>
+              </a:r>
+              <a:endParaRPr lang="en-DE" dirty="0">
+                <a:ln w="0"/>
+                <a:solidFill>
+                  <a:schemeClr val="tx1"/>
+                </a:solidFill>
+                <a:effectLst>
+                  <a:outerShdw blurRad="38100" dist="19050" dir="2700000" algn="tl" rotWithShape="0">
+                    <a:schemeClr val="dk1">
+                      <a:alpha val="40000"/>
+                    </a:schemeClr>
+                  </a:outerShdw>
+                </a:effectLst>
+              </a:endParaRPr>
+            </a:p>
+          </p:txBody>
+        </p:sp>
+        <p:cxnSp>
+          <p:nvCxnSpPr>
+            <p:cNvPr id="11" name="Straight Arrow Connector 10">
+              <a:extLst>
+                <a:ext uri="{FF2B5EF4-FFF2-40B4-BE49-F238E27FC236}">
+                  <a16:creationId xmlns:a16="http://schemas.microsoft.com/office/drawing/2014/main" id="{299CCEF4-56C3-3EDE-1AA3-9BBB06A0AFB6}"/>
+                </a:ext>
+              </a:extLst>
+            </p:cNvPr>
+            <p:cNvCxnSpPr>
+              <a:cxnSpLocks/>
+              <a:stCxn id="4" idx="2"/>
+              <a:endCxn id="2" idx="0"/>
+            </p:cNvCxnSpPr>
+            <p:nvPr/>
+          </p:nvCxnSpPr>
+          <p:spPr>
+            <a:xfrm>
+              <a:off x="5119277" y="2567553"/>
+              <a:ext cx="0" cy="447985"/>
+            </a:xfrm>
+            <a:prstGeom prst="straightConnector1">
+              <a:avLst/>
+            </a:prstGeom>
+            <a:ln>
+              <a:tailEnd type="triangle"/>
+            </a:ln>
+          </p:spPr>
+          <p:style>
+            <a:lnRef idx="1">
+              <a:schemeClr val="accent1"/>
+            </a:lnRef>
+            <a:fillRef idx="0">
+              <a:schemeClr val="accent1"/>
+            </a:fillRef>
+            <a:effectRef idx="0">
+              <a:schemeClr val="accent1"/>
+            </a:effectRef>
+            <a:fontRef idx="minor">
+              <a:schemeClr val="tx1"/>
+            </a:fontRef>
+          </p:style>
+        </p:cxnSp>
+        <p:cxnSp>
+          <p:nvCxnSpPr>
+            <p:cNvPr id="14" name="Straight Arrow Connector 13">
+              <a:extLst>
+                <a:ext uri="{FF2B5EF4-FFF2-40B4-BE49-F238E27FC236}">
+                  <a16:creationId xmlns:a16="http://schemas.microsoft.com/office/drawing/2014/main" id="{307DA897-228B-001B-4F93-DFD5BB89B0FD}"/>
+                </a:ext>
+              </a:extLst>
+            </p:cNvPr>
+            <p:cNvCxnSpPr>
+              <a:cxnSpLocks/>
+              <a:stCxn id="5" idx="2"/>
+            </p:cNvCxnSpPr>
+            <p:nvPr/>
+          </p:nvCxnSpPr>
+          <p:spPr>
+            <a:xfrm flipH="1">
+              <a:off x="5940371" y="2567553"/>
+              <a:ext cx="1342951" cy="447984"/>
+            </a:xfrm>
+            <a:prstGeom prst="straightConnector1">
+              <a:avLst/>
+            </a:prstGeom>
+            <a:ln>
+              <a:tailEnd type="triangle"/>
+            </a:ln>
+          </p:spPr>
+          <p:style>
+            <a:lnRef idx="1">
+              <a:schemeClr val="accent1"/>
+            </a:lnRef>
+            <a:fillRef idx="0">
+              <a:schemeClr val="accent1"/>
+            </a:fillRef>
+            <a:effectRef idx="0">
+              <a:schemeClr val="accent1"/>
+            </a:effectRef>
+            <a:fontRef idx="minor">
+              <a:schemeClr val="tx1"/>
+            </a:fontRef>
+          </p:style>
+        </p:cxnSp>
+        <p:cxnSp>
+          <p:nvCxnSpPr>
+            <p:cNvPr id="16" name="Straight Arrow Connector 15">
+              <a:extLst>
+                <a:ext uri="{FF2B5EF4-FFF2-40B4-BE49-F238E27FC236}">
+                  <a16:creationId xmlns:a16="http://schemas.microsoft.com/office/drawing/2014/main" id="{0A5597F5-006E-D04D-BB27-FF7802AA4F0C}"/>
+                </a:ext>
+              </a:extLst>
+            </p:cNvPr>
+            <p:cNvCxnSpPr>
+              <a:cxnSpLocks/>
+              <a:stCxn id="6" idx="1"/>
+              <a:endCxn id="2" idx="3"/>
+            </p:cNvCxnSpPr>
+            <p:nvPr/>
+          </p:nvCxnSpPr>
+          <p:spPr>
+            <a:xfrm flipH="1">
+              <a:off x="5940371" y="3314117"/>
+              <a:ext cx="521857" cy="1"/>
+            </a:xfrm>
+            <a:prstGeom prst="straightConnector1">
+              <a:avLst/>
+            </a:prstGeom>
+            <a:ln>
+              <a:tailEnd type="triangle"/>
+            </a:ln>
+          </p:spPr>
+          <p:style>
+            <a:lnRef idx="1">
+              <a:schemeClr val="accent1"/>
+            </a:lnRef>
+            <a:fillRef idx="0">
+              <a:schemeClr val="accent1"/>
+            </a:fillRef>
+            <a:effectRef idx="0">
+              <a:schemeClr val="accent1"/>
+            </a:effectRef>
+            <a:fontRef idx="minor">
+              <a:schemeClr val="tx1"/>
+            </a:fontRef>
+          </p:style>
+        </p:cxnSp>
+        <p:cxnSp>
+          <p:nvCxnSpPr>
+            <p:cNvPr id="19" name="Straight Arrow Connector 18">
+              <a:extLst>
+                <a:ext uri="{FF2B5EF4-FFF2-40B4-BE49-F238E27FC236}">
+                  <a16:creationId xmlns:a16="http://schemas.microsoft.com/office/drawing/2014/main" id="{759B72E0-AA4A-5E96-E402-6E7CB8411324}"/>
+                </a:ext>
+              </a:extLst>
+            </p:cNvPr>
+            <p:cNvCxnSpPr>
+              <a:stCxn id="2" idx="2"/>
+              <a:endCxn id="3" idx="0"/>
+            </p:cNvCxnSpPr>
+            <p:nvPr/>
+          </p:nvCxnSpPr>
+          <p:spPr>
+            <a:xfrm>
+              <a:off x="5119277" y="3612697"/>
+              <a:ext cx="0" cy="603461"/>
+            </a:xfrm>
+            <a:prstGeom prst="straightConnector1">
+              <a:avLst/>
+            </a:prstGeom>
+            <a:ln>
+              <a:tailEnd type="triangle"/>
+            </a:ln>
+          </p:spPr>
+          <p:style>
+            <a:lnRef idx="1">
+              <a:schemeClr val="accent1"/>
+            </a:lnRef>
+            <a:fillRef idx="0">
+              <a:schemeClr val="accent1"/>
+            </a:fillRef>
+            <a:effectRef idx="0">
+              <a:schemeClr val="accent1"/>
+            </a:effectRef>
+            <a:fontRef idx="minor">
+              <a:schemeClr val="tx1"/>
+            </a:fontRef>
+          </p:style>
+        </p:cxnSp>
+        <p:cxnSp>
+          <p:nvCxnSpPr>
+            <p:cNvPr id="21" name="Straight Arrow Connector 20">
+              <a:extLst>
+                <a:ext uri="{FF2B5EF4-FFF2-40B4-BE49-F238E27FC236}">
+                  <a16:creationId xmlns:a16="http://schemas.microsoft.com/office/drawing/2014/main" id="{0E725BD4-B87D-4675-6510-3FC0AE5E6F87}"/>
+                </a:ext>
+              </a:extLst>
+            </p:cNvPr>
+            <p:cNvCxnSpPr>
+              <a:cxnSpLocks/>
+              <a:stCxn id="8" idx="3"/>
+              <a:endCxn id="3" idx="1"/>
+            </p:cNvCxnSpPr>
+            <p:nvPr/>
+          </p:nvCxnSpPr>
+          <p:spPr>
+            <a:xfrm flipV="1">
+              <a:off x="3965510" y="4514738"/>
+              <a:ext cx="332673" cy="1"/>
+            </a:xfrm>
+            <a:prstGeom prst="straightConnector1">
+              <a:avLst/>
+            </a:prstGeom>
+            <a:ln>
+              <a:tailEnd type="triangle"/>
+            </a:ln>
+          </p:spPr>
+          <p:style>
+            <a:lnRef idx="1">
+              <a:schemeClr val="accent1"/>
+            </a:lnRef>
+            <a:fillRef idx="0">
+              <a:schemeClr val="accent1"/>
+            </a:fillRef>
+            <a:effectRef idx="0">
+              <a:schemeClr val="accent1"/>
+            </a:effectRef>
+            <a:fontRef idx="minor">
+              <a:schemeClr val="tx1"/>
+            </a:fontRef>
+          </p:style>
+        </p:cxnSp>
+        <p:cxnSp>
+          <p:nvCxnSpPr>
+            <p:cNvPr id="23" name="Straight Arrow Connector 22">
+              <a:extLst>
+                <a:ext uri="{FF2B5EF4-FFF2-40B4-BE49-F238E27FC236}">
+                  <a16:creationId xmlns:a16="http://schemas.microsoft.com/office/drawing/2014/main" id="{4ED941BF-3F2C-C446-C30F-ACF8CBDC2AFE}"/>
+                </a:ext>
+              </a:extLst>
+            </p:cNvPr>
+            <p:cNvCxnSpPr>
+              <a:stCxn id="3" idx="3"/>
+              <a:endCxn id="9" idx="1"/>
+            </p:cNvCxnSpPr>
+            <p:nvPr/>
+          </p:nvCxnSpPr>
+          <p:spPr>
+            <a:xfrm flipV="1">
+              <a:off x="5940371" y="4508668"/>
+              <a:ext cx="465992" cy="6070"/>
+            </a:xfrm>
+            <a:prstGeom prst="straightConnector1">
+              <a:avLst/>
+            </a:prstGeom>
+            <a:ln>
+              <a:tailEnd type="triangle"/>
+            </a:ln>
+          </p:spPr>
+          <p:style>
+            <a:lnRef idx="1">
+              <a:schemeClr val="accent1"/>
+            </a:lnRef>
+            <a:fillRef idx="0">
+              <a:schemeClr val="accent1"/>
+            </a:fillRef>
+            <a:effectRef idx="0">
+              <a:schemeClr val="accent1"/>
+            </a:effectRef>
+            <a:fontRef idx="minor">
+              <a:schemeClr val="tx1"/>
+            </a:fontRef>
+          </p:style>
+        </p:cxnSp>
+        <p:sp>
+          <p:nvSpPr>
+            <p:cNvPr id="24" name="Rectangle 23">
+              <a:extLst>
+                <a:ext uri="{FF2B5EF4-FFF2-40B4-BE49-F238E27FC236}">
+                  <a16:creationId xmlns:a16="http://schemas.microsoft.com/office/drawing/2014/main" id="{8D5321A1-5759-70C4-7E8D-107BFBF68292}"/>
+                </a:ext>
+              </a:extLst>
+            </p:cNvPr>
+            <p:cNvSpPr/>
+            <p:nvPr/>
+          </p:nvSpPr>
+          <p:spPr>
+            <a:xfrm>
+              <a:off x="1711569" y="3015538"/>
+              <a:ext cx="2253941" cy="597159"/>
+            </a:xfrm>
+            <a:prstGeom prst="rect">
+              <a:avLst/>
+            </a:prstGeom>
+          </p:spPr>
+          <p:style>
+            <a:lnRef idx="2">
+              <a:schemeClr val="accent6">
+                <a:shade val="15000"/>
+              </a:schemeClr>
+            </a:lnRef>
+            <a:fillRef idx="1">
+              <a:schemeClr val="accent6"/>
+            </a:fillRef>
+            <a:effectRef idx="0">
+              <a:schemeClr val="accent6"/>
+            </a:effectRef>
+            <a:fontRef idx="minor">
+              <a:schemeClr val="lt1"/>
+            </a:fontRef>
+          </p:style>
+          <p:txBody>
+            <a:bodyPr rtlCol="0" anchor="ctr"/>
+            <a:lstStyle/>
+            <a:p>
+              <a:pPr algn="ctr"/>
+              <a:r>
+                <a:rPr lang="en-US" dirty="0">
+                  <a:ln w="0"/>
+                  <a:solidFill>
+                    <a:schemeClr val="tx1"/>
+                  </a:solidFill>
+                  <a:effectLst>
+                    <a:outerShdw blurRad="38100" dist="19050" dir="2700000" algn="tl" rotWithShape="0">
+                      <a:schemeClr val="dk1">
+                        <a:alpha val="40000"/>
+                      </a:schemeClr>
+                    </a:outerShdw>
+                  </a:effectLst>
+                </a:rPr>
+                <a:t>User-Defined </a:t>
+              </a:r>
+            </a:p>
+            <a:p>
+              <a:pPr algn="ctr"/>
+              <a:r>
+                <a:rPr lang="en-US" dirty="0">
+                  <a:ln w="0"/>
+                  <a:solidFill>
+                    <a:schemeClr val="tx1"/>
+                  </a:solidFill>
+                  <a:effectLst>
+                    <a:outerShdw blurRad="38100" dist="19050" dir="2700000" algn="tl" rotWithShape="0">
+                      <a:schemeClr val="dk1">
+                        <a:alpha val="40000"/>
+                      </a:schemeClr>
+                    </a:outerShdw>
+                  </a:effectLst>
+                </a:rPr>
+                <a:t>Boundary Conditions</a:t>
+              </a:r>
+              <a:endParaRPr lang="en-DE" dirty="0">
+                <a:ln w="0"/>
+                <a:solidFill>
+                  <a:schemeClr val="tx1"/>
+                </a:solidFill>
+                <a:effectLst>
+                  <a:outerShdw blurRad="38100" dist="19050" dir="2700000" algn="tl" rotWithShape="0">
+                    <a:schemeClr val="dk1">
+                      <a:alpha val="40000"/>
+                    </a:schemeClr>
+                  </a:outerShdw>
+                </a:effectLst>
+              </a:endParaRPr>
+            </a:p>
+          </p:txBody>
+        </p:sp>
+        <p:cxnSp>
+          <p:nvCxnSpPr>
+            <p:cNvPr id="48" name="Straight Arrow Connector 47">
+              <a:extLst>
+                <a:ext uri="{FF2B5EF4-FFF2-40B4-BE49-F238E27FC236}">
+                  <a16:creationId xmlns:a16="http://schemas.microsoft.com/office/drawing/2014/main" id="{6B73746C-CA9A-8BB4-2481-4FF09EE34CD2}"/>
+                </a:ext>
+              </a:extLst>
+            </p:cNvPr>
+            <p:cNvCxnSpPr>
+              <a:stCxn id="24" idx="3"/>
+              <a:endCxn id="2" idx="1"/>
+            </p:cNvCxnSpPr>
+            <p:nvPr/>
+          </p:nvCxnSpPr>
+          <p:spPr>
+            <a:xfrm>
+              <a:off x="3965510" y="3314118"/>
+              <a:ext cx="332673" cy="0"/>
+            </a:xfrm>
+            <a:prstGeom prst="straightConnector1">
+              <a:avLst/>
+            </a:prstGeom>
+            <a:ln>
+              <a:tailEnd type="triangle"/>
+            </a:ln>
+          </p:spPr>
+          <p:style>
+            <a:lnRef idx="1">
+              <a:schemeClr val="accent1"/>
+            </a:lnRef>
+            <a:fillRef idx="0">
+              <a:schemeClr val="accent1"/>
+            </a:fillRef>
+            <a:effectRef idx="0">
+              <a:schemeClr val="accent1"/>
+            </a:effectRef>
+            <a:fontRef idx="minor">
+              <a:schemeClr val="tx1"/>
+            </a:fontRef>
+          </p:style>
+        </p:cxnSp>
+      </p:grpSp>
     </p:spTree>
     <p:extLst>
       <p:ext uri="{BB962C8B-B14F-4D97-AF65-F5344CB8AC3E}">
         <p14:creationId xmlns:p14="http://schemas.microsoft.com/office/powerpoint/2010/main" val="2303879477"/>
+      </p:ext>
+    </p:extLst>
+  </p:cSld>
+  <p:clrMapOvr>
+    <a:masterClrMapping/>
+  </p:clrMapOvr>
+</p:sld>
+</file>
+
+<file path=ppt/slides/slide2.xml><?xml version="1.0" encoding="utf-8"?>
+<p:sld xmlns:a="http://schemas.openxmlformats.org/drawingml/2006/main" xmlns:r="http://schemas.openxmlformats.org/officeDocument/2006/relationships" xmlns:p="http://schemas.openxmlformats.org/presentationml/2006/main">
+  <p:cSld>
+    <p:spTree>
+      <p:nvGrpSpPr>
+        <p:cNvPr id="1" name=""/>
+        <p:cNvGrpSpPr/>
+        <p:nvPr/>
+      </p:nvGrpSpPr>
+      <p:grpSpPr>
+        <a:xfrm>
+          <a:off x="0" y="0"/>
+          <a:ext cx="0" cy="0"/>
+          <a:chOff x="0" y="0"/>
+          <a:chExt cx="0" cy="0"/>
+        </a:xfrm>
+      </p:grpSpPr>
+      <p:grpSp>
+        <p:nvGrpSpPr>
+          <p:cNvPr id="86" name="Group 85">
+            <a:extLst>
+              <a:ext uri="{FF2B5EF4-FFF2-40B4-BE49-F238E27FC236}">
+                <a16:creationId xmlns:a16="http://schemas.microsoft.com/office/drawing/2014/main" id="{ECD16AEA-612A-1AED-2C23-34C669CEA56A}"/>
+              </a:ext>
+            </a:extLst>
+          </p:cNvPr>
+          <p:cNvGrpSpPr/>
+          <p:nvPr/>
+        </p:nvGrpSpPr>
+        <p:grpSpPr>
+          <a:xfrm>
+            <a:off x="340143" y="455677"/>
+            <a:ext cx="10371993" cy="6145532"/>
+            <a:chOff x="406131" y="389689"/>
+            <a:chExt cx="10371993" cy="6145532"/>
+          </a:xfrm>
+        </p:grpSpPr>
+        <p:sp>
+          <p:nvSpPr>
+            <p:cNvPr id="30" name="Rectangle 29">
+              <a:extLst>
+                <a:ext uri="{FF2B5EF4-FFF2-40B4-BE49-F238E27FC236}">
+                  <a16:creationId xmlns:a16="http://schemas.microsoft.com/office/drawing/2014/main" id="{52D7E261-F4CE-AA63-F1B1-D1D0B029BCC3}"/>
+                </a:ext>
+              </a:extLst>
+            </p:cNvPr>
+            <p:cNvSpPr/>
+            <p:nvPr/>
+          </p:nvSpPr>
+          <p:spPr>
+            <a:xfrm>
+              <a:off x="3722862" y="389689"/>
+              <a:ext cx="2373138" cy="1795154"/>
+            </a:xfrm>
+            <a:prstGeom prst="rect">
+              <a:avLst/>
+            </a:prstGeom>
+            <a:solidFill>
+              <a:schemeClr val="bg2">
+                <a:lumMod val="90000"/>
+                <a:alpha val="36000"/>
+              </a:schemeClr>
+            </a:solidFill>
+          </p:spPr>
+          <p:style>
+            <a:lnRef idx="2">
+              <a:schemeClr val="accent1">
+                <a:shade val="15000"/>
+              </a:schemeClr>
+            </a:lnRef>
+            <a:fillRef idx="1">
+              <a:schemeClr val="accent1"/>
+            </a:fillRef>
+            <a:effectRef idx="0">
+              <a:schemeClr val="accent1"/>
+            </a:effectRef>
+            <a:fontRef idx="minor">
+              <a:schemeClr val="lt1"/>
+            </a:fontRef>
+          </p:style>
+          <p:txBody>
+            <a:bodyPr rtlCol="0" anchor="t"/>
+            <a:lstStyle/>
+            <a:p>
+              <a:pPr algn="ctr"/>
+              <a:endParaRPr lang="en-DE" dirty="0">
+                <a:solidFill>
+                  <a:schemeClr val="tx1"/>
+                </a:solidFill>
+              </a:endParaRPr>
+            </a:p>
+          </p:txBody>
+        </p:sp>
+        <p:sp>
+          <p:nvSpPr>
+            <p:cNvPr id="28" name="Rectangle 27">
+              <a:extLst>
+                <a:ext uri="{FF2B5EF4-FFF2-40B4-BE49-F238E27FC236}">
+                  <a16:creationId xmlns:a16="http://schemas.microsoft.com/office/drawing/2014/main" id="{9CFF4396-7555-43B8-AB22-D3E13809C9C4}"/>
+                </a:ext>
+              </a:extLst>
+            </p:cNvPr>
+            <p:cNvSpPr/>
+            <p:nvPr/>
+          </p:nvSpPr>
+          <p:spPr>
+            <a:xfrm>
+              <a:off x="709622" y="395342"/>
+              <a:ext cx="2332532" cy="2285140"/>
+            </a:xfrm>
+            <a:prstGeom prst="rect">
+              <a:avLst/>
+            </a:prstGeom>
+            <a:solidFill>
+              <a:schemeClr val="bg2">
+                <a:lumMod val="90000"/>
+                <a:alpha val="36000"/>
+              </a:schemeClr>
+            </a:solidFill>
+          </p:spPr>
+          <p:style>
+            <a:lnRef idx="2">
+              <a:schemeClr val="accent1">
+                <a:shade val="15000"/>
+              </a:schemeClr>
+            </a:lnRef>
+            <a:fillRef idx="1">
+              <a:schemeClr val="accent1"/>
+            </a:fillRef>
+            <a:effectRef idx="0">
+              <a:schemeClr val="accent1"/>
+            </a:effectRef>
+            <a:fontRef idx="minor">
+              <a:schemeClr val="lt1"/>
+            </a:fontRef>
+          </p:style>
+          <p:txBody>
+            <a:bodyPr rtlCol="0" anchor="t"/>
+            <a:lstStyle/>
+            <a:p>
+              <a:pPr algn="ctr"/>
+              <a:endParaRPr lang="en-DE" dirty="0">
+                <a:solidFill>
+                  <a:schemeClr val="tx1"/>
+                </a:solidFill>
+              </a:endParaRPr>
+            </a:p>
+          </p:txBody>
+        </p:sp>
+        <p:sp>
+          <p:nvSpPr>
+            <p:cNvPr id="4" name="Rectangle 3">
+              <a:extLst>
+                <a:ext uri="{FF2B5EF4-FFF2-40B4-BE49-F238E27FC236}">
+                  <a16:creationId xmlns:a16="http://schemas.microsoft.com/office/drawing/2014/main" id="{C4F8ED71-F394-E685-8CCA-C8B6C58A733E}"/>
+                </a:ext>
+              </a:extLst>
+            </p:cNvPr>
+            <p:cNvSpPr/>
+            <p:nvPr/>
+          </p:nvSpPr>
+          <p:spPr>
+            <a:xfrm>
+              <a:off x="3844844" y="1404032"/>
+              <a:ext cx="2128267" cy="597159"/>
+            </a:xfrm>
+            <a:prstGeom prst="rect">
+              <a:avLst/>
+            </a:prstGeom>
+          </p:spPr>
+          <p:style>
+            <a:lnRef idx="2">
+              <a:schemeClr val="accent1">
+                <a:shade val="15000"/>
+              </a:schemeClr>
+            </a:lnRef>
+            <a:fillRef idx="1">
+              <a:schemeClr val="accent1"/>
+            </a:fillRef>
+            <a:effectRef idx="0">
+              <a:schemeClr val="accent1"/>
+            </a:effectRef>
+            <a:fontRef idx="minor">
+              <a:schemeClr val="lt1"/>
+            </a:fontRef>
+          </p:style>
+          <p:txBody>
+            <a:bodyPr rtlCol="0" anchor="ctr"/>
+            <a:lstStyle/>
+            <a:p>
+              <a:pPr algn="ctr"/>
+              <a:r>
+                <a:rPr lang="en-US" dirty="0"/>
+                <a:t>CAM Simulation</a:t>
+              </a:r>
+              <a:endParaRPr lang="en-DE" dirty="0"/>
+            </a:p>
+          </p:txBody>
+        </p:sp>
+        <p:sp>
+          <p:nvSpPr>
+            <p:cNvPr id="6" name="Rectangle 5">
+              <a:extLst>
+                <a:ext uri="{FF2B5EF4-FFF2-40B4-BE49-F238E27FC236}">
+                  <a16:creationId xmlns:a16="http://schemas.microsoft.com/office/drawing/2014/main" id="{EA9F2389-7BD8-70F6-004C-08F2E4F4D9B1}"/>
+                </a:ext>
+              </a:extLst>
+            </p:cNvPr>
+            <p:cNvSpPr/>
+            <p:nvPr/>
+          </p:nvSpPr>
+          <p:spPr>
+            <a:xfrm>
+              <a:off x="3722862" y="2535029"/>
+              <a:ext cx="2373138" cy="539865"/>
+            </a:xfrm>
+            <a:prstGeom prst="rect">
+              <a:avLst/>
+            </a:prstGeom>
+          </p:spPr>
+          <p:style>
+            <a:lnRef idx="2">
+              <a:schemeClr val="accent2">
+                <a:shade val="15000"/>
+              </a:schemeClr>
+            </a:lnRef>
+            <a:fillRef idx="1">
+              <a:schemeClr val="accent2"/>
+            </a:fillRef>
+            <a:effectRef idx="0">
+              <a:schemeClr val="accent2"/>
+            </a:effectRef>
+            <a:fontRef idx="minor">
+              <a:schemeClr val="lt1"/>
+            </a:fontRef>
+          </p:style>
+          <p:txBody>
+            <a:bodyPr rtlCol="0" anchor="ctr"/>
+            <a:lstStyle/>
+            <a:p>
+              <a:pPr algn="ctr"/>
+              <a:r>
+                <a:rPr lang="en-US" dirty="0">
+                  <a:ln w="0"/>
+                  <a:solidFill>
+                    <a:schemeClr val="tx1"/>
+                  </a:solidFill>
+                  <a:effectLst>
+                    <a:outerShdw blurRad="38100" dist="19050" dir="2700000" algn="tl" rotWithShape="0">
+                      <a:schemeClr val="dk1">
+                        <a:alpha val="40000"/>
+                      </a:schemeClr>
+                    </a:outerShdw>
+                  </a:effectLst>
+                </a:rPr>
+                <a:t>Angular position of each joint</a:t>
+              </a:r>
+              <a:endParaRPr lang="en-DE" dirty="0">
+                <a:ln w="0"/>
+                <a:solidFill>
+                  <a:schemeClr val="tx1"/>
+                </a:solidFill>
+                <a:effectLst>
+                  <a:outerShdw blurRad="38100" dist="19050" dir="2700000" algn="tl" rotWithShape="0">
+                    <a:schemeClr val="dk1">
+                      <a:alpha val="40000"/>
+                    </a:schemeClr>
+                  </a:outerShdw>
+                </a:effectLst>
+              </a:endParaRPr>
+            </a:p>
+          </p:txBody>
+        </p:sp>
+        <p:sp>
+          <p:nvSpPr>
+            <p:cNvPr id="7" name="Rectangle 6">
+              <a:extLst>
+                <a:ext uri="{FF2B5EF4-FFF2-40B4-BE49-F238E27FC236}">
+                  <a16:creationId xmlns:a16="http://schemas.microsoft.com/office/drawing/2014/main" id="{3A83BC56-9071-A778-4E0A-0DF8E762BE37}"/>
+                </a:ext>
+              </a:extLst>
+            </p:cNvPr>
+            <p:cNvSpPr/>
+            <p:nvPr/>
+          </p:nvSpPr>
+          <p:spPr>
+            <a:xfrm>
+              <a:off x="817025" y="532469"/>
+              <a:ext cx="2128267" cy="597159"/>
+            </a:xfrm>
+            <a:prstGeom prst="rect">
+              <a:avLst/>
+            </a:prstGeom>
+          </p:spPr>
+          <p:style>
+            <a:lnRef idx="2">
+              <a:schemeClr val="accent4">
+                <a:shade val="15000"/>
+              </a:schemeClr>
+            </a:lnRef>
+            <a:fillRef idx="1">
+              <a:schemeClr val="accent4"/>
+            </a:fillRef>
+            <a:effectRef idx="0">
+              <a:schemeClr val="accent4"/>
+            </a:effectRef>
+            <a:fontRef idx="minor">
+              <a:schemeClr val="lt1"/>
+            </a:fontRef>
+          </p:style>
+          <p:txBody>
+            <a:bodyPr rtlCol="0" anchor="ctr"/>
+            <a:lstStyle/>
+            <a:p>
+              <a:pPr algn="ctr"/>
+              <a:r>
+                <a:rPr lang="en-US" dirty="0">
+                  <a:ln w="0"/>
+                  <a:solidFill>
+                    <a:schemeClr val="tx1"/>
+                  </a:solidFill>
+                  <a:effectLst>
+                    <a:outerShdw blurRad="38100" dist="19050" dir="2700000" algn="tl" rotWithShape="0">
+                      <a:schemeClr val="dk1">
+                        <a:alpha val="40000"/>
+                      </a:schemeClr>
+                    </a:outerShdw>
+                  </a:effectLst>
+                </a:rPr>
+                <a:t>Machine</a:t>
+              </a:r>
+              <a:endParaRPr lang="en-DE" dirty="0">
+                <a:ln w="0"/>
+                <a:solidFill>
+                  <a:schemeClr val="tx1"/>
+                </a:solidFill>
+                <a:effectLst>
+                  <a:outerShdw blurRad="38100" dist="19050" dir="2700000" algn="tl" rotWithShape="0">
+                    <a:schemeClr val="dk1">
+                      <a:alpha val="40000"/>
+                    </a:schemeClr>
+                  </a:outerShdw>
+                </a:effectLst>
+              </a:endParaRPr>
+            </a:p>
+          </p:txBody>
+        </p:sp>
+        <p:sp>
+          <p:nvSpPr>
+            <p:cNvPr id="8" name="Rectangle 7">
+              <a:extLst>
+                <a:ext uri="{FF2B5EF4-FFF2-40B4-BE49-F238E27FC236}">
+                  <a16:creationId xmlns:a16="http://schemas.microsoft.com/office/drawing/2014/main" id="{0408C0F4-B496-A262-A47D-16DBDB975E1C}"/>
+                </a:ext>
+              </a:extLst>
+            </p:cNvPr>
+            <p:cNvSpPr/>
+            <p:nvPr/>
+          </p:nvSpPr>
+          <p:spPr>
+            <a:xfrm>
+              <a:off x="821361" y="1214714"/>
+              <a:ext cx="2128267" cy="597159"/>
+            </a:xfrm>
+            <a:prstGeom prst="rect">
+              <a:avLst/>
+            </a:prstGeom>
+          </p:spPr>
+          <p:style>
+            <a:lnRef idx="2">
+              <a:schemeClr val="accent4">
+                <a:shade val="15000"/>
+              </a:schemeClr>
+            </a:lnRef>
+            <a:fillRef idx="1">
+              <a:schemeClr val="accent4"/>
+            </a:fillRef>
+            <a:effectRef idx="0">
+              <a:schemeClr val="accent4"/>
+            </a:effectRef>
+            <a:fontRef idx="minor">
+              <a:schemeClr val="lt1"/>
+            </a:fontRef>
+          </p:style>
+          <p:txBody>
+            <a:bodyPr rtlCol="0" anchor="ctr"/>
+            <a:lstStyle/>
+            <a:p>
+              <a:pPr algn="ctr"/>
+              <a:r>
+                <a:rPr lang="en-US" dirty="0">
+                  <a:ln w="0"/>
+                  <a:solidFill>
+                    <a:schemeClr val="tx1"/>
+                  </a:solidFill>
+                  <a:effectLst>
+                    <a:outerShdw blurRad="38100" dist="19050" dir="2700000" algn="tl" rotWithShape="0">
+                      <a:schemeClr val="dk1">
+                        <a:alpha val="40000"/>
+                      </a:schemeClr>
+                    </a:outerShdw>
+                  </a:effectLst>
+                </a:rPr>
+                <a:t>Part</a:t>
+              </a:r>
+              <a:endParaRPr lang="en-DE" dirty="0">
+                <a:ln w="0"/>
+                <a:solidFill>
+                  <a:schemeClr val="tx1"/>
+                </a:solidFill>
+                <a:effectLst>
+                  <a:outerShdw blurRad="38100" dist="19050" dir="2700000" algn="tl" rotWithShape="0">
+                    <a:schemeClr val="dk1">
+                      <a:alpha val="40000"/>
+                    </a:schemeClr>
+                  </a:outerShdw>
+                </a:effectLst>
+              </a:endParaRPr>
+            </a:p>
+          </p:txBody>
+        </p:sp>
+        <p:sp>
+          <p:nvSpPr>
+            <p:cNvPr id="9" name="Rectangle 8">
+              <a:extLst>
+                <a:ext uri="{FF2B5EF4-FFF2-40B4-BE49-F238E27FC236}">
+                  <a16:creationId xmlns:a16="http://schemas.microsoft.com/office/drawing/2014/main" id="{D81AC8C3-FD1F-DF15-62AB-D5ED0F35D8BE}"/>
+                </a:ext>
+              </a:extLst>
+            </p:cNvPr>
+            <p:cNvSpPr/>
+            <p:nvPr/>
+          </p:nvSpPr>
+          <p:spPr>
+            <a:xfrm>
+              <a:off x="817025" y="1927327"/>
+              <a:ext cx="2128267" cy="597159"/>
+            </a:xfrm>
+            <a:prstGeom prst="rect">
+              <a:avLst/>
+            </a:prstGeom>
+          </p:spPr>
+          <p:style>
+            <a:lnRef idx="2">
+              <a:schemeClr val="accent4">
+                <a:shade val="15000"/>
+              </a:schemeClr>
+            </a:lnRef>
+            <a:fillRef idx="1">
+              <a:schemeClr val="accent4"/>
+            </a:fillRef>
+            <a:effectRef idx="0">
+              <a:schemeClr val="accent4"/>
+            </a:effectRef>
+            <a:fontRef idx="minor">
+              <a:schemeClr val="lt1"/>
+            </a:fontRef>
+          </p:style>
+          <p:txBody>
+            <a:bodyPr rtlCol="0" anchor="ctr"/>
+            <a:lstStyle/>
+            <a:p>
+              <a:pPr algn="ctr"/>
+              <a:r>
+                <a:rPr lang="en-US" dirty="0">
+                  <a:ln w="0"/>
+                  <a:solidFill>
+                    <a:schemeClr val="tx1"/>
+                  </a:solidFill>
+                  <a:effectLst>
+                    <a:outerShdw blurRad="38100" dist="19050" dir="2700000" algn="tl" rotWithShape="0">
+                      <a:schemeClr val="dk1">
+                        <a:alpha val="40000"/>
+                      </a:schemeClr>
+                    </a:outerShdw>
+                  </a:effectLst>
+                </a:rPr>
+                <a:t>Material</a:t>
+              </a:r>
+              <a:endParaRPr lang="en-DE" dirty="0">
+                <a:ln w="0"/>
+                <a:solidFill>
+                  <a:schemeClr val="tx1"/>
+                </a:solidFill>
+                <a:effectLst>
+                  <a:outerShdw blurRad="38100" dist="19050" dir="2700000" algn="tl" rotWithShape="0">
+                    <a:schemeClr val="dk1">
+                      <a:alpha val="40000"/>
+                    </a:schemeClr>
+                  </a:outerShdw>
+                </a:effectLst>
+              </a:endParaRPr>
+            </a:p>
+          </p:txBody>
+        </p:sp>
+        <p:sp>
+          <p:nvSpPr>
+            <p:cNvPr id="10" name="Rectangle 9">
+              <a:extLst>
+                <a:ext uri="{FF2B5EF4-FFF2-40B4-BE49-F238E27FC236}">
+                  <a16:creationId xmlns:a16="http://schemas.microsoft.com/office/drawing/2014/main" id="{858DFE08-69B1-39DC-056C-D9AFBD44265B}"/>
+                </a:ext>
+              </a:extLst>
+            </p:cNvPr>
+            <p:cNvSpPr/>
+            <p:nvPr/>
+          </p:nvSpPr>
+          <p:spPr>
+            <a:xfrm>
+              <a:off x="3844845" y="545166"/>
+              <a:ext cx="2128267" cy="627644"/>
+            </a:xfrm>
+            <a:prstGeom prst="rect">
+              <a:avLst/>
+            </a:prstGeom>
+          </p:spPr>
+          <p:style>
+            <a:lnRef idx="2">
+              <a:schemeClr val="accent1">
+                <a:shade val="15000"/>
+              </a:schemeClr>
+            </a:lnRef>
+            <a:fillRef idx="1">
+              <a:schemeClr val="accent1"/>
+            </a:fillRef>
+            <a:effectRef idx="0">
+              <a:schemeClr val="accent1"/>
+            </a:effectRef>
+            <a:fontRef idx="minor">
+              <a:schemeClr val="lt1"/>
+            </a:fontRef>
+          </p:style>
+          <p:txBody>
+            <a:bodyPr rtlCol="0" anchor="ctr"/>
+            <a:lstStyle/>
+            <a:p>
+              <a:pPr algn="ctr"/>
+              <a:r>
+                <a:rPr lang="en-US" dirty="0"/>
+                <a:t>Toolpath</a:t>
+              </a:r>
+              <a:endParaRPr lang="en-DE" dirty="0"/>
+            </a:p>
+          </p:txBody>
+        </p:sp>
+        <p:grpSp>
+          <p:nvGrpSpPr>
+            <p:cNvPr id="32" name="Group 31">
+              <a:extLst>
+                <a:ext uri="{FF2B5EF4-FFF2-40B4-BE49-F238E27FC236}">
+                  <a16:creationId xmlns:a16="http://schemas.microsoft.com/office/drawing/2014/main" id="{E2C62916-B883-E930-E17F-FD9004E2427F}"/>
+                </a:ext>
+              </a:extLst>
+            </p:cNvPr>
+            <p:cNvGrpSpPr/>
+            <p:nvPr/>
+          </p:nvGrpSpPr>
+          <p:grpSpPr>
+            <a:xfrm>
+              <a:off x="2525700" y="3783106"/>
+              <a:ext cx="1752589" cy="2752115"/>
+              <a:chOff x="2954114" y="3783106"/>
+              <a:chExt cx="1752589" cy="2752115"/>
+            </a:xfrm>
+          </p:grpSpPr>
+          <p:sp>
+            <p:nvSpPr>
+              <p:cNvPr id="16" name="Rectangle 15">
+                <a:extLst>
+                  <a:ext uri="{FF2B5EF4-FFF2-40B4-BE49-F238E27FC236}">
+                    <a16:creationId xmlns:a16="http://schemas.microsoft.com/office/drawing/2014/main" id="{088D10C2-FE7E-C674-D5F2-0B607552DE7D}"/>
+                  </a:ext>
+                </a:extLst>
+              </p:cNvPr>
+              <p:cNvSpPr/>
+              <p:nvPr/>
+            </p:nvSpPr>
+            <p:spPr>
+              <a:xfrm>
+                <a:off x="2954114" y="3783106"/>
+                <a:ext cx="1752589" cy="2752115"/>
+              </a:xfrm>
+              <a:prstGeom prst="rect">
+                <a:avLst/>
+              </a:prstGeom>
+              <a:solidFill>
+                <a:schemeClr val="bg2">
+                  <a:lumMod val="90000"/>
+                  <a:alpha val="36000"/>
+                </a:schemeClr>
+              </a:solidFill>
+            </p:spPr>
+            <p:style>
+              <a:lnRef idx="2">
+                <a:schemeClr val="accent1">
+                  <a:shade val="15000"/>
+                </a:schemeClr>
+              </a:lnRef>
+              <a:fillRef idx="1">
+                <a:schemeClr val="accent1"/>
+              </a:fillRef>
+              <a:effectRef idx="0">
+                <a:schemeClr val="accent1"/>
+              </a:effectRef>
+              <a:fontRef idx="minor">
+                <a:schemeClr val="lt1"/>
+              </a:fontRef>
+            </p:style>
+            <p:txBody>
+              <a:bodyPr rtlCol="0" anchor="t"/>
+              <a:lstStyle/>
+              <a:p>
+                <a:pPr algn="ctr"/>
+                <a:r>
+                  <a:rPr lang="en-US" dirty="0">
+                    <a:solidFill>
+                      <a:schemeClr val="tx1"/>
+                    </a:solidFill>
+                  </a:rPr>
+                  <a:t>For each joint</a:t>
+                </a:r>
+                <a:endParaRPr lang="en-DE" dirty="0">
+                  <a:solidFill>
+                    <a:schemeClr val="tx1"/>
+                  </a:solidFill>
+                </a:endParaRPr>
+              </a:p>
+            </p:txBody>
+          </p:sp>
+          <p:sp>
+            <p:nvSpPr>
+              <p:cNvPr id="11" name="Rectangle 10">
+                <a:extLst>
+                  <a:ext uri="{FF2B5EF4-FFF2-40B4-BE49-F238E27FC236}">
+                    <a16:creationId xmlns:a16="http://schemas.microsoft.com/office/drawing/2014/main" id="{EA1692FB-3652-0790-A7D1-BD6DFE60FDAD}"/>
+                  </a:ext>
+                </a:extLst>
+              </p:cNvPr>
+              <p:cNvSpPr/>
+              <p:nvPr/>
+            </p:nvSpPr>
+            <p:spPr>
+              <a:xfrm>
+                <a:off x="3115916" y="4198323"/>
+                <a:ext cx="1428989" cy="597159"/>
+              </a:xfrm>
+              <a:prstGeom prst="rect">
+                <a:avLst/>
+              </a:prstGeom>
+            </p:spPr>
+            <p:style>
+              <a:lnRef idx="2">
+                <a:schemeClr val="accent2">
+                  <a:shade val="15000"/>
+                </a:schemeClr>
+              </a:lnRef>
+              <a:fillRef idx="1">
+                <a:schemeClr val="accent2"/>
+              </a:fillRef>
+              <a:effectRef idx="0">
+                <a:schemeClr val="accent2"/>
+              </a:effectRef>
+              <a:fontRef idx="minor">
+                <a:schemeClr val="lt1"/>
+              </a:fontRef>
+            </p:style>
+            <p:txBody>
+              <a:bodyPr rtlCol="0" anchor="ctr"/>
+              <a:lstStyle/>
+              <a:p>
+                <a:pPr algn="ctr"/>
+                <a:r>
+                  <a:rPr lang="en-US" dirty="0">
+                    <a:ln w="0"/>
+                    <a:solidFill>
+                      <a:schemeClr val="tx1"/>
+                    </a:solidFill>
+                    <a:effectLst>
+                      <a:outerShdw blurRad="38100" dist="19050" dir="2700000" algn="tl" rotWithShape="0">
+                        <a:schemeClr val="dk1">
+                          <a:alpha val="40000"/>
+                        </a:schemeClr>
+                      </a:outerShdw>
+                    </a:effectLst>
+                  </a:rPr>
+                  <a:t>Angular velocity</a:t>
+                </a:r>
+                <a:endParaRPr lang="en-DE" dirty="0">
+                  <a:ln w="0"/>
+                  <a:solidFill>
+                    <a:schemeClr val="tx1"/>
+                  </a:solidFill>
+                  <a:effectLst>
+                    <a:outerShdw blurRad="38100" dist="19050" dir="2700000" algn="tl" rotWithShape="0">
+                      <a:schemeClr val="dk1">
+                        <a:alpha val="40000"/>
+                      </a:schemeClr>
+                    </a:outerShdw>
+                  </a:effectLst>
+                </a:endParaRPr>
+              </a:p>
+            </p:txBody>
+          </p:sp>
+          <p:sp>
+            <p:nvSpPr>
+              <p:cNvPr id="12" name="Rectangle 11">
+                <a:extLst>
+                  <a:ext uri="{FF2B5EF4-FFF2-40B4-BE49-F238E27FC236}">
+                    <a16:creationId xmlns:a16="http://schemas.microsoft.com/office/drawing/2014/main" id="{883F5666-6C4A-E2E8-4B09-0B76802AE25C}"/>
+                  </a:ext>
+                </a:extLst>
+              </p:cNvPr>
+              <p:cNvSpPr/>
+              <p:nvPr/>
+            </p:nvSpPr>
+            <p:spPr>
+              <a:xfrm>
+                <a:off x="3115915" y="4971651"/>
+                <a:ext cx="1428989" cy="597159"/>
+              </a:xfrm>
+              <a:prstGeom prst="rect">
+                <a:avLst/>
+              </a:prstGeom>
+            </p:spPr>
+            <p:style>
+              <a:lnRef idx="2">
+                <a:schemeClr val="accent2">
+                  <a:shade val="15000"/>
+                </a:schemeClr>
+              </a:lnRef>
+              <a:fillRef idx="1">
+                <a:schemeClr val="accent2"/>
+              </a:fillRef>
+              <a:effectRef idx="0">
+                <a:schemeClr val="accent2"/>
+              </a:effectRef>
+              <a:fontRef idx="minor">
+                <a:schemeClr val="lt1"/>
+              </a:fontRef>
+            </p:style>
+            <p:txBody>
+              <a:bodyPr rtlCol="0" anchor="ctr"/>
+              <a:lstStyle/>
+              <a:p>
+                <a:pPr algn="ctr"/>
+                <a:r>
+                  <a:rPr lang="en-US" dirty="0">
+                    <a:ln w="0"/>
+                    <a:solidFill>
+                      <a:schemeClr val="tx1"/>
+                    </a:solidFill>
+                    <a:effectLst>
+                      <a:outerShdw blurRad="38100" dist="19050" dir="2700000" algn="tl" rotWithShape="0">
+                        <a:schemeClr val="dk1">
+                          <a:alpha val="40000"/>
+                        </a:schemeClr>
+                      </a:outerShdw>
+                    </a:effectLst>
+                  </a:rPr>
+                  <a:t>Angular acceleration</a:t>
+                </a:r>
+                <a:endParaRPr lang="en-DE" dirty="0">
+                  <a:ln w="0"/>
+                  <a:solidFill>
+                    <a:schemeClr val="tx1"/>
+                  </a:solidFill>
+                  <a:effectLst>
+                    <a:outerShdw blurRad="38100" dist="19050" dir="2700000" algn="tl" rotWithShape="0">
+                      <a:schemeClr val="dk1">
+                        <a:alpha val="40000"/>
+                      </a:schemeClr>
+                    </a:outerShdw>
+                  </a:effectLst>
+                </a:endParaRPr>
+              </a:p>
+            </p:txBody>
+          </p:sp>
+          <p:sp>
+            <p:nvSpPr>
+              <p:cNvPr id="13" name="Rectangle 12">
+                <a:extLst>
+                  <a:ext uri="{FF2B5EF4-FFF2-40B4-BE49-F238E27FC236}">
+                    <a16:creationId xmlns:a16="http://schemas.microsoft.com/office/drawing/2014/main" id="{9032AF3D-725E-5DCC-DA5B-804CD8C9F606}"/>
+                  </a:ext>
+                </a:extLst>
+              </p:cNvPr>
+              <p:cNvSpPr/>
+              <p:nvPr/>
+            </p:nvSpPr>
+            <p:spPr>
+              <a:xfrm>
+                <a:off x="3115915" y="5744979"/>
+                <a:ext cx="1428989" cy="597159"/>
+              </a:xfrm>
+              <a:prstGeom prst="rect">
+                <a:avLst/>
+              </a:prstGeom>
+            </p:spPr>
+            <p:style>
+              <a:lnRef idx="2">
+                <a:schemeClr val="accent2">
+                  <a:shade val="15000"/>
+                </a:schemeClr>
+              </a:lnRef>
+              <a:fillRef idx="1">
+                <a:schemeClr val="accent2"/>
+              </a:fillRef>
+              <a:effectRef idx="0">
+                <a:schemeClr val="accent2"/>
+              </a:effectRef>
+              <a:fontRef idx="minor">
+                <a:schemeClr val="lt1"/>
+              </a:fontRef>
+            </p:style>
+            <p:txBody>
+              <a:bodyPr rtlCol="0" anchor="ctr"/>
+              <a:lstStyle/>
+              <a:p>
+                <a:pPr algn="ctr"/>
+                <a:r>
+                  <a:rPr lang="en-US" dirty="0">
+                    <a:ln w="0"/>
+                    <a:solidFill>
+                      <a:schemeClr val="tx1"/>
+                    </a:solidFill>
+                    <a:effectLst>
+                      <a:outerShdw blurRad="38100" dist="19050" dir="2700000" algn="tl" rotWithShape="0">
+                        <a:schemeClr val="dk1">
+                          <a:alpha val="40000"/>
+                        </a:schemeClr>
+                      </a:outerShdw>
+                    </a:effectLst>
+                  </a:rPr>
+                  <a:t>Angular jerk</a:t>
+                </a:r>
+                <a:endParaRPr lang="en-DE" dirty="0">
+                  <a:ln w="0"/>
+                  <a:solidFill>
+                    <a:schemeClr val="tx1"/>
+                  </a:solidFill>
+                  <a:effectLst>
+                    <a:outerShdw blurRad="38100" dist="19050" dir="2700000" algn="tl" rotWithShape="0">
+                      <a:schemeClr val="dk1">
+                        <a:alpha val="40000"/>
+                      </a:schemeClr>
+                    </a:outerShdw>
+                  </a:effectLst>
+                </a:endParaRPr>
+              </a:p>
+            </p:txBody>
+          </p:sp>
+        </p:grpSp>
+        <p:grpSp>
+          <p:nvGrpSpPr>
+            <p:cNvPr id="33" name="Group 32">
+              <a:extLst>
+                <a:ext uri="{FF2B5EF4-FFF2-40B4-BE49-F238E27FC236}">
+                  <a16:creationId xmlns:a16="http://schemas.microsoft.com/office/drawing/2014/main" id="{5DF71E5D-4C11-4AB6-DF6F-0B851A381CA9}"/>
+                </a:ext>
+              </a:extLst>
+            </p:cNvPr>
+            <p:cNvGrpSpPr/>
+            <p:nvPr/>
+          </p:nvGrpSpPr>
+          <p:grpSpPr>
+            <a:xfrm>
+              <a:off x="4588115" y="3783106"/>
+              <a:ext cx="1945620" cy="2037741"/>
+              <a:chOff x="4881843" y="3783106"/>
+              <a:chExt cx="1945620" cy="2037741"/>
+            </a:xfrm>
+          </p:grpSpPr>
+          <p:sp>
+            <p:nvSpPr>
+              <p:cNvPr id="24" name="Rectangle 23">
+                <a:extLst>
+                  <a:ext uri="{FF2B5EF4-FFF2-40B4-BE49-F238E27FC236}">
+                    <a16:creationId xmlns:a16="http://schemas.microsoft.com/office/drawing/2014/main" id="{2826DA8F-F9B1-CFAE-2FEA-FCB2CD43174A}"/>
+                  </a:ext>
+                </a:extLst>
+              </p:cNvPr>
+              <p:cNvSpPr/>
+              <p:nvPr/>
+            </p:nvSpPr>
+            <p:spPr>
+              <a:xfrm>
+                <a:off x="4881843" y="3783106"/>
+                <a:ext cx="1945620" cy="2037741"/>
+              </a:xfrm>
+              <a:prstGeom prst="rect">
+                <a:avLst/>
+              </a:prstGeom>
+              <a:solidFill>
+                <a:schemeClr val="bg2">
+                  <a:lumMod val="90000"/>
+                  <a:alpha val="36000"/>
+                </a:schemeClr>
+              </a:solidFill>
+            </p:spPr>
+            <p:style>
+              <a:lnRef idx="2">
+                <a:schemeClr val="accent1">
+                  <a:shade val="15000"/>
+                </a:schemeClr>
+              </a:lnRef>
+              <a:fillRef idx="1">
+                <a:schemeClr val="accent1"/>
+              </a:fillRef>
+              <a:effectRef idx="0">
+                <a:schemeClr val="accent1"/>
+              </a:effectRef>
+              <a:fontRef idx="minor">
+                <a:schemeClr val="lt1"/>
+              </a:fontRef>
+            </p:style>
+            <p:txBody>
+              <a:bodyPr rtlCol="0" anchor="t"/>
+              <a:lstStyle/>
+              <a:p>
+                <a:pPr algn="ctr"/>
+                <a:r>
+                  <a:rPr lang="en-US" dirty="0">
+                    <a:solidFill>
+                      <a:schemeClr val="tx1"/>
+                    </a:solidFill>
+                  </a:rPr>
+                  <a:t>X Y Z</a:t>
+                </a:r>
+                <a:endParaRPr lang="en-DE" dirty="0">
+                  <a:solidFill>
+                    <a:schemeClr val="tx1"/>
+                  </a:solidFill>
+                </a:endParaRPr>
+              </a:p>
+            </p:txBody>
+          </p:sp>
+          <p:sp>
+            <p:nvSpPr>
+              <p:cNvPr id="14" name="Rectangle 13">
+                <a:extLst>
+                  <a:ext uri="{FF2B5EF4-FFF2-40B4-BE49-F238E27FC236}">
+                    <a16:creationId xmlns:a16="http://schemas.microsoft.com/office/drawing/2014/main" id="{5EFF137F-9A17-E974-9F68-0AB0E3A1CBFA}"/>
+                  </a:ext>
+                </a:extLst>
+              </p:cNvPr>
+              <p:cNvSpPr/>
+              <p:nvPr/>
+            </p:nvSpPr>
+            <p:spPr>
+              <a:xfrm>
+                <a:off x="5030916" y="4173303"/>
+                <a:ext cx="1642661" cy="597159"/>
+              </a:xfrm>
+              <a:prstGeom prst="rect">
+                <a:avLst/>
+              </a:prstGeom>
+            </p:spPr>
+            <p:style>
+              <a:lnRef idx="2">
+                <a:schemeClr val="accent2">
+                  <a:shade val="15000"/>
+                </a:schemeClr>
+              </a:lnRef>
+              <a:fillRef idx="1">
+                <a:schemeClr val="accent2"/>
+              </a:fillRef>
+              <a:effectRef idx="0">
+                <a:schemeClr val="accent2"/>
+              </a:effectRef>
+              <a:fontRef idx="minor">
+                <a:schemeClr val="lt1"/>
+              </a:fontRef>
+            </p:style>
+            <p:txBody>
+              <a:bodyPr rtlCol="0" anchor="ctr"/>
+              <a:lstStyle/>
+              <a:p>
+                <a:pPr algn="ctr"/>
+                <a:r>
+                  <a:rPr lang="en-US" dirty="0">
+                    <a:ln w="0"/>
+                    <a:solidFill>
+                      <a:schemeClr val="tx1"/>
+                    </a:solidFill>
+                    <a:effectLst>
+                      <a:outerShdw blurRad="38100" dist="19050" dir="2700000" algn="tl" rotWithShape="0">
+                        <a:schemeClr val="dk1">
+                          <a:alpha val="40000"/>
+                        </a:schemeClr>
+                      </a:outerShdw>
+                    </a:effectLst>
+                  </a:rPr>
+                  <a:t>TCP coordinates</a:t>
+                </a:r>
+                <a:endParaRPr lang="en-DE" dirty="0">
+                  <a:ln w="0"/>
+                  <a:solidFill>
+                    <a:schemeClr val="tx1"/>
+                  </a:solidFill>
+                  <a:effectLst>
+                    <a:outerShdw blurRad="38100" dist="19050" dir="2700000" algn="tl" rotWithShape="0">
+                      <a:schemeClr val="dk1">
+                        <a:alpha val="40000"/>
+                      </a:schemeClr>
+                    </a:outerShdw>
+                  </a:effectLst>
+                </a:endParaRPr>
+              </a:p>
+            </p:txBody>
+          </p:sp>
+          <p:sp>
+            <p:nvSpPr>
+              <p:cNvPr id="17" name="Rectangle 16">
+                <a:extLst>
+                  <a:ext uri="{FF2B5EF4-FFF2-40B4-BE49-F238E27FC236}">
+                    <a16:creationId xmlns:a16="http://schemas.microsoft.com/office/drawing/2014/main" id="{8DE282D2-CF98-ACD9-ABDA-6A151F149745}"/>
+                  </a:ext>
+                </a:extLst>
+              </p:cNvPr>
+              <p:cNvSpPr/>
+              <p:nvPr/>
+            </p:nvSpPr>
+            <p:spPr>
+              <a:xfrm>
+                <a:off x="5029577" y="4900467"/>
+                <a:ext cx="1642661" cy="597159"/>
+              </a:xfrm>
+              <a:prstGeom prst="rect">
+                <a:avLst/>
+              </a:prstGeom>
+            </p:spPr>
+            <p:style>
+              <a:lnRef idx="2">
+                <a:schemeClr val="accent2">
+                  <a:shade val="15000"/>
+                </a:schemeClr>
+              </a:lnRef>
+              <a:fillRef idx="1">
+                <a:schemeClr val="accent2"/>
+              </a:fillRef>
+              <a:effectRef idx="0">
+                <a:schemeClr val="accent2"/>
+              </a:effectRef>
+              <a:fontRef idx="minor">
+                <a:schemeClr val="lt1"/>
+              </a:fontRef>
+            </p:style>
+            <p:txBody>
+              <a:bodyPr rtlCol="0" anchor="ctr"/>
+              <a:lstStyle/>
+              <a:p>
+                <a:pPr algn="ctr"/>
+                <a:r>
+                  <a:rPr lang="en-US" dirty="0">
+                    <a:ln w="0"/>
+                    <a:solidFill>
+                      <a:schemeClr val="tx1"/>
+                    </a:solidFill>
+                    <a:effectLst>
+                      <a:outerShdw blurRad="38100" dist="19050" dir="2700000" algn="tl" rotWithShape="0">
+                        <a:schemeClr val="dk1">
+                          <a:alpha val="40000"/>
+                        </a:schemeClr>
+                      </a:outerShdw>
+                    </a:effectLst>
+                  </a:rPr>
+                  <a:t>TCP acceleration</a:t>
+                </a:r>
+                <a:endParaRPr lang="en-DE" dirty="0">
+                  <a:ln w="0"/>
+                  <a:solidFill>
+                    <a:schemeClr val="tx1"/>
+                  </a:solidFill>
+                  <a:effectLst>
+                    <a:outerShdw blurRad="38100" dist="19050" dir="2700000" algn="tl" rotWithShape="0">
+                      <a:schemeClr val="dk1">
+                        <a:alpha val="40000"/>
+                      </a:schemeClr>
+                    </a:outerShdw>
+                  </a:effectLst>
+                </a:endParaRPr>
+              </a:p>
+            </p:txBody>
+          </p:sp>
+        </p:grpSp>
+        <p:grpSp>
+          <p:nvGrpSpPr>
+            <p:cNvPr id="31" name="Group 30">
+              <a:extLst>
+                <a:ext uri="{FF2B5EF4-FFF2-40B4-BE49-F238E27FC236}">
+                  <a16:creationId xmlns:a16="http://schemas.microsoft.com/office/drawing/2014/main" id="{1AC9DAC1-FC6E-5775-38F1-CDFC3C174016}"/>
+                </a:ext>
+              </a:extLst>
+            </p:cNvPr>
+            <p:cNvGrpSpPr/>
+            <p:nvPr/>
+          </p:nvGrpSpPr>
+          <p:grpSpPr>
+            <a:xfrm>
+              <a:off x="406131" y="3783106"/>
+              <a:ext cx="1752589" cy="2057400"/>
+              <a:chOff x="406131" y="3783106"/>
+              <a:chExt cx="1752589" cy="2057400"/>
+            </a:xfrm>
+          </p:grpSpPr>
+          <p:sp>
+            <p:nvSpPr>
+              <p:cNvPr id="15" name="Rectangle 14">
+                <a:extLst>
+                  <a:ext uri="{FF2B5EF4-FFF2-40B4-BE49-F238E27FC236}">
+                    <a16:creationId xmlns:a16="http://schemas.microsoft.com/office/drawing/2014/main" id="{28AFBF65-AABA-3827-92B2-AC107D32A907}"/>
+                  </a:ext>
+                </a:extLst>
+              </p:cNvPr>
+              <p:cNvSpPr/>
+              <p:nvPr/>
+            </p:nvSpPr>
+            <p:spPr>
+              <a:xfrm>
+                <a:off x="406131" y="3783106"/>
+                <a:ext cx="1752589" cy="2057400"/>
+              </a:xfrm>
+              <a:prstGeom prst="rect">
+                <a:avLst/>
+              </a:prstGeom>
+              <a:solidFill>
+                <a:schemeClr val="bg2">
+                  <a:lumMod val="90000"/>
+                  <a:alpha val="36000"/>
+                </a:schemeClr>
+              </a:solidFill>
+            </p:spPr>
+            <p:style>
+              <a:lnRef idx="2">
+                <a:schemeClr val="accent1">
+                  <a:shade val="15000"/>
+                </a:schemeClr>
+              </a:lnRef>
+              <a:fillRef idx="1">
+                <a:schemeClr val="accent1"/>
+              </a:fillRef>
+              <a:effectRef idx="0">
+                <a:schemeClr val="accent1"/>
+              </a:effectRef>
+              <a:fontRef idx="minor">
+                <a:schemeClr val="lt1"/>
+              </a:fontRef>
+            </p:style>
+            <p:txBody>
+              <a:bodyPr rtlCol="0" anchor="t"/>
+              <a:lstStyle/>
+              <a:p>
+                <a:pPr algn="ctr"/>
+                <a:r>
+                  <a:rPr lang="en-US" dirty="0">
+                    <a:solidFill>
+                      <a:schemeClr val="tx1"/>
+                    </a:solidFill>
+                  </a:rPr>
+                  <a:t>For each joint</a:t>
+                </a:r>
+                <a:endParaRPr lang="en-DE" dirty="0">
+                  <a:solidFill>
+                    <a:schemeClr val="tx1"/>
+                  </a:solidFill>
+                </a:endParaRPr>
+              </a:p>
+            </p:txBody>
+          </p:sp>
+          <p:sp>
+            <p:nvSpPr>
+              <p:cNvPr id="22" name="Rectangle 21">
+                <a:extLst>
+                  <a:ext uri="{FF2B5EF4-FFF2-40B4-BE49-F238E27FC236}">
+                    <a16:creationId xmlns:a16="http://schemas.microsoft.com/office/drawing/2014/main" id="{06BCE183-A616-72A2-134F-DB04CEB7CBAB}"/>
+                  </a:ext>
+                </a:extLst>
+              </p:cNvPr>
+              <p:cNvSpPr/>
+              <p:nvPr/>
+            </p:nvSpPr>
+            <p:spPr>
+              <a:xfrm>
+                <a:off x="553344" y="4217982"/>
+                <a:ext cx="1428988" cy="597159"/>
+              </a:xfrm>
+              <a:prstGeom prst="rect">
+                <a:avLst/>
+              </a:prstGeom>
+            </p:spPr>
+            <p:style>
+              <a:lnRef idx="2">
+                <a:schemeClr val="accent2">
+                  <a:shade val="15000"/>
+                </a:schemeClr>
+              </a:lnRef>
+              <a:fillRef idx="1">
+                <a:schemeClr val="accent2"/>
+              </a:fillRef>
+              <a:effectRef idx="0">
+                <a:schemeClr val="accent2"/>
+              </a:effectRef>
+              <a:fontRef idx="minor">
+                <a:schemeClr val="lt1"/>
+              </a:fontRef>
+            </p:style>
+            <p:txBody>
+              <a:bodyPr rtlCol="0" anchor="ctr"/>
+              <a:lstStyle/>
+              <a:p>
+                <a:pPr algn="ctr"/>
+                <a:r>
+                  <a:rPr lang="en-US" dirty="0">
+                    <a:ln w="0"/>
+                    <a:solidFill>
+                      <a:schemeClr val="tx1"/>
+                    </a:solidFill>
+                    <a:effectLst>
+                      <a:outerShdw blurRad="38100" dist="19050" dir="2700000" algn="tl" rotWithShape="0">
+                        <a:schemeClr val="dk1">
+                          <a:alpha val="40000"/>
+                        </a:schemeClr>
+                      </a:outerShdw>
+                    </a:effectLst>
+                  </a:rPr>
+                  <a:t>Direction changes</a:t>
+                </a:r>
+                <a:endParaRPr lang="en-DE" dirty="0">
+                  <a:ln w="0"/>
+                  <a:solidFill>
+                    <a:schemeClr val="tx1"/>
+                  </a:solidFill>
+                  <a:effectLst>
+                    <a:outerShdw blurRad="38100" dist="19050" dir="2700000" algn="tl" rotWithShape="0">
+                      <a:schemeClr val="dk1">
+                        <a:alpha val="40000"/>
+                      </a:schemeClr>
+                    </a:outerShdw>
+                  </a:effectLst>
+                </a:endParaRPr>
+              </a:p>
+            </p:txBody>
+          </p:sp>
+          <p:sp>
+            <p:nvSpPr>
+              <p:cNvPr id="23" name="Rectangle 22">
+                <a:extLst>
+                  <a:ext uri="{FF2B5EF4-FFF2-40B4-BE49-F238E27FC236}">
+                    <a16:creationId xmlns:a16="http://schemas.microsoft.com/office/drawing/2014/main" id="{FE3A0AE2-EEBA-2780-AE4F-E36E4BFF9911}"/>
+                  </a:ext>
+                </a:extLst>
+              </p:cNvPr>
+              <p:cNvSpPr/>
+              <p:nvPr/>
+            </p:nvSpPr>
+            <p:spPr>
+              <a:xfrm>
+                <a:off x="553343" y="4991310"/>
+                <a:ext cx="1428989" cy="597159"/>
+              </a:xfrm>
+              <a:prstGeom prst="rect">
+                <a:avLst/>
+              </a:prstGeom>
+            </p:spPr>
+            <p:style>
+              <a:lnRef idx="2">
+                <a:schemeClr val="accent2">
+                  <a:shade val="15000"/>
+                </a:schemeClr>
+              </a:lnRef>
+              <a:fillRef idx="1">
+                <a:schemeClr val="accent2"/>
+              </a:fillRef>
+              <a:effectRef idx="0">
+                <a:schemeClr val="accent2"/>
+              </a:effectRef>
+              <a:fontRef idx="minor">
+                <a:schemeClr val="lt1"/>
+              </a:fontRef>
+            </p:style>
+            <p:txBody>
+              <a:bodyPr rtlCol="0" anchor="ctr"/>
+              <a:lstStyle/>
+              <a:p>
+                <a:pPr algn="ctr"/>
+                <a:r>
+                  <a:rPr lang="en-US" dirty="0">
+                    <a:ln w="0"/>
+                    <a:solidFill>
+                      <a:schemeClr val="tx1"/>
+                    </a:solidFill>
+                    <a:effectLst>
+                      <a:outerShdw blurRad="38100" dist="19050" dir="2700000" algn="tl" rotWithShape="0">
+                        <a:schemeClr val="dk1">
+                          <a:alpha val="40000"/>
+                        </a:schemeClr>
+                      </a:outerShdw>
+                    </a:effectLst>
+                  </a:rPr>
+                  <a:t>Total travel</a:t>
+                </a:r>
+                <a:endParaRPr lang="en-DE" dirty="0">
+                  <a:ln w="0"/>
+                  <a:solidFill>
+                    <a:schemeClr val="tx1"/>
+                  </a:solidFill>
+                  <a:effectLst>
+                    <a:outerShdw blurRad="38100" dist="19050" dir="2700000" algn="tl" rotWithShape="0">
+                      <a:schemeClr val="dk1">
+                        <a:alpha val="40000"/>
+                      </a:schemeClr>
+                    </a:outerShdw>
+                  </a:effectLst>
+                </a:endParaRPr>
+              </a:p>
+            </p:txBody>
+          </p:sp>
+        </p:grpSp>
+        <p:sp>
+          <p:nvSpPr>
+            <p:cNvPr id="26" name="Rectangle 25">
+              <a:extLst>
+                <a:ext uri="{FF2B5EF4-FFF2-40B4-BE49-F238E27FC236}">
+                  <a16:creationId xmlns:a16="http://schemas.microsoft.com/office/drawing/2014/main" id="{BB879C62-A81E-EAD0-955C-8384DFBC5386}"/>
+                </a:ext>
+              </a:extLst>
+            </p:cNvPr>
+            <p:cNvSpPr/>
+            <p:nvPr/>
+          </p:nvSpPr>
+          <p:spPr>
+            <a:xfrm>
+              <a:off x="7746707" y="1774257"/>
+              <a:ext cx="2128267" cy="597159"/>
+            </a:xfrm>
+            <a:prstGeom prst="rect">
+              <a:avLst/>
+            </a:prstGeom>
+          </p:spPr>
+          <p:style>
+            <a:lnRef idx="2">
+              <a:schemeClr val="accent2">
+                <a:shade val="15000"/>
+              </a:schemeClr>
+            </a:lnRef>
+            <a:fillRef idx="1">
+              <a:schemeClr val="accent2"/>
+            </a:fillRef>
+            <a:effectRef idx="0">
+              <a:schemeClr val="accent2"/>
+            </a:effectRef>
+            <a:fontRef idx="minor">
+              <a:schemeClr val="lt1"/>
+            </a:fontRef>
+          </p:style>
+          <p:txBody>
+            <a:bodyPr rtlCol="0" anchor="ctr"/>
+            <a:lstStyle/>
+            <a:p>
+              <a:pPr algn="ctr"/>
+              <a:r>
+                <a:rPr lang="en-US" dirty="0">
+                  <a:ln w="0"/>
+                  <a:solidFill>
+                    <a:schemeClr val="tx1"/>
+                  </a:solidFill>
+                  <a:effectLst>
+                    <a:outerShdw blurRad="38100" dist="19050" dir="2700000" algn="tl" rotWithShape="0">
+                      <a:schemeClr val="dk1">
+                        <a:alpha val="40000"/>
+                      </a:schemeClr>
+                    </a:outerShdw>
+                  </a:effectLst>
+                </a:rPr>
+                <a:t>Singularity Analysis</a:t>
+              </a:r>
+              <a:endParaRPr lang="en-DE" dirty="0">
+                <a:ln w="0"/>
+                <a:solidFill>
+                  <a:schemeClr val="tx1"/>
+                </a:solidFill>
+                <a:effectLst>
+                  <a:outerShdw blurRad="38100" dist="19050" dir="2700000" algn="tl" rotWithShape="0">
+                    <a:schemeClr val="dk1">
+                      <a:alpha val="40000"/>
+                    </a:schemeClr>
+                  </a:outerShdw>
+                </a:effectLst>
+              </a:endParaRPr>
+            </a:p>
+          </p:txBody>
+        </p:sp>
+        <p:sp>
+          <p:nvSpPr>
+            <p:cNvPr id="27" name="Rectangle 26">
+              <a:extLst>
+                <a:ext uri="{FF2B5EF4-FFF2-40B4-BE49-F238E27FC236}">
+                  <a16:creationId xmlns:a16="http://schemas.microsoft.com/office/drawing/2014/main" id="{76A473ED-4A46-D933-50D7-151EFF96F375}"/>
+                </a:ext>
+              </a:extLst>
+            </p:cNvPr>
+            <p:cNvSpPr/>
+            <p:nvPr/>
+          </p:nvSpPr>
+          <p:spPr>
+            <a:xfrm>
+              <a:off x="7746707" y="866164"/>
+              <a:ext cx="2128267" cy="597159"/>
+            </a:xfrm>
+            <a:prstGeom prst="rect">
+              <a:avLst/>
+            </a:prstGeom>
+          </p:spPr>
+          <p:style>
+            <a:lnRef idx="2">
+              <a:schemeClr val="accent2">
+                <a:shade val="15000"/>
+              </a:schemeClr>
+            </a:lnRef>
+            <a:fillRef idx="1">
+              <a:schemeClr val="accent2"/>
+            </a:fillRef>
+            <a:effectRef idx="0">
+              <a:schemeClr val="accent2"/>
+            </a:effectRef>
+            <a:fontRef idx="minor">
+              <a:schemeClr val="lt1"/>
+            </a:fontRef>
+          </p:style>
+          <p:txBody>
+            <a:bodyPr rtlCol="0" anchor="ctr"/>
+            <a:lstStyle/>
+            <a:p>
+              <a:pPr algn="ctr"/>
+              <a:r>
+                <a:rPr lang="en-US" dirty="0">
+                  <a:ln w="0"/>
+                  <a:solidFill>
+                    <a:schemeClr val="tx1"/>
+                  </a:solidFill>
+                  <a:effectLst>
+                    <a:outerShdw blurRad="38100" dist="19050" dir="2700000" algn="tl" rotWithShape="0">
+                      <a:schemeClr val="dk1">
+                        <a:alpha val="40000"/>
+                      </a:schemeClr>
+                    </a:outerShdw>
+                  </a:effectLst>
+                </a:rPr>
+                <a:t>Cycle time</a:t>
+              </a:r>
+              <a:endParaRPr lang="en-DE" dirty="0">
+                <a:ln w="0"/>
+                <a:solidFill>
+                  <a:schemeClr val="tx1"/>
+                </a:solidFill>
+                <a:effectLst>
+                  <a:outerShdw blurRad="38100" dist="19050" dir="2700000" algn="tl" rotWithShape="0">
+                    <a:schemeClr val="dk1">
+                      <a:alpha val="40000"/>
+                    </a:schemeClr>
+                  </a:outerShdw>
+                </a:effectLst>
+              </a:endParaRPr>
+            </a:p>
+          </p:txBody>
+        </p:sp>
+        <p:grpSp>
+          <p:nvGrpSpPr>
+            <p:cNvPr id="34" name="Group 33">
+              <a:extLst>
+                <a:ext uri="{FF2B5EF4-FFF2-40B4-BE49-F238E27FC236}">
+                  <a16:creationId xmlns:a16="http://schemas.microsoft.com/office/drawing/2014/main" id="{7E8B966E-79F6-ABEE-D8E5-D31B2A31430C}"/>
+                </a:ext>
+              </a:extLst>
+            </p:cNvPr>
+            <p:cNvGrpSpPr/>
+            <p:nvPr/>
+          </p:nvGrpSpPr>
+          <p:grpSpPr>
+            <a:xfrm>
+              <a:off x="6843561" y="3783106"/>
+              <a:ext cx="3934563" cy="2609851"/>
+              <a:chOff x="7054972" y="3783106"/>
+              <a:chExt cx="3934563" cy="2609851"/>
+            </a:xfrm>
+          </p:grpSpPr>
+          <p:sp>
+            <p:nvSpPr>
+              <p:cNvPr id="21" name="Rectangle 20">
+                <a:extLst>
+                  <a:ext uri="{FF2B5EF4-FFF2-40B4-BE49-F238E27FC236}">
+                    <a16:creationId xmlns:a16="http://schemas.microsoft.com/office/drawing/2014/main" id="{55CE4CEA-72A4-D8B2-DEDF-CB90EC714716}"/>
+                  </a:ext>
+                </a:extLst>
+              </p:cNvPr>
+              <p:cNvSpPr/>
+              <p:nvPr/>
+            </p:nvSpPr>
+            <p:spPr>
+              <a:xfrm>
+                <a:off x="7054972" y="3783106"/>
+                <a:ext cx="3934563" cy="2609851"/>
+              </a:xfrm>
+              <a:prstGeom prst="rect">
+                <a:avLst/>
+              </a:prstGeom>
+              <a:solidFill>
+                <a:schemeClr val="bg2">
+                  <a:lumMod val="90000"/>
+                  <a:alpha val="36000"/>
+                </a:schemeClr>
+              </a:solidFill>
+            </p:spPr>
+            <p:style>
+              <a:lnRef idx="2">
+                <a:schemeClr val="accent1">
+                  <a:shade val="15000"/>
+                </a:schemeClr>
+              </a:lnRef>
+              <a:fillRef idx="1">
+                <a:schemeClr val="accent1"/>
+              </a:fillRef>
+              <a:effectRef idx="0">
+                <a:schemeClr val="accent1"/>
+              </a:effectRef>
+              <a:fontRef idx="minor">
+                <a:schemeClr val="lt1"/>
+              </a:fontRef>
+            </p:style>
+            <p:txBody>
+              <a:bodyPr rtlCol="0" anchor="t"/>
+              <a:lstStyle/>
+              <a:p>
+                <a:pPr algn="ctr"/>
+                <a:endParaRPr lang="en-DE" dirty="0">
+                  <a:solidFill>
+                    <a:schemeClr val="tx1"/>
+                  </a:solidFill>
+                </a:endParaRPr>
+              </a:p>
+            </p:txBody>
+          </p:sp>
+          <p:sp>
+            <p:nvSpPr>
+              <p:cNvPr id="2" name="Rectangle 1">
+                <a:extLst>
+                  <a:ext uri="{FF2B5EF4-FFF2-40B4-BE49-F238E27FC236}">
+                    <a16:creationId xmlns:a16="http://schemas.microsoft.com/office/drawing/2014/main" id="{40FA7018-D17C-28F8-8ED2-8558F0F9AAC8}"/>
+                  </a:ext>
+                </a:extLst>
+              </p:cNvPr>
+              <p:cNvSpPr/>
+              <p:nvPr/>
+            </p:nvSpPr>
+            <p:spPr>
+              <a:xfrm>
+                <a:off x="7204403" y="4935902"/>
+                <a:ext cx="1428989" cy="597159"/>
+              </a:xfrm>
+              <a:prstGeom prst="rect">
+                <a:avLst/>
+              </a:prstGeom>
+            </p:spPr>
+            <p:style>
+              <a:lnRef idx="2">
+                <a:schemeClr val="accent2">
+                  <a:shade val="15000"/>
+                </a:schemeClr>
+              </a:lnRef>
+              <a:fillRef idx="1">
+                <a:schemeClr val="accent2"/>
+              </a:fillRef>
+              <a:effectRef idx="0">
+                <a:schemeClr val="accent2"/>
+              </a:effectRef>
+              <a:fontRef idx="minor">
+                <a:schemeClr val="lt1"/>
+              </a:fontRef>
+            </p:style>
+            <p:txBody>
+              <a:bodyPr rtlCol="0" anchor="ctr"/>
+              <a:lstStyle/>
+              <a:p>
+                <a:pPr algn="ctr"/>
+                <a:r>
+                  <a:rPr lang="en-US" dirty="0">
+                    <a:ln w="0"/>
+                    <a:solidFill>
+                      <a:schemeClr val="tx1"/>
+                    </a:solidFill>
+                    <a:effectLst>
+                      <a:outerShdw blurRad="38100" dist="19050" dir="2700000" algn="tl" rotWithShape="0">
+                        <a:schemeClr val="dk1">
+                          <a:alpha val="40000"/>
+                        </a:schemeClr>
+                      </a:outerShdw>
+                    </a:effectLst>
+                  </a:rPr>
+                  <a:t>Stiffness value</a:t>
+                </a:r>
+                <a:endParaRPr lang="en-DE" dirty="0">
+                  <a:ln w="0"/>
+                  <a:solidFill>
+                    <a:schemeClr val="tx1"/>
+                  </a:solidFill>
+                  <a:effectLst>
+                    <a:outerShdw blurRad="38100" dist="19050" dir="2700000" algn="tl" rotWithShape="0">
+                      <a:schemeClr val="dk1">
+                        <a:alpha val="40000"/>
+                      </a:schemeClr>
+                    </a:outerShdw>
+                  </a:effectLst>
+                </a:endParaRPr>
+              </a:p>
+            </p:txBody>
+          </p:sp>
+          <p:sp>
+            <p:nvSpPr>
+              <p:cNvPr id="3" name="Rectangle 2">
+                <a:extLst>
+                  <a:ext uri="{FF2B5EF4-FFF2-40B4-BE49-F238E27FC236}">
+                    <a16:creationId xmlns:a16="http://schemas.microsoft.com/office/drawing/2014/main" id="{03EB9A2C-9729-900A-BA39-432DCABD4CA8}"/>
+                  </a:ext>
+                </a:extLst>
+              </p:cNvPr>
+              <p:cNvSpPr/>
+              <p:nvPr/>
+            </p:nvSpPr>
+            <p:spPr>
+              <a:xfrm>
+                <a:off x="8824168" y="4935901"/>
+                <a:ext cx="1945620" cy="597159"/>
+              </a:xfrm>
+              <a:prstGeom prst="rect">
+                <a:avLst/>
+              </a:prstGeom>
+            </p:spPr>
+            <p:style>
+              <a:lnRef idx="2">
+                <a:schemeClr val="accent2">
+                  <a:shade val="15000"/>
+                </a:schemeClr>
+              </a:lnRef>
+              <a:fillRef idx="1">
+                <a:schemeClr val="accent2"/>
+              </a:fillRef>
+              <a:effectRef idx="0">
+                <a:schemeClr val="accent2"/>
+              </a:effectRef>
+              <a:fontRef idx="minor">
+                <a:schemeClr val="lt1"/>
+              </a:fontRef>
+            </p:style>
+            <p:txBody>
+              <a:bodyPr rtlCol="0" anchor="ctr"/>
+              <a:lstStyle/>
+              <a:p>
+                <a:pPr algn="ctr"/>
+                <a:r>
+                  <a:rPr lang="en-US" dirty="0">
+                    <a:ln w="0"/>
+                    <a:solidFill>
+                      <a:schemeClr val="tx1"/>
+                    </a:solidFill>
+                    <a:effectLst>
+                      <a:outerShdw blurRad="38100" dist="19050" dir="2700000" algn="tl" rotWithShape="0">
+                        <a:schemeClr val="dk1">
+                          <a:alpha val="40000"/>
+                        </a:schemeClr>
+                      </a:outerShdw>
+                    </a:effectLst>
+                  </a:rPr>
+                  <a:t>Continuous energy usage</a:t>
+                </a:r>
+                <a:endParaRPr lang="en-DE" dirty="0">
+                  <a:ln w="0"/>
+                  <a:solidFill>
+                    <a:schemeClr val="tx1"/>
+                  </a:solidFill>
+                  <a:effectLst>
+                    <a:outerShdw blurRad="38100" dist="19050" dir="2700000" algn="tl" rotWithShape="0">
+                      <a:schemeClr val="dk1">
+                        <a:alpha val="40000"/>
+                      </a:schemeClr>
+                    </a:outerShdw>
+                  </a:effectLst>
+                </a:endParaRPr>
+              </a:p>
+            </p:txBody>
+          </p:sp>
+          <p:sp>
+            <p:nvSpPr>
+              <p:cNvPr id="5" name="Rectangle 4">
+                <a:extLst>
+                  <a:ext uri="{FF2B5EF4-FFF2-40B4-BE49-F238E27FC236}">
+                    <a16:creationId xmlns:a16="http://schemas.microsoft.com/office/drawing/2014/main" id="{7A335642-08FB-73FB-7E5A-0F30DCCE7C83}"/>
+                  </a:ext>
+                </a:extLst>
+              </p:cNvPr>
+              <p:cNvSpPr/>
+              <p:nvPr/>
+            </p:nvSpPr>
+            <p:spPr>
+              <a:xfrm>
+                <a:off x="8824168" y="5693166"/>
+                <a:ext cx="1945620" cy="597159"/>
+              </a:xfrm>
+              <a:prstGeom prst="rect">
+                <a:avLst/>
+              </a:prstGeom>
+            </p:spPr>
+            <p:style>
+              <a:lnRef idx="2">
+                <a:schemeClr val="accent2">
+                  <a:shade val="15000"/>
+                </a:schemeClr>
+              </a:lnRef>
+              <a:fillRef idx="1">
+                <a:schemeClr val="accent2"/>
+              </a:fillRef>
+              <a:effectRef idx="0">
+                <a:schemeClr val="accent2"/>
+              </a:effectRef>
+              <a:fontRef idx="minor">
+                <a:schemeClr val="lt1"/>
+              </a:fontRef>
+            </p:style>
+            <p:txBody>
+              <a:bodyPr rtlCol="0" anchor="ctr"/>
+              <a:lstStyle/>
+              <a:p>
+                <a:pPr algn="ctr"/>
+                <a:r>
+                  <a:rPr lang="en-US" dirty="0">
+                    <a:ln w="0"/>
+                    <a:solidFill>
+                      <a:schemeClr val="tx1"/>
+                    </a:solidFill>
+                    <a:effectLst>
+                      <a:outerShdw blurRad="38100" dist="19050" dir="2700000" algn="tl" rotWithShape="0">
+                        <a:schemeClr val="dk1">
+                          <a:alpha val="40000"/>
+                        </a:schemeClr>
+                      </a:outerShdw>
+                    </a:effectLst>
+                  </a:rPr>
+                  <a:t>Total energy usage</a:t>
+                </a:r>
+                <a:endParaRPr lang="en-DE" dirty="0">
+                  <a:ln w="0"/>
+                  <a:solidFill>
+                    <a:schemeClr val="tx1"/>
+                  </a:solidFill>
+                  <a:effectLst>
+                    <a:outerShdw blurRad="38100" dist="19050" dir="2700000" algn="tl" rotWithShape="0">
+                      <a:schemeClr val="dk1">
+                        <a:alpha val="40000"/>
+                      </a:schemeClr>
+                    </a:outerShdw>
+                  </a:effectLst>
+                </a:endParaRPr>
+              </a:p>
+            </p:txBody>
+          </p:sp>
+          <p:sp>
+            <p:nvSpPr>
+              <p:cNvPr id="29" name="Rectangle 28">
+                <a:extLst>
+                  <a:ext uri="{FF2B5EF4-FFF2-40B4-BE49-F238E27FC236}">
+                    <a16:creationId xmlns:a16="http://schemas.microsoft.com/office/drawing/2014/main" id="{C4289430-CEC9-7FC9-23B0-8CFACCA22364}"/>
+                  </a:ext>
+                </a:extLst>
+              </p:cNvPr>
+              <p:cNvSpPr/>
+              <p:nvPr/>
+            </p:nvSpPr>
+            <p:spPr>
+              <a:xfrm>
+                <a:off x="7958119" y="3948673"/>
+                <a:ext cx="2128267" cy="597159"/>
+              </a:xfrm>
+              <a:prstGeom prst="rect">
+                <a:avLst/>
+              </a:prstGeom>
+            </p:spPr>
+            <p:style>
+              <a:lnRef idx="2">
+                <a:schemeClr val="accent1">
+                  <a:shade val="15000"/>
+                </a:schemeClr>
+              </a:lnRef>
+              <a:fillRef idx="1">
+                <a:schemeClr val="accent1"/>
+              </a:fillRef>
+              <a:effectRef idx="0">
+                <a:schemeClr val="accent1"/>
+              </a:effectRef>
+              <a:fontRef idx="minor">
+                <a:schemeClr val="lt1"/>
+              </a:fontRef>
+            </p:style>
+            <p:txBody>
+              <a:bodyPr rtlCol="0" anchor="ctr"/>
+              <a:lstStyle/>
+              <a:p>
+                <a:pPr algn="ctr"/>
+                <a:r>
+                  <a:rPr lang="en-US" dirty="0"/>
+                  <a:t>FE + MBS Simulation</a:t>
+                </a:r>
+                <a:endParaRPr lang="en-DE" dirty="0"/>
+              </a:p>
+            </p:txBody>
+          </p:sp>
+        </p:grpSp>
+        <p:cxnSp>
+          <p:nvCxnSpPr>
+            <p:cNvPr id="41" name="Connector: Elbow 40">
+              <a:extLst>
+                <a:ext uri="{FF2B5EF4-FFF2-40B4-BE49-F238E27FC236}">
+                  <a16:creationId xmlns:a16="http://schemas.microsoft.com/office/drawing/2014/main" id="{C005DB67-268F-E745-CE94-4250610D3A97}"/>
+                </a:ext>
+              </a:extLst>
+            </p:cNvPr>
+            <p:cNvCxnSpPr>
+              <a:stCxn id="28" idx="3"/>
+              <a:endCxn id="10" idx="0"/>
+            </p:cNvCxnSpPr>
+            <p:nvPr/>
+          </p:nvCxnSpPr>
+          <p:spPr>
+            <a:xfrm flipV="1">
+              <a:off x="3042154" y="545166"/>
+              <a:ext cx="1866825" cy="992746"/>
+            </a:xfrm>
+            <a:prstGeom prst="bentConnector4">
+              <a:avLst>
+                <a:gd name="adj1" fmla="val 21499"/>
+                <a:gd name="adj2" fmla="val 138119"/>
+              </a:avLst>
+            </a:prstGeom>
+            <a:ln>
+              <a:tailEnd type="triangle"/>
+            </a:ln>
+          </p:spPr>
+          <p:style>
+            <a:lnRef idx="1">
+              <a:schemeClr val="accent1"/>
+            </a:lnRef>
+            <a:fillRef idx="0">
+              <a:schemeClr val="accent1"/>
+            </a:fillRef>
+            <a:effectRef idx="0">
+              <a:schemeClr val="accent1"/>
+            </a:effectRef>
+            <a:fontRef idx="minor">
+              <a:schemeClr val="tx1"/>
+            </a:fontRef>
+          </p:style>
+        </p:cxnSp>
+        <p:cxnSp>
+          <p:nvCxnSpPr>
+            <p:cNvPr id="43" name="Straight Arrow Connector 42">
+              <a:extLst>
+                <a:ext uri="{FF2B5EF4-FFF2-40B4-BE49-F238E27FC236}">
+                  <a16:creationId xmlns:a16="http://schemas.microsoft.com/office/drawing/2014/main" id="{325B8746-8F30-ADAD-AD7C-9E96C8742BC1}"/>
+                </a:ext>
+              </a:extLst>
+            </p:cNvPr>
+            <p:cNvCxnSpPr>
+              <a:cxnSpLocks/>
+              <a:stCxn id="10" idx="2"/>
+              <a:endCxn id="4" idx="0"/>
+            </p:cNvCxnSpPr>
+            <p:nvPr/>
+          </p:nvCxnSpPr>
+          <p:spPr>
+            <a:xfrm flipH="1">
+              <a:off x="4908978" y="1172810"/>
+              <a:ext cx="1" cy="231222"/>
+            </a:xfrm>
+            <a:prstGeom prst="straightConnector1">
+              <a:avLst/>
+            </a:prstGeom>
+            <a:ln>
+              <a:tailEnd type="triangle"/>
+            </a:ln>
+          </p:spPr>
+          <p:style>
+            <a:lnRef idx="1">
+              <a:schemeClr val="accent1"/>
+            </a:lnRef>
+            <a:fillRef idx="0">
+              <a:schemeClr val="accent1"/>
+            </a:fillRef>
+            <a:effectRef idx="0">
+              <a:schemeClr val="accent1"/>
+            </a:effectRef>
+            <a:fontRef idx="minor">
+              <a:schemeClr val="tx1"/>
+            </a:fontRef>
+          </p:style>
+        </p:cxnSp>
+        <p:cxnSp>
+          <p:nvCxnSpPr>
+            <p:cNvPr id="47" name="Straight Arrow Connector 46">
+              <a:extLst>
+                <a:ext uri="{FF2B5EF4-FFF2-40B4-BE49-F238E27FC236}">
+                  <a16:creationId xmlns:a16="http://schemas.microsoft.com/office/drawing/2014/main" id="{4FBFDF2C-920A-0E02-21BB-D5B6FA5F940D}"/>
+                </a:ext>
+              </a:extLst>
+            </p:cNvPr>
+            <p:cNvCxnSpPr>
+              <a:stCxn id="4" idx="2"/>
+              <a:endCxn id="6" idx="0"/>
+            </p:cNvCxnSpPr>
+            <p:nvPr/>
+          </p:nvCxnSpPr>
+          <p:spPr>
+            <a:xfrm>
+              <a:off x="4908978" y="2001191"/>
+              <a:ext cx="453" cy="533838"/>
+            </a:xfrm>
+            <a:prstGeom prst="straightConnector1">
+              <a:avLst/>
+            </a:prstGeom>
+            <a:ln>
+              <a:tailEnd type="triangle"/>
+            </a:ln>
+          </p:spPr>
+          <p:style>
+            <a:lnRef idx="1">
+              <a:schemeClr val="accent1"/>
+            </a:lnRef>
+            <a:fillRef idx="0">
+              <a:schemeClr val="accent1"/>
+            </a:fillRef>
+            <a:effectRef idx="0">
+              <a:schemeClr val="accent1"/>
+            </a:effectRef>
+            <a:fontRef idx="minor">
+              <a:schemeClr val="tx1"/>
+            </a:fontRef>
+          </p:style>
+        </p:cxnSp>
+        <p:cxnSp>
+          <p:nvCxnSpPr>
+            <p:cNvPr id="49" name="Connector: Elbow 48">
+              <a:extLst>
+                <a:ext uri="{FF2B5EF4-FFF2-40B4-BE49-F238E27FC236}">
+                  <a16:creationId xmlns:a16="http://schemas.microsoft.com/office/drawing/2014/main" id="{BB3CE74F-F05D-45E4-3908-DA3942889F89}"/>
+                </a:ext>
+              </a:extLst>
+            </p:cNvPr>
+            <p:cNvCxnSpPr>
+              <a:stCxn id="6" idx="2"/>
+              <a:endCxn id="15" idx="0"/>
+            </p:cNvCxnSpPr>
+            <p:nvPr/>
+          </p:nvCxnSpPr>
+          <p:spPr>
+            <a:xfrm rot="5400000">
+              <a:off x="2741823" y="1615498"/>
+              <a:ext cx="708212" cy="3627005"/>
+            </a:xfrm>
+            <a:prstGeom prst="bentConnector3">
+              <a:avLst/>
+            </a:prstGeom>
+            <a:ln>
+              <a:tailEnd type="triangle"/>
+            </a:ln>
+          </p:spPr>
+          <p:style>
+            <a:lnRef idx="1">
+              <a:schemeClr val="accent1"/>
+            </a:lnRef>
+            <a:fillRef idx="0">
+              <a:schemeClr val="accent1"/>
+            </a:fillRef>
+            <a:effectRef idx="0">
+              <a:schemeClr val="accent1"/>
+            </a:effectRef>
+            <a:fontRef idx="minor">
+              <a:schemeClr val="tx1"/>
+            </a:fontRef>
+          </p:style>
+        </p:cxnSp>
+        <p:cxnSp>
+          <p:nvCxnSpPr>
+            <p:cNvPr id="51" name="Connector: Elbow 50">
+              <a:extLst>
+                <a:ext uri="{FF2B5EF4-FFF2-40B4-BE49-F238E27FC236}">
+                  <a16:creationId xmlns:a16="http://schemas.microsoft.com/office/drawing/2014/main" id="{8A70E0A0-315B-0616-9BDA-F1637135DDA9}"/>
+                </a:ext>
+              </a:extLst>
+            </p:cNvPr>
+            <p:cNvCxnSpPr>
+              <a:stCxn id="6" idx="2"/>
+              <a:endCxn id="24" idx="0"/>
+            </p:cNvCxnSpPr>
+            <p:nvPr/>
+          </p:nvCxnSpPr>
+          <p:spPr>
+            <a:xfrm rot="16200000" flipH="1">
+              <a:off x="4881072" y="3103253"/>
+              <a:ext cx="708212" cy="651494"/>
+            </a:xfrm>
+            <a:prstGeom prst="bentConnector3">
+              <a:avLst/>
+            </a:prstGeom>
+            <a:ln>
+              <a:tailEnd type="triangle"/>
+            </a:ln>
+          </p:spPr>
+          <p:style>
+            <a:lnRef idx="1">
+              <a:schemeClr val="accent1"/>
+            </a:lnRef>
+            <a:fillRef idx="0">
+              <a:schemeClr val="accent1"/>
+            </a:fillRef>
+            <a:effectRef idx="0">
+              <a:schemeClr val="accent1"/>
+            </a:effectRef>
+            <a:fontRef idx="minor">
+              <a:schemeClr val="tx1"/>
+            </a:fontRef>
+          </p:style>
+        </p:cxnSp>
+        <p:cxnSp>
+          <p:nvCxnSpPr>
+            <p:cNvPr id="53" name="Connector: Elbow 52">
+              <a:extLst>
+                <a:ext uri="{FF2B5EF4-FFF2-40B4-BE49-F238E27FC236}">
+                  <a16:creationId xmlns:a16="http://schemas.microsoft.com/office/drawing/2014/main" id="{D540BE21-FFAC-3C35-A206-6FCD4C1335E8}"/>
+                </a:ext>
+              </a:extLst>
+            </p:cNvPr>
+            <p:cNvCxnSpPr>
+              <a:stCxn id="6" idx="2"/>
+              <a:endCxn id="16" idx="0"/>
+            </p:cNvCxnSpPr>
+            <p:nvPr/>
+          </p:nvCxnSpPr>
+          <p:spPr>
+            <a:xfrm rot="5400000">
+              <a:off x="3801607" y="2675282"/>
+              <a:ext cx="708212" cy="1507436"/>
+            </a:xfrm>
+            <a:prstGeom prst="bentConnector3">
+              <a:avLst/>
+            </a:prstGeom>
+            <a:ln>
+              <a:tailEnd type="triangle"/>
+            </a:ln>
+          </p:spPr>
+          <p:style>
+            <a:lnRef idx="1">
+              <a:schemeClr val="accent1"/>
+            </a:lnRef>
+            <a:fillRef idx="0">
+              <a:schemeClr val="accent1"/>
+            </a:fillRef>
+            <a:effectRef idx="0">
+              <a:schemeClr val="accent1"/>
+            </a:effectRef>
+            <a:fontRef idx="minor">
+              <a:schemeClr val="tx1"/>
+            </a:fontRef>
+          </p:style>
+        </p:cxnSp>
+        <p:cxnSp>
+          <p:nvCxnSpPr>
+            <p:cNvPr id="55" name="Connector: Elbow 54">
+              <a:extLst>
+                <a:ext uri="{FF2B5EF4-FFF2-40B4-BE49-F238E27FC236}">
+                  <a16:creationId xmlns:a16="http://schemas.microsoft.com/office/drawing/2014/main" id="{542FF1C2-4941-733D-60F0-583390587582}"/>
+                </a:ext>
+              </a:extLst>
+            </p:cNvPr>
+            <p:cNvCxnSpPr>
+              <a:stCxn id="6" idx="3"/>
+              <a:endCxn id="29" idx="0"/>
+            </p:cNvCxnSpPr>
+            <p:nvPr/>
+          </p:nvCxnSpPr>
+          <p:spPr>
+            <a:xfrm>
+              <a:off x="6096000" y="2804962"/>
+              <a:ext cx="2714842" cy="1143711"/>
+            </a:xfrm>
+            <a:prstGeom prst="bentConnector2">
+              <a:avLst/>
+            </a:prstGeom>
+            <a:ln>
+              <a:tailEnd type="triangle"/>
+            </a:ln>
+          </p:spPr>
+          <p:style>
+            <a:lnRef idx="1">
+              <a:schemeClr val="accent1"/>
+            </a:lnRef>
+            <a:fillRef idx="0">
+              <a:schemeClr val="accent1"/>
+            </a:fillRef>
+            <a:effectRef idx="0">
+              <a:schemeClr val="accent1"/>
+            </a:effectRef>
+            <a:fontRef idx="minor">
+              <a:schemeClr val="tx1"/>
+            </a:fontRef>
+          </p:style>
+        </p:cxnSp>
+        <p:cxnSp>
+          <p:nvCxnSpPr>
+            <p:cNvPr id="59" name="Connector: Elbow 58">
+              <a:extLst>
+                <a:ext uri="{FF2B5EF4-FFF2-40B4-BE49-F238E27FC236}">
+                  <a16:creationId xmlns:a16="http://schemas.microsoft.com/office/drawing/2014/main" id="{285024C9-751D-5779-B765-179B17002AE4}"/>
+                </a:ext>
+              </a:extLst>
+            </p:cNvPr>
+            <p:cNvCxnSpPr>
+              <a:stCxn id="29" idx="2"/>
+              <a:endCxn id="2" idx="0"/>
+            </p:cNvCxnSpPr>
+            <p:nvPr/>
+          </p:nvCxnSpPr>
+          <p:spPr>
+            <a:xfrm rot="5400000">
+              <a:off x="8064130" y="4189190"/>
+              <a:ext cx="390070" cy="1103355"/>
+            </a:xfrm>
+            <a:prstGeom prst="bentConnector3">
+              <a:avLst>
+                <a:gd name="adj1" fmla="val 50000"/>
+              </a:avLst>
+            </a:prstGeom>
+            <a:ln>
+              <a:tailEnd type="triangle"/>
+            </a:ln>
+          </p:spPr>
+          <p:style>
+            <a:lnRef idx="1">
+              <a:schemeClr val="accent1"/>
+            </a:lnRef>
+            <a:fillRef idx="0">
+              <a:schemeClr val="accent1"/>
+            </a:fillRef>
+            <a:effectRef idx="0">
+              <a:schemeClr val="accent1"/>
+            </a:effectRef>
+            <a:fontRef idx="minor">
+              <a:schemeClr val="tx1"/>
+            </a:fontRef>
+          </p:style>
+        </p:cxnSp>
+        <p:cxnSp>
+          <p:nvCxnSpPr>
+            <p:cNvPr id="65" name="Connector: Elbow 64">
+              <a:extLst>
+                <a:ext uri="{FF2B5EF4-FFF2-40B4-BE49-F238E27FC236}">
+                  <a16:creationId xmlns:a16="http://schemas.microsoft.com/office/drawing/2014/main" id="{188A4E89-F1D8-12AC-D253-6E9392C8A180}"/>
+                </a:ext>
+              </a:extLst>
+            </p:cNvPr>
+            <p:cNvCxnSpPr>
+              <a:cxnSpLocks/>
+              <a:stCxn id="29" idx="2"/>
+              <a:endCxn id="3" idx="0"/>
+            </p:cNvCxnSpPr>
+            <p:nvPr/>
+          </p:nvCxnSpPr>
+          <p:spPr>
+            <a:xfrm rot="16200000" flipH="1">
+              <a:off x="9003170" y="4353503"/>
+              <a:ext cx="390069" cy="774725"/>
+            </a:xfrm>
+            <a:prstGeom prst="bentConnector3">
+              <a:avLst>
+                <a:gd name="adj1" fmla="val 50000"/>
+              </a:avLst>
+            </a:prstGeom>
+            <a:ln>
+              <a:tailEnd type="triangle"/>
+            </a:ln>
+          </p:spPr>
+          <p:style>
+            <a:lnRef idx="1">
+              <a:schemeClr val="accent1"/>
+            </a:lnRef>
+            <a:fillRef idx="0">
+              <a:schemeClr val="accent1"/>
+            </a:fillRef>
+            <a:effectRef idx="0">
+              <a:schemeClr val="accent1"/>
+            </a:effectRef>
+            <a:fontRef idx="minor">
+              <a:schemeClr val="tx1"/>
+            </a:fontRef>
+          </p:style>
+        </p:cxnSp>
+        <p:cxnSp>
+          <p:nvCxnSpPr>
+            <p:cNvPr id="78" name="Straight Arrow Connector 77">
+              <a:extLst>
+                <a:ext uri="{FF2B5EF4-FFF2-40B4-BE49-F238E27FC236}">
+                  <a16:creationId xmlns:a16="http://schemas.microsoft.com/office/drawing/2014/main" id="{A7E78311-3943-1113-1BBB-FA85D4F6A25C}"/>
+                </a:ext>
+              </a:extLst>
+            </p:cNvPr>
+            <p:cNvCxnSpPr>
+              <a:stCxn id="3" idx="2"/>
+              <a:endCxn id="5" idx="0"/>
+            </p:cNvCxnSpPr>
+            <p:nvPr/>
+          </p:nvCxnSpPr>
+          <p:spPr>
+            <a:xfrm>
+              <a:off x="9585567" y="5533060"/>
+              <a:ext cx="0" cy="160106"/>
+            </a:xfrm>
+            <a:prstGeom prst="straightConnector1">
+              <a:avLst/>
+            </a:prstGeom>
+            <a:ln>
+              <a:tailEnd type="triangle"/>
+            </a:ln>
+          </p:spPr>
+          <p:style>
+            <a:lnRef idx="1">
+              <a:schemeClr val="accent1"/>
+            </a:lnRef>
+            <a:fillRef idx="0">
+              <a:schemeClr val="accent1"/>
+            </a:fillRef>
+            <a:effectRef idx="0">
+              <a:schemeClr val="accent1"/>
+            </a:effectRef>
+            <a:fontRef idx="minor">
+              <a:schemeClr val="tx1"/>
+            </a:fontRef>
+          </p:style>
+        </p:cxnSp>
+        <p:cxnSp>
+          <p:nvCxnSpPr>
+            <p:cNvPr id="80" name="Connector: Elbow 79">
+              <a:extLst>
+                <a:ext uri="{FF2B5EF4-FFF2-40B4-BE49-F238E27FC236}">
+                  <a16:creationId xmlns:a16="http://schemas.microsoft.com/office/drawing/2014/main" id="{27E7190B-572E-9338-0F81-82625D7A6FED}"/>
+                </a:ext>
+              </a:extLst>
+            </p:cNvPr>
+            <p:cNvCxnSpPr>
+              <a:stCxn id="6" idx="3"/>
+              <a:endCxn id="26" idx="2"/>
+            </p:cNvCxnSpPr>
+            <p:nvPr/>
+          </p:nvCxnSpPr>
+          <p:spPr>
+            <a:xfrm flipV="1">
+              <a:off x="6096000" y="2371416"/>
+              <a:ext cx="2714841" cy="433546"/>
+            </a:xfrm>
+            <a:prstGeom prst="bentConnector2">
+              <a:avLst/>
+            </a:prstGeom>
+            <a:ln>
+              <a:tailEnd type="triangle"/>
+            </a:ln>
+          </p:spPr>
+          <p:style>
+            <a:lnRef idx="1">
+              <a:schemeClr val="accent1"/>
+            </a:lnRef>
+            <a:fillRef idx="0">
+              <a:schemeClr val="accent1"/>
+            </a:fillRef>
+            <a:effectRef idx="0">
+              <a:schemeClr val="accent1"/>
+            </a:effectRef>
+            <a:fontRef idx="minor">
+              <a:schemeClr val="tx1"/>
+            </a:fontRef>
+          </p:style>
+        </p:cxnSp>
+        <p:cxnSp>
+          <p:nvCxnSpPr>
+            <p:cNvPr id="83" name="Connector: Elbow 82">
+              <a:extLst>
+                <a:ext uri="{FF2B5EF4-FFF2-40B4-BE49-F238E27FC236}">
+                  <a16:creationId xmlns:a16="http://schemas.microsoft.com/office/drawing/2014/main" id="{DC419FD4-AB46-ECAF-4266-08F0664577F2}"/>
+                </a:ext>
+              </a:extLst>
+            </p:cNvPr>
+            <p:cNvCxnSpPr>
+              <a:stCxn id="4" idx="3"/>
+              <a:endCxn id="27" idx="1"/>
+            </p:cNvCxnSpPr>
+            <p:nvPr/>
+          </p:nvCxnSpPr>
+          <p:spPr>
+            <a:xfrm flipV="1">
+              <a:off x="5973111" y="1164744"/>
+              <a:ext cx="1773596" cy="537868"/>
+            </a:xfrm>
+            <a:prstGeom prst="bentConnector3">
+              <a:avLst/>
+            </a:prstGeom>
+            <a:ln>
+              <a:tailEnd type="triangle"/>
+            </a:ln>
+          </p:spPr>
+          <p:style>
+            <a:lnRef idx="1">
+              <a:schemeClr val="accent1"/>
+            </a:lnRef>
+            <a:fillRef idx="0">
+              <a:schemeClr val="accent1"/>
+            </a:fillRef>
+            <a:effectRef idx="0">
+              <a:schemeClr val="accent1"/>
+            </a:effectRef>
+            <a:fontRef idx="minor">
+              <a:schemeClr val="tx1"/>
+            </a:fontRef>
+          </p:style>
+        </p:cxnSp>
+      </p:grpSp>
+    </p:spTree>
+    <p:extLst>
+      <p:ext uri="{BB962C8B-B14F-4D97-AF65-F5344CB8AC3E}">
+        <p14:creationId xmlns:p14="http://schemas.microsoft.com/office/powerpoint/2010/main" val="658351939"/>
+      </p:ext>
+    </p:extLst>
+  </p:cSld>
+  <p:clrMapOvr>
+    <a:masterClrMapping/>
+  </p:clrMapOvr>
+</p:sld>
+</file>
+
+<file path=ppt/slides/slide3.xml><?xml version="1.0" encoding="utf-8"?>
+<p:sld xmlns:a="http://schemas.openxmlformats.org/drawingml/2006/main" xmlns:r="http://schemas.openxmlformats.org/officeDocument/2006/relationships" xmlns:p="http://schemas.openxmlformats.org/presentationml/2006/main">
+  <p:cSld>
+    <p:spTree>
+      <p:nvGrpSpPr>
+        <p:cNvPr id="1" name=""/>
+        <p:cNvGrpSpPr/>
+        <p:nvPr/>
+      </p:nvGrpSpPr>
+      <p:grpSpPr>
+        <a:xfrm>
+          <a:off x="0" y="0"/>
+          <a:ext cx="0" cy="0"/>
+          <a:chOff x="0" y="0"/>
+          <a:chExt cx="0" cy="0"/>
+        </a:xfrm>
+      </p:grpSpPr>
+      <p:grpSp>
+        <p:nvGrpSpPr>
+          <p:cNvPr id="45" name="Group 44">
+            <a:extLst>
+              <a:ext uri="{FF2B5EF4-FFF2-40B4-BE49-F238E27FC236}">
+                <a16:creationId xmlns:a16="http://schemas.microsoft.com/office/drawing/2014/main" id="{88250655-0E8E-35B6-64FD-7C4D2961614D}"/>
+              </a:ext>
+            </a:extLst>
+          </p:cNvPr>
+          <p:cNvGrpSpPr/>
+          <p:nvPr/>
+        </p:nvGrpSpPr>
+        <p:grpSpPr>
+          <a:xfrm>
+            <a:off x="1522764" y="1787998"/>
+            <a:ext cx="7147556" cy="2238991"/>
+            <a:chOff x="1522764" y="1787998"/>
+            <a:chExt cx="7147556" cy="2238991"/>
+          </a:xfrm>
+        </p:grpSpPr>
+        <p:cxnSp>
+          <p:nvCxnSpPr>
+            <p:cNvPr id="6" name="Straight Connector 5">
+              <a:extLst>
+                <a:ext uri="{FF2B5EF4-FFF2-40B4-BE49-F238E27FC236}">
+                  <a16:creationId xmlns:a16="http://schemas.microsoft.com/office/drawing/2014/main" id="{D1EB5C9F-2484-1C12-7BC6-3A709E49980F}"/>
+                </a:ext>
+              </a:extLst>
+            </p:cNvPr>
+            <p:cNvCxnSpPr>
+              <a:cxnSpLocks/>
+              <a:stCxn id="8" idx="3"/>
+              <a:endCxn id="10" idx="3"/>
+            </p:cNvCxnSpPr>
+            <p:nvPr/>
+          </p:nvCxnSpPr>
+          <p:spPr>
+            <a:xfrm>
+              <a:off x="3965517" y="2919399"/>
+              <a:ext cx="4216753" cy="14367"/>
+            </a:xfrm>
+            <a:prstGeom prst="line">
+              <a:avLst/>
+            </a:prstGeom>
+            <a:ln w="47625">
+              <a:prstDash val="sysDash"/>
+              <a:headEnd type="stealth" w="lg" len="lg"/>
+              <a:tailEnd type="stealth" w="lg" len="lg"/>
+            </a:ln>
+          </p:spPr>
+          <p:style>
+            <a:lnRef idx="1">
+              <a:schemeClr val="accent1"/>
+            </a:lnRef>
+            <a:fillRef idx="0">
+              <a:schemeClr val="accent1"/>
+            </a:fillRef>
+            <a:effectRef idx="0">
+              <a:schemeClr val="accent1"/>
+            </a:effectRef>
+            <a:fontRef idx="minor">
+              <a:schemeClr val="tx1"/>
+            </a:fontRef>
+          </p:style>
+        </p:cxnSp>
+        <p:sp>
+          <p:nvSpPr>
+            <p:cNvPr id="8" name="Arrow: Pentagon 7">
+              <a:extLst>
+                <a:ext uri="{FF2B5EF4-FFF2-40B4-BE49-F238E27FC236}">
+                  <a16:creationId xmlns:a16="http://schemas.microsoft.com/office/drawing/2014/main" id="{BA232561-2683-60E4-8CC5-2A7CBAD504C8}"/>
+                </a:ext>
+              </a:extLst>
+            </p:cNvPr>
+            <p:cNvSpPr/>
+            <p:nvPr/>
+          </p:nvSpPr>
+          <p:spPr>
+            <a:xfrm rot="5400000">
+              <a:off x="3556955" y="2140886"/>
+              <a:ext cx="817124" cy="739901"/>
+            </a:xfrm>
+            <a:prstGeom prst="homePlate">
+              <a:avLst/>
+            </a:prstGeom>
+          </p:spPr>
+          <p:style>
+            <a:lnRef idx="2">
+              <a:schemeClr val="accent1">
+                <a:shade val="15000"/>
+              </a:schemeClr>
+            </a:lnRef>
+            <a:fillRef idx="1">
+              <a:schemeClr val="accent1"/>
+            </a:fillRef>
+            <a:effectRef idx="0">
+              <a:schemeClr val="accent1"/>
+            </a:effectRef>
+            <a:fontRef idx="minor">
+              <a:schemeClr val="lt1"/>
+            </a:fontRef>
+          </p:style>
+          <p:txBody>
+            <a:bodyPr vert="vert270" rtlCol="0" anchor="ctr"/>
+            <a:lstStyle/>
+            <a:p>
+              <a:pPr algn="ctr"/>
+              <a:r>
+                <a:rPr lang="en-US" dirty="0"/>
+                <a:t>23</a:t>
+              </a:r>
+              <a:endParaRPr lang="en-DE" dirty="0"/>
+            </a:p>
+          </p:txBody>
+        </p:sp>
+        <p:sp>
+          <p:nvSpPr>
+            <p:cNvPr id="9" name="Arrow: Pentagon 8">
+              <a:extLst>
+                <a:ext uri="{FF2B5EF4-FFF2-40B4-BE49-F238E27FC236}">
+                  <a16:creationId xmlns:a16="http://schemas.microsoft.com/office/drawing/2014/main" id="{8398A023-6630-B853-88BE-8D14F8AAC4E6}"/>
+                </a:ext>
+              </a:extLst>
+            </p:cNvPr>
+            <p:cNvSpPr/>
+            <p:nvPr/>
+          </p:nvSpPr>
+          <p:spPr>
+            <a:xfrm rot="5400000">
+              <a:off x="5046746" y="2118026"/>
+              <a:ext cx="817124" cy="739901"/>
+            </a:xfrm>
+            <a:prstGeom prst="homePlate">
+              <a:avLst/>
+            </a:prstGeom>
+          </p:spPr>
+          <p:style>
+            <a:lnRef idx="2">
+              <a:schemeClr val="accent2">
+                <a:shade val="15000"/>
+              </a:schemeClr>
+            </a:lnRef>
+            <a:fillRef idx="1">
+              <a:schemeClr val="accent2"/>
+            </a:fillRef>
+            <a:effectRef idx="0">
+              <a:schemeClr val="accent2"/>
+            </a:effectRef>
+            <a:fontRef idx="minor">
+              <a:schemeClr val="lt1"/>
+            </a:fontRef>
+          </p:style>
+          <p:txBody>
+            <a:bodyPr vert="vert270" rtlCol="0" anchor="ctr"/>
+            <a:lstStyle/>
+            <a:p>
+              <a:pPr algn="ctr"/>
+              <a:r>
+                <a:rPr lang="en-US" dirty="0"/>
+                <a:t>55</a:t>
+              </a:r>
+              <a:endParaRPr lang="en-DE" dirty="0"/>
+            </a:p>
+          </p:txBody>
+        </p:sp>
+        <p:sp>
+          <p:nvSpPr>
+            <p:cNvPr id="10" name="Arrow: Pentagon 9">
+              <a:extLst>
+                <a:ext uri="{FF2B5EF4-FFF2-40B4-BE49-F238E27FC236}">
+                  <a16:creationId xmlns:a16="http://schemas.microsoft.com/office/drawing/2014/main" id="{36850367-4040-5EBC-F802-E60C6D3D1149}"/>
+                </a:ext>
+              </a:extLst>
+            </p:cNvPr>
+            <p:cNvSpPr/>
+            <p:nvPr/>
+          </p:nvSpPr>
+          <p:spPr>
+            <a:xfrm rot="5400000">
+              <a:off x="7773708" y="2155253"/>
+              <a:ext cx="817124" cy="739901"/>
+            </a:xfrm>
+            <a:prstGeom prst="homePlate">
+              <a:avLst/>
+            </a:prstGeom>
+          </p:spPr>
+          <p:style>
+            <a:lnRef idx="2">
+              <a:schemeClr val="accent1">
+                <a:shade val="15000"/>
+              </a:schemeClr>
+            </a:lnRef>
+            <a:fillRef idx="1">
+              <a:schemeClr val="accent1"/>
+            </a:fillRef>
+            <a:effectRef idx="0">
+              <a:schemeClr val="accent1"/>
+            </a:effectRef>
+            <a:fontRef idx="minor">
+              <a:schemeClr val="lt1"/>
+            </a:fontRef>
+          </p:style>
+          <p:txBody>
+            <a:bodyPr vert="vert270" rtlCol="0" anchor="ctr"/>
+            <a:lstStyle/>
+            <a:p>
+              <a:pPr algn="ctr"/>
+              <a:r>
+                <a:rPr lang="en-US" dirty="0"/>
+                <a:t>90</a:t>
+              </a:r>
+              <a:endParaRPr lang="en-DE" dirty="0"/>
+            </a:p>
+          </p:txBody>
+        </p:sp>
+        <p:sp>
+          <p:nvSpPr>
+            <p:cNvPr id="11" name="Arrow: Pentagon 10">
+              <a:extLst>
+                <a:ext uri="{FF2B5EF4-FFF2-40B4-BE49-F238E27FC236}">
+                  <a16:creationId xmlns:a16="http://schemas.microsoft.com/office/drawing/2014/main" id="{E03FE479-9EE6-D36A-58BE-51EBDC850E75}"/>
+                </a:ext>
+              </a:extLst>
+            </p:cNvPr>
+            <p:cNvSpPr/>
+            <p:nvPr/>
+          </p:nvSpPr>
+          <p:spPr>
+            <a:xfrm rot="5400000">
+              <a:off x="6584893" y="2125646"/>
+              <a:ext cx="817124" cy="739901"/>
+            </a:xfrm>
+            <a:prstGeom prst="homePlate">
+              <a:avLst/>
+            </a:prstGeom>
+          </p:spPr>
+          <p:style>
+            <a:lnRef idx="2">
+              <a:schemeClr val="accent1">
+                <a:shade val="15000"/>
+              </a:schemeClr>
+            </a:lnRef>
+            <a:fillRef idx="1">
+              <a:schemeClr val="accent1"/>
+            </a:fillRef>
+            <a:effectRef idx="0">
+              <a:schemeClr val="accent1"/>
+            </a:effectRef>
+            <a:fontRef idx="minor">
+              <a:schemeClr val="lt1"/>
+            </a:fontRef>
+          </p:style>
+          <p:txBody>
+            <a:bodyPr vert="vert270" rtlCol="0" anchor="ctr"/>
+            <a:lstStyle/>
+            <a:p>
+              <a:pPr algn="ctr"/>
+              <a:r>
+                <a:rPr lang="en-US" dirty="0"/>
+                <a:t>78</a:t>
+              </a:r>
+              <a:endParaRPr lang="en-DE" dirty="0"/>
+            </a:p>
+          </p:txBody>
+        </p:sp>
+        <p:cxnSp>
+          <p:nvCxnSpPr>
+            <p:cNvPr id="14" name="Straight Connector 13">
+              <a:extLst>
+                <a:ext uri="{FF2B5EF4-FFF2-40B4-BE49-F238E27FC236}">
+                  <a16:creationId xmlns:a16="http://schemas.microsoft.com/office/drawing/2014/main" id="{8DBCEF0C-118D-B16C-079E-BC2805D16CD5}"/>
+                </a:ext>
+              </a:extLst>
+            </p:cNvPr>
+            <p:cNvCxnSpPr>
+              <a:cxnSpLocks/>
+              <a:stCxn id="15" idx="3"/>
+            </p:cNvCxnSpPr>
+            <p:nvPr/>
+          </p:nvCxnSpPr>
+          <p:spPr>
+            <a:xfrm>
+              <a:off x="3955747" y="3409007"/>
+              <a:ext cx="4226524" cy="14366"/>
+            </a:xfrm>
+            <a:prstGeom prst="line">
+              <a:avLst/>
+            </a:prstGeom>
+            <a:ln w="47625">
+              <a:prstDash val="sysDash"/>
+              <a:headEnd type="stealth" w="lg" len="lg"/>
+              <a:tailEnd type="stealth" w="lg" len="lg"/>
+            </a:ln>
+          </p:spPr>
+          <p:style>
+            <a:lnRef idx="1">
+              <a:schemeClr val="accent1"/>
+            </a:lnRef>
+            <a:fillRef idx="0">
+              <a:schemeClr val="accent1"/>
+            </a:fillRef>
+            <a:effectRef idx="0">
+              <a:schemeClr val="accent1"/>
+            </a:effectRef>
+            <a:fontRef idx="minor">
+              <a:schemeClr val="tx1"/>
+            </a:fontRef>
+          </p:style>
+        </p:cxnSp>
+        <p:sp>
+          <p:nvSpPr>
+            <p:cNvPr id="15" name="Arrow: Pentagon 14">
+              <a:extLst>
+                <a:ext uri="{FF2B5EF4-FFF2-40B4-BE49-F238E27FC236}">
+                  <a16:creationId xmlns:a16="http://schemas.microsoft.com/office/drawing/2014/main" id="{5E7092F6-BB9E-2D6B-5629-025262252ED3}"/>
+                </a:ext>
+              </a:extLst>
+            </p:cNvPr>
+            <p:cNvSpPr/>
+            <p:nvPr/>
+          </p:nvSpPr>
+          <p:spPr>
+            <a:xfrm rot="16200000">
+              <a:off x="3671780" y="3464320"/>
+              <a:ext cx="567932" cy="457305"/>
+            </a:xfrm>
+            <a:prstGeom prst="homePlate">
+              <a:avLst/>
+            </a:prstGeom>
+          </p:spPr>
+          <p:style>
+            <a:lnRef idx="2">
+              <a:schemeClr val="accent6">
+                <a:shade val="15000"/>
+              </a:schemeClr>
+            </a:lnRef>
+            <a:fillRef idx="1">
+              <a:schemeClr val="accent6"/>
+            </a:fillRef>
+            <a:effectRef idx="0">
+              <a:schemeClr val="accent6"/>
+            </a:effectRef>
+            <a:fontRef idx="minor">
+              <a:schemeClr val="lt1"/>
+            </a:fontRef>
+          </p:style>
+          <p:txBody>
+            <a:bodyPr vert="vert" rtlCol="0" anchor="ctr"/>
+            <a:lstStyle/>
+            <a:p>
+              <a:pPr algn="ctr"/>
+              <a:r>
+                <a:rPr lang="en-US" dirty="0"/>
+                <a:t>100</a:t>
+              </a:r>
+              <a:endParaRPr lang="en-DE" dirty="0"/>
+            </a:p>
+          </p:txBody>
+        </p:sp>
+        <p:sp>
+          <p:nvSpPr>
+            <p:cNvPr id="19" name="Arrow: Pentagon 18">
+              <a:extLst>
+                <a:ext uri="{FF2B5EF4-FFF2-40B4-BE49-F238E27FC236}">
+                  <a16:creationId xmlns:a16="http://schemas.microsoft.com/office/drawing/2014/main" id="{1384DDF1-C4CF-AECB-30CB-103E45051ABF}"/>
+                </a:ext>
+              </a:extLst>
+            </p:cNvPr>
+            <p:cNvSpPr/>
+            <p:nvPr/>
+          </p:nvSpPr>
+          <p:spPr>
+            <a:xfrm rot="16200000">
+              <a:off x="7901898" y="3495960"/>
+              <a:ext cx="560747" cy="457306"/>
+            </a:xfrm>
+            <a:prstGeom prst="homePlate">
+              <a:avLst/>
+            </a:prstGeom>
+            <a:solidFill>
+              <a:srgbClr val="FF5050"/>
+            </a:solidFill>
+          </p:spPr>
+          <p:style>
+            <a:lnRef idx="2">
+              <a:schemeClr val="accent1">
+                <a:shade val="15000"/>
+              </a:schemeClr>
+            </a:lnRef>
+            <a:fillRef idx="1">
+              <a:schemeClr val="accent1"/>
+            </a:fillRef>
+            <a:effectRef idx="0">
+              <a:schemeClr val="accent1"/>
+            </a:effectRef>
+            <a:fontRef idx="minor">
+              <a:schemeClr val="lt1"/>
+            </a:fontRef>
+          </p:style>
+          <p:txBody>
+            <a:bodyPr vert="vert" rtlCol="0" anchor="ctr"/>
+            <a:lstStyle/>
+            <a:p>
+              <a:pPr algn="ctr"/>
+              <a:r>
+                <a:rPr lang="en-US" dirty="0"/>
+                <a:t>0</a:t>
+              </a:r>
+              <a:endParaRPr lang="en-DE" dirty="0"/>
+            </a:p>
+          </p:txBody>
+        </p:sp>
+        <p:cxnSp>
+          <p:nvCxnSpPr>
+            <p:cNvPr id="21" name="Straight Connector 20">
+              <a:extLst>
+                <a:ext uri="{FF2B5EF4-FFF2-40B4-BE49-F238E27FC236}">
+                  <a16:creationId xmlns:a16="http://schemas.microsoft.com/office/drawing/2014/main" id="{FD48367F-58E2-23C4-CDC7-7424301D2540}"/>
+                </a:ext>
+              </a:extLst>
+            </p:cNvPr>
+            <p:cNvCxnSpPr>
+              <a:cxnSpLocks/>
+              <a:stCxn id="10" idx="3"/>
+              <a:endCxn id="19" idx="3"/>
+            </p:cNvCxnSpPr>
+            <p:nvPr/>
+          </p:nvCxnSpPr>
+          <p:spPr>
+            <a:xfrm>
+              <a:off x="8182270" y="2933766"/>
+              <a:ext cx="2" cy="510474"/>
+            </a:xfrm>
+            <a:prstGeom prst="line">
+              <a:avLst/>
+            </a:prstGeom>
+            <a:ln>
+              <a:prstDash val="lgDash"/>
+            </a:ln>
+          </p:spPr>
+          <p:style>
+            <a:lnRef idx="1">
+              <a:schemeClr val="accent1"/>
+            </a:lnRef>
+            <a:fillRef idx="0">
+              <a:schemeClr val="accent1"/>
+            </a:fillRef>
+            <a:effectRef idx="0">
+              <a:schemeClr val="accent1"/>
+            </a:effectRef>
+            <a:fontRef idx="minor">
+              <a:schemeClr val="tx1"/>
+            </a:fontRef>
+          </p:style>
+        </p:cxnSp>
+        <p:cxnSp>
+          <p:nvCxnSpPr>
+            <p:cNvPr id="22" name="Straight Connector 21">
+              <a:extLst>
+                <a:ext uri="{FF2B5EF4-FFF2-40B4-BE49-F238E27FC236}">
+                  <a16:creationId xmlns:a16="http://schemas.microsoft.com/office/drawing/2014/main" id="{BD2B6BC0-8896-BFA5-8833-9AB8679AFF63}"/>
+                </a:ext>
+              </a:extLst>
+            </p:cNvPr>
+            <p:cNvCxnSpPr/>
+            <p:nvPr/>
+          </p:nvCxnSpPr>
+          <p:spPr>
+            <a:xfrm>
+              <a:off x="3955746" y="2890215"/>
+              <a:ext cx="1" cy="817801"/>
+            </a:xfrm>
+            <a:prstGeom prst="line">
+              <a:avLst/>
+            </a:prstGeom>
+            <a:ln>
+              <a:prstDash val="lgDash"/>
+            </a:ln>
+          </p:spPr>
+          <p:style>
+            <a:lnRef idx="1">
+              <a:schemeClr val="accent1"/>
+            </a:lnRef>
+            <a:fillRef idx="0">
+              <a:schemeClr val="accent1"/>
+            </a:fillRef>
+            <a:effectRef idx="0">
+              <a:schemeClr val="accent1"/>
+            </a:effectRef>
+            <a:fontRef idx="minor">
+              <a:schemeClr val="tx1"/>
+            </a:fontRef>
+          </p:style>
+        </p:cxnSp>
+        <p:sp>
+          <p:nvSpPr>
+            <p:cNvPr id="23" name="TextBox 22">
+              <a:extLst>
+                <a:ext uri="{FF2B5EF4-FFF2-40B4-BE49-F238E27FC236}">
+                  <a16:creationId xmlns:a16="http://schemas.microsoft.com/office/drawing/2014/main" id="{15B64826-923B-075F-D68C-131FAC231CE2}"/>
+                </a:ext>
+              </a:extLst>
+            </p:cNvPr>
+            <p:cNvSpPr txBox="1"/>
+            <p:nvPr/>
+          </p:nvSpPr>
+          <p:spPr>
+            <a:xfrm>
+              <a:off x="1525018" y="2000454"/>
+              <a:ext cx="1911854" cy="646331"/>
+            </a:xfrm>
+            <a:prstGeom prst="rect">
+              <a:avLst/>
+            </a:prstGeom>
+            <a:noFill/>
+          </p:spPr>
+          <p:txBody>
+            <a:bodyPr wrap="square" rtlCol="0">
+              <a:spAutoFit/>
+            </a:bodyPr>
+            <a:lstStyle/>
+            <a:p>
+              <a:pPr algn="r"/>
+              <a:r>
+                <a:rPr lang="en-US" dirty="0"/>
+                <a:t>Direction changes in joint 1</a:t>
+              </a:r>
+              <a:endParaRPr lang="en-DE" dirty="0"/>
+            </a:p>
+          </p:txBody>
+        </p:sp>
+        <p:sp>
+          <p:nvSpPr>
+            <p:cNvPr id="25" name="TextBox 24">
+              <a:extLst>
+                <a:ext uri="{FF2B5EF4-FFF2-40B4-BE49-F238E27FC236}">
+                  <a16:creationId xmlns:a16="http://schemas.microsoft.com/office/drawing/2014/main" id="{97FABF77-5B34-A13D-DCB6-5B036275A6C9}"/>
+                </a:ext>
+              </a:extLst>
+            </p:cNvPr>
+            <p:cNvSpPr txBox="1"/>
+            <p:nvPr/>
+          </p:nvSpPr>
+          <p:spPr>
+            <a:xfrm>
+              <a:off x="4853263" y="1809091"/>
+              <a:ext cx="1212383" cy="307777"/>
+            </a:xfrm>
+            <a:prstGeom prst="rect">
+              <a:avLst/>
+            </a:prstGeom>
+            <a:noFill/>
+          </p:spPr>
+          <p:txBody>
+            <a:bodyPr wrap="none" rtlCol="0">
+              <a:spAutoFit/>
+            </a:bodyPr>
+            <a:lstStyle/>
+            <a:p>
+              <a:r>
+                <a:rPr lang="en-US" sz="1400" dirty="0"/>
+                <a:t>Analyzed Path</a:t>
+              </a:r>
+              <a:endParaRPr lang="en-DE" sz="1400" dirty="0"/>
+            </a:p>
+          </p:txBody>
+        </p:sp>
+        <p:sp>
+          <p:nvSpPr>
+            <p:cNvPr id="26" name="TextBox 25">
+              <a:extLst>
+                <a:ext uri="{FF2B5EF4-FFF2-40B4-BE49-F238E27FC236}">
+                  <a16:creationId xmlns:a16="http://schemas.microsoft.com/office/drawing/2014/main" id="{87D847E8-F5F5-BDB4-AA65-BDEEF0AAD7A2}"/>
+                </a:ext>
+              </a:extLst>
+            </p:cNvPr>
+            <p:cNvSpPr txBox="1"/>
+            <p:nvPr/>
+          </p:nvSpPr>
+          <p:spPr>
+            <a:xfrm>
+              <a:off x="6497642" y="1794496"/>
+              <a:ext cx="976101" cy="307777"/>
+            </a:xfrm>
+            <a:prstGeom prst="rect">
+              <a:avLst/>
+            </a:prstGeom>
+            <a:noFill/>
+          </p:spPr>
+          <p:txBody>
+            <a:bodyPr wrap="none" rtlCol="0">
+              <a:spAutoFit/>
+            </a:bodyPr>
+            <a:lstStyle/>
+            <a:p>
+              <a:r>
+                <a:rPr lang="en-US" sz="1400" dirty="0"/>
+                <a:t>Variation 3</a:t>
+              </a:r>
+              <a:endParaRPr lang="en-DE" sz="1400" dirty="0"/>
+            </a:p>
+          </p:txBody>
+        </p:sp>
+        <p:sp>
+          <p:nvSpPr>
+            <p:cNvPr id="27" name="TextBox 26">
+              <a:extLst>
+                <a:ext uri="{FF2B5EF4-FFF2-40B4-BE49-F238E27FC236}">
+                  <a16:creationId xmlns:a16="http://schemas.microsoft.com/office/drawing/2014/main" id="{67CCE1D6-CE36-9DAF-D19D-3D94E582912E}"/>
+                </a:ext>
+              </a:extLst>
+            </p:cNvPr>
+            <p:cNvSpPr txBox="1"/>
+            <p:nvPr/>
+          </p:nvSpPr>
+          <p:spPr>
+            <a:xfrm>
+              <a:off x="7694219" y="1787998"/>
+              <a:ext cx="976101" cy="307777"/>
+            </a:xfrm>
+            <a:prstGeom prst="rect">
+              <a:avLst/>
+            </a:prstGeom>
+            <a:noFill/>
+          </p:spPr>
+          <p:txBody>
+            <a:bodyPr wrap="none" rtlCol="0">
+              <a:spAutoFit/>
+            </a:bodyPr>
+            <a:lstStyle/>
+            <a:p>
+              <a:r>
+                <a:rPr lang="en-US" sz="1400" dirty="0"/>
+                <a:t>Variation 1</a:t>
+              </a:r>
+              <a:endParaRPr lang="en-DE" sz="1400" dirty="0"/>
+            </a:p>
+          </p:txBody>
+        </p:sp>
+        <p:sp>
+          <p:nvSpPr>
+            <p:cNvPr id="28" name="TextBox 27">
+              <a:extLst>
+                <a:ext uri="{FF2B5EF4-FFF2-40B4-BE49-F238E27FC236}">
+                  <a16:creationId xmlns:a16="http://schemas.microsoft.com/office/drawing/2014/main" id="{C35C0E87-C6FA-0FE6-CCA9-A1CFD4300D39}"/>
+                </a:ext>
+              </a:extLst>
+            </p:cNvPr>
+            <p:cNvSpPr txBox="1"/>
+            <p:nvPr/>
+          </p:nvSpPr>
+          <p:spPr>
+            <a:xfrm>
+              <a:off x="3514773" y="1808864"/>
+              <a:ext cx="976101" cy="307777"/>
+            </a:xfrm>
+            <a:prstGeom prst="rect">
+              <a:avLst/>
+            </a:prstGeom>
+            <a:noFill/>
+          </p:spPr>
+          <p:txBody>
+            <a:bodyPr wrap="none" rtlCol="0">
+              <a:spAutoFit/>
+            </a:bodyPr>
+            <a:lstStyle/>
+            <a:p>
+              <a:r>
+                <a:rPr lang="en-US" sz="1400" dirty="0"/>
+                <a:t>Variation 2</a:t>
+              </a:r>
+              <a:endParaRPr lang="en-DE" sz="1400" dirty="0"/>
+            </a:p>
+          </p:txBody>
+        </p:sp>
+        <p:sp>
+          <p:nvSpPr>
+            <p:cNvPr id="39" name="Arrow: Pentagon 38">
+              <a:extLst>
+                <a:ext uri="{FF2B5EF4-FFF2-40B4-BE49-F238E27FC236}">
+                  <a16:creationId xmlns:a16="http://schemas.microsoft.com/office/drawing/2014/main" id="{F1D95585-F059-D2AB-D450-B3E72589FCB9}"/>
+                </a:ext>
+              </a:extLst>
+            </p:cNvPr>
+            <p:cNvSpPr/>
+            <p:nvPr/>
+          </p:nvSpPr>
+          <p:spPr>
+            <a:xfrm rot="16200000">
+              <a:off x="5171342" y="3514370"/>
+              <a:ext cx="567932" cy="457305"/>
+            </a:xfrm>
+            <a:prstGeom prst="homePlate">
+              <a:avLst/>
+            </a:prstGeom>
+          </p:spPr>
+          <p:style>
+            <a:lnRef idx="2">
+              <a:schemeClr val="accent2">
+                <a:shade val="15000"/>
+              </a:schemeClr>
+            </a:lnRef>
+            <a:fillRef idx="1">
+              <a:schemeClr val="accent2"/>
+            </a:fillRef>
+            <a:effectRef idx="0">
+              <a:schemeClr val="accent2"/>
+            </a:effectRef>
+            <a:fontRef idx="minor">
+              <a:schemeClr val="lt1"/>
+            </a:fontRef>
+          </p:style>
+          <p:txBody>
+            <a:bodyPr vert="vert" rtlCol="0" anchor="ctr"/>
+            <a:lstStyle/>
+            <a:p>
+              <a:pPr algn="ctr"/>
+              <a:r>
+                <a:rPr lang="en-US" dirty="0"/>
+                <a:t>80</a:t>
+              </a:r>
+              <a:endParaRPr lang="en-DE" dirty="0"/>
+            </a:p>
+          </p:txBody>
+        </p:sp>
+        <p:sp>
+          <p:nvSpPr>
+            <p:cNvPr id="44" name="TextBox 43">
+              <a:extLst>
+                <a:ext uri="{FF2B5EF4-FFF2-40B4-BE49-F238E27FC236}">
+                  <a16:creationId xmlns:a16="http://schemas.microsoft.com/office/drawing/2014/main" id="{65DA2F63-2D67-A5AC-28F4-07F7C359666A}"/>
+                </a:ext>
+              </a:extLst>
+            </p:cNvPr>
+            <p:cNvSpPr txBox="1"/>
+            <p:nvPr/>
+          </p:nvSpPr>
+          <p:spPr>
+            <a:xfrm>
+              <a:off x="1522764" y="3539947"/>
+              <a:ext cx="1911854" cy="369332"/>
+            </a:xfrm>
+            <a:prstGeom prst="rect">
+              <a:avLst/>
+            </a:prstGeom>
+            <a:noFill/>
+          </p:spPr>
+          <p:txBody>
+            <a:bodyPr wrap="square" rtlCol="0">
+              <a:spAutoFit/>
+            </a:bodyPr>
+            <a:lstStyle/>
+            <a:p>
+              <a:pPr algn="r"/>
+              <a:r>
+                <a:rPr lang="en-US" dirty="0"/>
+                <a:t>Local rating:</a:t>
+              </a:r>
+              <a:endParaRPr lang="en-DE" dirty="0"/>
+            </a:p>
+          </p:txBody>
+        </p:sp>
+      </p:grpSp>
+    </p:spTree>
+    <p:extLst>
+      <p:ext uri="{BB962C8B-B14F-4D97-AF65-F5344CB8AC3E}">
+        <p14:creationId xmlns:p14="http://schemas.microsoft.com/office/powerpoint/2010/main" val="1867626950"/>
       </p:ext>
     </p:extLst>
   </p:cSld>

</xml_diff>

<commit_message>
methode und code und überarbeitung alles chilly vanailly
</commit_message>
<xml_diff>
--- a/Latex/figures/images.pptx
+++ b/Latex/figures/images.pptx
@@ -13,10 +13,11 @@
     <p:sldId id="259" r:id="rId7"/>
     <p:sldId id="260" r:id="rId8"/>
     <p:sldId id="261" r:id="rId9"/>
-    <p:sldId id="262" r:id="rId10"/>
-    <p:sldId id="263" r:id="rId11"/>
-    <p:sldId id="266" r:id="rId12"/>
-    <p:sldId id="267" r:id="rId13"/>
+    <p:sldId id="268" r:id="rId10"/>
+    <p:sldId id="262" r:id="rId11"/>
+    <p:sldId id="263" r:id="rId12"/>
+    <p:sldId id="266" r:id="rId13"/>
+    <p:sldId id="267" r:id="rId14"/>
   </p:sldIdLst>
   <p:sldSz cx="12192000" cy="6858000"/>
   <p:notesSz cx="6858000" cy="9144000"/>
@@ -272,7 +273,7 @@
           <a:p>
             <a:fld id="{A2EF96EC-B110-4427-9456-97730D7A221B}" type="datetimeFigureOut">
               <a:rPr lang="en-DE" smtClean="0"/>
-              <a:t>15/11/2023</a:t>
+              <a:t>17/11/2023</a:t>
             </a:fld>
             <a:endParaRPr lang="en-DE"/>
           </a:p>
@@ -472,7 +473,7 @@
           <a:p>
             <a:fld id="{A2EF96EC-B110-4427-9456-97730D7A221B}" type="datetimeFigureOut">
               <a:rPr lang="en-DE" smtClean="0"/>
-              <a:t>15/11/2023</a:t>
+              <a:t>17/11/2023</a:t>
             </a:fld>
             <a:endParaRPr lang="en-DE"/>
           </a:p>
@@ -682,7 +683,7 @@
           <a:p>
             <a:fld id="{A2EF96EC-B110-4427-9456-97730D7A221B}" type="datetimeFigureOut">
               <a:rPr lang="en-DE" smtClean="0"/>
-              <a:t>15/11/2023</a:t>
+              <a:t>17/11/2023</a:t>
             </a:fld>
             <a:endParaRPr lang="en-DE"/>
           </a:p>
@@ -882,7 +883,7 @@
           <a:p>
             <a:fld id="{A2EF96EC-B110-4427-9456-97730D7A221B}" type="datetimeFigureOut">
               <a:rPr lang="en-DE" smtClean="0"/>
-              <a:t>15/11/2023</a:t>
+              <a:t>17/11/2023</a:t>
             </a:fld>
             <a:endParaRPr lang="en-DE"/>
           </a:p>
@@ -1158,7 +1159,7 @@
           <a:p>
             <a:fld id="{A2EF96EC-B110-4427-9456-97730D7A221B}" type="datetimeFigureOut">
               <a:rPr lang="en-DE" smtClean="0"/>
-              <a:t>15/11/2023</a:t>
+              <a:t>17/11/2023</a:t>
             </a:fld>
             <a:endParaRPr lang="en-DE"/>
           </a:p>
@@ -1426,7 +1427,7 @@
           <a:p>
             <a:fld id="{A2EF96EC-B110-4427-9456-97730D7A221B}" type="datetimeFigureOut">
               <a:rPr lang="en-DE" smtClean="0"/>
-              <a:t>15/11/2023</a:t>
+              <a:t>17/11/2023</a:t>
             </a:fld>
             <a:endParaRPr lang="en-DE"/>
           </a:p>
@@ -1841,7 +1842,7 @@
           <a:p>
             <a:fld id="{A2EF96EC-B110-4427-9456-97730D7A221B}" type="datetimeFigureOut">
               <a:rPr lang="en-DE" smtClean="0"/>
-              <a:t>15/11/2023</a:t>
+              <a:t>17/11/2023</a:t>
             </a:fld>
             <a:endParaRPr lang="en-DE"/>
           </a:p>
@@ -1983,7 +1984,7 @@
           <a:p>
             <a:fld id="{A2EF96EC-B110-4427-9456-97730D7A221B}" type="datetimeFigureOut">
               <a:rPr lang="en-DE" smtClean="0"/>
-              <a:t>15/11/2023</a:t>
+              <a:t>17/11/2023</a:t>
             </a:fld>
             <a:endParaRPr lang="en-DE"/>
           </a:p>
@@ -2096,7 +2097,7 @@
           <a:p>
             <a:fld id="{A2EF96EC-B110-4427-9456-97730D7A221B}" type="datetimeFigureOut">
               <a:rPr lang="en-DE" smtClean="0"/>
-              <a:t>15/11/2023</a:t>
+              <a:t>17/11/2023</a:t>
             </a:fld>
             <a:endParaRPr lang="en-DE"/>
           </a:p>
@@ -2409,7 +2410,7 @@
           <a:p>
             <a:fld id="{A2EF96EC-B110-4427-9456-97730D7A221B}" type="datetimeFigureOut">
               <a:rPr lang="en-DE" smtClean="0"/>
-              <a:t>15/11/2023</a:t>
+              <a:t>17/11/2023</a:t>
             </a:fld>
             <a:endParaRPr lang="en-DE"/>
           </a:p>
@@ -2698,7 +2699,7 @@
           <a:p>
             <a:fld id="{A2EF96EC-B110-4427-9456-97730D7A221B}" type="datetimeFigureOut">
               <a:rPr lang="en-DE" smtClean="0"/>
-              <a:t>15/11/2023</a:t>
+              <a:t>17/11/2023</a:t>
             </a:fld>
             <a:endParaRPr lang="en-DE"/>
           </a:p>
@@ -2941,7 +2942,7 @@
           <a:p>
             <a:fld id="{A2EF96EC-B110-4427-9456-97730D7A221B}" type="datetimeFigureOut">
               <a:rPr lang="en-DE" smtClean="0"/>
-              <a:t>15/11/2023</a:t>
+              <a:t>17/11/2023</a:t>
             </a:fld>
             <a:endParaRPr lang="en-DE"/>
           </a:p>
@@ -4406,6 +4407,1031 @@
       </p:grpSpPr>
       <p:cxnSp>
         <p:nvCxnSpPr>
+          <p:cNvPr id="10" name="Straight Connector 9">
+            <a:extLst>
+              <a:ext uri="{FF2B5EF4-FFF2-40B4-BE49-F238E27FC236}">
+                <a16:creationId xmlns:a16="http://schemas.microsoft.com/office/drawing/2014/main" id="{98BA9C8F-BD2B-F8AD-56EB-EED1BC4B5F56}"/>
+              </a:ext>
+            </a:extLst>
+          </p:cNvPr>
+          <p:cNvCxnSpPr/>
+          <p:nvPr/>
+        </p:nvCxnSpPr>
+        <p:spPr>
+          <a:xfrm flipV="1">
+            <a:off x="3278481" y="2200274"/>
+            <a:ext cx="896353" cy="1317959"/>
+          </a:xfrm>
+          <a:prstGeom prst="line">
+            <a:avLst/>
+          </a:prstGeom>
+          <a:ln w="38100">
+            <a:solidFill>
+              <a:schemeClr val="tx1"/>
+            </a:solidFill>
+          </a:ln>
+        </p:spPr>
+        <p:style>
+          <a:lnRef idx="1">
+            <a:schemeClr val="accent1"/>
+          </a:lnRef>
+          <a:fillRef idx="0">
+            <a:schemeClr val="accent1"/>
+          </a:fillRef>
+          <a:effectRef idx="0">
+            <a:schemeClr val="accent1"/>
+          </a:effectRef>
+          <a:fontRef idx="minor">
+            <a:schemeClr val="tx1"/>
+          </a:fontRef>
+        </p:style>
+      </p:cxnSp>
+      <p:cxnSp>
+        <p:nvCxnSpPr>
+          <p:cNvPr id="4" name="Straight Arrow Connector 3">
+            <a:extLst>
+              <a:ext uri="{FF2B5EF4-FFF2-40B4-BE49-F238E27FC236}">
+                <a16:creationId xmlns:a16="http://schemas.microsoft.com/office/drawing/2014/main" id="{9F76E815-5928-07BB-5510-B55DE84A7785}"/>
+              </a:ext>
+            </a:extLst>
+          </p:cNvPr>
+          <p:cNvCxnSpPr/>
+          <p:nvPr/>
+        </p:nvCxnSpPr>
+        <p:spPr>
+          <a:xfrm>
+            <a:off x="3152274" y="3537284"/>
+            <a:ext cx="3978442" cy="0"/>
+          </a:xfrm>
+          <a:prstGeom prst="straightConnector1">
+            <a:avLst/>
+          </a:prstGeom>
+          <a:ln w="38100">
+            <a:tailEnd type="triangle"/>
+          </a:ln>
+        </p:spPr>
+        <p:style>
+          <a:lnRef idx="1">
+            <a:schemeClr val="accent1"/>
+          </a:lnRef>
+          <a:fillRef idx="0">
+            <a:schemeClr val="accent1"/>
+          </a:fillRef>
+          <a:effectRef idx="0">
+            <a:schemeClr val="accent1"/>
+          </a:effectRef>
+          <a:fontRef idx="minor">
+            <a:schemeClr val="tx1"/>
+          </a:fontRef>
+        </p:style>
+      </p:cxnSp>
+      <p:cxnSp>
+        <p:nvCxnSpPr>
+          <p:cNvPr id="5" name="Straight Arrow Connector 4">
+            <a:extLst>
+              <a:ext uri="{FF2B5EF4-FFF2-40B4-BE49-F238E27FC236}">
+                <a16:creationId xmlns:a16="http://schemas.microsoft.com/office/drawing/2014/main" id="{2DD1A29F-9FD4-767D-22ED-95B9B3408829}"/>
+              </a:ext>
+            </a:extLst>
+          </p:cNvPr>
+          <p:cNvCxnSpPr/>
+          <p:nvPr/>
+        </p:nvCxnSpPr>
+        <p:spPr>
+          <a:xfrm flipV="1">
+            <a:off x="3256547" y="1780674"/>
+            <a:ext cx="0" cy="1868905"/>
+          </a:xfrm>
+          <a:prstGeom prst="straightConnector1">
+            <a:avLst/>
+          </a:prstGeom>
+          <a:ln w="38100">
+            <a:tailEnd type="triangle"/>
+          </a:ln>
+        </p:spPr>
+        <p:style>
+          <a:lnRef idx="1">
+            <a:schemeClr val="accent1"/>
+          </a:lnRef>
+          <a:fillRef idx="0">
+            <a:schemeClr val="accent1"/>
+          </a:fillRef>
+          <a:effectRef idx="0">
+            <a:schemeClr val="accent1"/>
+          </a:effectRef>
+          <a:fontRef idx="minor">
+            <a:schemeClr val="tx1"/>
+          </a:fontRef>
+        </p:style>
+      </p:cxnSp>
+      <p:sp>
+        <p:nvSpPr>
+          <p:cNvPr id="7" name="TextBox 6">
+            <a:extLst>
+              <a:ext uri="{FF2B5EF4-FFF2-40B4-BE49-F238E27FC236}">
+                <a16:creationId xmlns:a16="http://schemas.microsoft.com/office/drawing/2014/main" id="{016BCDE9-DE36-9306-BE3D-42C171F64CDF}"/>
+              </a:ext>
+            </a:extLst>
+          </p:cNvPr>
+          <p:cNvSpPr txBox="1"/>
+          <p:nvPr/>
+        </p:nvSpPr>
+        <p:spPr>
+          <a:xfrm>
+            <a:off x="4660315" y="3537284"/>
+            <a:ext cx="649537" cy="369332"/>
+          </a:xfrm>
+          <a:prstGeom prst="rect">
+            <a:avLst/>
+          </a:prstGeom>
+          <a:noFill/>
+        </p:spPr>
+        <p:txBody>
+          <a:bodyPr wrap="none" rtlCol="0">
+            <a:spAutoFit/>
+          </a:bodyPr>
+          <a:lstStyle/>
+          <a:p>
+            <a:r>
+              <a:rPr lang="en-US" dirty="0"/>
+              <a:t>Time</a:t>
+            </a:r>
+            <a:endParaRPr lang="en-DE" dirty="0"/>
+          </a:p>
+        </p:txBody>
+      </p:sp>
+      <p:sp>
+        <p:nvSpPr>
+          <p:cNvPr id="8" name="TextBox 7">
+            <a:extLst>
+              <a:ext uri="{FF2B5EF4-FFF2-40B4-BE49-F238E27FC236}">
+                <a16:creationId xmlns:a16="http://schemas.microsoft.com/office/drawing/2014/main" id="{09335185-7159-AEF8-3C22-0973E1E016E1}"/>
+              </a:ext>
+            </a:extLst>
+          </p:cNvPr>
+          <p:cNvSpPr txBox="1"/>
+          <p:nvPr/>
+        </p:nvSpPr>
+        <p:spPr>
+          <a:xfrm rot="16200000">
+            <a:off x="2084790" y="2433887"/>
+            <a:ext cx="1620893" cy="369332"/>
+          </a:xfrm>
+          <a:prstGeom prst="rect">
+            <a:avLst/>
+          </a:prstGeom>
+          <a:noFill/>
+        </p:spPr>
+        <p:txBody>
+          <a:bodyPr wrap="none" rtlCol="0">
+            <a:spAutoFit/>
+          </a:bodyPr>
+          <a:lstStyle/>
+          <a:p>
+            <a:r>
+              <a:rPr lang="en-US" dirty="0"/>
+              <a:t>Rotation in </a:t>
+            </a:r>
+            <a:r>
+              <a:rPr lang="en-US" i="1" dirty="0"/>
+              <a:t>Rad</a:t>
+            </a:r>
+            <a:endParaRPr lang="en-DE" i="1" dirty="0"/>
+          </a:p>
+        </p:txBody>
+      </p:sp>
+      <p:cxnSp>
+        <p:nvCxnSpPr>
+          <p:cNvPr id="12" name="Straight Connector 11">
+            <a:extLst>
+              <a:ext uri="{FF2B5EF4-FFF2-40B4-BE49-F238E27FC236}">
+                <a16:creationId xmlns:a16="http://schemas.microsoft.com/office/drawing/2014/main" id="{48459C69-C9C6-11B1-5F77-9FD3CD29D940}"/>
+              </a:ext>
+            </a:extLst>
+          </p:cNvPr>
+          <p:cNvCxnSpPr/>
+          <p:nvPr/>
+        </p:nvCxnSpPr>
+        <p:spPr>
+          <a:xfrm>
+            <a:off x="4171010" y="2219324"/>
+            <a:ext cx="266700" cy="485775"/>
+          </a:xfrm>
+          <a:prstGeom prst="line">
+            <a:avLst/>
+          </a:prstGeom>
+          <a:ln w="38100">
+            <a:solidFill>
+              <a:schemeClr val="tx1"/>
+            </a:solidFill>
+          </a:ln>
+        </p:spPr>
+        <p:style>
+          <a:lnRef idx="1">
+            <a:schemeClr val="accent1"/>
+          </a:lnRef>
+          <a:fillRef idx="0">
+            <a:schemeClr val="accent1"/>
+          </a:fillRef>
+          <a:effectRef idx="0">
+            <a:schemeClr val="accent1"/>
+          </a:effectRef>
+          <a:fontRef idx="minor">
+            <a:schemeClr val="tx1"/>
+          </a:fontRef>
+        </p:style>
+      </p:cxnSp>
+      <p:cxnSp>
+        <p:nvCxnSpPr>
+          <p:cNvPr id="14" name="Straight Connector 13">
+            <a:extLst>
+              <a:ext uri="{FF2B5EF4-FFF2-40B4-BE49-F238E27FC236}">
+                <a16:creationId xmlns:a16="http://schemas.microsoft.com/office/drawing/2014/main" id="{F927E216-CAF8-3EC6-A276-4AB4BDE79EAF}"/>
+              </a:ext>
+            </a:extLst>
+          </p:cNvPr>
+          <p:cNvCxnSpPr/>
+          <p:nvPr/>
+        </p:nvCxnSpPr>
+        <p:spPr>
+          <a:xfrm flipV="1">
+            <a:off x="4419600" y="2219325"/>
+            <a:ext cx="1524000" cy="485775"/>
+          </a:xfrm>
+          <a:prstGeom prst="line">
+            <a:avLst/>
+          </a:prstGeom>
+          <a:ln w="38100">
+            <a:solidFill>
+              <a:schemeClr val="tx1"/>
+            </a:solidFill>
+          </a:ln>
+        </p:spPr>
+        <p:style>
+          <a:lnRef idx="1">
+            <a:schemeClr val="accent1"/>
+          </a:lnRef>
+          <a:fillRef idx="0">
+            <a:schemeClr val="accent1"/>
+          </a:fillRef>
+          <a:effectRef idx="0">
+            <a:schemeClr val="accent1"/>
+          </a:effectRef>
+          <a:fontRef idx="minor">
+            <a:schemeClr val="tx1"/>
+          </a:fontRef>
+        </p:style>
+      </p:cxnSp>
+      <p:cxnSp>
+        <p:nvCxnSpPr>
+          <p:cNvPr id="16" name="Straight Connector 15">
+            <a:extLst>
+              <a:ext uri="{FF2B5EF4-FFF2-40B4-BE49-F238E27FC236}">
+                <a16:creationId xmlns:a16="http://schemas.microsoft.com/office/drawing/2014/main" id="{20272C19-BADA-936B-6A5A-1ADB2E742B14}"/>
+              </a:ext>
+            </a:extLst>
+          </p:cNvPr>
+          <p:cNvCxnSpPr>
+            <a:cxnSpLocks/>
+          </p:cNvCxnSpPr>
+          <p:nvPr/>
+        </p:nvCxnSpPr>
+        <p:spPr>
+          <a:xfrm>
+            <a:off x="5922171" y="2212181"/>
+            <a:ext cx="409575" cy="990600"/>
+          </a:xfrm>
+          <a:prstGeom prst="line">
+            <a:avLst/>
+          </a:prstGeom>
+          <a:ln w="38100">
+            <a:solidFill>
+              <a:schemeClr val="tx1"/>
+            </a:solidFill>
+          </a:ln>
+        </p:spPr>
+        <p:style>
+          <a:lnRef idx="1">
+            <a:schemeClr val="accent1"/>
+          </a:lnRef>
+          <a:fillRef idx="0">
+            <a:schemeClr val="accent1"/>
+          </a:fillRef>
+          <a:effectRef idx="0">
+            <a:schemeClr val="accent1"/>
+          </a:effectRef>
+          <a:fontRef idx="minor">
+            <a:schemeClr val="tx1"/>
+          </a:fontRef>
+        </p:style>
+      </p:cxnSp>
+      <p:cxnSp>
+        <p:nvCxnSpPr>
+          <p:cNvPr id="19" name="Straight Connector 18">
+            <a:extLst>
+              <a:ext uri="{FF2B5EF4-FFF2-40B4-BE49-F238E27FC236}">
+                <a16:creationId xmlns:a16="http://schemas.microsoft.com/office/drawing/2014/main" id="{E1FE6B1F-9DDA-DFE4-3FA2-7EB398225082}"/>
+              </a:ext>
+            </a:extLst>
+          </p:cNvPr>
+          <p:cNvCxnSpPr/>
+          <p:nvPr/>
+        </p:nvCxnSpPr>
+        <p:spPr>
+          <a:xfrm flipV="1">
+            <a:off x="6315079" y="3028950"/>
+            <a:ext cx="542925" cy="180975"/>
+          </a:xfrm>
+          <a:prstGeom prst="line">
+            <a:avLst/>
+          </a:prstGeom>
+          <a:ln w="38100">
+            <a:solidFill>
+              <a:schemeClr val="tx1"/>
+            </a:solidFill>
+          </a:ln>
+        </p:spPr>
+        <p:style>
+          <a:lnRef idx="1">
+            <a:schemeClr val="accent1"/>
+          </a:lnRef>
+          <a:fillRef idx="0">
+            <a:schemeClr val="accent1"/>
+          </a:fillRef>
+          <a:effectRef idx="0">
+            <a:schemeClr val="accent1"/>
+          </a:effectRef>
+          <a:fontRef idx="minor">
+            <a:schemeClr val="tx1"/>
+          </a:fontRef>
+        </p:style>
+      </p:cxnSp>
+      <p:cxnSp>
+        <p:nvCxnSpPr>
+          <p:cNvPr id="21" name="Straight Arrow Connector 20">
+            <a:extLst>
+              <a:ext uri="{FF2B5EF4-FFF2-40B4-BE49-F238E27FC236}">
+                <a16:creationId xmlns:a16="http://schemas.microsoft.com/office/drawing/2014/main" id="{5784C3B1-825B-9E0E-4F89-AEDDDC1EE10F}"/>
+              </a:ext>
+            </a:extLst>
+          </p:cNvPr>
+          <p:cNvCxnSpPr/>
+          <p:nvPr/>
+        </p:nvCxnSpPr>
+        <p:spPr>
+          <a:xfrm flipV="1">
+            <a:off x="4159250" y="2286000"/>
+            <a:ext cx="0" cy="1206500"/>
+          </a:xfrm>
+          <a:prstGeom prst="straightConnector1">
+            <a:avLst/>
+          </a:prstGeom>
+          <a:ln w="25400">
+            <a:tailEnd type="triangle"/>
+          </a:ln>
+        </p:spPr>
+        <p:style>
+          <a:lnRef idx="1">
+            <a:schemeClr val="accent6"/>
+          </a:lnRef>
+          <a:fillRef idx="0">
+            <a:schemeClr val="accent6"/>
+          </a:fillRef>
+          <a:effectRef idx="0">
+            <a:schemeClr val="accent6"/>
+          </a:effectRef>
+          <a:fontRef idx="minor">
+            <a:schemeClr val="tx1"/>
+          </a:fontRef>
+        </p:style>
+      </p:cxnSp>
+      <p:cxnSp>
+        <p:nvCxnSpPr>
+          <p:cNvPr id="22" name="Straight Arrow Connector 21">
+            <a:extLst>
+              <a:ext uri="{FF2B5EF4-FFF2-40B4-BE49-F238E27FC236}">
+                <a16:creationId xmlns:a16="http://schemas.microsoft.com/office/drawing/2014/main" id="{982C949D-5F61-0FAC-F225-D049FF274F0D}"/>
+              </a:ext>
+            </a:extLst>
+          </p:cNvPr>
+          <p:cNvCxnSpPr>
+            <a:cxnSpLocks/>
+          </p:cNvCxnSpPr>
+          <p:nvPr/>
+        </p:nvCxnSpPr>
+        <p:spPr>
+          <a:xfrm flipV="1">
+            <a:off x="5909471" y="2266950"/>
+            <a:ext cx="0" cy="448176"/>
+          </a:xfrm>
+          <a:prstGeom prst="straightConnector1">
+            <a:avLst/>
+          </a:prstGeom>
+          <a:ln w="25400">
+            <a:tailEnd type="triangle"/>
+          </a:ln>
+        </p:spPr>
+        <p:style>
+          <a:lnRef idx="1">
+            <a:schemeClr val="accent6"/>
+          </a:lnRef>
+          <a:fillRef idx="0">
+            <a:schemeClr val="accent6"/>
+          </a:fillRef>
+          <a:effectRef idx="0">
+            <a:schemeClr val="accent6"/>
+          </a:effectRef>
+          <a:fontRef idx="minor">
+            <a:schemeClr val="tx1"/>
+          </a:fontRef>
+        </p:style>
+      </p:cxnSp>
+      <p:cxnSp>
+        <p:nvCxnSpPr>
+          <p:cNvPr id="23" name="Straight Arrow Connector 22">
+            <a:extLst>
+              <a:ext uri="{FF2B5EF4-FFF2-40B4-BE49-F238E27FC236}">
+                <a16:creationId xmlns:a16="http://schemas.microsoft.com/office/drawing/2014/main" id="{96B88B49-76F0-00A0-F4C8-23D416AF78EA}"/>
+              </a:ext>
+            </a:extLst>
+          </p:cNvPr>
+          <p:cNvCxnSpPr>
+            <a:cxnSpLocks/>
+          </p:cNvCxnSpPr>
+          <p:nvPr/>
+        </p:nvCxnSpPr>
+        <p:spPr>
+          <a:xfrm flipV="1">
+            <a:off x="6868325" y="3062288"/>
+            <a:ext cx="3963" cy="182562"/>
+          </a:xfrm>
+          <a:prstGeom prst="straightConnector1">
+            <a:avLst/>
+          </a:prstGeom>
+          <a:ln w="25400">
+            <a:tailEnd type="triangle"/>
+          </a:ln>
+        </p:spPr>
+        <p:style>
+          <a:lnRef idx="1">
+            <a:schemeClr val="accent6"/>
+          </a:lnRef>
+          <a:fillRef idx="0">
+            <a:schemeClr val="accent6"/>
+          </a:fillRef>
+          <a:effectRef idx="0">
+            <a:schemeClr val="accent6"/>
+          </a:effectRef>
+          <a:fontRef idx="minor">
+            <a:schemeClr val="tx1"/>
+          </a:fontRef>
+        </p:style>
+      </p:cxnSp>
+      <p:cxnSp>
+        <p:nvCxnSpPr>
+          <p:cNvPr id="24" name="Straight Arrow Connector 23">
+            <a:extLst>
+              <a:ext uri="{FF2B5EF4-FFF2-40B4-BE49-F238E27FC236}">
+                <a16:creationId xmlns:a16="http://schemas.microsoft.com/office/drawing/2014/main" id="{9421952F-700B-CB9D-41B2-183E05F1B9B2}"/>
+              </a:ext>
+            </a:extLst>
+          </p:cNvPr>
+          <p:cNvCxnSpPr>
+            <a:cxnSpLocks/>
+          </p:cNvCxnSpPr>
+          <p:nvPr/>
+        </p:nvCxnSpPr>
+        <p:spPr>
+          <a:xfrm>
+            <a:off x="4446149" y="2200274"/>
+            <a:ext cx="0" cy="458260"/>
+          </a:xfrm>
+          <a:prstGeom prst="straightConnector1">
+            <a:avLst/>
+          </a:prstGeom>
+          <a:ln w="25400">
+            <a:tailEnd type="triangle"/>
+          </a:ln>
+        </p:spPr>
+        <p:style>
+          <a:lnRef idx="1">
+            <a:schemeClr val="accent2"/>
+          </a:lnRef>
+          <a:fillRef idx="0">
+            <a:schemeClr val="accent2"/>
+          </a:fillRef>
+          <a:effectRef idx="0">
+            <a:schemeClr val="accent2"/>
+          </a:effectRef>
+          <a:fontRef idx="minor">
+            <a:schemeClr val="tx1"/>
+          </a:fontRef>
+        </p:style>
+      </p:cxnSp>
+      <p:cxnSp>
+        <p:nvCxnSpPr>
+          <p:cNvPr id="25" name="Straight Arrow Connector 24">
+            <a:extLst>
+              <a:ext uri="{FF2B5EF4-FFF2-40B4-BE49-F238E27FC236}">
+                <a16:creationId xmlns:a16="http://schemas.microsoft.com/office/drawing/2014/main" id="{CBBCE28E-FED7-5653-3F84-C4BB2285085D}"/>
+              </a:ext>
+            </a:extLst>
+          </p:cNvPr>
+          <p:cNvCxnSpPr>
+            <a:cxnSpLocks/>
+          </p:cNvCxnSpPr>
+          <p:nvPr/>
+        </p:nvCxnSpPr>
+        <p:spPr>
+          <a:xfrm>
+            <a:off x="6342067" y="2212181"/>
+            <a:ext cx="0" cy="952766"/>
+          </a:xfrm>
+          <a:prstGeom prst="straightConnector1">
+            <a:avLst/>
+          </a:prstGeom>
+          <a:ln w="25400">
+            <a:solidFill>
+              <a:schemeClr val="accent2"/>
+            </a:solidFill>
+            <a:tailEnd type="triangle"/>
+          </a:ln>
+        </p:spPr>
+        <p:style>
+          <a:lnRef idx="1">
+            <a:schemeClr val="accent2"/>
+          </a:lnRef>
+          <a:fillRef idx="0">
+            <a:schemeClr val="accent2"/>
+          </a:fillRef>
+          <a:effectRef idx="0">
+            <a:schemeClr val="accent2"/>
+          </a:effectRef>
+          <a:fontRef idx="minor">
+            <a:schemeClr val="tx1"/>
+          </a:fontRef>
+        </p:style>
+      </p:cxnSp>
+      <p:cxnSp>
+        <p:nvCxnSpPr>
+          <p:cNvPr id="35" name="Straight Connector 34">
+            <a:extLst>
+              <a:ext uri="{FF2B5EF4-FFF2-40B4-BE49-F238E27FC236}">
+                <a16:creationId xmlns:a16="http://schemas.microsoft.com/office/drawing/2014/main" id="{085E07E1-D7CE-4649-5164-1DD6BF2CC64C}"/>
+              </a:ext>
+            </a:extLst>
+          </p:cNvPr>
+          <p:cNvCxnSpPr>
+            <a:cxnSpLocks/>
+          </p:cNvCxnSpPr>
+          <p:nvPr/>
+        </p:nvCxnSpPr>
+        <p:spPr>
+          <a:xfrm>
+            <a:off x="4162425" y="2190749"/>
+            <a:ext cx="283724" cy="0"/>
+          </a:xfrm>
+          <a:prstGeom prst="line">
+            <a:avLst/>
+          </a:prstGeom>
+        </p:spPr>
+        <p:style>
+          <a:lnRef idx="1">
+            <a:schemeClr val="accent1"/>
+          </a:lnRef>
+          <a:fillRef idx="0">
+            <a:schemeClr val="accent1"/>
+          </a:fillRef>
+          <a:effectRef idx="0">
+            <a:schemeClr val="accent1"/>
+          </a:effectRef>
+          <a:fontRef idx="minor">
+            <a:schemeClr val="tx1"/>
+          </a:fontRef>
+        </p:style>
+      </p:cxnSp>
+      <p:cxnSp>
+        <p:nvCxnSpPr>
+          <p:cNvPr id="37" name="Straight Connector 36">
+            <a:extLst>
+              <a:ext uri="{FF2B5EF4-FFF2-40B4-BE49-F238E27FC236}">
+                <a16:creationId xmlns:a16="http://schemas.microsoft.com/office/drawing/2014/main" id="{77035B4D-EF71-4FCF-419A-18690745A6D0}"/>
+              </a:ext>
+            </a:extLst>
+          </p:cNvPr>
+          <p:cNvCxnSpPr>
+            <a:cxnSpLocks/>
+          </p:cNvCxnSpPr>
+          <p:nvPr/>
+        </p:nvCxnSpPr>
+        <p:spPr>
+          <a:xfrm>
+            <a:off x="4429126" y="2736847"/>
+            <a:ext cx="1480345" cy="0"/>
+          </a:xfrm>
+          <a:prstGeom prst="line">
+            <a:avLst/>
+          </a:prstGeom>
+        </p:spPr>
+        <p:style>
+          <a:lnRef idx="1">
+            <a:schemeClr val="accent1"/>
+          </a:lnRef>
+          <a:fillRef idx="0">
+            <a:schemeClr val="accent1"/>
+          </a:fillRef>
+          <a:effectRef idx="0">
+            <a:schemeClr val="accent1"/>
+          </a:effectRef>
+          <a:fontRef idx="minor">
+            <a:schemeClr val="tx1"/>
+          </a:fontRef>
+        </p:style>
+      </p:cxnSp>
+      <p:cxnSp>
+        <p:nvCxnSpPr>
+          <p:cNvPr id="40" name="Straight Connector 39">
+            <a:extLst>
+              <a:ext uri="{FF2B5EF4-FFF2-40B4-BE49-F238E27FC236}">
+                <a16:creationId xmlns:a16="http://schemas.microsoft.com/office/drawing/2014/main" id="{AC6BAAB3-C0EE-1279-D4D0-E70BBC26C736}"/>
+              </a:ext>
+            </a:extLst>
+          </p:cNvPr>
+          <p:cNvCxnSpPr>
+            <a:cxnSpLocks/>
+          </p:cNvCxnSpPr>
+          <p:nvPr/>
+        </p:nvCxnSpPr>
+        <p:spPr>
+          <a:xfrm flipV="1">
+            <a:off x="6315079" y="3244850"/>
+            <a:ext cx="553246" cy="3172"/>
+          </a:xfrm>
+          <a:prstGeom prst="line">
+            <a:avLst/>
+          </a:prstGeom>
+        </p:spPr>
+        <p:style>
+          <a:lnRef idx="1">
+            <a:schemeClr val="accent1"/>
+          </a:lnRef>
+          <a:fillRef idx="0">
+            <a:schemeClr val="accent1"/>
+          </a:fillRef>
+          <a:effectRef idx="0">
+            <a:schemeClr val="accent1"/>
+          </a:effectRef>
+          <a:fontRef idx="minor">
+            <a:schemeClr val="tx1"/>
+          </a:fontRef>
+        </p:style>
+      </p:cxnSp>
+      <p:cxnSp>
+        <p:nvCxnSpPr>
+          <p:cNvPr id="42" name="Straight Connector 41">
+            <a:extLst>
+              <a:ext uri="{FF2B5EF4-FFF2-40B4-BE49-F238E27FC236}">
+                <a16:creationId xmlns:a16="http://schemas.microsoft.com/office/drawing/2014/main" id="{2707911B-B651-C8F0-858A-873BE72818D2}"/>
+              </a:ext>
+            </a:extLst>
+          </p:cNvPr>
+          <p:cNvCxnSpPr>
+            <a:cxnSpLocks/>
+          </p:cNvCxnSpPr>
+          <p:nvPr/>
+        </p:nvCxnSpPr>
+        <p:spPr>
+          <a:xfrm>
+            <a:off x="5922171" y="2195281"/>
+            <a:ext cx="409575" cy="4993"/>
+          </a:xfrm>
+          <a:prstGeom prst="line">
+            <a:avLst/>
+          </a:prstGeom>
+        </p:spPr>
+        <p:style>
+          <a:lnRef idx="1">
+            <a:schemeClr val="accent1"/>
+          </a:lnRef>
+          <a:fillRef idx="0">
+            <a:schemeClr val="accent1"/>
+          </a:fillRef>
+          <a:effectRef idx="0">
+            <a:schemeClr val="accent1"/>
+          </a:effectRef>
+          <a:fontRef idx="minor">
+            <a:schemeClr val="tx1"/>
+          </a:fontRef>
+        </p:style>
+      </p:cxnSp>
+      <p:sp>
+        <p:nvSpPr>
+          <p:cNvPr id="2" name="Oval 1">
+            <a:extLst>
+              <a:ext uri="{FF2B5EF4-FFF2-40B4-BE49-F238E27FC236}">
+                <a16:creationId xmlns:a16="http://schemas.microsoft.com/office/drawing/2014/main" id="{C634A829-C3EE-8BED-FD02-A9974BCC029F}"/>
+              </a:ext>
+            </a:extLst>
+          </p:cNvPr>
+          <p:cNvSpPr/>
+          <p:nvPr/>
+        </p:nvSpPr>
+        <p:spPr>
+          <a:xfrm>
+            <a:off x="3250555" y="3453464"/>
+            <a:ext cx="76200" cy="83820"/>
+          </a:xfrm>
+          <a:prstGeom prst="ellipse">
+            <a:avLst/>
+          </a:prstGeom>
+        </p:spPr>
+        <p:style>
+          <a:lnRef idx="2">
+            <a:schemeClr val="accent4">
+              <a:shade val="15000"/>
+            </a:schemeClr>
+          </a:lnRef>
+          <a:fillRef idx="1">
+            <a:schemeClr val="accent4"/>
+          </a:fillRef>
+          <a:effectRef idx="0">
+            <a:schemeClr val="accent4"/>
+          </a:effectRef>
+          <a:fontRef idx="minor">
+            <a:schemeClr val="lt1"/>
+          </a:fontRef>
+        </p:style>
+        <p:txBody>
+          <a:bodyPr rtlCol="0" anchor="ctr"/>
+          <a:lstStyle/>
+          <a:p>
+            <a:pPr algn="ctr"/>
+            <a:endParaRPr lang="en-DE"/>
+          </a:p>
+        </p:txBody>
+      </p:sp>
+      <p:sp>
+        <p:nvSpPr>
+          <p:cNvPr id="3" name="Oval 2">
+            <a:extLst>
+              <a:ext uri="{FF2B5EF4-FFF2-40B4-BE49-F238E27FC236}">
+                <a16:creationId xmlns:a16="http://schemas.microsoft.com/office/drawing/2014/main" id="{05DCA83D-0808-66AE-B2BC-9EA900652DEC}"/>
+              </a:ext>
+            </a:extLst>
+          </p:cNvPr>
+          <p:cNvSpPr/>
+          <p:nvPr/>
+        </p:nvSpPr>
+        <p:spPr>
+          <a:xfrm>
+            <a:off x="4126560" y="2148839"/>
+            <a:ext cx="76200" cy="83820"/>
+          </a:xfrm>
+          <a:prstGeom prst="ellipse">
+            <a:avLst/>
+          </a:prstGeom>
+        </p:spPr>
+        <p:style>
+          <a:lnRef idx="2">
+            <a:schemeClr val="accent4">
+              <a:shade val="15000"/>
+            </a:schemeClr>
+          </a:lnRef>
+          <a:fillRef idx="1">
+            <a:schemeClr val="accent4"/>
+          </a:fillRef>
+          <a:effectRef idx="0">
+            <a:schemeClr val="accent4"/>
+          </a:effectRef>
+          <a:fontRef idx="minor">
+            <a:schemeClr val="lt1"/>
+          </a:fontRef>
+        </p:style>
+        <p:txBody>
+          <a:bodyPr rtlCol="0" anchor="ctr"/>
+          <a:lstStyle/>
+          <a:p>
+            <a:pPr algn="ctr"/>
+            <a:endParaRPr lang="en-DE"/>
+          </a:p>
+        </p:txBody>
+      </p:sp>
+      <p:sp>
+        <p:nvSpPr>
+          <p:cNvPr id="6" name="Oval 5">
+            <a:extLst>
+              <a:ext uri="{FF2B5EF4-FFF2-40B4-BE49-F238E27FC236}">
+                <a16:creationId xmlns:a16="http://schemas.microsoft.com/office/drawing/2014/main" id="{9309FD40-BC37-DF55-9D06-B41D1FD5F139}"/>
+              </a:ext>
+            </a:extLst>
+          </p:cNvPr>
+          <p:cNvSpPr/>
+          <p:nvPr/>
+        </p:nvSpPr>
+        <p:spPr>
+          <a:xfrm>
+            <a:off x="4408049" y="2677426"/>
+            <a:ext cx="76200" cy="83820"/>
+          </a:xfrm>
+          <a:prstGeom prst="ellipse">
+            <a:avLst/>
+          </a:prstGeom>
+        </p:spPr>
+        <p:style>
+          <a:lnRef idx="2">
+            <a:schemeClr val="accent4">
+              <a:shade val="15000"/>
+            </a:schemeClr>
+          </a:lnRef>
+          <a:fillRef idx="1">
+            <a:schemeClr val="accent4"/>
+          </a:fillRef>
+          <a:effectRef idx="0">
+            <a:schemeClr val="accent4"/>
+          </a:effectRef>
+          <a:fontRef idx="minor">
+            <a:schemeClr val="lt1"/>
+          </a:fontRef>
+        </p:style>
+        <p:txBody>
+          <a:bodyPr rtlCol="0" anchor="ctr"/>
+          <a:lstStyle/>
+          <a:p>
+            <a:pPr algn="ctr"/>
+            <a:endParaRPr lang="en-DE"/>
+          </a:p>
+        </p:txBody>
+      </p:sp>
+      <p:sp>
+        <p:nvSpPr>
+          <p:cNvPr id="9" name="Oval 8">
+            <a:extLst>
+              <a:ext uri="{FF2B5EF4-FFF2-40B4-BE49-F238E27FC236}">
+                <a16:creationId xmlns:a16="http://schemas.microsoft.com/office/drawing/2014/main" id="{D273B856-CECE-4720-E3AA-33739949F881}"/>
+              </a:ext>
+            </a:extLst>
+          </p:cNvPr>
+          <p:cNvSpPr/>
+          <p:nvPr/>
+        </p:nvSpPr>
+        <p:spPr>
+          <a:xfrm>
+            <a:off x="5882487" y="2167013"/>
+            <a:ext cx="76200" cy="83820"/>
+          </a:xfrm>
+          <a:prstGeom prst="ellipse">
+            <a:avLst/>
+          </a:prstGeom>
+        </p:spPr>
+        <p:style>
+          <a:lnRef idx="2">
+            <a:schemeClr val="accent4">
+              <a:shade val="15000"/>
+            </a:schemeClr>
+          </a:lnRef>
+          <a:fillRef idx="1">
+            <a:schemeClr val="accent4"/>
+          </a:fillRef>
+          <a:effectRef idx="0">
+            <a:schemeClr val="accent4"/>
+          </a:effectRef>
+          <a:fontRef idx="minor">
+            <a:schemeClr val="lt1"/>
+          </a:fontRef>
+        </p:style>
+        <p:txBody>
+          <a:bodyPr rtlCol="0" anchor="ctr"/>
+          <a:lstStyle/>
+          <a:p>
+            <a:pPr algn="ctr"/>
+            <a:endParaRPr lang="en-DE"/>
+          </a:p>
+        </p:txBody>
+      </p:sp>
+      <p:sp>
+        <p:nvSpPr>
+          <p:cNvPr id="11" name="Oval 10">
+            <a:extLst>
+              <a:ext uri="{FF2B5EF4-FFF2-40B4-BE49-F238E27FC236}">
+                <a16:creationId xmlns:a16="http://schemas.microsoft.com/office/drawing/2014/main" id="{A22AAB5E-D3DB-C140-23D6-EC2A05108D42}"/>
+              </a:ext>
+            </a:extLst>
+          </p:cNvPr>
+          <p:cNvSpPr/>
+          <p:nvPr/>
+        </p:nvSpPr>
+        <p:spPr>
+          <a:xfrm>
+            <a:off x="6290765" y="3175108"/>
+            <a:ext cx="76200" cy="83820"/>
+          </a:xfrm>
+          <a:prstGeom prst="ellipse">
+            <a:avLst/>
+          </a:prstGeom>
+        </p:spPr>
+        <p:style>
+          <a:lnRef idx="2">
+            <a:schemeClr val="accent4">
+              <a:shade val="15000"/>
+            </a:schemeClr>
+          </a:lnRef>
+          <a:fillRef idx="1">
+            <a:schemeClr val="accent4"/>
+          </a:fillRef>
+          <a:effectRef idx="0">
+            <a:schemeClr val="accent4"/>
+          </a:effectRef>
+          <a:fontRef idx="minor">
+            <a:schemeClr val="lt1"/>
+          </a:fontRef>
+        </p:style>
+        <p:txBody>
+          <a:bodyPr rtlCol="0" anchor="ctr"/>
+          <a:lstStyle/>
+          <a:p>
+            <a:pPr algn="ctr"/>
+            <a:endParaRPr lang="en-DE"/>
+          </a:p>
+        </p:txBody>
+      </p:sp>
+      <p:sp>
+        <p:nvSpPr>
+          <p:cNvPr id="13" name="Oval 12">
+            <a:extLst>
+              <a:ext uri="{FF2B5EF4-FFF2-40B4-BE49-F238E27FC236}">
+                <a16:creationId xmlns:a16="http://schemas.microsoft.com/office/drawing/2014/main" id="{278EC329-D97E-5C70-C984-F89C6C075527}"/>
+              </a:ext>
+            </a:extLst>
+          </p:cNvPr>
+          <p:cNvSpPr/>
+          <p:nvPr/>
+        </p:nvSpPr>
+        <p:spPr>
+          <a:xfrm>
+            <a:off x="6844218" y="2973697"/>
+            <a:ext cx="76200" cy="83820"/>
+          </a:xfrm>
+          <a:prstGeom prst="ellipse">
+            <a:avLst/>
+          </a:prstGeom>
+        </p:spPr>
+        <p:style>
+          <a:lnRef idx="2">
+            <a:schemeClr val="accent4">
+              <a:shade val="15000"/>
+            </a:schemeClr>
+          </a:lnRef>
+          <a:fillRef idx="1">
+            <a:schemeClr val="accent4"/>
+          </a:fillRef>
+          <a:effectRef idx="0">
+            <a:schemeClr val="accent4"/>
+          </a:effectRef>
+          <a:fontRef idx="minor">
+            <a:schemeClr val="lt1"/>
+          </a:fontRef>
+        </p:style>
+        <p:txBody>
+          <a:bodyPr rtlCol="0" anchor="ctr"/>
+          <a:lstStyle/>
+          <a:p>
+            <a:pPr algn="ctr"/>
+            <a:endParaRPr lang="en-DE"/>
+          </a:p>
+        </p:txBody>
+      </p:sp>
+    </p:spTree>
+    <p:extLst>
+      <p:ext uri="{BB962C8B-B14F-4D97-AF65-F5344CB8AC3E}">
+        <p14:creationId xmlns:p14="http://schemas.microsoft.com/office/powerpoint/2010/main" val="2542912483"/>
+      </p:ext>
+    </p:extLst>
+  </p:cSld>
+  <p:clrMapOvr>
+    <a:masterClrMapping/>
+  </p:clrMapOvr>
+</p:sld>
+</file>
+
+<file path=ppt/slides/slide11.xml><?xml version="1.0" encoding="utf-8"?>
+<p:sld xmlns:a="http://schemas.openxmlformats.org/drawingml/2006/main" xmlns:r="http://schemas.openxmlformats.org/officeDocument/2006/relationships" xmlns:p="http://schemas.openxmlformats.org/presentationml/2006/main">
+  <p:cSld>
+    <p:spTree>
+      <p:nvGrpSpPr>
+        <p:cNvPr id="1" name=""/>
+        <p:cNvGrpSpPr/>
+        <p:nvPr/>
+      </p:nvGrpSpPr>
+      <p:grpSpPr>
+        <a:xfrm>
+          <a:off x="0" y="0"/>
+          <a:ext cx="0" cy="0"/>
+          <a:chOff x="0" y="0"/>
+          <a:chExt cx="0" cy="0"/>
+        </a:xfrm>
+      </p:grpSpPr>
+      <p:cxnSp>
+        <p:nvCxnSpPr>
           <p:cNvPr id="77" name="Straight Connector 76">
             <a:extLst>
               <a:ext uri="{FF2B5EF4-FFF2-40B4-BE49-F238E27FC236}">
@@ -5691,7 +6717,7 @@
 </p:sld>
 </file>
 
-<file path=ppt/slides/slide11.xml><?xml version="1.0" encoding="utf-8"?>
+<file path=ppt/slides/slide12.xml><?xml version="1.0" encoding="utf-8"?>
 <p:sld xmlns:a="http://schemas.openxmlformats.org/drawingml/2006/main" xmlns:r="http://schemas.openxmlformats.org/officeDocument/2006/relationships" xmlns:p="http://schemas.openxmlformats.org/presentationml/2006/main">
   <p:cSld>
     <p:spTree>
@@ -6475,7 +7501,7 @@
 </p:sld>
 </file>
 
-<file path=ppt/slides/slide12.xml><?xml version="1.0" encoding="utf-8"?>
+<file path=ppt/slides/slide13.xml><?xml version="1.0" encoding="utf-8"?>
 <p:sld xmlns:a="http://schemas.openxmlformats.org/drawingml/2006/main" xmlns:r="http://schemas.openxmlformats.org/officeDocument/2006/relationships" xmlns:p="http://schemas.openxmlformats.org/presentationml/2006/main">
   <p:cSld>
     <p:spTree>
@@ -7774,10 +8800,10 @@
       </p:grpSpPr>
       <p:grpSp>
         <p:nvGrpSpPr>
-          <p:cNvPr id="114" name="Group 113">
-            <a:extLst>
-              <a:ext uri="{FF2B5EF4-FFF2-40B4-BE49-F238E27FC236}">
-                <a16:creationId xmlns:a16="http://schemas.microsoft.com/office/drawing/2014/main" id="{B569F6C8-17B4-B650-1128-DCBFC40E6992}"/>
+          <p:cNvPr id="76" name="Group 75">
+            <a:extLst>
+              <a:ext uri="{FF2B5EF4-FFF2-40B4-BE49-F238E27FC236}">
+                <a16:creationId xmlns:a16="http://schemas.microsoft.com/office/drawing/2014/main" id="{95898938-AFA4-DAB8-7C26-4C7247097D80}"/>
               </a:ext>
             </a:extLst>
           </p:cNvPr>
@@ -7786,10 +8812,10 @@
         </p:nvGrpSpPr>
         <p:grpSpPr>
           <a:xfrm>
-            <a:off x="135224" y="172664"/>
-            <a:ext cx="11921551" cy="6512671"/>
-            <a:chOff x="140176" y="144379"/>
-            <a:chExt cx="11921551" cy="6512671"/>
+            <a:off x="445367" y="702050"/>
+            <a:ext cx="9158977" cy="5997284"/>
+            <a:chOff x="445367" y="702050"/>
+            <a:chExt cx="9158977" cy="5997284"/>
           </a:xfrm>
         </p:grpSpPr>
         <p:sp>
@@ -7806,7 +8832,7 @@
           </p:nvSpPr>
           <p:spPr>
             <a:xfrm>
-              <a:off x="9688589" y="514664"/>
+              <a:off x="7231206" y="4060095"/>
               <a:ext cx="2373138" cy="2455253"/>
             </a:xfrm>
             <a:prstGeom prst="rect">
@@ -7862,8 +8888,8 @@
           </p:nvSpPr>
           <p:spPr>
             <a:xfrm>
-              <a:off x="140176" y="144379"/>
-              <a:ext cx="2332532" cy="2811674"/>
+              <a:off x="456064" y="702050"/>
+              <a:ext cx="2332532" cy="1463631"/>
             </a:xfrm>
             <a:prstGeom prst="rect">
               <a:avLst/>
@@ -7918,7 +8944,7 @@
           </p:nvSpPr>
           <p:spPr>
             <a:xfrm>
-              <a:off x="6379648" y="1279071"/>
+              <a:off x="445367" y="2915300"/>
               <a:ext cx="2373138" cy="539865"/>
             </a:xfrm>
             <a:prstGeom prst="rect">
@@ -7992,7 +9018,7 @@
           </p:nvSpPr>
           <p:spPr>
             <a:xfrm>
-              <a:off x="251915" y="216086"/>
+              <a:off x="567803" y="773757"/>
               <a:ext cx="2128267" cy="597159"/>
             </a:xfrm>
             <a:prstGeom prst="rect">
@@ -8066,7 +9092,7 @@
           </p:nvSpPr>
           <p:spPr>
             <a:xfrm>
-              <a:off x="242308" y="932151"/>
+              <a:off x="558196" y="1489822"/>
               <a:ext cx="2128267" cy="597159"/>
             </a:xfrm>
             <a:prstGeom prst="rect">
@@ -8126,80 +9152,6 @@
             </a:p>
           </p:txBody>
         </p:sp>
-        <p:sp>
-          <p:nvSpPr>
-            <p:cNvPr id="9" name="Rectangle 8">
-              <a:extLst>
-                <a:ext uri="{FF2B5EF4-FFF2-40B4-BE49-F238E27FC236}">
-                  <a16:creationId xmlns:a16="http://schemas.microsoft.com/office/drawing/2014/main" id="{D81AC8C3-FD1F-DF15-62AB-D5ED0F35D8BE}"/>
-                </a:ext>
-              </a:extLst>
-            </p:cNvPr>
-            <p:cNvSpPr/>
-            <p:nvPr/>
-          </p:nvSpPr>
-          <p:spPr>
-            <a:xfrm>
-              <a:off x="247579" y="1610065"/>
-              <a:ext cx="2128267" cy="597159"/>
-            </a:xfrm>
-            <a:prstGeom prst="rect">
-              <a:avLst/>
-            </a:prstGeom>
-          </p:spPr>
-          <p:style>
-            <a:lnRef idx="2">
-              <a:schemeClr val="accent4">
-                <a:shade val="15000"/>
-              </a:schemeClr>
-            </a:lnRef>
-            <a:fillRef idx="1">
-              <a:schemeClr val="accent4"/>
-            </a:fillRef>
-            <a:effectRef idx="0">
-              <a:schemeClr val="accent4"/>
-            </a:effectRef>
-            <a:fontRef idx="minor">
-              <a:schemeClr val="lt1"/>
-            </a:fontRef>
-          </p:style>
-          <p:txBody>
-            <a:bodyPr rtlCol="0" anchor="ctr"/>
-            <a:lstStyle/>
-            <a:p>
-              <a:pPr algn="ctr"/>
-              <a:r>
-                <a:rPr lang="en-US" dirty="0">
-                  <a:ln w="0"/>
-                  <a:solidFill>
-                    <a:schemeClr val="tx1"/>
-                  </a:solidFill>
-                  <a:effectLst>
-                    <a:outerShdw blurRad="38100" dist="19050" dir="2700000" algn="tl" rotWithShape="0">
-                      <a:schemeClr val="dk1">
-                        <a:alpha val="40000"/>
-                      </a:schemeClr>
-                    </a:outerShdw>
-                  </a:effectLst>
-                </a:rPr>
-                <a:t>Material</a:t>
-              </a:r>
-              <a:endParaRPr lang="en-DE" dirty="0">
-                <a:ln w="0"/>
-                <a:solidFill>
-                  <a:schemeClr val="tx1"/>
-                </a:solidFill>
-                <a:effectLst>
-                  <a:outerShdw blurRad="38100" dist="19050" dir="2700000" algn="tl" rotWithShape="0">
-                    <a:schemeClr val="dk1">
-                      <a:alpha val="40000"/>
-                    </a:schemeClr>
-                  </a:outerShdw>
-                </a:effectLst>
-              </a:endParaRPr>
-            </a:p>
-          </p:txBody>
-        </p:sp>
         <p:grpSp>
           <p:nvGrpSpPr>
             <p:cNvPr id="48" name="Group 47">
@@ -8214,7 +9166,7 @@
           </p:nvGrpSpPr>
           <p:grpSpPr>
             <a:xfrm>
-              <a:off x="3239609" y="678488"/>
+              <a:off x="3234657" y="706773"/>
               <a:ext cx="2373138" cy="1741032"/>
               <a:chOff x="3656874" y="466192"/>
               <a:chExt cx="2373138" cy="1741032"/>
@@ -8391,7 +9343,7 @@
           </p:nvGrpSpPr>
           <p:grpSpPr>
             <a:xfrm>
-              <a:off x="6689924" y="4017811"/>
+              <a:off x="3031703" y="4060095"/>
               <a:ext cx="1752589" cy="2639239"/>
               <a:chOff x="2977215" y="4002372"/>
               <a:chExt cx="1752589" cy="2639239"/>
@@ -8698,7 +9650,7 @@
           </p:nvGrpSpPr>
           <p:grpSpPr>
             <a:xfrm>
-              <a:off x="8842292" y="4020303"/>
+              <a:off x="5123190" y="4062587"/>
               <a:ext cx="1945620" cy="2636747"/>
               <a:chOff x="4819512" y="4008867"/>
               <a:chExt cx="1945620" cy="2636747"/>
@@ -8931,7 +9883,7 @@
           </p:nvGrpSpPr>
           <p:grpSpPr>
             <a:xfrm>
-              <a:off x="4450459" y="4017811"/>
+              <a:off x="746034" y="4099634"/>
               <a:ext cx="1752589" cy="2057400"/>
               <a:chOff x="406131" y="3783106"/>
               <a:chExt cx="1752589" cy="2057400"/>
@@ -9164,7 +10116,7 @@
           </p:nvSpPr>
           <p:spPr>
             <a:xfrm>
-              <a:off x="9811746" y="727265"/>
+              <a:off x="7341039" y="4195679"/>
               <a:ext cx="2128267" cy="597159"/>
             </a:xfrm>
             <a:prstGeom prst="rect">
@@ -9238,9 +10190,9 @@
           </p:nvGrpSpPr>
           <p:grpSpPr>
             <a:xfrm>
-              <a:off x="1531659" y="4020302"/>
+              <a:off x="6258395" y="773757"/>
               <a:ext cx="2373138" cy="1606255"/>
-              <a:chOff x="1484889" y="3838563"/>
+              <a:chOff x="7496615" y="1265047"/>
               <a:chExt cx="2373138" cy="1606255"/>
             </a:xfrm>
           </p:grpSpPr>
@@ -9258,7 +10210,7 @@
             </p:nvSpPr>
             <p:spPr>
               <a:xfrm>
-                <a:off x="1484889" y="3838563"/>
+                <a:off x="7496615" y="1265047"/>
                 <a:ext cx="2373138" cy="1606255"/>
               </a:xfrm>
               <a:prstGeom prst="rect">
@@ -9314,7 +10266,7 @@
             </p:nvSpPr>
             <p:spPr>
               <a:xfrm>
-                <a:off x="1698649" y="3993722"/>
+                <a:off x="7710375" y="1420206"/>
                 <a:ext cx="1945620" cy="597159"/>
               </a:xfrm>
               <a:prstGeom prst="rect">
@@ -9388,7 +10340,7 @@
             </p:nvSpPr>
             <p:spPr>
               <a:xfrm>
-                <a:off x="1698649" y="4725066"/>
+                <a:off x="7710375" y="2151550"/>
                 <a:ext cx="1945620" cy="597159"/>
               </a:xfrm>
               <a:prstGeom prst="rect">
@@ -9461,107 +10413,19 @@
             <p:cNvCxnSpPr>
               <a:cxnSpLocks/>
               <a:stCxn id="28" idx="3"/>
-              <a:endCxn id="10" idx="0"/>
+              <a:endCxn id="30" idx="0"/>
             </p:cNvCxnSpPr>
             <p:nvPr/>
           </p:nvCxnSpPr>
           <p:spPr>
             <a:xfrm flipV="1">
-              <a:off x="2472708" y="823450"/>
-              <a:ext cx="1953018" cy="726766"/>
+              <a:off x="2788596" y="706773"/>
+              <a:ext cx="1632630" cy="727093"/>
             </a:xfrm>
             <a:prstGeom prst="bentConnector4">
               <a:avLst>
-                <a:gd name="adj1" fmla="val 22757"/>
-                <a:gd name="adj2" fmla="val 150188"/>
-              </a:avLst>
-            </a:prstGeom>
-            <a:ln w="38100">
-              <a:tailEnd type="triangle"/>
-            </a:ln>
-          </p:spPr>
-          <p:style>
-            <a:lnRef idx="1">
-              <a:schemeClr val="accent1"/>
-            </a:lnRef>
-            <a:fillRef idx="0">
-              <a:schemeClr val="accent1"/>
-            </a:fillRef>
-            <a:effectRef idx="0">
-              <a:schemeClr val="accent1"/>
-            </a:effectRef>
-            <a:fontRef idx="minor">
-              <a:schemeClr val="tx1"/>
-            </a:fontRef>
-          </p:style>
-        </p:cxnSp>
-        <p:cxnSp>
-          <p:nvCxnSpPr>
-            <p:cNvPr id="43" name="Straight Arrow Connector 42">
-              <a:extLst>
-                <a:ext uri="{FF2B5EF4-FFF2-40B4-BE49-F238E27FC236}">
-                  <a16:creationId xmlns:a16="http://schemas.microsoft.com/office/drawing/2014/main" id="{325B8746-8F30-ADAD-AD7C-9E96C8742BC1}"/>
-                </a:ext>
-              </a:extLst>
-            </p:cNvPr>
-            <p:cNvCxnSpPr>
-              <a:cxnSpLocks/>
-              <a:stCxn id="10" idx="2"/>
-              <a:endCxn id="4" idx="0"/>
-            </p:cNvCxnSpPr>
-            <p:nvPr/>
-          </p:nvCxnSpPr>
-          <p:spPr>
-            <a:xfrm flipH="1">
-              <a:off x="4425725" y="1451094"/>
-              <a:ext cx="1" cy="231222"/>
-            </a:xfrm>
-            <a:prstGeom prst="straightConnector1">
-              <a:avLst/>
-            </a:prstGeom>
-            <a:ln w="38100">
-              <a:tailEnd type="triangle"/>
-            </a:ln>
-          </p:spPr>
-          <p:style>
-            <a:lnRef idx="1">
-              <a:schemeClr val="accent1"/>
-            </a:lnRef>
-            <a:fillRef idx="0">
-              <a:schemeClr val="accent1"/>
-            </a:fillRef>
-            <a:effectRef idx="0">
-              <a:schemeClr val="accent1"/>
-            </a:effectRef>
-            <a:fontRef idx="minor">
-              <a:schemeClr val="tx1"/>
-            </a:fontRef>
-          </p:style>
-        </p:cxnSp>
-        <p:cxnSp>
-          <p:nvCxnSpPr>
-            <p:cNvPr id="49" name="Connector: Elbow 48">
-              <a:extLst>
-                <a:ext uri="{FF2B5EF4-FFF2-40B4-BE49-F238E27FC236}">
-                  <a16:creationId xmlns:a16="http://schemas.microsoft.com/office/drawing/2014/main" id="{BB3CE74F-F05D-45E4-3908-DA3942889F89}"/>
-                </a:ext>
-              </a:extLst>
-            </p:cNvPr>
-            <p:cNvCxnSpPr>
-              <a:cxnSpLocks/>
-              <a:stCxn id="6" idx="2"/>
-              <a:endCxn id="15" idx="0"/>
-            </p:cNvCxnSpPr>
-            <p:nvPr/>
-          </p:nvCxnSpPr>
-          <p:spPr>
-            <a:xfrm rot="5400000">
-              <a:off x="5347049" y="1798642"/>
-              <a:ext cx="2198875" cy="2239463"/>
-            </a:xfrm>
-            <a:prstGeom prst="bentConnector3">
-              <a:avLst>
-                <a:gd name="adj1" fmla="val 75413"/>
+                <a:gd name="adj1" fmla="val 13661"/>
+                <a:gd name="adj2" fmla="val 132090"/>
               </a:avLst>
             </a:prstGeom>
             <a:ln w="38100">
@@ -9601,12 +10465,12 @@
           </p:nvCxnSpPr>
           <p:spPr>
             <a:xfrm rot="16200000" flipH="1">
-              <a:off x="7589976" y="1795176"/>
-              <a:ext cx="2201367" cy="2248885"/>
+              <a:off x="3560257" y="1526844"/>
+              <a:ext cx="607422" cy="4464064"/>
             </a:xfrm>
             <a:prstGeom prst="bentConnector3">
               <a:avLst>
-                <a:gd name="adj1" fmla="val 75398"/>
+                <a:gd name="adj1" fmla="val 49478"/>
               </a:avLst>
             </a:prstGeom>
             <a:ln w="38100">
@@ -9646,8 +10510,8 @@
           </p:nvCxnSpPr>
           <p:spPr>
             <a:xfrm rot="16200000" flipH="1">
-              <a:off x="6466781" y="2918372"/>
-              <a:ext cx="2198875" cy="2"/>
+              <a:off x="2467502" y="2619599"/>
+              <a:ext cx="604930" cy="2276062"/>
             </a:xfrm>
             <a:prstGeom prst="bentConnector3">
               <a:avLst>
@@ -9673,80 +10537,6 @@
             </a:fontRef>
           </p:style>
         </p:cxnSp>
-        <p:sp>
-          <p:nvSpPr>
-            <p:cNvPr id="19" name="Rectangle 18">
-              <a:extLst>
-                <a:ext uri="{FF2B5EF4-FFF2-40B4-BE49-F238E27FC236}">
-                  <a16:creationId xmlns:a16="http://schemas.microsoft.com/office/drawing/2014/main" id="{35652CB9-54FF-5FA5-6424-6244D2F1ED38}"/>
-                </a:ext>
-              </a:extLst>
-            </p:cNvPr>
-            <p:cNvSpPr/>
-            <p:nvPr/>
-          </p:nvSpPr>
-          <p:spPr>
-            <a:xfrm>
-              <a:off x="251987" y="2292421"/>
-              <a:ext cx="2120716" cy="597159"/>
-            </a:xfrm>
-            <a:prstGeom prst="rect">
-              <a:avLst/>
-            </a:prstGeom>
-          </p:spPr>
-          <p:style>
-            <a:lnRef idx="2">
-              <a:schemeClr val="accent4">
-                <a:shade val="15000"/>
-              </a:schemeClr>
-            </a:lnRef>
-            <a:fillRef idx="1">
-              <a:schemeClr val="accent4"/>
-            </a:fillRef>
-            <a:effectRef idx="0">
-              <a:schemeClr val="accent4"/>
-            </a:effectRef>
-            <a:fontRef idx="minor">
-              <a:schemeClr val="lt1"/>
-            </a:fontRef>
-          </p:style>
-          <p:txBody>
-            <a:bodyPr rtlCol="0" anchor="ctr"/>
-            <a:lstStyle/>
-            <a:p>
-              <a:pPr algn="ctr"/>
-              <a:r>
-                <a:rPr lang="en-US" dirty="0">
-                  <a:ln w="0"/>
-                  <a:solidFill>
-                    <a:schemeClr val="tx1"/>
-                  </a:solidFill>
-                  <a:effectLst>
-                    <a:outerShdw blurRad="38100" dist="19050" dir="2700000" algn="tl" rotWithShape="0">
-                      <a:schemeClr val="dk1">
-                        <a:alpha val="40000"/>
-                      </a:schemeClr>
-                    </a:outerShdw>
-                  </a:effectLst>
-                </a:rPr>
-                <a:t>Adjacent parameters</a:t>
-              </a:r>
-              <a:endParaRPr lang="en-DE" dirty="0">
-                <a:ln w="0"/>
-                <a:solidFill>
-                  <a:schemeClr val="tx1"/>
-                </a:solidFill>
-                <a:effectLst>
-                  <a:outerShdw blurRad="38100" dist="19050" dir="2700000" algn="tl" rotWithShape="0">
-                    <a:schemeClr val="dk1">
-                      <a:alpha val="40000"/>
-                    </a:schemeClr>
-                  </a:outerShdw>
-                </a:effectLst>
-              </a:endParaRPr>
-            </a:p>
-          </p:txBody>
-        </p:sp>
         <p:cxnSp>
           <p:nvCxnSpPr>
             <p:cNvPr id="63" name="Connector: Elbow 62">
@@ -9757,21 +10547,20 @@
               </a:extLst>
             </p:cNvPr>
             <p:cNvCxnSpPr>
-              <a:stCxn id="4" idx="2"/>
+              <a:cxnSpLocks/>
+              <a:stCxn id="30" idx="2"/>
               <a:endCxn id="6" idx="0"/>
             </p:cNvCxnSpPr>
             <p:nvPr/>
           </p:nvCxnSpPr>
           <p:spPr>
-            <a:xfrm rot="5400000" flipH="1" flipV="1">
-              <a:off x="5495769" y="209027"/>
-              <a:ext cx="1000404" cy="3140492"/>
+            <a:xfrm rot="5400000">
+              <a:off x="2792834" y="1286907"/>
+              <a:ext cx="467495" cy="2789290"/>
             </a:xfrm>
-            <a:prstGeom prst="bentConnector5">
+            <a:prstGeom prst="bentConnector3">
               <a:avLst>
-                <a:gd name="adj1" fmla="val -22851"/>
-                <a:gd name="adj2" fmla="val 48051"/>
-                <a:gd name="adj3" fmla="val 122851"/>
+                <a:gd name="adj1" fmla="val 50000"/>
               </a:avLst>
             </a:prstGeom>
             <a:ln w="38100">
@@ -9810,13 +10599,15 @@
             <p:nvPr/>
           </p:nvCxnSpPr>
           <p:spPr>
-            <a:xfrm rot="5400000">
-              <a:off x="2771812" y="2365936"/>
-              <a:ext cx="1600782" cy="1707950"/>
+            <a:xfrm rot="5400000" flipH="1" flipV="1">
+              <a:off x="5096071" y="98912"/>
+              <a:ext cx="1674048" cy="3023738"/>
             </a:xfrm>
-            <a:prstGeom prst="bentConnector3">
+            <a:prstGeom prst="bentConnector5">
               <a:avLst>
-                <a:gd name="adj1" fmla="val 50000"/>
+                <a:gd name="adj1" fmla="val -14135"/>
+                <a:gd name="adj2" fmla="val 50000"/>
+                <a:gd name="adj3" fmla="val 113656"/>
               </a:avLst>
             </a:prstGeom>
             <a:ln w="38100">
@@ -9852,7 +10643,7 @@
           </p:nvSpPr>
           <p:spPr>
             <a:xfrm>
-              <a:off x="9806948" y="1458380"/>
+              <a:off x="7336241" y="4926794"/>
               <a:ext cx="2128267" cy="597159"/>
             </a:xfrm>
             <a:prstGeom prst="rect">
@@ -9926,7 +10717,7 @@
           </p:nvSpPr>
           <p:spPr>
             <a:xfrm>
-              <a:off x="9806947" y="2169514"/>
+              <a:off x="7336240" y="5637928"/>
               <a:ext cx="2128267" cy="597159"/>
             </a:xfrm>
             <a:prstGeom prst="rect">
@@ -10002,15 +10793,128 @@
             <p:nvPr/>
           </p:nvCxnSpPr>
           <p:spPr>
-            <a:xfrm flipV="1">
-              <a:off x="8752786" y="514664"/>
-              <a:ext cx="2122372" cy="1034340"/>
+            <a:xfrm>
+              <a:off x="2818505" y="3185233"/>
+              <a:ext cx="5599270" cy="874862"/>
             </a:xfrm>
-            <a:prstGeom prst="bentConnector4">
-              <a:avLst>
-                <a:gd name="adj1" fmla="val 22046"/>
-                <a:gd name="adj2" fmla="val 122101"/>
-              </a:avLst>
+            <a:prstGeom prst="bentConnector2">
+              <a:avLst/>
+            </a:prstGeom>
+            <a:ln w="38100">
+              <a:tailEnd type="triangle"/>
+            </a:ln>
+          </p:spPr>
+          <p:style>
+            <a:lnRef idx="1">
+              <a:schemeClr val="accent1"/>
+            </a:lnRef>
+            <a:fillRef idx="0">
+              <a:schemeClr val="accent1"/>
+            </a:fillRef>
+            <a:effectRef idx="0">
+              <a:schemeClr val="accent1"/>
+            </a:effectRef>
+            <a:fontRef idx="minor">
+              <a:schemeClr val="tx1"/>
+            </a:fontRef>
+          </p:style>
+        </p:cxnSp>
+        <p:sp>
+          <p:nvSpPr>
+            <p:cNvPr id="18" name="Rectangle 17">
+              <a:extLst>
+                <a:ext uri="{FF2B5EF4-FFF2-40B4-BE49-F238E27FC236}">
+                  <a16:creationId xmlns:a16="http://schemas.microsoft.com/office/drawing/2014/main" id="{83BC5B43-2916-D6EB-A947-26EDF8127BD7}"/>
+                </a:ext>
+              </a:extLst>
+            </p:cNvPr>
+            <p:cNvSpPr/>
+            <p:nvPr/>
+          </p:nvSpPr>
+          <p:spPr>
+            <a:xfrm>
+              <a:off x="5272262" y="5210705"/>
+              <a:ext cx="1642661" cy="597159"/>
+            </a:xfrm>
+            <a:prstGeom prst="rect">
+              <a:avLst/>
+            </a:prstGeom>
+          </p:spPr>
+          <p:style>
+            <a:lnRef idx="2">
+              <a:schemeClr val="accent2">
+                <a:shade val="15000"/>
+              </a:schemeClr>
+            </a:lnRef>
+            <a:fillRef idx="1">
+              <a:schemeClr val="accent2"/>
+            </a:fillRef>
+            <a:effectRef idx="0">
+              <a:schemeClr val="accent2"/>
+            </a:effectRef>
+            <a:fontRef idx="minor">
+              <a:schemeClr val="lt1"/>
+            </a:fontRef>
+          </p:style>
+          <p:txBody>
+            <a:bodyPr rtlCol="0" anchor="ctr"/>
+            <a:lstStyle/>
+            <a:p>
+              <a:pPr algn="ctr"/>
+              <a:r>
+                <a:rPr lang="en-US" dirty="0">
+                  <a:ln w="0"/>
+                  <a:solidFill>
+                    <a:schemeClr val="tx1"/>
+                  </a:solidFill>
+                  <a:effectLst>
+                    <a:outerShdw blurRad="38100" dist="19050" dir="2700000" algn="tl" rotWithShape="0">
+                      <a:schemeClr val="dk1">
+                        <a:alpha val="40000"/>
+                      </a:schemeClr>
+                    </a:outerShdw>
+                  </a:effectLst>
+                </a:rPr>
+                <a:t>TCP velocity</a:t>
+              </a:r>
+              <a:endParaRPr lang="en-DE" dirty="0">
+                <a:ln w="0"/>
+                <a:solidFill>
+                  <a:schemeClr val="tx1"/>
+                </a:solidFill>
+                <a:effectLst>
+                  <a:outerShdw blurRad="38100" dist="19050" dir="2700000" algn="tl" rotWithShape="0">
+                    <a:schemeClr val="dk1">
+                      <a:alpha val="40000"/>
+                    </a:schemeClr>
+                  </a:outerShdw>
+                </a:effectLst>
+              </a:endParaRPr>
+            </a:p>
+          </p:txBody>
+        </p:sp>
+        <p:cxnSp>
+          <p:nvCxnSpPr>
+            <p:cNvPr id="75" name="Straight Connector 74">
+              <a:extLst>
+                <a:ext uri="{FF2B5EF4-FFF2-40B4-BE49-F238E27FC236}">
+                  <a16:creationId xmlns:a16="http://schemas.microsoft.com/office/drawing/2014/main" id="{04420CE7-E0FC-1C6C-F9BE-16428B7DEA9C}"/>
+                </a:ext>
+              </a:extLst>
+            </p:cNvPr>
+            <p:cNvCxnSpPr>
+              <a:stCxn id="6" idx="2"/>
+              <a:endCxn id="15" idx="0"/>
+            </p:cNvCxnSpPr>
+            <p:nvPr/>
+          </p:nvCxnSpPr>
+          <p:spPr>
+            <a:xfrm flipH="1">
+              <a:off x="1622329" y="3455165"/>
+              <a:ext cx="9607" cy="644469"/>
+            </a:xfrm>
+            <a:prstGeom prst="line">
+              <a:avLst/>
             </a:prstGeom>
             <a:ln w="38100">
               <a:tailEnd type="triangle"/>
@@ -10032,80 +10936,6 @@
           </p:style>
         </p:cxnSp>
       </p:grpSp>
-      <p:sp>
-        <p:nvSpPr>
-          <p:cNvPr id="18" name="Rectangle 17">
-            <a:extLst>
-              <a:ext uri="{FF2B5EF4-FFF2-40B4-BE49-F238E27FC236}">
-                <a16:creationId xmlns:a16="http://schemas.microsoft.com/office/drawing/2014/main" id="{83BC5B43-2916-D6EB-A947-26EDF8127BD7}"/>
-              </a:ext>
-            </a:extLst>
-          </p:cNvPr>
-          <p:cNvSpPr/>
-          <p:nvPr/>
-        </p:nvSpPr>
-        <p:spPr>
-          <a:xfrm>
-            <a:off x="8987688" y="5197287"/>
-            <a:ext cx="1642661" cy="597159"/>
-          </a:xfrm>
-          <a:prstGeom prst="rect">
-            <a:avLst/>
-          </a:prstGeom>
-        </p:spPr>
-        <p:style>
-          <a:lnRef idx="2">
-            <a:schemeClr val="accent2">
-              <a:shade val="15000"/>
-            </a:schemeClr>
-          </a:lnRef>
-          <a:fillRef idx="1">
-            <a:schemeClr val="accent2"/>
-          </a:fillRef>
-          <a:effectRef idx="0">
-            <a:schemeClr val="accent2"/>
-          </a:effectRef>
-          <a:fontRef idx="minor">
-            <a:schemeClr val="lt1"/>
-          </a:fontRef>
-        </p:style>
-        <p:txBody>
-          <a:bodyPr rtlCol="0" anchor="ctr"/>
-          <a:lstStyle/>
-          <a:p>
-            <a:pPr algn="ctr"/>
-            <a:r>
-              <a:rPr lang="en-US" dirty="0">
-                <a:ln w="0"/>
-                <a:solidFill>
-                  <a:schemeClr val="tx1"/>
-                </a:solidFill>
-                <a:effectLst>
-                  <a:outerShdw blurRad="38100" dist="19050" dir="2700000" algn="tl" rotWithShape="0">
-                    <a:schemeClr val="dk1">
-                      <a:alpha val="40000"/>
-                    </a:schemeClr>
-                  </a:outerShdw>
-                </a:effectLst>
-              </a:rPr>
-              <a:t>TCP velocity</a:t>
-            </a:r>
-            <a:endParaRPr lang="en-DE" dirty="0">
-              <a:ln w="0"/>
-              <a:solidFill>
-                <a:schemeClr val="tx1"/>
-              </a:solidFill>
-              <a:effectLst>
-                <a:outerShdw blurRad="38100" dist="19050" dir="2700000" algn="tl" rotWithShape="0">
-                  <a:schemeClr val="dk1">
-                    <a:alpha val="40000"/>
-                  </a:schemeClr>
-                </a:outerShdw>
-              </a:effectLst>
-            </a:endParaRPr>
-          </a:p>
-        </p:txBody>
-      </p:sp>
     </p:spTree>
     <p:extLst>
       <p:ext uri="{BB962C8B-B14F-4D97-AF65-F5344CB8AC3E}">
@@ -15808,51 +16638,10 @@
       </p:grpSpPr>
       <p:cxnSp>
         <p:nvCxnSpPr>
-          <p:cNvPr id="10" name="Straight Connector 9">
-            <a:extLst>
-              <a:ext uri="{FF2B5EF4-FFF2-40B4-BE49-F238E27FC236}">
-                <a16:creationId xmlns:a16="http://schemas.microsoft.com/office/drawing/2014/main" id="{98BA9C8F-BD2B-F8AD-56EB-EED1BC4B5F56}"/>
-              </a:ext>
-            </a:extLst>
-          </p:cNvPr>
-          <p:cNvCxnSpPr/>
-          <p:nvPr/>
-        </p:nvCxnSpPr>
-        <p:spPr>
-          <a:xfrm flipV="1">
-            <a:off x="3278481" y="2200274"/>
-            <a:ext cx="896353" cy="1317959"/>
-          </a:xfrm>
-          <a:prstGeom prst="line">
-            <a:avLst/>
-          </a:prstGeom>
-          <a:ln w="38100">
-            <a:solidFill>
-              <a:schemeClr val="tx1"/>
-            </a:solidFill>
-          </a:ln>
-        </p:spPr>
-        <p:style>
-          <a:lnRef idx="1">
-            <a:schemeClr val="accent1"/>
-          </a:lnRef>
-          <a:fillRef idx="0">
-            <a:schemeClr val="accent1"/>
-          </a:fillRef>
-          <a:effectRef idx="0">
-            <a:schemeClr val="accent1"/>
-          </a:effectRef>
-          <a:fontRef idx="minor">
-            <a:schemeClr val="tx1"/>
-          </a:fontRef>
-        </p:style>
-      </p:cxnSp>
-      <p:cxnSp>
-        <p:nvCxnSpPr>
           <p:cNvPr id="4" name="Straight Arrow Connector 3">
             <a:extLst>
               <a:ext uri="{FF2B5EF4-FFF2-40B4-BE49-F238E27FC236}">
-                <a16:creationId xmlns:a16="http://schemas.microsoft.com/office/drawing/2014/main" id="{9F76E815-5928-07BB-5510-B55DE84A7785}"/>
+                <a16:creationId xmlns:a16="http://schemas.microsoft.com/office/drawing/2014/main" id="{02160608-85E5-4BD5-AEB0-736F347E085B}"/>
               </a:ext>
             </a:extLst>
           </p:cNvPr>
@@ -15861,7 +16650,7 @@
         </p:nvCxnSpPr>
         <p:spPr>
           <a:xfrm>
-            <a:off x="3152274" y="3537284"/>
+            <a:off x="1485399" y="3584909"/>
             <a:ext cx="3978442" cy="0"/>
           </a:xfrm>
           <a:prstGeom prst="straightConnector1">
@@ -15891,7 +16680,7 @@
           <p:cNvPr id="5" name="Straight Arrow Connector 4">
             <a:extLst>
               <a:ext uri="{FF2B5EF4-FFF2-40B4-BE49-F238E27FC236}">
-                <a16:creationId xmlns:a16="http://schemas.microsoft.com/office/drawing/2014/main" id="{2DD1A29F-9FD4-767D-22ED-95B9B3408829}"/>
+                <a16:creationId xmlns:a16="http://schemas.microsoft.com/office/drawing/2014/main" id="{EFE4D728-7743-2452-88AC-F188D0694706}"/>
               </a:ext>
             </a:extLst>
           </p:cNvPr>
@@ -15900,7 +16689,7 @@
         </p:nvCxnSpPr>
         <p:spPr>
           <a:xfrm flipV="1">
-            <a:off x="3256547" y="1780674"/>
+            <a:off x="1589672" y="1828299"/>
             <a:ext cx="0" cy="1868905"/>
           </a:xfrm>
           <a:prstGeom prst="straightConnector1">
@@ -15927,10 +16716,106 @@
       </p:cxnSp>
       <p:sp>
         <p:nvSpPr>
+          <p:cNvPr id="6" name="Freeform: Shape 5">
+            <a:extLst>
+              <a:ext uri="{FF2B5EF4-FFF2-40B4-BE49-F238E27FC236}">
+                <a16:creationId xmlns:a16="http://schemas.microsoft.com/office/drawing/2014/main" id="{BE696EAC-3DEB-3F6B-BF0D-147206A539EC}"/>
+              </a:ext>
+            </a:extLst>
+          </p:cNvPr>
+          <p:cNvSpPr/>
+          <p:nvPr/>
+        </p:nvSpPr>
+        <p:spPr>
+          <a:xfrm>
+            <a:off x="1605714" y="2382200"/>
+            <a:ext cx="3424990" cy="1186667"/>
+          </a:xfrm>
+          <a:custGeom>
+            <a:avLst/>
+            <a:gdLst>
+              <a:gd name="connsiteX0" fmla="*/ 0 w 3424990"/>
+              <a:gd name="connsiteY0" fmla="*/ 1186667 h 1186667"/>
+              <a:gd name="connsiteX1" fmla="*/ 1403684 w 3424990"/>
+              <a:gd name="connsiteY1" fmla="*/ 7572 h 1186667"/>
+              <a:gd name="connsiteX2" fmla="*/ 2775284 w 3424990"/>
+              <a:gd name="connsiteY2" fmla="*/ 665298 h 1186667"/>
+              <a:gd name="connsiteX3" fmla="*/ 3424990 w 3424990"/>
+              <a:gd name="connsiteY3" fmla="*/ 344456 h 1186667"/>
+            </a:gdLst>
+            <a:ahLst/>
+            <a:cxnLst>
+              <a:cxn ang="0">
+                <a:pos x="connsiteX0" y="connsiteY0"/>
+              </a:cxn>
+              <a:cxn ang="0">
+                <a:pos x="connsiteX1" y="connsiteY1"/>
+              </a:cxn>
+              <a:cxn ang="0">
+                <a:pos x="connsiteX2" y="connsiteY2"/>
+              </a:cxn>
+              <a:cxn ang="0">
+                <a:pos x="connsiteX3" y="connsiteY3"/>
+              </a:cxn>
+            </a:cxnLst>
+            <a:rect l="l" t="t" r="r" b="b"/>
+            <a:pathLst>
+              <a:path w="3424990" h="1186667">
+                <a:moveTo>
+                  <a:pt x="0" y="1186667"/>
+                </a:moveTo>
+                <a:cubicBezTo>
+                  <a:pt x="470568" y="640567"/>
+                  <a:pt x="941137" y="94467"/>
+                  <a:pt x="1403684" y="7572"/>
+                </a:cubicBezTo>
+                <a:cubicBezTo>
+                  <a:pt x="1866231" y="-79323"/>
+                  <a:pt x="2438400" y="609151"/>
+                  <a:pt x="2775284" y="665298"/>
+                </a:cubicBezTo>
+                <a:cubicBezTo>
+                  <a:pt x="3112168" y="721445"/>
+                  <a:pt x="3312695" y="401940"/>
+                  <a:pt x="3424990" y="344456"/>
+                </a:cubicBezTo>
+              </a:path>
+            </a:pathLst>
+          </a:custGeom>
+          <a:noFill/>
+          <a:ln w="38100"/>
+        </p:spPr>
+        <p:style>
+          <a:lnRef idx="2">
+            <a:schemeClr val="accent1">
+              <a:shade val="15000"/>
+            </a:schemeClr>
+          </a:lnRef>
+          <a:fillRef idx="1">
+            <a:schemeClr val="accent1"/>
+          </a:fillRef>
+          <a:effectRef idx="0">
+            <a:schemeClr val="accent1"/>
+          </a:effectRef>
+          <a:fontRef idx="minor">
+            <a:schemeClr val="lt1"/>
+          </a:fontRef>
+        </p:style>
+        <p:txBody>
+          <a:bodyPr rtlCol="0" anchor="ctr"/>
+          <a:lstStyle/>
+          <a:p>
+            <a:pPr algn="ctr"/>
+            <a:endParaRPr lang="en-DE" dirty="0"/>
+          </a:p>
+        </p:txBody>
+      </p:sp>
+      <p:sp>
+        <p:nvSpPr>
           <p:cNvPr id="7" name="TextBox 6">
             <a:extLst>
               <a:ext uri="{FF2B5EF4-FFF2-40B4-BE49-F238E27FC236}">
-                <a16:creationId xmlns:a16="http://schemas.microsoft.com/office/drawing/2014/main" id="{016BCDE9-DE36-9306-BE3D-42C171F64CDF}"/>
+                <a16:creationId xmlns:a16="http://schemas.microsoft.com/office/drawing/2014/main" id="{3A855878-0E76-EF31-B431-F3ABEF76DCB4}"/>
               </a:ext>
             </a:extLst>
           </p:cNvPr>
@@ -15939,7 +16824,7 @@
         </p:nvSpPr>
         <p:spPr>
           <a:xfrm>
-            <a:off x="4660315" y="3537284"/>
+            <a:off x="2993440" y="3584909"/>
             <a:ext cx="649537" cy="369332"/>
           </a:xfrm>
           <a:prstGeom prst="rect">
@@ -15966,7 +16851,7 @@
           <p:cNvPr id="8" name="TextBox 7">
             <a:extLst>
               <a:ext uri="{FF2B5EF4-FFF2-40B4-BE49-F238E27FC236}">
-                <a16:creationId xmlns:a16="http://schemas.microsoft.com/office/drawing/2014/main" id="{09335185-7159-AEF8-3C22-0973E1E016E1}"/>
+                <a16:creationId xmlns:a16="http://schemas.microsoft.com/office/drawing/2014/main" id="{5422F2F9-A3B4-3E2B-B694-8526231F3EE4}"/>
               </a:ext>
             </a:extLst>
           </p:cNvPr>
@@ -15975,7 +16860,7 @@
         </p:nvSpPr>
         <p:spPr>
           <a:xfrm rot="16200000">
-            <a:off x="2084790" y="2433887"/>
+            <a:off x="417915" y="2481512"/>
             <a:ext cx="1620893" cy="369332"/>
           </a:xfrm>
           <a:prstGeom prst="rect">
@@ -16001,12 +16886,692 @@
           </a:p>
         </p:txBody>
       </p:sp>
+      <p:graphicFrame>
+        <p:nvGraphicFramePr>
+          <p:cNvPr id="9" name="Table 11">
+            <a:extLst>
+              <a:ext uri="{FF2B5EF4-FFF2-40B4-BE49-F238E27FC236}">
+                <a16:creationId xmlns:a16="http://schemas.microsoft.com/office/drawing/2014/main" id="{AF90FDAA-8C8D-771E-97E9-FBC9D1377828}"/>
+              </a:ext>
+            </a:extLst>
+          </p:cNvPr>
+          <p:cNvGraphicFramePr>
+            <a:graphicFrameLocks noGrp="1"/>
+          </p:cNvGraphicFramePr>
+          <p:nvPr>
+            <p:extLst>
+              <p:ext uri="{D42A27DB-BD31-4B8C-83A1-F6EECF244321}">
+                <p14:modId xmlns:p14="http://schemas.microsoft.com/office/powerpoint/2010/main" val="4265390486"/>
+              </p:ext>
+            </p:extLst>
+          </p:nvPr>
+        </p:nvGraphicFramePr>
+        <p:xfrm>
+          <a:off x="389942" y="4071964"/>
+          <a:ext cx="5856532" cy="741680"/>
+        </p:xfrm>
+        <a:graphic>
+          <a:graphicData uri="http://schemas.openxmlformats.org/drawingml/2006/table">
+            <a:tbl>
+              <a:tblPr firstRow="1" bandRow="1">
+                <a:tableStyleId>{5C22544A-7EE6-4342-B048-85BDC9FD1C3A}</a:tableStyleId>
+              </a:tblPr>
+              <a:tblGrid>
+                <a:gridCol w="757555">
+                  <a:extLst>
+                    <a:ext uri="{9D8B030D-6E8A-4147-A177-3AD203B41FA5}">
+                      <a16:colId xmlns:a16="http://schemas.microsoft.com/office/drawing/2014/main" val="87683671"/>
+                    </a:ext>
+                  </a:extLst>
+                </a:gridCol>
+                <a:gridCol w="566553">
+                  <a:extLst>
+                    <a:ext uri="{9D8B030D-6E8A-4147-A177-3AD203B41FA5}">
+                      <a16:colId xmlns:a16="http://schemas.microsoft.com/office/drawing/2014/main" val="3734694188"/>
+                    </a:ext>
+                  </a:extLst>
+                </a:gridCol>
+                <a:gridCol w="566553">
+                  <a:extLst>
+                    <a:ext uri="{9D8B030D-6E8A-4147-A177-3AD203B41FA5}">
+                      <a16:colId xmlns:a16="http://schemas.microsoft.com/office/drawing/2014/main" val="2977745236"/>
+                    </a:ext>
+                  </a:extLst>
+                </a:gridCol>
+                <a:gridCol w="566553">
+                  <a:extLst>
+                    <a:ext uri="{9D8B030D-6E8A-4147-A177-3AD203B41FA5}">
+                      <a16:colId xmlns:a16="http://schemas.microsoft.com/office/drawing/2014/main" val="1818695962"/>
+                    </a:ext>
+                  </a:extLst>
+                </a:gridCol>
+                <a:gridCol w="566553">
+                  <a:extLst>
+                    <a:ext uri="{9D8B030D-6E8A-4147-A177-3AD203B41FA5}">
+                      <a16:colId xmlns:a16="http://schemas.microsoft.com/office/drawing/2014/main" val="967823149"/>
+                    </a:ext>
+                  </a:extLst>
+                </a:gridCol>
+                <a:gridCol w="566553">
+                  <a:extLst>
+                    <a:ext uri="{9D8B030D-6E8A-4147-A177-3AD203B41FA5}">
+                      <a16:colId xmlns:a16="http://schemas.microsoft.com/office/drawing/2014/main" val="309381458"/>
+                    </a:ext>
+                  </a:extLst>
+                </a:gridCol>
+                <a:gridCol w="566553">
+                  <a:extLst>
+                    <a:ext uri="{9D8B030D-6E8A-4147-A177-3AD203B41FA5}">
+                      <a16:colId xmlns:a16="http://schemas.microsoft.com/office/drawing/2014/main" val="442063938"/>
+                    </a:ext>
+                  </a:extLst>
+                </a:gridCol>
+                <a:gridCol w="566553">
+                  <a:extLst>
+                    <a:ext uri="{9D8B030D-6E8A-4147-A177-3AD203B41FA5}">
+                      <a16:colId xmlns:a16="http://schemas.microsoft.com/office/drawing/2014/main" val="171068656"/>
+                    </a:ext>
+                  </a:extLst>
+                </a:gridCol>
+                <a:gridCol w="566553">
+                  <a:extLst>
+                    <a:ext uri="{9D8B030D-6E8A-4147-A177-3AD203B41FA5}">
+                      <a16:colId xmlns:a16="http://schemas.microsoft.com/office/drawing/2014/main" val="3628914603"/>
+                    </a:ext>
+                  </a:extLst>
+                </a:gridCol>
+                <a:gridCol w="566553">
+                  <a:extLst>
+                    <a:ext uri="{9D8B030D-6E8A-4147-A177-3AD203B41FA5}">
+                      <a16:colId xmlns:a16="http://schemas.microsoft.com/office/drawing/2014/main" val="2226421123"/>
+                    </a:ext>
+                  </a:extLst>
+                </a:gridCol>
+              </a:tblGrid>
+              <a:tr h="370840">
+                <a:tc>
+                  <a:txBody>
+                    <a:bodyPr/>
+                    <a:lstStyle/>
+                    <a:p>
+                      <a:r>
+                        <a:rPr lang="en-US" b="0" u="sng" dirty="0">
+                          <a:solidFill>
+                            <a:schemeClr val="tx1"/>
+                          </a:solidFill>
+                        </a:rPr>
+                        <a:t>Rad:</a:t>
+                      </a:r>
+                      <a:endParaRPr lang="en-DE" b="0" u="sng" dirty="0">
+                        <a:solidFill>
+                          <a:schemeClr val="tx1"/>
+                        </a:solidFill>
+                      </a:endParaRPr>
+                    </a:p>
+                  </a:txBody>
+                  <a:tcPr>
+                    <a:solidFill>
+                      <a:schemeClr val="bg1">
+                        <a:lumMod val="95000"/>
+                      </a:schemeClr>
+                    </a:solidFill>
+                  </a:tcPr>
+                </a:tc>
+                <a:tc>
+                  <a:txBody>
+                    <a:bodyPr/>
+                    <a:lstStyle/>
+                    <a:p>
+                      <a:r>
+                        <a:rPr lang="en-US" b="0" dirty="0">
+                          <a:solidFill>
+                            <a:schemeClr val="tx1"/>
+                          </a:solidFill>
+                        </a:rPr>
+                        <a:t>0</a:t>
+                      </a:r>
+                      <a:endParaRPr lang="en-DE" b="0" dirty="0">
+                        <a:solidFill>
+                          <a:schemeClr val="tx1"/>
+                        </a:solidFill>
+                      </a:endParaRPr>
+                    </a:p>
+                  </a:txBody>
+                  <a:tcPr>
+                    <a:solidFill>
+                      <a:schemeClr val="bg1">
+                        <a:lumMod val="95000"/>
+                      </a:schemeClr>
+                    </a:solidFill>
+                  </a:tcPr>
+                </a:tc>
+                <a:tc>
+                  <a:txBody>
+                    <a:bodyPr/>
+                    <a:lstStyle/>
+                    <a:p>
+                      <a:r>
+                        <a:rPr lang="en-US" b="0" dirty="0">
+                          <a:solidFill>
+                            <a:schemeClr val="tx1"/>
+                          </a:solidFill>
+                        </a:rPr>
+                        <a:t>0.2</a:t>
+                      </a:r>
+                      <a:endParaRPr lang="en-DE" b="0" dirty="0">
+                        <a:solidFill>
+                          <a:schemeClr val="tx1"/>
+                        </a:solidFill>
+                      </a:endParaRPr>
+                    </a:p>
+                  </a:txBody>
+                  <a:tcPr>
+                    <a:solidFill>
+                      <a:schemeClr val="bg1">
+                        <a:lumMod val="95000"/>
+                      </a:schemeClr>
+                    </a:solidFill>
+                  </a:tcPr>
+                </a:tc>
+                <a:tc>
+                  <a:txBody>
+                    <a:bodyPr/>
+                    <a:lstStyle/>
+                    <a:p>
+                      <a:r>
+                        <a:rPr lang="en-US" b="0" dirty="0">
+                          <a:solidFill>
+                            <a:schemeClr val="tx1"/>
+                          </a:solidFill>
+                        </a:rPr>
+                        <a:t>0.4</a:t>
+                      </a:r>
+                      <a:endParaRPr lang="en-DE" b="0" dirty="0">
+                        <a:solidFill>
+                          <a:schemeClr val="tx1"/>
+                        </a:solidFill>
+                      </a:endParaRPr>
+                    </a:p>
+                  </a:txBody>
+                  <a:tcPr>
+                    <a:solidFill>
+                      <a:schemeClr val="bg1">
+                        <a:lumMod val="95000"/>
+                      </a:schemeClr>
+                    </a:solidFill>
+                  </a:tcPr>
+                </a:tc>
+                <a:tc>
+                  <a:txBody>
+                    <a:bodyPr/>
+                    <a:lstStyle/>
+                    <a:p>
+                      <a:r>
+                        <a:rPr lang="en-US" b="0" dirty="0">
+                          <a:solidFill>
+                            <a:schemeClr val="tx1"/>
+                          </a:solidFill>
+                        </a:rPr>
+                        <a:t>0.5</a:t>
+                      </a:r>
+                      <a:endParaRPr lang="en-DE" b="0" dirty="0">
+                        <a:solidFill>
+                          <a:schemeClr val="tx1"/>
+                        </a:solidFill>
+                      </a:endParaRPr>
+                    </a:p>
+                  </a:txBody>
+                  <a:tcPr>
+                    <a:solidFill>
+                      <a:schemeClr val="bg1">
+                        <a:lumMod val="95000"/>
+                      </a:schemeClr>
+                    </a:solidFill>
+                  </a:tcPr>
+                </a:tc>
+                <a:tc>
+                  <a:txBody>
+                    <a:bodyPr/>
+                    <a:lstStyle/>
+                    <a:p>
+                      <a:r>
+                        <a:rPr lang="en-US" b="0" dirty="0">
+                          <a:solidFill>
+                            <a:schemeClr val="tx1"/>
+                          </a:solidFill>
+                        </a:rPr>
+                        <a:t>0.4</a:t>
+                      </a:r>
+                      <a:endParaRPr lang="en-DE" b="0" dirty="0">
+                        <a:solidFill>
+                          <a:schemeClr val="tx1"/>
+                        </a:solidFill>
+                      </a:endParaRPr>
+                    </a:p>
+                  </a:txBody>
+                  <a:tcPr>
+                    <a:solidFill>
+                      <a:schemeClr val="bg1">
+                        <a:lumMod val="95000"/>
+                      </a:schemeClr>
+                    </a:solidFill>
+                  </a:tcPr>
+                </a:tc>
+                <a:tc>
+                  <a:txBody>
+                    <a:bodyPr/>
+                    <a:lstStyle/>
+                    <a:p>
+                      <a:r>
+                        <a:rPr lang="en-US" b="0" dirty="0">
+                          <a:solidFill>
+                            <a:schemeClr val="tx1"/>
+                          </a:solidFill>
+                        </a:rPr>
+                        <a:t>0.3</a:t>
+                      </a:r>
+                      <a:endParaRPr lang="en-DE" b="0" dirty="0">
+                        <a:solidFill>
+                          <a:schemeClr val="tx1"/>
+                        </a:solidFill>
+                      </a:endParaRPr>
+                    </a:p>
+                  </a:txBody>
+                  <a:tcPr>
+                    <a:solidFill>
+                      <a:schemeClr val="bg1">
+                        <a:lumMod val="95000"/>
+                      </a:schemeClr>
+                    </a:solidFill>
+                  </a:tcPr>
+                </a:tc>
+                <a:tc>
+                  <a:txBody>
+                    <a:bodyPr/>
+                    <a:lstStyle/>
+                    <a:p>
+                      <a:r>
+                        <a:rPr lang="en-US" b="0" dirty="0">
+                          <a:solidFill>
+                            <a:schemeClr val="tx1"/>
+                          </a:solidFill>
+                        </a:rPr>
+                        <a:t>0.2</a:t>
+                      </a:r>
+                      <a:endParaRPr lang="en-DE" b="0" dirty="0">
+                        <a:solidFill>
+                          <a:schemeClr val="tx1"/>
+                        </a:solidFill>
+                      </a:endParaRPr>
+                    </a:p>
+                  </a:txBody>
+                  <a:tcPr>
+                    <a:solidFill>
+                      <a:schemeClr val="bg1">
+                        <a:lumMod val="95000"/>
+                      </a:schemeClr>
+                    </a:solidFill>
+                  </a:tcPr>
+                </a:tc>
+                <a:tc>
+                  <a:txBody>
+                    <a:bodyPr/>
+                    <a:lstStyle/>
+                    <a:p>
+                      <a:r>
+                        <a:rPr lang="en-US" b="0" dirty="0">
+                          <a:solidFill>
+                            <a:schemeClr val="tx1"/>
+                          </a:solidFill>
+                        </a:rPr>
+                        <a:t>0.3</a:t>
+                      </a:r>
+                      <a:endParaRPr lang="en-DE" b="0" dirty="0">
+                        <a:solidFill>
+                          <a:schemeClr val="tx1"/>
+                        </a:solidFill>
+                      </a:endParaRPr>
+                    </a:p>
+                  </a:txBody>
+                  <a:tcPr>
+                    <a:solidFill>
+                      <a:schemeClr val="bg1">
+                        <a:lumMod val="95000"/>
+                      </a:schemeClr>
+                    </a:solidFill>
+                  </a:tcPr>
+                </a:tc>
+                <a:tc>
+                  <a:txBody>
+                    <a:bodyPr/>
+                    <a:lstStyle/>
+                    <a:p>
+                      <a:r>
+                        <a:rPr lang="en-US" b="0" dirty="0">
+                          <a:solidFill>
+                            <a:schemeClr val="tx1"/>
+                          </a:solidFill>
+                        </a:rPr>
+                        <a:t>0.4</a:t>
+                      </a:r>
+                      <a:endParaRPr lang="en-DE" b="0" dirty="0">
+                        <a:solidFill>
+                          <a:schemeClr val="tx1"/>
+                        </a:solidFill>
+                      </a:endParaRPr>
+                    </a:p>
+                  </a:txBody>
+                  <a:tcPr>
+                    <a:solidFill>
+                      <a:schemeClr val="bg1">
+                        <a:lumMod val="95000"/>
+                      </a:schemeClr>
+                    </a:solidFill>
+                  </a:tcPr>
+                </a:tc>
+                <a:extLst>
+                  <a:ext uri="{0D108BD9-81ED-4DB2-BD59-A6C34878D82A}">
+                    <a16:rowId xmlns:a16="http://schemas.microsoft.com/office/drawing/2014/main" val="2758571984"/>
+                  </a:ext>
+                </a:extLst>
+              </a:tr>
+              <a:tr h="370840">
+                <a:tc>
+                  <a:txBody>
+                    <a:bodyPr/>
+                    <a:lstStyle/>
+                    <a:p>
+                      <a:r>
+                        <a:rPr lang="en-US" b="0" u="sng" dirty="0">
+                          <a:solidFill>
+                            <a:schemeClr val="tx1"/>
+                          </a:solidFill>
+                        </a:rPr>
+                        <a:t>Time:</a:t>
+                      </a:r>
+                      <a:endParaRPr lang="en-DE" b="0" u="sng" dirty="0">
+                        <a:solidFill>
+                          <a:schemeClr val="tx1"/>
+                        </a:solidFill>
+                      </a:endParaRPr>
+                    </a:p>
+                  </a:txBody>
+                  <a:tcPr>
+                    <a:solidFill>
+                      <a:schemeClr val="bg1">
+                        <a:lumMod val="95000"/>
+                      </a:schemeClr>
+                    </a:solidFill>
+                  </a:tcPr>
+                </a:tc>
+                <a:tc>
+                  <a:txBody>
+                    <a:bodyPr/>
+                    <a:lstStyle/>
+                    <a:p>
+                      <a:r>
+                        <a:rPr lang="en-US" b="0" dirty="0">
+                          <a:solidFill>
+                            <a:schemeClr val="tx1"/>
+                          </a:solidFill>
+                        </a:rPr>
+                        <a:t>0s</a:t>
+                      </a:r>
+                      <a:endParaRPr lang="en-DE" b="0" dirty="0">
+                        <a:solidFill>
+                          <a:schemeClr val="tx1"/>
+                        </a:solidFill>
+                      </a:endParaRPr>
+                    </a:p>
+                  </a:txBody>
+                  <a:tcPr>
+                    <a:solidFill>
+                      <a:schemeClr val="bg1">
+                        <a:lumMod val="95000"/>
+                      </a:schemeClr>
+                    </a:solidFill>
+                  </a:tcPr>
+                </a:tc>
+                <a:tc>
+                  <a:txBody>
+                    <a:bodyPr/>
+                    <a:lstStyle/>
+                    <a:p>
+                      <a:r>
+                        <a:rPr lang="en-US" b="0" dirty="0">
+                          <a:solidFill>
+                            <a:schemeClr val="tx1"/>
+                          </a:solidFill>
+                        </a:rPr>
+                        <a:t>0.1s</a:t>
+                      </a:r>
+                      <a:endParaRPr lang="en-DE" b="0" dirty="0">
+                        <a:solidFill>
+                          <a:schemeClr val="tx1"/>
+                        </a:solidFill>
+                      </a:endParaRPr>
+                    </a:p>
+                  </a:txBody>
+                  <a:tcPr>
+                    <a:solidFill>
+                      <a:schemeClr val="bg1">
+                        <a:lumMod val="95000"/>
+                      </a:schemeClr>
+                    </a:solidFill>
+                  </a:tcPr>
+                </a:tc>
+                <a:tc>
+                  <a:txBody>
+                    <a:bodyPr/>
+                    <a:lstStyle/>
+                    <a:p>
+                      <a:r>
+                        <a:rPr lang="en-US" b="0" dirty="0">
+                          <a:solidFill>
+                            <a:schemeClr val="tx1"/>
+                          </a:solidFill>
+                        </a:rPr>
+                        <a:t>0.2s</a:t>
+                      </a:r>
+                      <a:endParaRPr lang="en-DE" b="0" dirty="0">
+                        <a:solidFill>
+                          <a:schemeClr val="tx1"/>
+                        </a:solidFill>
+                      </a:endParaRPr>
+                    </a:p>
+                  </a:txBody>
+                  <a:tcPr>
+                    <a:solidFill>
+                      <a:schemeClr val="bg1">
+                        <a:lumMod val="95000"/>
+                      </a:schemeClr>
+                    </a:solidFill>
+                  </a:tcPr>
+                </a:tc>
+                <a:tc>
+                  <a:txBody>
+                    <a:bodyPr/>
+                    <a:lstStyle/>
+                    <a:p>
+                      <a:r>
+                        <a:rPr lang="en-US" b="0" dirty="0">
+                          <a:solidFill>
+                            <a:schemeClr val="tx1"/>
+                          </a:solidFill>
+                        </a:rPr>
+                        <a:t>0.3s</a:t>
+                      </a:r>
+                      <a:endParaRPr lang="en-DE" b="0" dirty="0">
+                        <a:solidFill>
+                          <a:schemeClr val="tx1"/>
+                        </a:solidFill>
+                      </a:endParaRPr>
+                    </a:p>
+                  </a:txBody>
+                  <a:tcPr>
+                    <a:solidFill>
+                      <a:schemeClr val="bg1">
+                        <a:lumMod val="95000"/>
+                      </a:schemeClr>
+                    </a:solidFill>
+                  </a:tcPr>
+                </a:tc>
+                <a:tc>
+                  <a:txBody>
+                    <a:bodyPr/>
+                    <a:lstStyle/>
+                    <a:p>
+                      <a:r>
+                        <a:rPr lang="en-US" b="0" dirty="0">
+                          <a:solidFill>
+                            <a:schemeClr val="tx1"/>
+                          </a:solidFill>
+                        </a:rPr>
+                        <a:t>0.4s</a:t>
+                      </a:r>
+                      <a:endParaRPr lang="en-DE" b="0" dirty="0">
+                        <a:solidFill>
+                          <a:schemeClr val="tx1"/>
+                        </a:solidFill>
+                      </a:endParaRPr>
+                    </a:p>
+                  </a:txBody>
+                  <a:tcPr>
+                    <a:solidFill>
+                      <a:schemeClr val="bg1">
+                        <a:lumMod val="95000"/>
+                      </a:schemeClr>
+                    </a:solidFill>
+                  </a:tcPr>
+                </a:tc>
+                <a:tc>
+                  <a:txBody>
+                    <a:bodyPr/>
+                    <a:lstStyle/>
+                    <a:p>
+                      <a:r>
+                        <a:rPr lang="en-US" b="0" dirty="0">
+                          <a:solidFill>
+                            <a:schemeClr val="tx1"/>
+                          </a:solidFill>
+                        </a:rPr>
+                        <a:t>0.5s</a:t>
+                      </a:r>
+                      <a:endParaRPr lang="en-DE" b="0" dirty="0">
+                        <a:solidFill>
+                          <a:schemeClr val="tx1"/>
+                        </a:solidFill>
+                      </a:endParaRPr>
+                    </a:p>
+                  </a:txBody>
+                  <a:tcPr>
+                    <a:solidFill>
+                      <a:schemeClr val="bg1">
+                        <a:lumMod val="95000"/>
+                      </a:schemeClr>
+                    </a:solidFill>
+                  </a:tcPr>
+                </a:tc>
+                <a:tc>
+                  <a:txBody>
+                    <a:bodyPr/>
+                    <a:lstStyle/>
+                    <a:p>
+                      <a:r>
+                        <a:rPr lang="en-US" b="0" dirty="0">
+                          <a:solidFill>
+                            <a:schemeClr val="tx1"/>
+                          </a:solidFill>
+                        </a:rPr>
+                        <a:t>0.6s</a:t>
+                      </a:r>
+                      <a:endParaRPr lang="en-DE" b="0" dirty="0">
+                        <a:solidFill>
+                          <a:schemeClr val="tx1"/>
+                        </a:solidFill>
+                      </a:endParaRPr>
+                    </a:p>
+                  </a:txBody>
+                  <a:tcPr>
+                    <a:solidFill>
+                      <a:schemeClr val="bg1">
+                        <a:lumMod val="95000"/>
+                      </a:schemeClr>
+                    </a:solidFill>
+                  </a:tcPr>
+                </a:tc>
+                <a:tc>
+                  <a:txBody>
+                    <a:bodyPr/>
+                    <a:lstStyle/>
+                    <a:p>
+                      <a:r>
+                        <a:rPr lang="en-US" b="0" dirty="0">
+                          <a:solidFill>
+                            <a:schemeClr val="tx1"/>
+                          </a:solidFill>
+                        </a:rPr>
+                        <a:t>0.7s</a:t>
+                      </a:r>
+                      <a:endParaRPr lang="en-DE" b="0" dirty="0">
+                        <a:solidFill>
+                          <a:schemeClr val="tx1"/>
+                        </a:solidFill>
+                      </a:endParaRPr>
+                    </a:p>
+                  </a:txBody>
+                  <a:tcPr>
+                    <a:solidFill>
+                      <a:schemeClr val="bg1">
+                        <a:lumMod val="95000"/>
+                      </a:schemeClr>
+                    </a:solidFill>
+                  </a:tcPr>
+                </a:tc>
+                <a:tc>
+                  <a:txBody>
+                    <a:bodyPr/>
+                    <a:lstStyle/>
+                    <a:p>
+                      <a:r>
+                        <a:rPr lang="en-US" b="0" dirty="0">
+                          <a:solidFill>
+                            <a:schemeClr val="tx1"/>
+                          </a:solidFill>
+                        </a:rPr>
+                        <a:t>0.8s</a:t>
+                      </a:r>
+                      <a:endParaRPr lang="en-DE" b="0" dirty="0">
+                        <a:solidFill>
+                          <a:schemeClr val="tx1"/>
+                        </a:solidFill>
+                      </a:endParaRPr>
+                    </a:p>
+                  </a:txBody>
+                  <a:tcPr>
+                    <a:solidFill>
+                      <a:schemeClr val="bg1">
+                        <a:lumMod val="95000"/>
+                      </a:schemeClr>
+                    </a:solidFill>
+                  </a:tcPr>
+                </a:tc>
+                <a:extLst>
+                  <a:ext uri="{0D108BD9-81ED-4DB2-BD59-A6C34878D82A}">
+                    <a16:rowId xmlns:a16="http://schemas.microsoft.com/office/drawing/2014/main" val="4183935655"/>
+                  </a:ext>
+                </a:extLst>
+              </a:tr>
+            </a:tbl>
+          </a:graphicData>
+        </a:graphic>
+      </p:graphicFrame>
       <p:cxnSp>
         <p:nvCxnSpPr>
-          <p:cNvPr id="12" name="Straight Connector 11">
-            <a:extLst>
-              <a:ext uri="{FF2B5EF4-FFF2-40B4-BE49-F238E27FC236}">
-                <a16:creationId xmlns:a16="http://schemas.microsoft.com/office/drawing/2014/main" id="{48459C69-C9C6-11B1-5F77-9FD3CD29D940}"/>
+          <p:cNvPr id="10" name="Straight Arrow Connector 9">
+            <a:extLst>
+              <a:ext uri="{FF2B5EF4-FFF2-40B4-BE49-F238E27FC236}">
+                <a16:creationId xmlns:a16="http://schemas.microsoft.com/office/drawing/2014/main" id="{0B406FA7-991F-8A95-D8C9-C2AD4D212ED7}"/>
               </a:ext>
             </a:extLst>
           </p:cNvPr>
@@ -16015,8 +17580,590 @@
         </p:nvCxnSpPr>
         <p:spPr>
           <a:xfrm>
-            <a:off x="4171010" y="2219324"/>
-            <a:ext cx="266700" cy="485775"/>
+            <a:off x="7141290" y="3596184"/>
+            <a:ext cx="3978442" cy="0"/>
+          </a:xfrm>
+          <a:prstGeom prst="straightConnector1">
+            <a:avLst/>
+          </a:prstGeom>
+          <a:ln w="38100">
+            <a:tailEnd type="triangle"/>
+          </a:ln>
+        </p:spPr>
+        <p:style>
+          <a:lnRef idx="1">
+            <a:schemeClr val="accent1"/>
+          </a:lnRef>
+          <a:fillRef idx="0">
+            <a:schemeClr val="accent1"/>
+          </a:fillRef>
+          <a:effectRef idx="0">
+            <a:schemeClr val="accent1"/>
+          </a:effectRef>
+          <a:fontRef idx="minor">
+            <a:schemeClr val="tx1"/>
+          </a:fontRef>
+        </p:style>
+      </p:cxnSp>
+      <p:cxnSp>
+        <p:nvCxnSpPr>
+          <p:cNvPr id="11" name="Straight Arrow Connector 10">
+            <a:extLst>
+              <a:ext uri="{FF2B5EF4-FFF2-40B4-BE49-F238E27FC236}">
+                <a16:creationId xmlns:a16="http://schemas.microsoft.com/office/drawing/2014/main" id="{7506212D-883E-EDC8-E4EC-46C0481D4500}"/>
+              </a:ext>
+            </a:extLst>
+          </p:cNvPr>
+          <p:cNvCxnSpPr/>
+          <p:nvPr/>
+        </p:nvCxnSpPr>
+        <p:spPr>
+          <a:xfrm flipV="1">
+            <a:off x="7245563" y="1839574"/>
+            <a:ext cx="0" cy="1868905"/>
+          </a:xfrm>
+          <a:prstGeom prst="straightConnector1">
+            <a:avLst/>
+          </a:prstGeom>
+          <a:ln w="38100">
+            <a:tailEnd type="triangle"/>
+          </a:ln>
+        </p:spPr>
+        <p:style>
+          <a:lnRef idx="1">
+            <a:schemeClr val="accent1"/>
+          </a:lnRef>
+          <a:fillRef idx="0">
+            <a:schemeClr val="accent1"/>
+          </a:fillRef>
+          <a:effectRef idx="0">
+            <a:schemeClr val="accent1"/>
+          </a:effectRef>
+          <a:fontRef idx="minor">
+            <a:schemeClr val="tx1"/>
+          </a:fontRef>
+        </p:style>
+      </p:cxnSp>
+      <p:sp>
+        <p:nvSpPr>
+          <p:cNvPr id="12" name="TextBox 11">
+            <a:extLst>
+              <a:ext uri="{FF2B5EF4-FFF2-40B4-BE49-F238E27FC236}">
+                <a16:creationId xmlns:a16="http://schemas.microsoft.com/office/drawing/2014/main" id="{54DBD41C-F0A0-95A6-9857-0D8D3AD4ADFC}"/>
+              </a:ext>
+            </a:extLst>
+          </p:cNvPr>
+          <p:cNvSpPr txBox="1"/>
+          <p:nvPr/>
+        </p:nvSpPr>
+        <p:spPr>
+          <a:xfrm>
+            <a:off x="8649331" y="3596184"/>
+            <a:ext cx="649537" cy="369332"/>
+          </a:xfrm>
+          <a:prstGeom prst="rect">
+            <a:avLst/>
+          </a:prstGeom>
+          <a:noFill/>
+        </p:spPr>
+        <p:txBody>
+          <a:bodyPr wrap="none" rtlCol="0">
+            <a:spAutoFit/>
+          </a:bodyPr>
+          <a:lstStyle/>
+          <a:p>
+            <a:r>
+              <a:rPr lang="en-US" dirty="0"/>
+              <a:t>Time</a:t>
+            </a:r>
+            <a:endParaRPr lang="en-DE" dirty="0"/>
+          </a:p>
+        </p:txBody>
+      </p:sp>
+      <p:sp>
+        <p:nvSpPr>
+          <p:cNvPr id="13" name="TextBox 12">
+            <a:extLst>
+              <a:ext uri="{FF2B5EF4-FFF2-40B4-BE49-F238E27FC236}">
+                <a16:creationId xmlns:a16="http://schemas.microsoft.com/office/drawing/2014/main" id="{EC505E4B-39B6-C383-7C50-88FB5B3EAAF7}"/>
+              </a:ext>
+            </a:extLst>
+          </p:cNvPr>
+          <p:cNvSpPr txBox="1"/>
+          <p:nvPr/>
+        </p:nvSpPr>
+        <p:spPr>
+          <a:xfrm rot="16200000">
+            <a:off x="6073806" y="2492787"/>
+            <a:ext cx="1620893" cy="369332"/>
+          </a:xfrm>
+          <a:prstGeom prst="rect">
+            <a:avLst/>
+          </a:prstGeom>
+          <a:noFill/>
+        </p:spPr>
+        <p:txBody>
+          <a:bodyPr wrap="none" rtlCol="0">
+            <a:spAutoFit/>
+          </a:bodyPr>
+          <a:lstStyle/>
+          <a:p>
+            <a:r>
+              <a:rPr lang="en-US" dirty="0"/>
+              <a:t>Rotation in </a:t>
+            </a:r>
+            <a:r>
+              <a:rPr lang="en-US" i="1" dirty="0"/>
+              <a:t>Rad</a:t>
+            </a:r>
+            <a:endParaRPr lang="en-DE" i="1" dirty="0"/>
+          </a:p>
+        </p:txBody>
+      </p:sp>
+      <p:graphicFrame>
+        <p:nvGraphicFramePr>
+          <p:cNvPr id="14" name="Table 11">
+            <a:extLst>
+              <a:ext uri="{FF2B5EF4-FFF2-40B4-BE49-F238E27FC236}">
+                <a16:creationId xmlns:a16="http://schemas.microsoft.com/office/drawing/2014/main" id="{85EBF64F-B075-579E-2CF8-5D32C3CB2120}"/>
+              </a:ext>
+            </a:extLst>
+          </p:cNvPr>
+          <p:cNvGraphicFramePr>
+            <a:graphicFrameLocks noGrp="1"/>
+          </p:cNvGraphicFramePr>
+          <p:nvPr>
+            <p:extLst>
+              <p:ext uri="{D42A27DB-BD31-4B8C-83A1-F6EECF244321}">
+                <p14:modId xmlns:p14="http://schemas.microsoft.com/office/powerpoint/2010/main" val="2309156566"/>
+              </p:ext>
+            </p:extLst>
+          </p:nvPr>
+        </p:nvGraphicFramePr>
+        <p:xfrm>
+          <a:off x="7068919" y="4071964"/>
+          <a:ext cx="3870750" cy="741680"/>
+        </p:xfrm>
+        <a:graphic>
+          <a:graphicData uri="http://schemas.openxmlformats.org/drawingml/2006/table">
+            <a:tbl>
+              <a:tblPr firstRow="1" bandRow="1">
+                <a:tableStyleId>{5C22544A-7EE6-4342-B048-85BDC9FD1C3A}</a:tableStyleId>
+              </a:tblPr>
+              <a:tblGrid>
+                <a:gridCol w="857670">
+                  <a:extLst>
+                    <a:ext uri="{9D8B030D-6E8A-4147-A177-3AD203B41FA5}">
+                      <a16:colId xmlns:a16="http://schemas.microsoft.com/office/drawing/2014/main" val="87683671"/>
+                    </a:ext>
+                  </a:extLst>
+                </a:gridCol>
+                <a:gridCol w="521160">
+                  <a:extLst>
+                    <a:ext uri="{9D8B030D-6E8A-4147-A177-3AD203B41FA5}">
+                      <a16:colId xmlns:a16="http://schemas.microsoft.com/office/drawing/2014/main" val="3734694188"/>
+                    </a:ext>
+                  </a:extLst>
+                </a:gridCol>
+                <a:gridCol w="615950">
+                  <a:extLst>
+                    <a:ext uri="{9D8B030D-6E8A-4147-A177-3AD203B41FA5}">
+                      <a16:colId xmlns:a16="http://schemas.microsoft.com/office/drawing/2014/main" val="2977745236"/>
+                    </a:ext>
+                  </a:extLst>
+                </a:gridCol>
+                <a:gridCol w="647700">
+                  <a:extLst>
+                    <a:ext uri="{9D8B030D-6E8A-4147-A177-3AD203B41FA5}">
+                      <a16:colId xmlns:a16="http://schemas.microsoft.com/office/drawing/2014/main" val="1818695962"/>
+                    </a:ext>
+                  </a:extLst>
+                </a:gridCol>
+                <a:gridCol w="692150">
+                  <a:extLst>
+                    <a:ext uri="{9D8B030D-6E8A-4147-A177-3AD203B41FA5}">
+                      <a16:colId xmlns:a16="http://schemas.microsoft.com/office/drawing/2014/main" val="967823149"/>
+                    </a:ext>
+                  </a:extLst>
+                </a:gridCol>
+                <a:gridCol w="536120">
+                  <a:extLst>
+                    <a:ext uri="{9D8B030D-6E8A-4147-A177-3AD203B41FA5}">
+                      <a16:colId xmlns:a16="http://schemas.microsoft.com/office/drawing/2014/main" val="309381458"/>
+                    </a:ext>
+                  </a:extLst>
+                </a:gridCol>
+              </a:tblGrid>
+              <a:tr h="370840">
+                <a:tc>
+                  <a:txBody>
+                    <a:bodyPr/>
+                    <a:lstStyle/>
+                    <a:p>
+                      <a:r>
+                        <a:rPr lang="en-US" b="0" u="sng" dirty="0">
+                          <a:solidFill>
+                            <a:schemeClr val="tx1"/>
+                          </a:solidFill>
+                        </a:rPr>
+                        <a:t>Rad:</a:t>
+                      </a:r>
+                      <a:endParaRPr lang="en-DE" b="0" u="sng" dirty="0">
+                        <a:solidFill>
+                          <a:schemeClr val="tx1"/>
+                        </a:solidFill>
+                      </a:endParaRPr>
+                    </a:p>
+                  </a:txBody>
+                  <a:tcPr>
+                    <a:solidFill>
+                      <a:schemeClr val="bg1">
+                        <a:lumMod val="95000"/>
+                      </a:schemeClr>
+                    </a:solidFill>
+                  </a:tcPr>
+                </a:tc>
+                <a:tc>
+                  <a:txBody>
+                    <a:bodyPr/>
+                    <a:lstStyle/>
+                    <a:p>
+                      <a:r>
+                        <a:rPr lang="en-US" b="0" dirty="0">
+                          <a:solidFill>
+                            <a:schemeClr val="tx1"/>
+                          </a:solidFill>
+                        </a:rPr>
+                        <a:t>0.3</a:t>
+                      </a:r>
+                      <a:endParaRPr lang="en-DE" b="0" dirty="0">
+                        <a:solidFill>
+                          <a:schemeClr val="tx1"/>
+                        </a:solidFill>
+                      </a:endParaRPr>
+                    </a:p>
+                  </a:txBody>
+                  <a:tcPr>
+                    <a:solidFill>
+                      <a:schemeClr val="bg1">
+                        <a:lumMod val="95000"/>
+                      </a:schemeClr>
+                    </a:solidFill>
+                  </a:tcPr>
+                </a:tc>
+                <a:tc>
+                  <a:txBody>
+                    <a:bodyPr/>
+                    <a:lstStyle/>
+                    <a:p>
+                      <a:r>
+                        <a:rPr lang="en-US" b="0" dirty="0">
+                          <a:solidFill>
+                            <a:schemeClr val="tx1"/>
+                          </a:solidFill>
+                        </a:rPr>
+                        <a:t>0.5</a:t>
+                      </a:r>
+                      <a:endParaRPr lang="en-DE" b="0" dirty="0">
+                        <a:solidFill>
+                          <a:schemeClr val="tx1"/>
+                        </a:solidFill>
+                      </a:endParaRPr>
+                    </a:p>
+                  </a:txBody>
+                  <a:tcPr>
+                    <a:solidFill>
+                      <a:schemeClr val="bg1">
+                        <a:lumMod val="95000"/>
+                      </a:schemeClr>
+                    </a:solidFill>
+                  </a:tcPr>
+                </a:tc>
+                <a:tc>
+                  <a:txBody>
+                    <a:bodyPr/>
+                    <a:lstStyle/>
+                    <a:p>
+                      <a:r>
+                        <a:rPr lang="en-US" b="0" dirty="0">
+                          <a:solidFill>
+                            <a:schemeClr val="tx1"/>
+                          </a:solidFill>
+                        </a:rPr>
+                        <a:t>0.25</a:t>
+                      </a:r>
+                      <a:endParaRPr lang="en-DE" b="0" dirty="0">
+                        <a:solidFill>
+                          <a:schemeClr val="tx1"/>
+                        </a:solidFill>
+                      </a:endParaRPr>
+                    </a:p>
+                  </a:txBody>
+                  <a:tcPr>
+                    <a:solidFill>
+                      <a:schemeClr val="bg1">
+                        <a:lumMod val="95000"/>
+                      </a:schemeClr>
+                    </a:solidFill>
+                  </a:tcPr>
+                </a:tc>
+                <a:tc>
+                  <a:txBody>
+                    <a:bodyPr/>
+                    <a:lstStyle/>
+                    <a:p>
+                      <a:r>
+                        <a:rPr lang="en-US" b="0" dirty="0">
+                          <a:solidFill>
+                            <a:schemeClr val="tx1"/>
+                          </a:solidFill>
+                        </a:rPr>
+                        <a:t>0.3</a:t>
+                      </a:r>
+                      <a:endParaRPr lang="en-DE" b="0" dirty="0">
+                        <a:solidFill>
+                          <a:schemeClr val="tx1"/>
+                        </a:solidFill>
+                      </a:endParaRPr>
+                    </a:p>
+                  </a:txBody>
+                  <a:tcPr>
+                    <a:solidFill>
+                      <a:schemeClr val="bg1">
+                        <a:lumMod val="95000"/>
+                      </a:schemeClr>
+                    </a:solidFill>
+                  </a:tcPr>
+                </a:tc>
+                <a:tc>
+                  <a:txBody>
+                    <a:bodyPr/>
+                    <a:lstStyle/>
+                    <a:p>
+                      <a:r>
+                        <a:rPr lang="en-US" b="0" dirty="0">
+                          <a:solidFill>
+                            <a:schemeClr val="tx1"/>
+                          </a:solidFill>
+                        </a:rPr>
+                        <a:t>0.3</a:t>
+                      </a:r>
+                      <a:endParaRPr lang="en-DE" b="0" dirty="0">
+                        <a:solidFill>
+                          <a:schemeClr val="tx1"/>
+                        </a:solidFill>
+                      </a:endParaRPr>
+                    </a:p>
+                  </a:txBody>
+                  <a:tcPr>
+                    <a:solidFill>
+                      <a:schemeClr val="bg1">
+                        <a:lumMod val="95000"/>
+                      </a:schemeClr>
+                    </a:solidFill>
+                  </a:tcPr>
+                </a:tc>
+                <a:extLst>
+                  <a:ext uri="{0D108BD9-81ED-4DB2-BD59-A6C34878D82A}">
+                    <a16:rowId xmlns:a16="http://schemas.microsoft.com/office/drawing/2014/main" val="2758571984"/>
+                  </a:ext>
+                </a:extLst>
+              </a:tr>
+              <a:tr h="370840">
+                <a:tc>
+                  <a:txBody>
+                    <a:bodyPr/>
+                    <a:lstStyle/>
+                    <a:p>
+                      <a:r>
+                        <a:rPr lang="en-US" b="0" u="sng" dirty="0">
+                          <a:solidFill>
+                            <a:schemeClr val="tx1"/>
+                          </a:solidFill>
+                        </a:rPr>
+                        <a:t>Time:</a:t>
+                      </a:r>
+                      <a:endParaRPr lang="en-DE" b="0" u="sng" dirty="0">
+                        <a:solidFill>
+                          <a:schemeClr val="tx1"/>
+                        </a:solidFill>
+                      </a:endParaRPr>
+                    </a:p>
+                  </a:txBody>
+                  <a:tcPr>
+                    <a:solidFill>
+                      <a:schemeClr val="bg1">
+                        <a:lumMod val="95000"/>
+                      </a:schemeClr>
+                    </a:solidFill>
+                  </a:tcPr>
+                </a:tc>
+                <a:tc>
+                  <a:txBody>
+                    <a:bodyPr/>
+                    <a:lstStyle/>
+                    <a:p>
+                      <a:r>
+                        <a:rPr lang="en-US" b="0" dirty="0">
+                          <a:solidFill>
+                            <a:schemeClr val="tx1"/>
+                          </a:solidFill>
+                        </a:rPr>
+                        <a:t>0s</a:t>
+                      </a:r>
+                      <a:endParaRPr lang="en-DE" b="0" dirty="0">
+                        <a:solidFill>
+                          <a:schemeClr val="tx1"/>
+                        </a:solidFill>
+                      </a:endParaRPr>
+                    </a:p>
+                  </a:txBody>
+                  <a:tcPr>
+                    <a:solidFill>
+                      <a:schemeClr val="bg1">
+                        <a:lumMod val="95000"/>
+                      </a:schemeClr>
+                    </a:solidFill>
+                  </a:tcPr>
+                </a:tc>
+                <a:tc>
+                  <a:txBody>
+                    <a:bodyPr/>
+                    <a:lstStyle/>
+                    <a:p>
+                      <a:r>
+                        <a:rPr lang="en-US" b="0" dirty="0">
+                          <a:solidFill>
+                            <a:schemeClr val="tx1"/>
+                          </a:solidFill>
+                        </a:rPr>
+                        <a:t>0.2s</a:t>
+                      </a:r>
+                      <a:endParaRPr lang="en-DE" b="0" dirty="0">
+                        <a:solidFill>
+                          <a:schemeClr val="tx1"/>
+                        </a:solidFill>
+                      </a:endParaRPr>
+                    </a:p>
+                  </a:txBody>
+                  <a:tcPr>
+                    <a:solidFill>
+                      <a:schemeClr val="bg1">
+                        <a:lumMod val="95000"/>
+                      </a:schemeClr>
+                    </a:solidFill>
+                  </a:tcPr>
+                </a:tc>
+                <a:tc>
+                  <a:txBody>
+                    <a:bodyPr/>
+                    <a:lstStyle/>
+                    <a:p>
+                      <a:r>
+                        <a:rPr lang="en-US" b="0" dirty="0">
+                          <a:solidFill>
+                            <a:schemeClr val="tx1"/>
+                          </a:solidFill>
+                        </a:rPr>
+                        <a:t>0.3s</a:t>
+                      </a:r>
+                      <a:endParaRPr lang="en-DE" b="0" dirty="0">
+                        <a:solidFill>
+                          <a:schemeClr val="tx1"/>
+                        </a:solidFill>
+                      </a:endParaRPr>
+                    </a:p>
+                  </a:txBody>
+                  <a:tcPr>
+                    <a:solidFill>
+                      <a:schemeClr val="bg1">
+                        <a:lumMod val="95000"/>
+                      </a:schemeClr>
+                    </a:solidFill>
+                  </a:tcPr>
+                </a:tc>
+                <a:tc>
+                  <a:txBody>
+                    <a:bodyPr/>
+                    <a:lstStyle/>
+                    <a:p>
+                      <a:r>
+                        <a:rPr lang="en-US" b="0" dirty="0">
+                          <a:solidFill>
+                            <a:schemeClr val="tx1"/>
+                          </a:solidFill>
+                        </a:rPr>
+                        <a:t>0.35s</a:t>
+                      </a:r>
+                      <a:endParaRPr lang="en-DE" b="0" dirty="0">
+                        <a:solidFill>
+                          <a:schemeClr val="tx1"/>
+                        </a:solidFill>
+                      </a:endParaRPr>
+                    </a:p>
+                  </a:txBody>
+                  <a:tcPr>
+                    <a:solidFill>
+                      <a:schemeClr val="bg1">
+                        <a:lumMod val="95000"/>
+                      </a:schemeClr>
+                    </a:solidFill>
+                  </a:tcPr>
+                </a:tc>
+                <a:tc>
+                  <a:txBody>
+                    <a:bodyPr/>
+                    <a:lstStyle/>
+                    <a:p>
+                      <a:r>
+                        <a:rPr lang="en-US" b="0" dirty="0">
+                          <a:solidFill>
+                            <a:schemeClr val="tx1"/>
+                          </a:solidFill>
+                        </a:rPr>
+                        <a:t>1s</a:t>
+                      </a:r>
+                      <a:endParaRPr lang="en-DE" b="0" dirty="0">
+                        <a:solidFill>
+                          <a:schemeClr val="tx1"/>
+                        </a:solidFill>
+                      </a:endParaRPr>
+                    </a:p>
+                  </a:txBody>
+                  <a:tcPr>
+                    <a:solidFill>
+                      <a:schemeClr val="bg1">
+                        <a:lumMod val="95000"/>
+                      </a:schemeClr>
+                    </a:solidFill>
+                  </a:tcPr>
+                </a:tc>
+                <a:extLst>
+                  <a:ext uri="{0D108BD9-81ED-4DB2-BD59-A6C34878D82A}">
+                    <a16:rowId xmlns:a16="http://schemas.microsoft.com/office/drawing/2014/main" val="4183935655"/>
+                  </a:ext>
+                </a:extLst>
+              </a:tr>
+            </a:tbl>
+          </a:graphicData>
+        </a:graphic>
+      </p:graphicFrame>
+      <p:cxnSp>
+        <p:nvCxnSpPr>
+          <p:cNvPr id="15" name="Straight Connector 14">
+            <a:extLst>
+              <a:ext uri="{FF2B5EF4-FFF2-40B4-BE49-F238E27FC236}">
+                <a16:creationId xmlns:a16="http://schemas.microsoft.com/office/drawing/2014/main" id="{3FBBBBB4-B726-2D57-E2AA-A4700BB60E5E}"/>
+              </a:ext>
+            </a:extLst>
+          </p:cNvPr>
+          <p:cNvCxnSpPr/>
+          <p:nvPr/>
+        </p:nvCxnSpPr>
+        <p:spPr>
+          <a:xfrm>
+            <a:off x="7264611" y="3074816"/>
+            <a:ext cx="914400" cy="0"/>
           </a:xfrm>
           <a:prstGeom prst="line">
             <a:avLst/>
@@ -16044,20 +18191,22 @@
       </p:cxnSp>
       <p:cxnSp>
         <p:nvCxnSpPr>
-          <p:cNvPr id="14" name="Straight Connector 13">
-            <a:extLst>
-              <a:ext uri="{FF2B5EF4-FFF2-40B4-BE49-F238E27FC236}">
-                <a16:creationId xmlns:a16="http://schemas.microsoft.com/office/drawing/2014/main" id="{F927E216-CAF8-3EC6-A276-4AB4BDE79EAF}"/>
-              </a:ext>
-            </a:extLst>
-          </p:cNvPr>
-          <p:cNvCxnSpPr/>
+          <p:cNvPr id="16" name="Straight Connector 15">
+            <a:extLst>
+              <a:ext uri="{FF2B5EF4-FFF2-40B4-BE49-F238E27FC236}">
+                <a16:creationId xmlns:a16="http://schemas.microsoft.com/office/drawing/2014/main" id="{15477860-05A6-E70E-8871-B34C0D3B65C5}"/>
+              </a:ext>
+            </a:extLst>
+          </p:cNvPr>
+          <p:cNvCxnSpPr>
+            <a:cxnSpLocks/>
+          </p:cNvCxnSpPr>
           <p:nvPr/>
         </p:nvCxnSpPr>
         <p:spPr>
-          <a:xfrm flipV="1">
-            <a:off x="4419600" y="2219325"/>
-            <a:ext cx="1524000" cy="485775"/>
+          <a:xfrm>
+            <a:off x="8140915" y="2425111"/>
+            <a:ext cx="489368" cy="0"/>
           </a:xfrm>
           <a:prstGeom prst="line">
             <a:avLst/>
@@ -16085,10 +18234,10 @@
       </p:cxnSp>
       <p:cxnSp>
         <p:nvCxnSpPr>
-          <p:cNvPr id="16" name="Straight Connector 15">
-            <a:extLst>
-              <a:ext uri="{FF2B5EF4-FFF2-40B4-BE49-F238E27FC236}">
-                <a16:creationId xmlns:a16="http://schemas.microsoft.com/office/drawing/2014/main" id="{20272C19-BADA-936B-6A5A-1ADB2E742B14}"/>
+          <p:cNvPr id="17" name="Straight Connector 16">
+            <a:extLst>
+              <a:ext uri="{FF2B5EF4-FFF2-40B4-BE49-F238E27FC236}">
+                <a16:creationId xmlns:a16="http://schemas.microsoft.com/office/drawing/2014/main" id="{3A550CBC-32EE-EDC2-4C1A-E5AA67472A85}"/>
               </a:ext>
             </a:extLst>
           </p:cNvPr>
@@ -16099,8 +18248,8 @@
         </p:nvCxnSpPr>
         <p:spPr>
           <a:xfrm>
-            <a:off x="5922171" y="2212181"/>
-            <a:ext cx="409575" cy="990600"/>
+            <a:off x="8594562" y="3271731"/>
+            <a:ext cx="286335" cy="0"/>
           </a:xfrm>
           <a:prstGeom prst="line">
             <a:avLst/>
@@ -16128,20 +18277,22 @@
       </p:cxnSp>
       <p:cxnSp>
         <p:nvCxnSpPr>
-          <p:cNvPr id="19" name="Straight Connector 18">
-            <a:extLst>
-              <a:ext uri="{FF2B5EF4-FFF2-40B4-BE49-F238E27FC236}">
-                <a16:creationId xmlns:a16="http://schemas.microsoft.com/office/drawing/2014/main" id="{E1FE6B1F-9DDA-DFE4-3FA2-7EB398225082}"/>
-              </a:ext>
-            </a:extLst>
-          </p:cNvPr>
-          <p:cNvCxnSpPr/>
+          <p:cNvPr id="18" name="Straight Connector 17">
+            <a:extLst>
+              <a:ext uri="{FF2B5EF4-FFF2-40B4-BE49-F238E27FC236}">
+                <a16:creationId xmlns:a16="http://schemas.microsoft.com/office/drawing/2014/main" id="{93C3DDFD-FB41-4872-8E17-AEF6434A64BF}"/>
+              </a:ext>
+            </a:extLst>
+          </p:cNvPr>
+          <p:cNvCxnSpPr>
+            <a:cxnSpLocks/>
+          </p:cNvCxnSpPr>
           <p:nvPr/>
         </p:nvCxnSpPr>
         <p:spPr>
-          <a:xfrm flipV="1">
-            <a:off x="6315079" y="3028950"/>
-            <a:ext cx="542925" cy="180975"/>
+          <a:xfrm>
+            <a:off x="8845178" y="3110008"/>
+            <a:ext cx="1987550" cy="0"/>
           </a:xfrm>
           <a:prstGeom prst="line">
             <a:avLst/>
@@ -16169,37 +18320,41 @@
       </p:cxnSp>
       <p:cxnSp>
         <p:nvCxnSpPr>
-          <p:cNvPr id="21" name="Straight Arrow Connector 20">
-            <a:extLst>
-              <a:ext uri="{FF2B5EF4-FFF2-40B4-BE49-F238E27FC236}">
-                <a16:creationId xmlns:a16="http://schemas.microsoft.com/office/drawing/2014/main" id="{5784C3B1-825B-9E0E-4F89-AEDDDC1EE10F}"/>
-              </a:ext>
-            </a:extLst>
-          </p:cNvPr>
-          <p:cNvCxnSpPr/>
+          <p:cNvPr id="19" name="Straight Connector 18">
+            <a:extLst>
+              <a:ext uri="{FF2B5EF4-FFF2-40B4-BE49-F238E27FC236}">
+                <a16:creationId xmlns:a16="http://schemas.microsoft.com/office/drawing/2014/main" id="{393094E0-C71D-9362-A4EC-6A6D194814EA}"/>
+              </a:ext>
+            </a:extLst>
+          </p:cNvPr>
+          <p:cNvCxnSpPr>
+            <a:cxnSpLocks/>
+          </p:cNvCxnSpPr>
           <p:nvPr/>
         </p:nvCxnSpPr>
         <p:spPr>
           <a:xfrm flipV="1">
-            <a:off x="4159250" y="2286000"/>
-            <a:ext cx="0" cy="1206500"/>
+            <a:off x="8159963" y="2425111"/>
+            <a:ext cx="0" cy="649705"/>
           </a:xfrm>
-          <a:prstGeom prst="straightConnector1">
+          <a:prstGeom prst="line">
             <a:avLst/>
           </a:prstGeom>
-          <a:ln w="25400">
-            <a:tailEnd type="triangle"/>
+          <a:ln w="38100">
+            <a:solidFill>
+              <a:schemeClr val="tx1"/>
+            </a:solidFill>
           </a:ln>
         </p:spPr>
         <p:style>
           <a:lnRef idx="1">
-            <a:schemeClr val="accent6"/>
+            <a:schemeClr val="accent1"/>
           </a:lnRef>
           <a:fillRef idx="0">
-            <a:schemeClr val="accent6"/>
+            <a:schemeClr val="accent1"/>
           </a:fillRef>
           <a:effectRef idx="0">
-            <a:schemeClr val="accent6"/>
+            <a:schemeClr val="accent1"/>
           </a:effectRef>
           <a:fontRef idx="minor">
             <a:schemeClr val="tx1"/>
@@ -16208,10 +18363,10 @@
       </p:cxnSp>
       <p:cxnSp>
         <p:nvCxnSpPr>
-          <p:cNvPr id="22" name="Straight Arrow Connector 21">
-            <a:extLst>
-              <a:ext uri="{FF2B5EF4-FFF2-40B4-BE49-F238E27FC236}">
-                <a16:creationId xmlns:a16="http://schemas.microsoft.com/office/drawing/2014/main" id="{982C949D-5F61-0FAC-F225-D049FF274F0D}"/>
+          <p:cNvPr id="20" name="Straight Connector 19">
+            <a:extLst>
+              <a:ext uri="{FF2B5EF4-FFF2-40B4-BE49-F238E27FC236}">
+                <a16:creationId xmlns:a16="http://schemas.microsoft.com/office/drawing/2014/main" id="{2A387F8B-98AC-3E32-6802-99084178691E}"/>
               </a:ext>
             </a:extLst>
           </p:cNvPr>
@@ -16221,26 +18376,28 @@
           <p:nvPr/>
         </p:nvCxnSpPr>
         <p:spPr>
-          <a:xfrm flipV="1">
-            <a:off x="5909471" y="2266950"/>
-            <a:ext cx="0" cy="448176"/>
+          <a:xfrm>
+            <a:off x="8613404" y="2425111"/>
+            <a:ext cx="0" cy="862764"/>
           </a:xfrm>
-          <a:prstGeom prst="straightConnector1">
+          <a:prstGeom prst="line">
             <a:avLst/>
           </a:prstGeom>
-          <a:ln w="25400">
-            <a:tailEnd type="triangle"/>
+          <a:ln w="38100">
+            <a:solidFill>
+              <a:schemeClr val="tx1"/>
+            </a:solidFill>
           </a:ln>
         </p:spPr>
         <p:style>
           <a:lnRef idx="1">
-            <a:schemeClr val="accent6"/>
+            <a:schemeClr val="accent1"/>
           </a:lnRef>
           <a:fillRef idx="0">
-            <a:schemeClr val="accent6"/>
+            <a:schemeClr val="accent1"/>
           </a:fillRef>
           <a:effectRef idx="0">
-            <a:schemeClr val="accent6"/>
+            <a:schemeClr val="accent1"/>
           </a:effectRef>
           <a:fontRef idx="minor">
             <a:schemeClr val="tx1"/>
@@ -16249,51 +18406,10 @@
       </p:cxnSp>
       <p:cxnSp>
         <p:nvCxnSpPr>
-          <p:cNvPr id="23" name="Straight Arrow Connector 22">
-            <a:extLst>
-              <a:ext uri="{FF2B5EF4-FFF2-40B4-BE49-F238E27FC236}">
-                <a16:creationId xmlns:a16="http://schemas.microsoft.com/office/drawing/2014/main" id="{96B88B49-76F0-00A0-F4C8-23D416AF78EA}"/>
-              </a:ext>
-            </a:extLst>
-          </p:cNvPr>
-          <p:cNvCxnSpPr>
-            <a:cxnSpLocks/>
-          </p:cNvCxnSpPr>
-          <p:nvPr/>
-        </p:nvCxnSpPr>
-        <p:spPr>
-          <a:xfrm flipV="1">
-            <a:off x="6868325" y="3062288"/>
-            <a:ext cx="3963" cy="182562"/>
-          </a:xfrm>
-          <a:prstGeom prst="straightConnector1">
-            <a:avLst/>
-          </a:prstGeom>
-          <a:ln w="25400">
-            <a:tailEnd type="triangle"/>
-          </a:ln>
-        </p:spPr>
-        <p:style>
-          <a:lnRef idx="1">
-            <a:schemeClr val="accent6"/>
-          </a:lnRef>
-          <a:fillRef idx="0">
-            <a:schemeClr val="accent6"/>
-          </a:fillRef>
-          <a:effectRef idx="0">
-            <a:schemeClr val="accent6"/>
-          </a:effectRef>
-          <a:fontRef idx="minor">
-            <a:schemeClr val="tx1"/>
-          </a:fontRef>
-        </p:style>
-      </p:cxnSp>
-      <p:cxnSp>
-        <p:nvCxnSpPr>
-          <p:cNvPr id="24" name="Straight Arrow Connector 23">
-            <a:extLst>
-              <a:ext uri="{FF2B5EF4-FFF2-40B4-BE49-F238E27FC236}">
-                <a16:creationId xmlns:a16="http://schemas.microsoft.com/office/drawing/2014/main" id="{9421952F-700B-CB9D-41B2-183E05F1B9B2}"/>
+          <p:cNvPr id="21" name="Straight Connector 20">
+            <a:extLst>
+              <a:ext uri="{FF2B5EF4-FFF2-40B4-BE49-F238E27FC236}">
+                <a16:creationId xmlns:a16="http://schemas.microsoft.com/office/drawing/2014/main" id="{65C9791E-4939-E7C9-A2F5-D95C46F519D1}"/>
               </a:ext>
             </a:extLst>
           </p:cNvPr>
@@ -16304,507 +18420,37 @@
         </p:nvCxnSpPr>
         <p:spPr>
           <a:xfrm>
-            <a:off x="4446149" y="2200274"/>
-            <a:ext cx="0" cy="458260"/>
+            <a:off x="8864228" y="3110008"/>
+            <a:ext cx="0" cy="177867"/>
           </a:xfrm>
-          <a:prstGeom prst="straightConnector1">
+          <a:prstGeom prst="line">
             <a:avLst/>
           </a:prstGeom>
-          <a:ln w="25400">
-            <a:tailEnd type="triangle"/>
+          <a:ln w="38100">
+            <a:solidFill>
+              <a:schemeClr val="tx1"/>
+            </a:solidFill>
           </a:ln>
         </p:spPr>
         <p:style>
           <a:lnRef idx="1">
-            <a:schemeClr val="accent2"/>
+            <a:schemeClr val="accent1"/>
           </a:lnRef>
           <a:fillRef idx="0">
-            <a:schemeClr val="accent2"/>
+            <a:schemeClr val="accent1"/>
           </a:fillRef>
           <a:effectRef idx="0">
-            <a:schemeClr val="accent2"/>
+            <a:schemeClr val="accent1"/>
           </a:effectRef>
           <a:fontRef idx="minor">
             <a:schemeClr val="tx1"/>
           </a:fontRef>
         </p:style>
       </p:cxnSp>
-      <p:cxnSp>
-        <p:nvCxnSpPr>
-          <p:cNvPr id="25" name="Straight Arrow Connector 24">
-            <a:extLst>
-              <a:ext uri="{FF2B5EF4-FFF2-40B4-BE49-F238E27FC236}">
-                <a16:creationId xmlns:a16="http://schemas.microsoft.com/office/drawing/2014/main" id="{CBBCE28E-FED7-5653-3F84-C4BB2285085D}"/>
-              </a:ext>
-            </a:extLst>
-          </p:cNvPr>
-          <p:cNvCxnSpPr>
-            <a:cxnSpLocks/>
-          </p:cNvCxnSpPr>
-          <p:nvPr/>
-        </p:nvCxnSpPr>
-        <p:spPr>
-          <a:xfrm>
-            <a:off x="6342067" y="2212181"/>
-            <a:ext cx="0" cy="952766"/>
-          </a:xfrm>
-          <a:prstGeom prst="straightConnector1">
-            <a:avLst/>
-          </a:prstGeom>
-          <a:ln w="25400">
-            <a:solidFill>
-              <a:schemeClr val="accent2"/>
-            </a:solidFill>
-            <a:tailEnd type="triangle"/>
-          </a:ln>
-        </p:spPr>
-        <p:style>
-          <a:lnRef idx="1">
-            <a:schemeClr val="accent2"/>
-          </a:lnRef>
-          <a:fillRef idx="0">
-            <a:schemeClr val="accent2"/>
-          </a:fillRef>
-          <a:effectRef idx="0">
-            <a:schemeClr val="accent2"/>
-          </a:effectRef>
-          <a:fontRef idx="minor">
-            <a:schemeClr val="tx1"/>
-          </a:fontRef>
-        </p:style>
-      </p:cxnSp>
-      <p:cxnSp>
-        <p:nvCxnSpPr>
-          <p:cNvPr id="35" name="Straight Connector 34">
-            <a:extLst>
-              <a:ext uri="{FF2B5EF4-FFF2-40B4-BE49-F238E27FC236}">
-                <a16:creationId xmlns:a16="http://schemas.microsoft.com/office/drawing/2014/main" id="{085E07E1-D7CE-4649-5164-1DD6BF2CC64C}"/>
-              </a:ext>
-            </a:extLst>
-          </p:cNvPr>
-          <p:cNvCxnSpPr>
-            <a:cxnSpLocks/>
-          </p:cNvCxnSpPr>
-          <p:nvPr/>
-        </p:nvCxnSpPr>
-        <p:spPr>
-          <a:xfrm>
-            <a:off x="4162425" y="2190749"/>
-            <a:ext cx="283724" cy="0"/>
-          </a:xfrm>
-          <a:prstGeom prst="line">
-            <a:avLst/>
-          </a:prstGeom>
-        </p:spPr>
-        <p:style>
-          <a:lnRef idx="1">
-            <a:schemeClr val="accent1"/>
-          </a:lnRef>
-          <a:fillRef idx="0">
-            <a:schemeClr val="accent1"/>
-          </a:fillRef>
-          <a:effectRef idx="0">
-            <a:schemeClr val="accent1"/>
-          </a:effectRef>
-          <a:fontRef idx="minor">
-            <a:schemeClr val="tx1"/>
-          </a:fontRef>
-        </p:style>
-      </p:cxnSp>
-      <p:cxnSp>
-        <p:nvCxnSpPr>
-          <p:cNvPr id="37" name="Straight Connector 36">
-            <a:extLst>
-              <a:ext uri="{FF2B5EF4-FFF2-40B4-BE49-F238E27FC236}">
-                <a16:creationId xmlns:a16="http://schemas.microsoft.com/office/drawing/2014/main" id="{77035B4D-EF71-4FCF-419A-18690745A6D0}"/>
-              </a:ext>
-            </a:extLst>
-          </p:cNvPr>
-          <p:cNvCxnSpPr>
-            <a:cxnSpLocks/>
-          </p:cNvCxnSpPr>
-          <p:nvPr/>
-        </p:nvCxnSpPr>
-        <p:spPr>
-          <a:xfrm>
-            <a:off x="4429126" y="2736847"/>
-            <a:ext cx="1480345" cy="0"/>
-          </a:xfrm>
-          <a:prstGeom prst="line">
-            <a:avLst/>
-          </a:prstGeom>
-        </p:spPr>
-        <p:style>
-          <a:lnRef idx="1">
-            <a:schemeClr val="accent1"/>
-          </a:lnRef>
-          <a:fillRef idx="0">
-            <a:schemeClr val="accent1"/>
-          </a:fillRef>
-          <a:effectRef idx="0">
-            <a:schemeClr val="accent1"/>
-          </a:effectRef>
-          <a:fontRef idx="minor">
-            <a:schemeClr val="tx1"/>
-          </a:fontRef>
-        </p:style>
-      </p:cxnSp>
-      <p:cxnSp>
-        <p:nvCxnSpPr>
-          <p:cNvPr id="40" name="Straight Connector 39">
-            <a:extLst>
-              <a:ext uri="{FF2B5EF4-FFF2-40B4-BE49-F238E27FC236}">
-                <a16:creationId xmlns:a16="http://schemas.microsoft.com/office/drawing/2014/main" id="{AC6BAAB3-C0EE-1279-D4D0-E70BBC26C736}"/>
-              </a:ext>
-            </a:extLst>
-          </p:cNvPr>
-          <p:cNvCxnSpPr>
-            <a:cxnSpLocks/>
-          </p:cNvCxnSpPr>
-          <p:nvPr/>
-        </p:nvCxnSpPr>
-        <p:spPr>
-          <a:xfrm flipV="1">
-            <a:off x="6315079" y="3244850"/>
-            <a:ext cx="553246" cy="3172"/>
-          </a:xfrm>
-          <a:prstGeom prst="line">
-            <a:avLst/>
-          </a:prstGeom>
-        </p:spPr>
-        <p:style>
-          <a:lnRef idx="1">
-            <a:schemeClr val="accent1"/>
-          </a:lnRef>
-          <a:fillRef idx="0">
-            <a:schemeClr val="accent1"/>
-          </a:fillRef>
-          <a:effectRef idx="0">
-            <a:schemeClr val="accent1"/>
-          </a:effectRef>
-          <a:fontRef idx="minor">
-            <a:schemeClr val="tx1"/>
-          </a:fontRef>
-        </p:style>
-      </p:cxnSp>
-      <p:cxnSp>
-        <p:nvCxnSpPr>
-          <p:cNvPr id="42" name="Straight Connector 41">
-            <a:extLst>
-              <a:ext uri="{FF2B5EF4-FFF2-40B4-BE49-F238E27FC236}">
-                <a16:creationId xmlns:a16="http://schemas.microsoft.com/office/drawing/2014/main" id="{2707911B-B651-C8F0-858A-873BE72818D2}"/>
-              </a:ext>
-            </a:extLst>
-          </p:cNvPr>
-          <p:cNvCxnSpPr>
-            <a:cxnSpLocks/>
-          </p:cNvCxnSpPr>
-          <p:nvPr/>
-        </p:nvCxnSpPr>
-        <p:spPr>
-          <a:xfrm>
-            <a:off x="5922171" y="2195281"/>
-            <a:ext cx="409575" cy="4993"/>
-          </a:xfrm>
-          <a:prstGeom prst="line">
-            <a:avLst/>
-          </a:prstGeom>
-        </p:spPr>
-        <p:style>
-          <a:lnRef idx="1">
-            <a:schemeClr val="accent1"/>
-          </a:lnRef>
-          <a:fillRef idx="0">
-            <a:schemeClr val="accent1"/>
-          </a:fillRef>
-          <a:effectRef idx="0">
-            <a:schemeClr val="accent1"/>
-          </a:effectRef>
-          <a:fontRef idx="minor">
-            <a:schemeClr val="tx1"/>
-          </a:fontRef>
-        </p:style>
-      </p:cxnSp>
-      <p:sp>
-        <p:nvSpPr>
-          <p:cNvPr id="2" name="Oval 1">
-            <a:extLst>
-              <a:ext uri="{FF2B5EF4-FFF2-40B4-BE49-F238E27FC236}">
-                <a16:creationId xmlns:a16="http://schemas.microsoft.com/office/drawing/2014/main" id="{C634A829-C3EE-8BED-FD02-A9974BCC029F}"/>
-              </a:ext>
-            </a:extLst>
-          </p:cNvPr>
-          <p:cNvSpPr/>
-          <p:nvPr/>
-        </p:nvSpPr>
-        <p:spPr>
-          <a:xfrm>
-            <a:off x="3250555" y="3453464"/>
-            <a:ext cx="76200" cy="83820"/>
-          </a:xfrm>
-          <a:prstGeom prst="ellipse">
-            <a:avLst/>
-          </a:prstGeom>
-        </p:spPr>
-        <p:style>
-          <a:lnRef idx="2">
-            <a:schemeClr val="accent4">
-              <a:shade val="15000"/>
-            </a:schemeClr>
-          </a:lnRef>
-          <a:fillRef idx="1">
-            <a:schemeClr val="accent4"/>
-          </a:fillRef>
-          <a:effectRef idx="0">
-            <a:schemeClr val="accent4"/>
-          </a:effectRef>
-          <a:fontRef idx="minor">
-            <a:schemeClr val="lt1"/>
-          </a:fontRef>
-        </p:style>
-        <p:txBody>
-          <a:bodyPr rtlCol="0" anchor="ctr"/>
-          <a:lstStyle/>
-          <a:p>
-            <a:pPr algn="ctr"/>
-            <a:endParaRPr lang="en-DE"/>
-          </a:p>
-        </p:txBody>
-      </p:sp>
-      <p:sp>
-        <p:nvSpPr>
-          <p:cNvPr id="3" name="Oval 2">
-            <a:extLst>
-              <a:ext uri="{FF2B5EF4-FFF2-40B4-BE49-F238E27FC236}">
-                <a16:creationId xmlns:a16="http://schemas.microsoft.com/office/drawing/2014/main" id="{05DCA83D-0808-66AE-B2BC-9EA900652DEC}"/>
-              </a:ext>
-            </a:extLst>
-          </p:cNvPr>
-          <p:cNvSpPr/>
-          <p:nvPr/>
-        </p:nvSpPr>
-        <p:spPr>
-          <a:xfrm>
-            <a:off x="4126560" y="2148839"/>
-            <a:ext cx="76200" cy="83820"/>
-          </a:xfrm>
-          <a:prstGeom prst="ellipse">
-            <a:avLst/>
-          </a:prstGeom>
-        </p:spPr>
-        <p:style>
-          <a:lnRef idx="2">
-            <a:schemeClr val="accent4">
-              <a:shade val="15000"/>
-            </a:schemeClr>
-          </a:lnRef>
-          <a:fillRef idx="1">
-            <a:schemeClr val="accent4"/>
-          </a:fillRef>
-          <a:effectRef idx="0">
-            <a:schemeClr val="accent4"/>
-          </a:effectRef>
-          <a:fontRef idx="minor">
-            <a:schemeClr val="lt1"/>
-          </a:fontRef>
-        </p:style>
-        <p:txBody>
-          <a:bodyPr rtlCol="0" anchor="ctr"/>
-          <a:lstStyle/>
-          <a:p>
-            <a:pPr algn="ctr"/>
-            <a:endParaRPr lang="en-DE"/>
-          </a:p>
-        </p:txBody>
-      </p:sp>
-      <p:sp>
-        <p:nvSpPr>
-          <p:cNvPr id="6" name="Oval 5">
-            <a:extLst>
-              <a:ext uri="{FF2B5EF4-FFF2-40B4-BE49-F238E27FC236}">
-                <a16:creationId xmlns:a16="http://schemas.microsoft.com/office/drawing/2014/main" id="{9309FD40-BC37-DF55-9D06-B41D1FD5F139}"/>
-              </a:ext>
-            </a:extLst>
-          </p:cNvPr>
-          <p:cNvSpPr/>
-          <p:nvPr/>
-        </p:nvSpPr>
-        <p:spPr>
-          <a:xfrm>
-            <a:off x="4408049" y="2677426"/>
-            <a:ext cx="76200" cy="83820"/>
-          </a:xfrm>
-          <a:prstGeom prst="ellipse">
-            <a:avLst/>
-          </a:prstGeom>
-        </p:spPr>
-        <p:style>
-          <a:lnRef idx="2">
-            <a:schemeClr val="accent4">
-              <a:shade val="15000"/>
-            </a:schemeClr>
-          </a:lnRef>
-          <a:fillRef idx="1">
-            <a:schemeClr val="accent4"/>
-          </a:fillRef>
-          <a:effectRef idx="0">
-            <a:schemeClr val="accent4"/>
-          </a:effectRef>
-          <a:fontRef idx="minor">
-            <a:schemeClr val="lt1"/>
-          </a:fontRef>
-        </p:style>
-        <p:txBody>
-          <a:bodyPr rtlCol="0" anchor="ctr"/>
-          <a:lstStyle/>
-          <a:p>
-            <a:pPr algn="ctr"/>
-            <a:endParaRPr lang="en-DE"/>
-          </a:p>
-        </p:txBody>
-      </p:sp>
-      <p:sp>
-        <p:nvSpPr>
-          <p:cNvPr id="9" name="Oval 8">
-            <a:extLst>
-              <a:ext uri="{FF2B5EF4-FFF2-40B4-BE49-F238E27FC236}">
-                <a16:creationId xmlns:a16="http://schemas.microsoft.com/office/drawing/2014/main" id="{D273B856-CECE-4720-E3AA-33739949F881}"/>
-              </a:ext>
-            </a:extLst>
-          </p:cNvPr>
-          <p:cNvSpPr/>
-          <p:nvPr/>
-        </p:nvSpPr>
-        <p:spPr>
-          <a:xfrm>
-            <a:off x="5882487" y="2167013"/>
-            <a:ext cx="76200" cy="83820"/>
-          </a:xfrm>
-          <a:prstGeom prst="ellipse">
-            <a:avLst/>
-          </a:prstGeom>
-        </p:spPr>
-        <p:style>
-          <a:lnRef idx="2">
-            <a:schemeClr val="accent4">
-              <a:shade val="15000"/>
-            </a:schemeClr>
-          </a:lnRef>
-          <a:fillRef idx="1">
-            <a:schemeClr val="accent4"/>
-          </a:fillRef>
-          <a:effectRef idx="0">
-            <a:schemeClr val="accent4"/>
-          </a:effectRef>
-          <a:fontRef idx="minor">
-            <a:schemeClr val="lt1"/>
-          </a:fontRef>
-        </p:style>
-        <p:txBody>
-          <a:bodyPr rtlCol="0" anchor="ctr"/>
-          <a:lstStyle/>
-          <a:p>
-            <a:pPr algn="ctr"/>
-            <a:endParaRPr lang="en-DE"/>
-          </a:p>
-        </p:txBody>
-      </p:sp>
-      <p:sp>
-        <p:nvSpPr>
-          <p:cNvPr id="11" name="Oval 10">
-            <a:extLst>
-              <a:ext uri="{FF2B5EF4-FFF2-40B4-BE49-F238E27FC236}">
-                <a16:creationId xmlns:a16="http://schemas.microsoft.com/office/drawing/2014/main" id="{A22AAB5E-D3DB-C140-23D6-EC2A05108D42}"/>
-              </a:ext>
-            </a:extLst>
-          </p:cNvPr>
-          <p:cNvSpPr/>
-          <p:nvPr/>
-        </p:nvSpPr>
-        <p:spPr>
-          <a:xfrm>
-            <a:off x="6290765" y="3175108"/>
-            <a:ext cx="76200" cy="83820"/>
-          </a:xfrm>
-          <a:prstGeom prst="ellipse">
-            <a:avLst/>
-          </a:prstGeom>
-        </p:spPr>
-        <p:style>
-          <a:lnRef idx="2">
-            <a:schemeClr val="accent4">
-              <a:shade val="15000"/>
-            </a:schemeClr>
-          </a:lnRef>
-          <a:fillRef idx="1">
-            <a:schemeClr val="accent4"/>
-          </a:fillRef>
-          <a:effectRef idx="0">
-            <a:schemeClr val="accent4"/>
-          </a:effectRef>
-          <a:fontRef idx="minor">
-            <a:schemeClr val="lt1"/>
-          </a:fontRef>
-        </p:style>
-        <p:txBody>
-          <a:bodyPr rtlCol="0" anchor="ctr"/>
-          <a:lstStyle/>
-          <a:p>
-            <a:pPr algn="ctr"/>
-            <a:endParaRPr lang="en-DE"/>
-          </a:p>
-        </p:txBody>
-      </p:sp>
-      <p:sp>
-        <p:nvSpPr>
-          <p:cNvPr id="13" name="Oval 12">
-            <a:extLst>
-              <a:ext uri="{FF2B5EF4-FFF2-40B4-BE49-F238E27FC236}">
-                <a16:creationId xmlns:a16="http://schemas.microsoft.com/office/drawing/2014/main" id="{278EC329-D97E-5C70-C984-F89C6C075527}"/>
-              </a:ext>
-            </a:extLst>
-          </p:cNvPr>
-          <p:cNvSpPr/>
-          <p:nvPr/>
-        </p:nvSpPr>
-        <p:spPr>
-          <a:xfrm>
-            <a:off x="6844218" y="2973697"/>
-            <a:ext cx="76200" cy="83820"/>
-          </a:xfrm>
-          <a:prstGeom prst="ellipse">
-            <a:avLst/>
-          </a:prstGeom>
-        </p:spPr>
-        <p:style>
-          <a:lnRef idx="2">
-            <a:schemeClr val="accent4">
-              <a:shade val="15000"/>
-            </a:schemeClr>
-          </a:lnRef>
-          <a:fillRef idx="1">
-            <a:schemeClr val="accent4"/>
-          </a:fillRef>
-          <a:effectRef idx="0">
-            <a:schemeClr val="accent4"/>
-          </a:effectRef>
-          <a:fontRef idx="minor">
-            <a:schemeClr val="lt1"/>
-          </a:fontRef>
-        </p:style>
-        <p:txBody>
-          <a:bodyPr rtlCol="0" anchor="ctr"/>
-          <a:lstStyle/>
-          <a:p>
-            <a:pPr algn="ctr"/>
-            <a:endParaRPr lang="en-DE"/>
-          </a:p>
-        </p:txBody>
-      </p:sp>
     </p:spTree>
     <p:extLst>
       <p:ext uri="{BB962C8B-B14F-4D97-AF65-F5344CB8AC3E}">
-        <p14:creationId xmlns:p14="http://schemas.microsoft.com/office/powerpoint/2010/main" val="2542912483"/>
+        <p14:creationId xmlns:p14="http://schemas.microsoft.com/office/powerpoint/2010/main" val="4136123011"/>
       </p:ext>
     </p:extLst>
   </p:cSld>

</xml_diff>

<commit_message>
usless chapter continue with ernergy
</commit_message>
<xml_diff>
--- a/Latex/figures/images.pptx
+++ b/Latex/figures/images.pptx
@@ -17,7 +17,10 @@
     <p:sldId id="262" r:id="rId11"/>
     <p:sldId id="263" r:id="rId12"/>
     <p:sldId id="266" r:id="rId13"/>
-    <p:sldId id="267" r:id="rId14"/>
+    <p:sldId id="269" r:id="rId14"/>
+    <p:sldId id="267" r:id="rId15"/>
+    <p:sldId id="270" r:id="rId16"/>
+    <p:sldId id="271" r:id="rId17"/>
   </p:sldIdLst>
   <p:sldSz cx="12192000" cy="6858000"/>
   <p:notesSz cx="6858000" cy="9144000"/>
@@ -273,7 +276,7 @@
           <a:p>
             <a:fld id="{A2EF96EC-B110-4427-9456-97730D7A221B}" type="datetimeFigureOut">
               <a:rPr lang="en-DE" smtClean="0"/>
-              <a:t>17/11/2023</a:t>
+              <a:t>21/11/2023</a:t>
             </a:fld>
             <a:endParaRPr lang="en-DE"/>
           </a:p>
@@ -473,7 +476,7 @@
           <a:p>
             <a:fld id="{A2EF96EC-B110-4427-9456-97730D7A221B}" type="datetimeFigureOut">
               <a:rPr lang="en-DE" smtClean="0"/>
-              <a:t>17/11/2023</a:t>
+              <a:t>21/11/2023</a:t>
             </a:fld>
             <a:endParaRPr lang="en-DE"/>
           </a:p>
@@ -683,7 +686,7 @@
           <a:p>
             <a:fld id="{A2EF96EC-B110-4427-9456-97730D7A221B}" type="datetimeFigureOut">
               <a:rPr lang="en-DE" smtClean="0"/>
-              <a:t>17/11/2023</a:t>
+              <a:t>21/11/2023</a:t>
             </a:fld>
             <a:endParaRPr lang="en-DE"/>
           </a:p>
@@ -883,7 +886,7 @@
           <a:p>
             <a:fld id="{A2EF96EC-B110-4427-9456-97730D7A221B}" type="datetimeFigureOut">
               <a:rPr lang="en-DE" smtClean="0"/>
-              <a:t>17/11/2023</a:t>
+              <a:t>21/11/2023</a:t>
             </a:fld>
             <a:endParaRPr lang="en-DE"/>
           </a:p>
@@ -1159,7 +1162,7 @@
           <a:p>
             <a:fld id="{A2EF96EC-B110-4427-9456-97730D7A221B}" type="datetimeFigureOut">
               <a:rPr lang="en-DE" smtClean="0"/>
-              <a:t>17/11/2023</a:t>
+              <a:t>21/11/2023</a:t>
             </a:fld>
             <a:endParaRPr lang="en-DE"/>
           </a:p>
@@ -1427,7 +1430,7 @@
           <a:p>
             <a:fld id="{A2EF96EC-B110-4427-9456-97730D7A221B}" type="datetimeFigureOut">
               <a:rPr lang="en-DE" smtClean="0"/>
-              <a:t>17/11/2023</a:t>
+              <a:t>21/11/2023</a:t>
             </a:fld>
             <a:endParaRPr lang="en-DE"/>
           </a:p>
@@ -1842,7 +1845,7 @@
           <a:p>
             <a:fld id="{A2EF96EC-B110-4427-9456-97730D7A221B}" type="datetimeFigureOut">
               <a:rPr lang="en-DE" smtClean="0"/>
-              <a:t>17/11/2023</a:t>
+              <a:t>21/11/2023</a:t>
             </a:fld>
             <a:endParaRPr lang="en-DE"/>
           </a:p>
@@ -1984,7 +1987,7 @@
           <a:p>
             <a:fld id="{A2EF96EC-B110-4427-9456-97730D7A221B}" type="datetimeFigureOut">
               <a:rPr lang="en-DE" smtClean="0"/>
-              <a:t>17/11/2023</a:t>
+              <a:t>21/11/2023</a:t>
             </a:fld>
             <a:endParaRPr lang="en-DE"/>
           </a:p>
@@ -2097,7 +2100,7 @@
           <a:p>
             <a:fld id="{A2EF96EC-B110-4427-9456-97730D7A221B}" type="datetimeFigureOut">
               <a:rPr lang="en-DE" smtClean="0"/>
-              <a:t>17/11/2023</a:t>
+              <a:t>21/11/2023</a:t>
             </a:fld>
             <a:endParaRPr lang="en-DE"/>
           </a:p>
@@ -2410,7 +2413,7 @@
           <a:p>
             <a:fld id="{A2EF96EC-B110-4427-9456-97730D7A221B}" type="datetimeFigureOut">
               <a:rPr lang="en-DE" smtClean="0"/>
-              <a:t>17/11/2023</a:t>
+              <a:t>21/11/2023</a:t>
             </a:fld>
             <a:endParaRPr lang="en-DE"/>
           </a:p>
@@ -2699,7 +2702,7 @@
           <a:p>
             <a:fld id="{A2EF96EC-B110-4427-9456-97730D7A221B}" type="datetimeFigureOut">
               <a:rPr lang="en-DE" smtClean="0"/>
-              <a:t>17/11/2023</a:t>
+              <a:t>21/11/2023</a:t>
             </a:fld>
             <a:endParaRPr lang="en-DE"/>
           </a:p>
@@ -2942,7 +2945,7 @@
           <a:p>
             <a:fld id="{A2EF96EC-B110-4427-9456-97730D7A221B}" type="datetimeFigureOut">
               <a:rPr lang="en-DE" smtClean="0"/>
-              <a:t>17/11/2023</a:t>
+              <a:t>21/11/2023</a:t>
             </a:fld>
             <a:endParaRPr lang="en-DE"/>
           </a:p>
@@ -7176,7 +7179,7 @@
         </p:nvSpPr>
         <p:spPr>
           <a:xfrm>
-            <a:off x="5923103" y="2612483"/>
+            <a:off x="5913442" y="2679416"/>
             <a:ext cx="3461085" cy="1058785"/>
           </a:xfrm>
           <a:custGeom>
@@ -7502,6 +7505,864 @@
 </file>
 
 <file path=ppt/slides/slide13.xml><?xml version="1.0" encoding="utf-8"?>
+<p:sld xmlns:a="http://schemas.openxmlformats.org/drawingml/2006/main" xmlns:r="http://schemas.openxmlformats.org/officeDocument/2006/relationships" xmlns:p="http://schemas.openxmlformats.org/presentationml/2006/main">
+  <p:cSld>
+    <p:spTree>
+      <p:nvGrpSpPr>
+        <p:cNvPr id="1" name=""/>
+        <p:cNvGrpSpPr/>
+        <p:nvPr/>
+      </p:nvGrpSpPr>
+      <p:grpSpPr>
+        <a:xfrm>
+          <a:off x="0" y="0"/>
+          <a:ext cx="0" cy="0"/>
+          <a:chOff x="0" y="0"/>
+          <a:chExt cx="0" cy="0"/>
+        </a:xfrm>
+      </p:grpSpPr>
+      <p:cxnSp>
+        <p:nvCxnSpPr>
+          <p:cNvPr id="11" name="Straight Arrow Connector 10">
+            <a:extLst>
+              <a:ext uri="{FF2B5EF4-FFF2-40B4-BE49-F238E27FC236}">
+                <a16:creationId xmlns:a16="http://schemas.microsoft.com/office/drawing/2014/main" id="{2A3A811F-FFF6-7B21-4280-6A9C22F94376}"/>
+              </a:ext>
+            </a:extLst>
+          </p:cNvPr>
+          <p:cNvCxnSpPr/>
+          <p:nvPr/>
+        </p:nvCxnSpPr>
+        <p:spPr>
+          <a:xfrm>
+            <a:off x="723821" y="4379886"/>
+            <a:ext cx="3978442" cy="0"/>
+          </a:xfrm>
+          <a:prstGeom prst="straightConnector1">
+            <a:avLst/>
+          </a:prstGeom>
+          <a:ln w="38100">
+            <a:tailEnd type="triangle"/>
+          </a:ln>
+        </p:spPr>
+        <p:style>
+          <a:lnRef idx="1">
+            <a:schemeClr val="accent1"/>
+          </a:lnRef>
+          <a:fillRef idx="0">
+            <a:schemeClr val="accent1"/>
+          </a:fillRef>
+          <a:effectRef idx="0">
+            <a:schemeClr val="accent1"/>
+          </a:effectRef>
+          <a:fontRef idx="minor">
+            <a:schemeClr val="tx1"/>
+          </a:fontRef>
+        </p:style>
+      </p:cxnSp>
+      <p:cxnSp>
+        <p:nvCxnSpPr>
+          <p:cNvPr id="12" name="Straight Arrow Connector 11">
+            <a:extLst>
+              <a:ext uri="{FF2B5EF4-FFF2-40B4-BE49-F238E27FC236}">
+                <a16:creationId xmlns:a16="http://schemas.microsoft.com/office/drawing/2014/main" id="{2451CEAC-0123-9547-73B0-57E1D3D8B3CA}"/>
+              </a:ext>
+            </a:extLst>
+          </p:cNvPr>
+          <p:cNvCxnSpPr/>
+          <p:nvPr/>
+        </p:nvCxnSpPr>
+        <p:spPr>
+          <a:xfrm flipV="1">
+            <a:off x="828094" y="2623276"/>
+            <a:ext cx="0" cy="1868905"/>
+          </a:xfrm>
+          <a:prstGeom prst="straightConnector1">
+            <a:avLst/>
+          </a:prstGeom>
+          <a:ln w="38100">
+            <a:tailEnd type="triangle"/>
+          </a:ln>
+        </p:spPr>
+        <p:style>
+          <a:lnRef idx="1">
+            <a:schemeClr val="accent1"/>
+          </a:lnRef>
+          <a:fillRef idx="0">
+            <a:schemeClr val="accent1"/>
+          </a:fillRef>
+          <a:effectRef idx="0">
+            <a:schemeClr val="accent1"/>
+          </a:effectRef>
+          <a:fontRef idx="minor">
+            <a:schemeClr val="tx1"/>
+          </a:fontRef>
+        </p:style>
+      </p:cxnSp>
+      <p:sp>
+        <p:nvSpPr>
+          <p:cNvPr id="13" name="TextBox 12">
+            <a:extLst>
+              <a:ext uri="{FF2B5EF4-FFF2-40B4-BE49-F238E27FC236}">
+                <a16:creationId xmlns:a16="http://schemas.microsoft.com/office/drawing/2014/main" id="{531D2BD9-4FE3-458C-3CC2-ADEA9F5D22BB}"/>
+              </a:ext>
+            </a:extLst>
+          </p:cNvPr>
+          <p:cNvSpPr txBox="1"/>
+          <p:nvPr/>
+        </p:nvSpPr>
+        <p:spPr>
+          <a:xfrm>
+            <a:off x="2231862" y="4379886"/>
+            <a:ext cx="649537" cy="369332"/>
+          </a:xfrm>
+          <a:prstGeom prst="rect">
+            <a:avLst/>
+          </a:prstGeom>
+          <a:noFill/>
+        </p:spPr>
+        <p:txBody>
+          <a:bodyPr wrap="none" rtlCol="0">
+            <a:spAutoFit/>
+          </a:bodyPr>
+          <a:lstStyle/>
+          <a:p>
+            <a:r>
+              <a:rPr lang="en-US" dirty="0"/>
+              <a:t>Time</a:t>
+            </a:r>
+            <a:endParaRPr lang="en-DE" dirty="0"/>
+          </a:p>
+        </p:txBody>
+      </p:sp>
+      <p:sp>
+        <p:nvSpPr>
+          <p:cNvPr id="14" name="TextBox 13">
+            <a:extLst>
+              <a:ext uri="{FF2B5EF4-FFF2-40B4-BE49-F238E27FC236}">
+                <a16:creationId xmlns:a16="http://schemas.microsoft.com/office/drawing/2014/main" id="{C41C127C-F615-8B32-57F9-7C73DC2EE699}"/>
+              </a:ext>
+            </a:extLst>
+          </p:cNvPr>
+          <p:cNvSpPr txBox="1"/>
+          <p:nvPr/>
+        </p:nvSpPr>
+        <p:spPr>
+          <a:xfrm rot="16200000">
+            <a:off x="-603759" y="3322480"/>
+            <a:ext cx="2181559" cy="369332"/>
+          </a:xfrm>
+          <a:prstGeom prst="rect">
+            <a:avLst/>
+          </a:prstGeom>
+          <a:noFill/>
+        </p:spPr>
+        <p:txBody>
+          <a:bodyPr wrap="none" rtlCol="0">
+            <a:spAutoFit/>
+          </a:bodyPr>
+          <a:lstStyle/>
+          <a:p>
+            <a:r>
+              <a:rPr lang="en-US" dirty="0"/>
+              <a:t>Abs. velocity in </a:t>
+            </a:r>
+            <a:r>
+              <a:rPr lang="en-US" i="1" dirty="0"/>
+              <a:t>Rad/s</a:t>
+            </a:r>
+            <a:endParaRPr lang="en-DE" i="1" dirty="0"/>
+          </a:p>
+        </p:txBody>
+      </p:sp>
+      <p:cxnSp>
+        <p:nvCxnSpPr>
+          <p:cNvPr id="19" name="Straight Connector 18">
+            <a:extLst>
+              <a:ext uri="{FF2B5EF4-FFF2-40B4-BE49-F238E27FC236}">
+                <a16:creationId xmlns:a16="http://schemas.microsoft.com/office/drawing/2014/main" id="{51E8DE41-28AD-DAAE-67BC-34FB4176045D}"/>
+              </a:ext>
+            </a:extLst>
+          </p:cNvPr>
+          <p:cNvCxnSpPr>
+            <a:cxnSpLocks/>
+          </p:cNvCxnSpPr>
+          <p:nvPr/>
+        </p:nvCxnSpPr>
+        <p:spPr>
+          <a:xfrm>
+            <a:off x="856166" y="2944118"/>
+            <a:ext cx="2907211" cy="0"/>
+          </a:xfrm>
+          <a:prstGeom prst="line">
+            <a:avLst/>
+          </a:prstGeom>
+          <a:ln w="15875">
+            <a:prstDash val="dashDot"/>
+          </a:ln>
+        </p:spPr>
+        <p:style>
+          <a:lnRef idx="1">
+            <a:schemeClr val="accent1"/>
+          </a:lnRef>
+          <a:fillRef idx="0">
+            <a:schemeClr val="accent1"/>
+          </a:fillRef>
+          <a:effectRef idx="0">
+            <a:schemeClr val="accent1"/>
+          </a:effectRef>
+          <a:fontRef idx="minor">
+            <a:schemeClr val="tx1"/>
+          </a:fontRef>
+        </p:style>
+      </p:cxnSp>
+      <p:cxnSp>
+        <p:nvCxnSpPr>
+          <p:cNvPr id="20" name="Straight Connector 19">
+            <a:extLst>
+              <a:ext uri="{FF2B5EF4-FFF2-40B4-BE49-F238E27FC236}">
+                <a16:creationId xmlns:a16="http://schemas.microsoft.com/office/drawing/2014/main" id="{B07EE8CD-1A07-3471-6482-66A4C7FCA277}"/>
+              </a:ext>
+            </a:extLst>
+          </p:cNvPr>
+          <p:cNvCxnSpPr>
+            <a:cxnSpLocks/>
+          </p:cNvCxnSpPr>
+          <p:nvPr/>
+        </p:nvCxnSpPr>
+        <p:spPr>
+          <a:xfrm>
+            <a:off x="790496" y="3373237"/>
+            <a:ext cx="3039556" cy="0"/>
+          </a:xfrm>
+          <a:prstGeom prst="line">
+            <a:avLst/>
+          </a:prstGeom>
+          <a:ln w="15875">
+            <a:prstDash val="dashDot"/>
+          </a:ln>
+        </p:spPr>
+        <p:style>
+          <a:lnRef idx="1">
+            <a:schemeClr val="accent1"/>
+          </a:lnRef>
+          <a:fillRef idx="0">
+            <a:schemeClr val="accent1"/>
+          </a:fillRef>
+          <a:effectRef idx="0">
+            <a:schemeClr val="accent1"/>
+          </a:effectRef>
+          <a:fontRef idx="minor">
+            <a:schemeClr val="tx1"/>
+          </a:fontRef>
+        </p:style>
+      </p:cxnSp>
+      <p:sp>
+        <p:nvSpPr>
+          <p:cNvPr id="21" name="TextBox 20">
+            <a:extLst>
+              <a:ext uri="{FF2B5EF4-FFF2-40B4-BE49-F238E27FC236}">
+                <a16:creationId xmlns:a16="http://schemas.microsoft.com/office/drawing/2014/main" id="{2D4004F3-F9A5-29AE-C8C6-6E0CB0AA6CD7}"/>
+              </a:ext>
+            </a:extLst>
+          </p:cNvPr>
+          <p:cNvSpPr txBox="1"/>
+          <p:nvPr/>
+        </p:nvSpPr>
+        <p:spPr>
+          <a:xfrm>
+            <a:off x="3858123" y="2726788"/>
+            <a:ext cx="1424236" cy="369332"/>
+          </a:xfrm>
+          <a:prstGeom prst="rect">
+            <a:avLst/>
+          </a:prstGeom>
+          <a:noFill/>
+        </p:spPr>
+        <p:txBody>
+          <a:bodyPr wrap="none" rtlCol="0">
+            <a:spAutoFit/>
+          </a:bodyPr>
+          <a:lstStyle/>
+          <a:p>
+            <a:r>
+              <a:rPr lang="en-US" dirty="0"/>
+              <a:t>Max. velocity</a:t>
+            </a:r>
+            <a:endParaRPr lang="en-DE" dirty="0"/>
+          </a:p>
+        </p:txBody>
+      </p:sp>
+      <p:sp>
+        <p:nvSpPr>
+          <p:cNvPr id="22" name="TextBox 21">
+            <a:extLst>
+              <a:ext uri="{FF2B5EF4-FFF2-40B4-BE49-F238E27FC236}">
+                <a16:creationId xmlns:a16="http://schemas.microsoft.com/office/drawing/2014/main" id="{E8698082-5865-9B4E-0B2F-1AE0144715FD}"/>
+              </a:ext>
+            </a:extLst>
+          </p:cNvPr>
+          <p:cNvSpPr txBox="1"/>
+          <p:nvPr/>
+        </p:nvSpPr>
+        <p:spPr>
+          <a:xfrm>
+            <a:off x="3858123" y="3171113"/>
+            <a:ext cx="2108719" cy="369332"/>
+          </a:xfrm>
+          <a:prstGeom prst="rect">
+            <a:avLst/>
+          </a:prstGeom>
+          <a:noFill/>
+        </p:spPr>
+        <p:txBody>
+          <a:bodyPr wrap="none" rtlCol="0">
+            <a:spAutoFit/>
+          </a:bodyPr>
+          <a:lstStyle/>
+          <a:p>
+            <a:r>
+              <a:rPr lang="en-US" dirty="0"/>
+              <a:t>80% of max. velocity</a:t>
+            </a:r>
+            <a:endParaRPr lang="en-DE" dirty="0"/>
+          </a:p>
+        </p:txBody>
+      </p:sp>
+      <p:sp>
+        <p:nvSpPr>
+          <p:cNvPr id="2" name="Freeform: Shape 1">
+            <a:extLst>
+              <a:ext uri="{FF2B5EF4-FFF2-40B4-BE49-F238E27FC236}">
+                <a16:creationId xmlns:a16="http://schemas.microsoft.com/office/drawing/2014/main" id="{223AADA0-CCA6-EE5C-A4F4-1EEF6F3CC387}"/>
+              </a:ext>
+            </a:extLst>
+          </p:cNvPr>
+          <p:cNvSpPr/>
+          <p:nvPr/>
+        </p:nvSpPr>
+        <p:spPr>
+          <a:xfrm>
+            <a:off x="828094" y="3015917"/>
+            <a:ext cx="3136224" cy="1283760"/>
+          </a:xfrm>
+          <a:custGeom>
+            <a:avLst/>
+            <a:gdLst>
+              <a:gd name="connsiteX0" fmla="*/ 0 w 2951747"/>
+              <a:gd name="connsiteY0" fmla="*/ 1099523 h 1111516"/>
+              <a:gd name="connsiteX1" fmla="*/ 1106905 w 2951747"/>
+              <a:gd name="connsiteY1" fmla="*/ 955144 h 1111516"/>
+              <a:gd name="connsiteX2" fmla="*/ 1435768 w 2951747"/>
+              <a:gd name="connsiteY2" fmla="*/ 639 h 1111516"/>
+              <a:gd name="connsiteX3" fmla="*/ 1532021 w 2951747"/>
+              <a:gd name="connsiteY3" fmla="*/ 810765 h 1111516"/>
+              <a:gd name="connsiteX4" fmla="*/ 1925052 w 2951747"/>
+              <a:gd name="connsiteY4" fmla="*/ 1035355 h 1111516"/>
+              <a:gd name="connsiteX5" fmla="*/ 2951747 w 2951747"/>
+              <a:gd name="connsiteY5" fmla="*/ 1075460 h 1111516"/>
+            </a:gdLst>
+            <a:ahLst/>
+            <a:cxnLst>
+              <a:cxn ang="0">
+                <a:pos x="connsiteX0" y="connsiteY0"/>
+              </a:cxn>
+              <a:cxn ang="0">
+                <a:pos x="connsiteX1" y="connsiteY1"/>
+              </a:cxn>
+              <a:cxn ang="0">
+                <a:pos x="connsiteX2" y="connsiteY2"/>
+              </a:cxn>
+              <a:cxn ang="0">
+                <a:pos x="connsiteX3" y="connsiteY3"/>
+              </a:cxn>
+              <a:cxn ang="0">
+                <a:pos x="connsiteX4" y="connsiteY4"/>
+              </a:cxn>
+              <a:cxn ang="0">
+                <a:pos x="connsiteX5" y="connsiteY5"/>
+              </a:cxn>
+            </a:cxnLst>
+            <a:rect l="l" t="t" r="r" b="b"/>
+            <a:pathLst>
+              <a:path w="2951747" h="1111516">
+                <a:moveTo>
+                  <a:pt x="0" y="1099523"/>
+                </a:moveTo>
+                <a:cubicBezTo>
+                  <a:pt x="433805" y="1118907"/>
+                  <a:pt x="867610" y="1138291"/>
+                  <a:pt x="1106905" y="955144"/>
+                </a:cubicBezTo>
+                <a:cubicBezTo>
+                  <a:pt x="1346200" y="771997"/>
+                  <a:pt x="1364915" y="24702"/>
+                  <a:pt x="1435768" y="639"/>
+                </a:cubicBezTo>
+                <a:cubicBezTo>
+                  <a:pt x="1506621" y="-23424"/>
+                  <a:pt x="1450474" y="638312"/>
+                  <a:pt x="1532021" y="810765"/>
+                </a:cubicBezTo>
+                <a:cubicBezTo>
+                  <a:pt x="1613568" y="983218"/>
+                  <a:pt x="1688431" y="991239"/>
+                  <a:pt x="1925052" y="1035355"/>
+                </a:cubicBezTo>
+                <a:cubicBezTo>
+                  <a:pt x="2161673" y="1079471"/>
+                  <a:pt x="2709779" y="1096849"/>
+                  <a:pt x="2951747" y="1075460"/>
+                </a:cubicBezTo>
+              </a:path>
+            </a:pathLst>
+          </a:custGeom>
+          <a:noFill/>
+          <a:ln w="38100"/>
+        </p:spPr>
+        <p:style>
+          <a:lnRef idx="2">
+            <a:schemeClr val="accent1">
+              <a:shade val="15000"/>
+            </a:schemeClr>
+          </a:lnRef>
+          <a:fillRef idx="1">
+            <a:schemeClr val="accent1"/>
+          </a:fillRef>
+          <a:effectRef idx="0">
+            <a:schemeClr val="accent1"/>
+          </a:effectRef>
+          <a:fontRef idx="minor">
+            <a:schemeClr val="lt1"/>
+          </a:fontRef>
+        </p:style>
+        <p:txBody>
+          <a:bodyPr rtlCol="0" anchor="ctr"/>
+          <a:lstStyle/>
+          <a:p>
+            <a:pPr algn="ctr"/>
+            <a:endParaRPr lang="en-DE"/>
+          </a:p>
+        </p:txBody>
+      </p:sp>
+      <p:cxnSp>
+        <p:nvCxnSpPr>
+          <p:cNvPr id="3" name="Straight Arrow Connector 2">
+            <a:extLst>
+              <a:ext uri="{FF2B5EF4-FFF2-40B4-BE49-F238E27FC236}">
+                <a16:creationId xmlns:a16="http://schemas.microsoft.com/office/drawing/2014/main" id="{A4D139A2-B408-8CB3-61C2-64B8F3698B01}"/>
+              </a:ext>
+            </a:extLst>
+          </p:cNvPr>
+          <p:cNvCxnSpPr/>
+          <p:nvPr/>
+        </p:nvCxnSpPr>
+        <p:spPr>
+          <a:xfrm>
+            <a:off x="6416380" y="4379886"/>
+            <a:ext cx="3978442" cy="0"/>
+          </a:xfrm>
+          <a:prstGeom prst="straightConnector1">
+            <a:avLst/>
+          </a:prstGeom>
+          <a:ln w="38100">
+            <a:tailEnd type="triangle"/>
+          </a:ln>
+        </p:spPr>
+        <p:style>
+          <a:lnRef idx="1">
+            <a:schemeClr val="accent1"/>
+          </a:lnRef>
+          <a:fillRef idx="0">
+            <a:schemeClr val="accent1"/>
+          </a:fillRef>
+          <a:effectRef idx="0">
+            <a:schemeClr val="accent1"/>
+          </a:effectRef>
+          <a:fontRef idx="minor">
+            <a:schemeClr val="tx1"/>
+          </a:fontRef>
+        </p:style>
+      </p:cxnSp>
+      <p:cxnSp>
+        <p:nvCxnSpPr>
+          <p:cNvPr id="8" name="Straight Arrow Connector 7">
+            <a:extLst>
+              <a:ext uri="{FF2B5EF4-FFF2-40B4-BE49-F238E27FC236}">
+                <a16:creationId xmlns:a16="http://schemas.microsoft.com/office/drawing/2014/main" id="{4BEF8C08-9AA7-3A74-9176-CB01D4353944}"/>
+              </a:ext>
+            </a:extLst>
+          </p:cNvPr>
+          <p:cNvCxnSpPr/>
+          <p:nvPr/>
+        </p:nvCxnSpPr>
+        <p:spPr>
+          <a:xfrm flipV="1">
+            <a:off x="6520653" y="2623276"/>
+            <a:ext cx="0" cy="1868905"/>
+          </a:xfrm>
+          <a:prstGeom prst="straightConnector1">
+            <a:avLst/>
+          </a:prstGeom>
+          <a:ln w="38100">
+            <a:tailEnd type="triangle"/>
+          </a:ln>
+        </p:spPr>
+        <p:style>
+          <a:lnRef idx="1">
+            <a:schemeClr val="accent1"/>
+          </a:lnRef>
+          <a:fillRef idx="0">
+            <a:schemeClr val="accent1"/>
+          </a:fillRef>
+          <a:effectRef idx="0">
+            <a:schemeClr val="accent1"/>
+          </a:effectRef>
+          <a:fontRef idx="minor">
+            <a:schemeClr val="tx1"/>
+          </a:fontRef>
+        </p:style>
+      </p:cxnSp>
+      <p:sp>
+        <p:nvSpPr>
+          <p:cNvPr id="9" name="TextBox 8">
+            <a:extLst>
+              <a:ext uri="{FF2B5EF4-FFF2-40B4-BE49-F238E27FC236}">
+                <a16:creationId xmlns:a16="http://schemas.microsoft.com/office/drawing/2014/main" id="{D008F4A7-541B-F654-27EB-28B5C49733A9}"/>
+              </a:ext>
+            </a:extLst>
+          </p:cNvPr>
+          <p:cNvSpPr txBox="1"/>
+          <p:nvPr/>
+        </p:nvSpPr>
+        <p:spPr>
+          <a:xfrm>
+            <a:off x="7924421" y="4379886"/>
+            <a:ext cx="649537" cy="369332"/>
+          </a:xfrm>
+          <a:prstGeom prst="rect">
+            <a:avLst/>
+          </a:prstGeom>
+          <a:noFill/>
+        </p:spPr>
+        <p:txBody>
+          <a:bodyPr wrap="none" rtlCol="0">
+            <a:spAutoFit/>
+          </a:bodyPr>
+          <a:lstStyle/>
+          <a:p>
+            <a:r>
+              <a:rPr lang="en-US" dirty="0"/>
+              <a:t>Time</a:t>
+            </a:r>
+            <a:endParaRPr lang="en-DE" dirty="0"/>
+          </a:p>
+        </p:txBody>
+      </p:sp>
+      <p:sp>
+        <p:nvSpPr>
+          <p:cNvPr id="15" name="TextBox 14">
+            <a:extLst>
+              <a:ext uri="{FF2B5EF4-FFF2-40B4-BE49-F238E27FC236}">
+                <a16:creationId xmlns:a16="http://schemas.microsoft.com/office/drawing/2014/main" id="{42AB3C0C-9A8F-9594-5AFE-9274CD0168DA}"/>
+              </a:ext>
+            </a:extLst>
+          </p:cNvPr>
+          <p:cNvSpPr txBox="1"/>
+          <p:nvPr/>
+        </p:nvSpPr>
+        <p:spPr>
+          <a:xfrm rot="16200000">
+            <a:off x="5088800" y="3322480"/>
+            <a:ext cx="2181559" cy="369332"/>
+          </a:xfrm>
+          <a:prstGeom prst="rect">
+            <a:avLst/>
+          </a:prstGeom>
+          <a:noFill/>
+        </p:spPr>
+        <p:txBody>
+          <a:bodyPr wrap="none" rtlCol="0">
+            <a:spAutoFit/>
+          </a:bodyPr>
+          <a:lstStyle/>
+          <a:p>
+            <a:r>
+              <a:rPr lang="en-US" dirty="0"/>
+              <a:t>Abs. velocity in </a:t>
+            </a:r>
+            <a:r>
+              <a:rPr lang="en-US" i="1" dirty="0"/>
+              <a:t>Rad/s</a:t>
+            </a:r>
+            <a:endParaRPr lang="en-DE" i="1" dirty="0"/>
+          </a:p>
+        </p:txBody>
+      </p:sp>
+      <p:cxnSp>
+        <p:nvCxnSpPr>
+          <p:cNvPr id="16" name="Straight Connector 15">
+            <a:extLst>
+              <a:ext uri="{FF2B5EF4-FFF2-40B4-BE49-F238E27FC236}">
+                <a16:creationId xmlns:a16="http://schemas.microsoft.com/office/drawing/2014/main" id="{83C1BB1D-CA79-47FB-E2E3-8771D7A408B3}"/>
+              </a:ext>
+            </a:extLst>
+          </p:cNvPr>
+          <p:cNvCxnSpPr>
+            <a:cxnSpLocks/>
+          </p:cNvCxnSpPr>
+          <p:nvPr/>
+        </p:nvCxnSpPr>
+        <p:spPr>
+          <a:xfrm>
+            <a:off x="6548725" y="2944118"/>
+            <a:ext cx="2907211" cy="0"/>
+          </a:xfrm>
+          <a:prstGeom prst="line">
+            <a:avLst/>
+          </a:prstGeom>
+          <a:ln w="15875">
+            <a:prstDash val="dashDot"/>
+          </a:ln>
+        </p:spPr>
+        <p:style>
+          <a:lnRef idx="1">
+            <a:schemeClr val="accent1"/>
+          </a:lnRef>
+          <a:fillRef idx="0">
+            <a:schemeClr val="accent1"/>
+          </a:fillRef>
+          <a:effectRef idx="0">
+            <a:schemeClr val="accent1"/>
+          </a:effectRef>
+          <a:fontRef idx="minor">
+            <a:schemeClr val="tx1"/>
+          </a:fontRef>
+        </p:style>
+      </p:cxnSp>
+      <p:cxnSp>
+        <p:nvCxnSpPr>
+          <p:cNvPr id="18" name="Straight Connector 17">
+            <a:extLst>
+              <a:ext uri="{FF2B5EF4-FFF2-40B4-BE49-F238E27FC236}">
+                <a16:creationId xmlns:a16="http://schemas.microsoft.com/office/drawing/2014/main" id="{9E0E0EE2-F13F-9167-9F62-77BB7B937915}"/>
+              </a:ext>
+            </a:extLst>
+          </p:cNvPr>
+          <p:cNvCxnSpPr>
+            <a:cxnSpLocks/>
+          </p:cNvCxnSpPr>
+          <p:nvPr/>
+        </p:nvCxnSpPr>
+        <p:spPr>
+          <a:xfrm>
+            <a:off x="6483055" y="3373237"/>
+            <a:ext cx="3039556" cy="0"/>
+          </a:xfrm>
+          <a:prstGeom prst="line">
+            <a:avLst/>
+          </a:prstGeom>
+          <a:ln w="15875">
+            <a:prstDash val="dashDot"/>
+          </a:ln>
+        </p:spPr>
+        <p:style>
+          <a:lnRef idx="1">
+            <a:schemeClr val="accent1"/>
+          </a:lnRef>
+          <a:fillRef idx="0">
+            <a:schemeClr val="accent1"/>
+          </a:fillRef>
+          <a:effectRef idx="0">
+            <a:schemeClr val="accent1"/>
+          </a:effectRef>
+          <a:fontRef idx="minor">
+            <a:schemeClr val="tx1"/>
+          </a:fontRef>
+        </p:style>
+      </p:cxnSp>
+      <p:sp>
+        <p:nvSpPr>
+          <p:cNvPr id="24" name="TextBox 23">
+            <a:extLst>
+              <a:ext uri="{FF2B5EF4-FFF2-40B4-BE49-F238E27FC236}">
+                <a16:creationId xmlns:a16="http://schemas.microsoft.com/office/drawing/2014/main" id="{7B16085B-8446-EAAA-9C68-FD589228C6EF}"/>
+              </a:ext>
+            </a:extLst>
+          </p:cNvPr>
+          <p:cNvSpPr txBox="1"/>
+          <p:nvPr/>
+        </p:nvSpPr>
+        <p:spPr>
+          <a:xfrm>
+            <a:off x="9550682" y="2726788"/>
+            <a:ext cx="1424236" cy="369332"/>
+          </a:xfrm>
+          <a:prstGeom prst="rect">
+            <a:avLst/>
+          </a:prstGeom>
+          <a:noFill/>
+        </p:spPr>
+        <p:txBody>
+          <a:bodyPr wrap="none" rtlCol="0">
+            <a:spAutoFit/>
+          </a:bodyPr>
+          <a:lstStyle/>
+          <a:p>
+            <a:r>
+              <a:rPr lang="en-US" dirty="0"/>
+              <a:t>Max. velocity</a:t>
+            </a:r>
+            <a:endParaRPr lang="en-DE" dirty="0"/>
+          </a:p>
+        </p:txBody>
+      </p:sp>
+      <p:sp>
+        <p:nvSpPr>
+          <p:cNvPr id="25" name="TextBox 24">
+            <a:extLst>
+              <a:ext uri="{FF2B5EF4-FFF2-40B4-BE49-F238E27FC236}">
+                <a16:creationId xmlns:a16="http://schemas.microsoft.com/office/drawing/2014/main" id="{8586148F-F82B-6ABF-F0E8-3511CDE80ABF}"/>
+              </a:ext>
+            </a:extLst>
+          </p:cNvPr>
+          <p:cNvSpPr txBox="1"/>
+          <p:nvPr/>
+        </p:nvSpPr>
+        <p:spPr>
+          <a:xfrm>
+            <a:off x="9550682" y="3171113"/>
+            <a:ext cx="2108719" cy="369332"/>
+          </a:xfrm>
+          <a:prstGeom prst="rect">
+            <a:avLst/>
+          </a:prstGeom>
+          <a:noFill/>
+        </p:spPr>
+        <p:txBody>
+          <a:bodyPr wrap="none" rtlCol="0">
+            <a:spAutoFit/>
+          </a:bodyPr>
+          <a:lstStyle/>
+          <a:p>
+            <a:r>
+              <a:rPr lang="en-US" dirty="0"/>
+              <a:t>80% of max. velocity</a:t>
+            </a:r>
+            <a:endParaRPr lang="en-DE" dirty="0"/>
+          </a:p>
+        </p:txBody>
+      </p:sp>
+      <p:sp>
+        <p:nvSpPr>
+          <p:cNvPr id="28" name="Freeform: Shape 27">
+            <a:extLst>
+              <a:ext uri="{FF2B5EF4-FFF2-40B4-BE49-F238E27FC236}">
+                <a16:creationId xmlns:a16="http://schemas.microsoft.com/office/drawing/2014/main" id="{1BD08AD9-819B-DCC3-C7EB-46B99CE3062B}"/>
+              </a:ext>
+            </a:extLst>
+          </p:cNvPr>
+          <p:cNvSpPr/>
+          <p:nvPr/>
+        </p:nvSpPr>
+        <p:spPr>
+          <a:xfrm>
+            <a:off x="6545179" y="3267804"/>
+            <a:ext cx="3064042" cy="911164"/>
+          </a:xfrm>
+          <a:custGeom>
+            <a:avLst/>
+            <a:gdLst>
+              <a:gd name="connsiteX0" fmla="*/ 0 w 3064042"/>
+              <a:gd name="connsiteY0" fmla="*/ 911164 h 911164"/>
+              <a:gd name="connsiteX1" fmla="*/ 521368 w 3064042"/>
+              <a:gd name="connsiteY1" fmla="*/ 109059 h 911164"/>
+              <a:gd name="connsiteX2" fmla="*/ 2550695 w 3064042"/>
+              <a:gd name="connsiteY2" fmla="*/ 93017 h 911164"/>
+              <a:gd name="connsiteX3" fmla="*/ 3064042 w 3064042"/>
+              <a:gd name="connsiteY3" fmla="*/ 903143 h 911164"/>
+            </a:gdLst>
+            <a:ahLst/>
+            <a:cxnLst>
+              <a:cxn ang="0">
+                <a:pos x="connsiteX0" y="connsiteY0"/>
+              </a:cxn>
+              <a:cxn ang="0">
+                <a:pos x="connsiteX1" y="connsiteY1"/>
+              </a:cxn>
+              <a:cxn ang="0">
+                <a:pos x="connsiteX2" y="connsiteY2"/>
+              </a:cxn>
+              <a:cxn ang="0">
+                <a:pos x="connsiteX3" y="connsiteY3"/>
+              </a:cxn>
+            </a:cxnLst>
+            <a:rect l="l" t="t" r="r" b="b"/>
+            <a:pathLst>
+              <a:path w="3064042" h="911164">
+                <a:moveTo>
+                  <a:pt x="0" y="911164"/>
+                </a:moveTo>
+                <a:cubicBezTo>
+                  <a:pt x="48126" y="578290"/>
+                  <a:pt x="96252" y="245417"/>
+                  <a:pt x="521368" y="109059"/>
+                </a:cubicBezTo>
+                <a:cubicBezTo>
+                  <a:pt x="946484" y="-27299"/>
+                  <a:pt x="2126916" y="-39330"/>
+                  <a:pt x="2550695" y="93017"/>
+                </a:cubicBezTo>
+                <a:cubicBezTo>
+                  <a:pt x="2974474" y="225364"/>
+                  <a:pt x="3019258" y="564253"/>
+                  <a:pt x="3064042" y="903143"/>
+                </a:cubicBezTo>
+              </a:path>
+            </a:pathLst>
+          </a:custGeom>
+          <a:noFill/>
+          <a:ln w="38100"/>
+        </p:spPr>
+        <p:style>
+          <a:lnRef idx="2">
+            <a:schemeClr val="accent1">
+              <a:shade val="15000"/>
+            </a:schemeClr>
+          </a:lnRef>
+          <a:fillRef idx="1">
+            <a:schemeClr val="accent1"/>
+          </a:fillRef>
+          <a:effectRef idx="0">
+            <a:schemeClr val="accent1"/>
+          </a:effectRef>
+          <a:fontRef idx="minor">
+            <a:schemeClr val="lt1"/>
+          </a:fontRef>
+        </p:style>
+        <p:txBody>
+          <a:bodyPr rtlCol="0" anchor="ctr"/>
+          <a:lstStyle/>
+          <a:p>
+            <a:pPr algn="ctr"/>
+            <a:endParaRPr lang="en-DE"/>
+          </a:p>
+        </p:txBody>
+      </p:sp>
+    </p:spTree>
+    <p:extLst>
+      <p:ext uri="{BB962C8B-B14F-4D97-AF65-F5344CB8AC3E}">
+        <p14:creationId xmlns:p14="http://schemas.microsoft.com/office/powerpoint/2010/main" val="2920827911"/>
+      </p:ext>
+    </p:extLst>
+  </p:cSld>
+  <p:clrMapOvr>
+    <a:masterClrMapping/>
+  </p:clrMapOvr>
+</p:sld>
+</file>
+
+<file path=ppt/slides/slide14.xml><?xml version="1.0" encoding="utf-8"?>
 <p:sld xmlns:a="http://schemas.openxmlformats.org/drawingml/2006/main" xmlns:r="http://schemas.openxmlformats.org/officeDocument/2006/relationships" xmlns:p="http://schemas.openxmlformats.org/presentationml/2006/main">
   <p:cSld>
     <p:spTree>
@@ -8772,6 +9633,1324 @@
     <p:extLst>
       <p:ext uri="{BB962C8B-B14F-4D97-AF65-F5344CB8AC3E}">
         <p14:creationId xmlns:p14="http://schemas.microsoft.com/office/powerpoint/2010/main" val="116645549"/>
+      </p:ext>
+    </p:extLst>
+  </p:cSld>
+  <p:clrMapOvr>
+    <a:masterClrMapping/>
+  </p:clrMapOvr>
+</p:sld>
+</file>
+
+<file path=ppt/slides/slide15.xml><?xml version="1.0" encoding="utf-8"?>
+<p:sld xmlns:a="http://schemas.openxmlformats.org/drawingml/2006/main" xmlns:r="http://schemas.openxmlformats.org/officeDocument/2006/relationships" xmlns:p="http://schemas.openxmlformats.org/presentationml/2006/main">
+  <p:cSld>
+    <p:bg>
+      <p:bgPr>
+        <a:gradFill>
+          <a:gsLst>
+            <a:gs pos="0">
+              <a:schemeClr val="tx1"/>
+            </a:gs>
+            <a:gs pos="100000">
+              <a:srgbClr val="15018D"/>
+            </a:gs>
+          </a:gsLst>
+          <a:lin ang="5400000" scaled="1"/>
+        </a:gradFill>
+        <a:effectLst/>
+      </p:bgPr>
+    </p:bg>
+    <p:spTree>
+      <p:nvGrpSpPr>
+        <p:cNvPr id="1" name=""/>
+        <p:cNvGrpSpPr/>
+        <p:nvPr/>
+      </p:nvGrpSpPr>
+      <p:grpSpPr>
+        <a:xfrm>
+          <a:off x="0" y="0"/>
+          <a:ext cx="0" cy="0"/>
+          <a:chOff x="0" y="0"/>
+          <a:chExt cx="0" cy="0"/>
+        </a:xfrm>
+      </p:grpSpPr>
+      <p:pic>
+        <p:nvPicPr>
+          <p:cNvPr id="5" name="Grafik 2">
+            <a:extLst>
+              <a:ext uri="{FF2B5EF4-FFF2-40B4-BE49-F238E27FC236}">
+                <a16:creationId xmlns:a16="http://schemas.microsoft.com/office/drawing/2014/main" id="{7974D065-6B64-81B5-FF7D-9F7D6E763AEE}"/>
+              </a:ext>
+            </a:extLst>
+          </p:cNvPr>
+          <p:cNvPicPr>
+            <a:picLocks noChangeAspect="1"/>
+          </p:cNvPicPr>
+          <p:nvPr/>
+        </p:nvPicPr>
+        <p:blipFill>
+          <a:blip r:embed="rId2">
+            <a:extLst>
+              <a:ext uri="{28A0092B-C50C-407E-A947-70E740481C1C}">
+                <a14:useLocalDpi xmlns:a14="http://schemas.microsoft.com/office/drawing/2010/main" val="0"/>
+              </a:ext>
+            </a:extLst>
+          </a:blip>
+          <a:srcRect/>
+          <a:stretch>
+            <a:fillRect/>
+          </a:stretch>
+        </p:blipFill>
+        <p:spPr bwMode="auto">
+          <a:xfrm>
+            <a:off x="321309" y="2067332"/>
+            <a:ext cx="2323465" cy="2266681"/>
+          </a:xfrm>
+          <a:prstGeom prst="rect">
+            <a:avLst/>
+          </a:prstGeom>
+          <a:noFill/>
+          <a:ln>
+            <a:noFill/>
+          </a:ln>
+        </p:spPr>
+      </p:pic>
+      <p:pic>
+        <p:nvPicPr>
+          <p:cNvPr id="6" name="Grafik 3">
+            <a:extLst>
+              <a:ext uri="{FF2B5EF4-FFF2-40B4-BE49-F238E27FC236}">
+                <a16:creationId xmlns:a16="http://schemas.microsoft.com/office/drawing/2014/main" id="{E020F63A-FFEB-CC8D-A1AD-E5355383557B}"/>
+              </a:ext>
+            </a:extLst>
+          </p:cNvPr>
+          <p:cNvPicPr>
+            <a:picLocks noChangeAspect="1"/>
+          </p:cNvPicPr>
+          <p:nvPr/>
+        </p:nvPicPr>
+        <p:blipFill>
+          <a:blip r:embed="rId3">
+            <a:extLst>
+              <a:ext uri="{28A0092B-C50C-407E-A947-70E740481C1C}">
+                <a14:useLocalDpi xmlns:a14="http://schemas.microsoft.com/office/drawing/2010/main" val="0"/>
+              </a:ext>
+            </a:extLst>
+          </a:blip>
+          <a:srcRect/>
+          <a:stretch>
+            <a:fillRect/>
+          </a:stretch>
+        </p:blipFill>
+        <p:spPr bwMode="auto">
+          <a:xfrm>
+            <a:off x="2928248" y="2066108"/>
+            <a:ext cx="2323465" cy="2267905"/>
+          </a:xfrm>
+          <a:prstGeom prst="rect">
+            <a:avLst/>
+          </a:prstGeom>
+          <a:noFill/>
+          <a:ln>
+            <a:noFill/>
+          </a:ln>
+        </p:spPr>
+      </p:pic>
+      <p:sp>
+        <p:nvSpPr>
+          <p:cNvPr id="9" name="TextBox 8">
+            <a:extLst>
+              <a:ext uri="{FF2B5EF4-FFF2-40B4-BE49-F238E27FC236}">
+                <a16:creationId xmlns:a16="http://schemas.microsoft.com/office/drawing/2014/main" id="{0F57D468-91AB-4F10-0867-3E182FDAF821}"/>
+              </a:ext>
+            </a:extLst>
+          </p:cNvPr>
+          <p:cNvSpPr txBox="1"/>
+          <p:nvPr/>
+        </p:nvSpPr>
+        <p:spPr>
+          <a:xfrm>
+            <a:off x="321309" y="223421"/>
+            <a:ext cx="6096000" cy="523220"/>
+          </a:xfrm>
+          <a:prstGeom prst="rect">
+            <a:avLst/>
+          </a:prstGeom>
+          <a:noFill/>
+        </p:spPr>
+        <p:txBody>
+          <a:bodyPr wrap="square">
+            <a:spAutoFit/>
+          </a:bodyPr>
+          <a:lstStyle/>
+          <a:p>
+            <a:r>
+              <a:rPr lang="de-DE" sz="2800" dirty="0">
+                <a:solidFill>
+                  <a:schemeClr val="bg1"/>
+                </a:solidFill>
+              </a:rPr>
+              <a:t>Gelenkwinkelanalyse</a:t>
+            </a:r>
+            <a:endParaRPr lang="de-DE" dirty="0">
+              <a:solidFill>
+                <a:schemeClr val="bg1"/>
+              </a:solidFill>
+            </a:endParaRPr>
+          </a:p>
+        </p:txBody>
+      </p:sp>
+      <p:sp>
+        <p:nvSpPr>
+          <p:cNvPr id="10" name="TextBox 9">
+            <a:extLst>
+              <a:ext uri="{FF2B5EF4-FFF2-40B4-BE49-F238E27FC236}">
+                <a16:creationId xmlns:a16="http://schemas.microsoft.com/office/drawing/2014/main" id="{0B2A0888-9E92-87FA-5853-557D6E2F4678}"/>
+              </a:ext>
+            </a:extLst>
+          </p:cNvPr>
+          <p:cNvSpPr txBox="1"/>
+          <p:nvPr/>
+        </p:nvSpPr>
+        <p:spPr>
+          <a:xfrm>
+            <a:off x="321309" y="857250"/>
+            <a:ext cx="11382375" cy="923330"/>
+          </a:xfrm>
+          <a:prstGeom prst="rect">
+            <a:avLst/>
+          </a:prstGeom>
+          <a:noFill/>
+        </p:spPr>
+        <p:txBody>
+          <a:bodyPr wrap="square" rtlCol="0">
+            <a:spAutoFit/>
+          </a:bodyPr>
+          <a:lstStyle/>
+          <a:p>
+            <a:r>
+              <a:rPr lang="de-DE" dirty="0">
+                <a:solidFill>
+                  <a:schemeClr val="bg1"/>
+                </a:solidFill>
+              </a:rPr>
+              <a:t>Beim Fräsen oder WAAM ist der </a:t>
+            </a:r>
+            <a:r>
+              <a:rPr lang="de-DE" dirty="0" err="1">
+                <a:solidFill>
+                  <a:schemeClr val="bg1"/>
+                </a:solidFill>
+              </a:rPr>
+              <a:t>Toolpath</a:t>
+            </a:r>
+            <a:r>
+              <a:rPr lang="de-DE" dirty="0">
+                <a:solidFill>
+                  <a:schemeClr val="bg1"/>
+                </a:solidFill>
+              </a:rPr>
+              <a:t> durch 5 Freiheitsgrade (X,Y,Z,A,B) definiert. Ein Industrieroboter mit 6 Freiheitsgraden benötigt für eine vollständige Definition eine manuell definierte Rotation um die C-Achse (Rotationsachse des Werkzeugs). Diese kann theoretisch frei gewählt werden. (Siehe Bild 1 und Bild 2)</a:t>
+            </a:r>
+          </a:p>
+        </p:txBody>
+      </p:sp>
+      <p:sp>
+        <p:nvSpPr>
+          <p:cNvPr id="11" name="TextBox 10">
+            <a:extLst>
+              <a:ext uri="{FF2B5EF4-FFF2-40B4-BE49-F238E27FC236}">
+                <a16:creationId xmlns:a16="http://schemas.microsoft.com/office/drawing/2014/main" id="{5BD99E77-21D5-F645-F305-03B325720962}"/>
+              </a:ext>
+            </a:extLst>
+          </p:cNvPr>
+          <p:cNvSpPr txBox="1"/>
+          <p:nvPr/>
+        </p:nvSpPr>
+        <p:spPr>
+          <a:xfrm>
+            <a:off x="5535187" y="2066108"/>
+            <a:ext cx="5932913" cy="1754326"/>
+          </a:xfrm>
+          <a:prstGeom prst="rect">
+            <a:avLst/>
+          </a:prstGeom>
+          <a:noFill/>
+        </p:spPr>
+        <p:txBody>
+          <a:bodyPr wrap="square" rtlCol="0">
+            <a:spAutoFit/>
+          </a:bodyPr>
+          <a:lstStyle/>
+          <a:p>
+            <a:r>
+              <a:rPr lang="de-DE" dirty="0">
+                <a:solidFill>
+                  <a:schemeClr val="bg1"/>
+                </a:solidFill>
+              </a:rPr>
+              <a:t>Diese Rotation um die C-Achse ist eine Randbedingung, die das Verhalten des Roboters signifikant verändern kann.</a:t>
+            </a:r>
+            <a:br>
+              <a:rPr lang="de-DE" dirty="0">
+                <a:solidFill>
+                  <a:schemeClr val="bg1"/>
+                </a:solidFill>
+              </a:rPr>
+            </a:br>
+            <a:br>
+              <a:rPr lang="de-DE" dirty="0">
+                <a:solidFill>
+                  <a:schemeClr val="bg1"/>
+                </a:solidFill>
+              </a:rPr>
+            </a:br>
+            <a:r>
+              <a:rPr lang="de-DE" dirty="0">
+                <a:solidFill>
+                  <a:schemeClr val="bg1"/>
+                </a:solidFill>
+              </a:rPr>
+              <a:t>Falls diese Randbedingung nicht optimal gesetzt ist, kann es beispielweise dazu führen dass sehr viele unnötige Gelenkbewegungen resultieren.</a:t>
+            </a:r>
+          </a:p>
+        </p:txBody>
+      </p:sp>
+      <p:sp>
+        <p:nvSpPr>
+          <p:cNvPr id="12" name="TextBox 11">
+            <a:extLst>
+              <a:ext uri="{FF2B5EF4-FFF2-40B4-BE49-F238E27FC236}">
+                <a16:creationId xmlns:a16="http://schemas.microsoft.com/office/drawing/2014/main" id="{E6D8DE75-EF15-FEF5-FC75-44338CA4BB5A}"/>
+              </a:ext>
+            </a:extLst>
+          </p:cNvPr>
+          <p:cNvSpPr txBox="1"/>
+          <p:nvPr/>
+        </p:nvSpPr>
+        <p:spPr>
+          <a:xfrm>
+            <a:off x="321309" y="4603254"/>
+            <a:ext cx="11146791" cy="2031325"/>
+          </a:xfrm>
+          <a:prstGeom prst="rect">
+            <a:avLst/>
+          </a:prstGeom>
+          <a:noFill/>
+        </p:spPr>
+        <p:txBody>
+          <a:bodyPr wrap="square" rtlCol="0">
+            <a:spAutoFit/>
+          </a:bodyPr>
+          <a:lstStyle/>
+          <a:p>
+            <a:r>
+              <a:rPr lang="de-DE" dirty="0">
+                <a:solidFill>
+                  <a:schemeClr val="bg1"/>
+                </a:solidFill>
+              </a:rPr>
+              <a:t>Ziel ist es, für einen gegebenen </a:t>
+            </a:r>
+            <a:r>
+              <a:rPr lang="de-DE" dirty="0" err="1">
+                <a:solidFill>
+                  <a:schemeClr val="bg1"/>
+                </a:solidFill>
+              </a:rPr>
+              <a:t>Toolpath</a:t>
+            </a:r>
+            <a:r>
+              <a:rPr lang="de-DE" dirty="0">
+                <a:solidFill>
+                  <a:schemeClr val="bg1"/>
+                </a:solidFill>
+              </a:rPr>
+              <a:t> mit manuell bestimmten Randbedingungen, eine Analyse der Gelenkwinkel durchzuführen. Im zweiten Schritt ist es möglich optimale Randbedingungen vorzuschlagen um auf bestimme Prozessparameter zu optimieren. </a:t>
+            </a:r>
+            <a:br>
+              <a:rPr lang="de-DE" dirty="0">
+                <a:solidFill>
+                  <a:schemeClr val="bg1"/>
+                </a:solidFill>
+              </a:rPr>
+            </a:br>
+            <a:endParaRPr lang="de-DE" dirty="0">
+              <a:solidFill>
+                <a:schemeClr val="bg1"/>
+              </a:solidFill>
+            </a:endParaRPr>
+          </a:p>
+          <a:p>
+            <a:r>
+              <a:rPr lang="de-DE" dirty="0">
+                <a:solidFill>
+                  <a:schemeClr val="bg1"/>
+                </a:solidFill>
+              </a:rPr>
+              <a:t>Beispiele solcher Prozessparameter sind: Anzahl der Gelenkumschläge oder Vermeidung von singularitätsnahen Posen</a:t>
+            </a:r>
+          </a:p>
+          <a:p>
+            <a:endParaRPr lang="de-DE" dirty="0">
+              <a:solidFill>
+                <a:schemeClr val="bg1"/>
+              </a:solidFill>
+            </a:endParaRPr>
+          </a:p>
+          <a:p>
+            <a:r>
+              <a:rPr lang="de-DE" dirty="0">
+                <a:solidFill>
+                  <a:schemeClr val="bg1"/>
+                </a:solidFill>
+              </a:rPr>
+              <a:t>Als Grundlage dafür benötigt man die Gelenkwinkel (J1-J6) als Ausgabeparameter von NX.</a:t>
+            </a:r>
+          </a:p>
+        </p:txBody>
+      </p:sp>
+      <p:sp>
+        <p:nvSpPr>
+          <p:cNvPr id="14" name="TextBox 13">
+            <a:extLst>
+              <a:ext uri="{FF2B5EF4-FFF2-40B4-BE49-F238E27FC236}">
+                <a16:creationId xmlns:a16="http://schemas.microsoft.com/office/drawing/2014/main" id="{984D50B5-828D-B69B-FE1B-1278A35C610F}"/>
+              </a:ext>
+            </a:extLst>
+          </p:cNvPr>
+          <p:cNvSpPr txBox="1"/>
+          <p:nvPr/>
+        </p:nvSpPr>
+        <p:spPr>
+          <a:xfrm>
+            <a:off x="321309" y="4005100"/>
+            <a:ext cx="2323465" cy="369332"/>
+          </a:xfrm>
+          <a:prstGeom prst="rect">
+            <a:avLst/>
+          </a:prstGeom>
+          <a:noFill/>
+        </p:spPr>
+        <p:txBody>
+          <a:bodyPr wrap="square">
+            <a:spAutoFit/>
+          </a:bodyPr>
+          <a:lstStyle/>
+          <a:p>
+            <a:r>
+              <a:rPr lang="de-DE" dirty="0">
+                <a:solidFill>
+                  <a:schemeClr val="bg1"/>
+                </a:solidFill>
+              </a:rPr>
+              <a:t>Bild 1</a:t>
+            </a:r>
+            <a:endParaRPr lang="en-DE" dirty="0"/>
+          </a:p>
+        </p:txBody>
+      </p:sp>
+      <p:sp>
+        <p:nvSpPr>
+          <p:cNvPr id="16" name="TextBox 15">
+            <a:extLst>
+              <a:ext uri="{FF2B5EF4-FFF2-40B4-BE49-F238E27FC236}">
+                <a16:creationId xmlns:a16="http://schemas.microsoft.com/office/drawing/2014/main" id="{B7F2F8EE-D1DB-9049-0786-86A2996CA702}"/>
+              </a:ext>
+            </a:extLst>
+          </p:cNvPr>
+          <p:cNvSpPr txBox="1"/>
+          <p:nvPr/>
+        </p:nvSpPr>
+        <p:spPr>
+          <a:xfrm>
+            <a:off x="2928248" y="3964681"/>
+            <a:ext cx="2323465" cy="369332"/>
+          </a:xfrm>
+          <a:prstGeom prst="rect">
+            <a:avLst/>
+          </a:prstGeom>
+          <a:noFill/>
+        </p:spPr>
+        <p:txBody>
+          <a:bodyPr wrap="square">
+            <a:spAutoFit/>
+          </a:bodyPr>
+          <a:lstStyle/>
+          <a:p>
+            <a:r>
+              <a:rPr lang="de-DE" dirty="0">
+                <a:solidFill>
+                  <a:schemeClr val="bg1"/>
+                </a:solidFill>
+              </a:rPr>
+              <a:t>Bild 2</a:t>
+            </a:r>
+            <a:endParaRPr lang="en-DE" dirty="0"/>
+          </a:p>
+        </p:txBody>
+      </p:sp>
+    </p:spTree>
+    <p:extLst>
+      <p:ext uri="{BB962C8B-B14F-4D97-AF65-F5344CB8AC3E}">
+        <p14:creationId xmlns:p14="http://schemas.microsoft.com/office/powerpoint/2010/main" val="1760859697"/>
+      </p:ext>
+    </p:extLst>
+  </p:cSld>
+  <p:clrMapOvr>
+    <a:masterClrMapping/>
+  </p:clrMapOvr>
+</p:sld>
+</file>
+
+<file path=ppt/slides/slide16.xml><?xml version="1.0" encoding="utf-8"?>
+<p:sld xmlns:a="http://schemas.openxmlformats.org/drawingml/2006/main" xmlns:r="http://schemas.openxmlformats.org/officeDocument/2006/relationships" xmlns:p="http://schemas.openxmlformats.org/presentationml/2006/main">
+  <p:cSld>
+    <p:spTree>
+      <p:nvGrpSpPr>
+        <p:cNvPr id="1" name=""/>
+        <p:cNvGrpSpPr/>
+        <p:nvPr/>
+      </p:nvGrpSpPr>
+      <p:grpSpPr>
+        <a:xfrm>
+          <a:off x="0" y="0"/>
+          <a:ext cx="0" cy="0"/>
+          <a:chOff x="0" y="0"/>
+          <a:chExt cx="0" cy="0"/>
+        </a:xfrm>
+      </p:grpSpPr>
+      <p:sp>
+        <p:nvSpPr>
+          <p:cNvPr id="33" name="Arc 32">
+            <a:extLst>
+              <a:ext uri="{FF2B5EF4-FFF2-40B4-BE49-F238E27FC236}">
+                <a16:creationId xmlns:a16="http://schemas.microsoft.com/office/drawing/2014/main" id="{C3C78B96-43D0-F6C1-07EB-7FE89A4ABB27}"/>
+              </a:ext>
+            </a:extLst>
+          </p:cNvPr>
+          <p:cNvSpPr/>
+          <p:nvPr/>
+        </p:nvSpPr>
+        <p:spPr>
+          <a:xfrm rot="16200000">
+            <a:off x="1574894" y="2558332"/>
+            <a:ext cx="1172191" cy="697684"/>
+          </a:xfrm>
+          <a:prstGeom prst="arc">
+            <a:avLst>
+              <a:gd name="adj1" fmla="val 19844186"/>
+              <a:gd name="adj2" fmla="val 1306241"/>
+            </a:avLst>
+          </a:prstGeom>
+          <a:ln w="28575">
+            <a:solidFill>
+              <a:srgbClr val="FF5050"/>
+            </a:solidFill>
+          </a:ln>
+        </p:spPr>
+        <p:style>
+          <a:lnRef idx="1">
+            <a:schemeClr val="accent1"/>
+          </a:lnRef>
+          <a:fillRef idx="0">
+            <a:schemeClr val="accent1"/>
+          </a:fillRef>
+          <a:effectRef idx="0">
+            <a:schemeClr val="accent1"/>
+          </a:effectRef>
+          <a:fontRef idx="minor">
+            <a:schemeClr val="tx1"/>
+          </a:fontRef>
+        </p:style>
+        <p:txBody>
+          <a:bodyPr rtlCol="0" anchor="ctr"/>
+          <a:lstStyle/>
+          <a:p>
+            <a:pPr algn="ctr"/>
+            <a:endParaRPr lang="en-DE"/>
+          </a:p>
+        </p:txBody>
+      </p:sp>
+      <p:cxnSp>
+        <p:nvCxnSpPr>
+          <p:cNvPr id="4" name="Straight Arrow Connector 3">
+            <a:extLst>
+              <a:ext uri="{FF2B5EF4-FFF2-40B4-BE49-F238E27FC236}">
+                <a16:creationId xmlns:a16="http://schemas.microsoft.com/office/drawing/2014/main" id="{40AEB782-3A43-3532-9151-066BE128CA7D}"/>
+              </a:ext>
+            </a:extLst>
+          </p:cNvPr>
+          <p:cNvCxnSpPr>
+            <a:cxnSpLocks/>
+          </p:cNvCxnSpPr>
+          <p:nvPr/>
+        </p:nvCxnSpPr>
+        <p:spPr>
+          <a:xfrm>
+            <a:off x="681873" y="3749333"/>
+            <a:ext cx="2945247" cy="0"/>
+          </a:xfrm>
+          <a:prstGeom prst="straightConnector1">
+            <a:avLst/>
+          </a:prstGeom>
+          <a:ln w="38100">
+            <a:tailEnd type="triangle"/>
+          </a:ln>
+        </p:spPr>
+        <p:style>
+          <a:lnRef idx="1">
+            <a:schemeClr val="accent1"/>
+          </a:lnRef>
+          <a:fillRef idx="0">
+            <a:schemeClr val="accent1"/>
+          </a:fillRef>
+          <a:effectRef idx="0">
+            <a:schemeClr val="accent1"/>
+          </a:effectRef>
+          <a:fontRef idx="minor">
+            <a:schemeClr val="tx1"/>
+          </a:fontRef>
+        </p:style>
+      </p:cxnSp>
+      <p:cxnSp>
+        <p:nvCxnSpPr>
+          <p:cNvPr id="5" name="Straight Arrow Connector 4">
+            <a:extLst>
+              <a:ext uri="{FF2B5EF4-FFF2-40B4-BE49-F238E27FC236}">
+                <a16:creationId xmlns:a16="http://schemas.microsoft.com/office/drawing/2014/main" id="{ADC38E9B-3391-00BC-ABD5-ED8688BEA3CF}"/>
+              </a:ext>
+            </a:extLst>
+          </p:cNvPr>
+          <p:cNvCxnSpPr/>
+          <p:nvPr/>
+        </p:nvCxnSpPr>
+        <p:spPr>
+          <a:xfrm flipV="1">
+            <a:off x="786146" y="1992723"/>
+            <a:ext cx="0" cy="1868905"/>
+          </a:xfrm>
+          <a:prstGeom prst="straightConnector1">
+            <a:avLst/>
+          </a:prstGeom>
+          <a:ln w="38100">
+            <a:tailEnd type="triangle"/>
+          </a:ln>
+        </p:spPr>
+        <p:style>
+          <a:lnRef idx="1">
+            <a:schemeClr val="accent1"/>
+          </a:lnRef>
+          <a:fillRef idx="0">
+            <a:schemeClr val="accent1"/>
+          </a:fillRef>
+          <a:effectRef idx="0">
+            <a:schemeClr val="accent1"/>
+          </a:effectRef>
+          <a:fontRef idx="minor">
+            <a:schemeClr val="tx1"/>
+          </a:fontRef>
+        </p:style>
+      </p:cxnSp>
+      <p:sp>
+        <p:nvSpPr>
+          <p:cNvPr id="6" name="TextBox 5">
+            <a:extLst>
+              <a:ext uri="{FF2B5EF4-FFF2-40B4-BE49-F238E27FC236}">
+                <a16:creationId xmlns:a16="http://schemas.microsoft.com/office/drawing/2014/main" id="{8C275AAD-E3BD-9C1F-1DDA-81E8607FBC2E}"/>
+              </a:ext>
+            </a:extLst>
+          </p:cNvPr>
+          <p:cNvSpPr txBox="1"/>
+          <p:nvPr/>
+        </p:nvSpPr>
+        <p:spPr>
+          <a:xfrm>
+            <a:off x="786147" y="3749333"/>
+            <a:ext cx="2780013" cy="369332"/>
+          </a:xfrm>
+          <a:prstGeom prst="rect">
+            <a:avLst/>
+          </a:prstGeom>
+          <a:noFill/>
+        </p:spPr>
+        <p:txBody>
+          <a:bodyPr wrap="square" rtlCol="0">
+            <a:spAutoFit/>
+          </a:bodyPr>
+          <a:lstStyle/>
+          <a:p>
+            <a:pPr algn="ctr"/>
+            <a:r>
+              <a:rPr lang="en-US" dirty="0"/>
+              <a:t>X</a:t>
+            </a:r>
+            <a:endParaRPr lang="en-DE" dirty="0"/>
+          </a:p>
+        </p:txBody>
+      </p:sp>
+      <p:sp>
+        <p:nvSpPr>
+          <p:cNvPr id="7" name="TextBox 6">
+            <a:extLst>
+              <a:ext uri="{FF2B5EF4-FFF2-40B4-BE49-F238E27FC236}">
+                <a16:creationId xmlns:a16="http://schemas.microsoft.com/office/drawing/2014/main" id="{25D727F6-D001-D3D7-0796-152CF7F7FC1E}"/>
+              </a:ext>
+            </a:extLst>
+          </p:cNvPr>
+          <p:cNvSpPr txBox="1"/>
+          <p:nvPr/>
+        </p:nvSpPr>
+        <p:spPr>
+          <a:xfrm rot="16200000">
+            <a:off x="-417321" y="2722510"/>
+            <a:ext cx="1684313" cy="369332"/>
+          </a:xfrm>
+          <a:prstGeom prst="rect">
+            <a:avLst/>
+          </a:prstGeom>
+          <a:noFill/>
+        </p:spPr>
+        <p:txBody>
+          <a:bodyPr wrap="square" rtlCol="0">
+            <a:spAutoFit/>
+          </a:bodyPr>
+          <a:lstStyle/>
+          <a:p>
+            <a:pPr algn="ctr"/>
+            <a:r>
+              <a:rPr lang="en-US" dirty="0"/>
+              <a:t>Y</a:t>
+            </a:r>
+            <a:endParaRPr lang="en-DE" i="1" dirty="0"/>
+          </a:p>
+        </p:txBody>
+      </p:sp>
+      <p:cxnSp>
+        <p:nvCxnSpPr>
+          <p:cNvPr id="11" name="Straight Connector 10">
+            <a:extLst>
+              <a:ext uri="{FF2B5EF4-FFF2-40B4-BE49-F238E27FC236}">
+                <a16:creationId xmlns:a16="http://schemas.microsoft.com/office/drawing/2014/main" id="{092EA715-A0B1-D303-0550-4463874FEBE0}"/>
+              </a:ext>
+            </a:extLst>
+          </p:cNvPr>
+          <p:cNvCxnSpPr>
+            <a:cxnSpLocks/>
+          </p:cNvCxnSpPr>
+          <p:nvPr/>
+        </p:nvCxnSpPr>
+        <p:spPr>
+          <a:xfrm flipV="1">
+            <a:off x="1308676" y="2211603"/>
+            <a:ext cx="845820" cy="954505"/>
+          </a:xfrm>
+          <a:prstGeom prst="line">
+            <a:avLst/>
+          </a:prstGeom>
+          <a:ln w="38100">
+            <a:solidFill>
+              <a:schemeClr val="tx1"/>
+            </a:solidFill>
+          </a:ln>
+        </p:spPr>
+        <p:style>
+          <a:lnRef idx="1">
+            <a:schemeClr val="accent1"/>
+          </a:lnRef>
+          <a:fillRef idx="0">
+            <a:schemeClr val="accent1"/>
+          </a:fillRef>
+          <a:effectRef idx="0">
+            <a:schemeClr val="accent1"/>
+          </a:effectRef>
+          <a:fontRef idx="minor">
+            <a:schemeClr val="tx1"/>
+          </a:fontRef>
+        </p:style>
+      </p:cxnSp>
+      <p:cxnSp>
+        <p:nvCxnSpPr>
+          <p:cNvPr id="13" name="Straight Connector 12">
+            <a:extLst>
+              <a:ext uri="{FF2B5EF4-FFF2-40B4-BE49-F238E27FC236}">
+                <a16:creationId xmlns:a16="http://schemas.microsoft.com/office/drawing/2014/main" id="{4492992C-B171-822B-EB13-6FA0BD99706A}"/>
+              </a:ext>
+            </a:extLst>
+          </p:cNvPr>
+          <p:cNvCxnSpPr>
+            <a:cxnSpLocks/>
+          </p:cNvCxnSpPr>
+          <p:nvPr/>
+        </p:nvCxnSpPr>
+        <p:spPr>
+          <a:xfrm flipH="1" flipV="1">
+            <a:off x="2154496" y="2211604"/>
+            <a:ext cx="1165860" cy="1129765"/>
+          </a:xfrm>
+          <a:prstGeom prst="line">
+            <a:avLst/>
+          </a:prstGeom>
+          <a:ln w="38100">
+            <a:solidFill>
+              <a:schemeClr val="tx1"/>
+            </a:solidFill>
+          </a:ln>
+        </p:spPr>
+        <p:style>
+          <a:lnRef idx="1">
+            <a:schemeClr val="accent1"/>
+          </a:lnRef>
+          <a:fillRef idx="0">
+            <a:schemeClr val="accent1"/>
+          </a:fillRef>
+          <a:effectRef idx="0">
+            <a:schemeClr val="accent1"/>
+          </a:effectRef>
+          <a:fontRef idx="minor">
+            <a:schemeClr val="tx1"/>
+          </a:fontRef>
+        </p:style>
+      </p:cxnSp>
+      <p:sp>
+        <p:nvSpPr>
+          <p:cNvPr id="18" name="Oval 17">
+            <a:extLst>
+              <a:ext uri="{FF2B5EF4-FFF2-40B4-BE49-F238E27FC236}">
+                <a16:creationId xmlns:a16="http://schemas.microsoft.com/office/drawing/2014/main" id="{330AFA50-32EA-B388-CB88-3CD46A96ACD8}"/>
+              </a:ext>
+            </a:extLst>
+          </p:cNvPr>
+          <p:cNvSpPr/>
+          <p:nvPr/>
+        </p:nvSpPr>
+        <p:spPr>
+          <a:xfrm>
+            <a:off x="2106394" y="2163984"/>
+            <a:ext cx="96203" cy="95236"/>
+          </a:xfrm>
+          <a:prstGeom prst="ellipse">
+            <a:avLst/>
+          </a:prstGeom>
+          <a:solidFill>
+            <a:schemeClr val="accent4"/>
+          </a:solidFill>
+        </p:spPr>
+        <p:style>
+          <a:lnRef idx="2">
+            <a:schemeClr val="accent1">
+              <a:shade val="15000"/>
+            </a:schemeClr>
+          </a:lnRef>
+          <a:fillRef idx="1">
+            <a:schemeClr val="accent1"/>
+          </a:fillRef>
+          <a:effectRef idx="0">
+            <a:schemeClr val="accent1"/>
+          </a:effectRef>
+          <a:fontRef idx="minor">
+            <a:schemeClr val="lt1"/>
+          </a:fontRef>
+        </p:style>
+        <p:txBody>
+          <a:bodyPr rtlCol="0" anchor="ctr"/>
+          <a:lstStyle/>
+          <a:p>
+            <a:pPr algn="ctr"/>
+            <a:endParaRPr lang="en-DE"/>
+          </a:p>
+        </p:txBody>
+      </p:sp>
+      <p:sp>
+        <p:nvSpPr>
+          <p:cNvPr id="19" name="Oval 18">
+            <a:extLst>
+              <a:ext uri="{FF2B5EF4-FFF2-40B4-BE49-F238E27FC236}">
+                <a16:creationId xmlns:a16="http://schemas.microsoft.com/office/drawing/2014/main" id="{9C05EFC7-1C86-FBA4-A417-2055C68D74C6}"/>
+              </a:ext>
+            </a:extLst>
+          </p:cNvPr>
+          <p:cNvSpPr/>
+          <p:nvPr/>
+        </p:nvSpPr>
+        <p:spPr>
+          <a:xfrm>
+            <a:off x="1245575" y="3127019"/>
+            <a:ext cx="96203" cy="95236"/>
+          </a:xfrm>
+          <a:prstGeom prst="ellipse">
+            <a:avLst/>
+          </a:prstGeom>
+          <a:solidFill>
+            <a:schemeClr val="accent4"/>
+          </a:solidFill>
+        </p:spPr>
+        <p:style>
+          <a:lnRef idx="2">
+            <a:schemeClr val="accent1">
+              <a:shade val="15000"/>
+            </a:schemeClr>
+          </a:lnRef>
+          <a:fillRef idx="1">
+            <a:schemeClr val="accent1"/>
+          </a:fillRef>
+          <a:effectRef idx="0">
+            <a:schemeClr val="accent1"/>
+          </a:effectRef>
+          <a:fontRef idx="minor">
+            <a:schemeClr val="lt1"/>
+          </a:fontRef>
+        </p:style>
+        <p:txBody>
+          <a:bodyPr rtlCol="0" anchor="ctr"/>
+          <a:lstStyle/>
+          <a:p>
+            <a:pPr algn="ctr"/>
+            <a:endParaRPr lang="en-DE"/>
+          </a:p>
+        </p:txBody>
+      </p:sp>
+      <p:sp>
+        <p:nvSpPr>
+          <p:cNvPr id="20" name="Oval 19">
+            <a:extLst>
+              <a:ext uri="{FF2B5EF4-FFF2-40B4-BE49-F238E27FC236}">
+                <a16:creationId xmlns:a16="http://schemas.microsoft.com/office/drawing/2014/main" id="{A2086AA1-7BB7-A154-4818-17D1EFE44489}"/>
+              </a:ext>
+            </a:extLst>
+          </p:cNvPr>
+          <p:cNvSpPr/>
+          <p:nvPr/>
+        </p:nvSpPr>
+        <p:spPr>
+          <a:xfrm>
+            <a:off x="3259375" y="3276372"/>
+            <a:ext cx="96203" cy="95236"/>
+          </a:xfrm>
+          <a:prstGeom prst="ellipse">
+            <a:avLst/>
+          </a:prstGeom>
+          <a:solidFill>
+            <a:schemeClr val="accent4"/>
+          </a:solidFill>
+        </p:spPr>
+        <p:style>
+          <a:lnRef idx="2">
+            <a:schemeClr val="accent1">
+              <a:shade val="15000"/>
+            </a:schemeClr>
+          </a:lnRef>
+          <a:fillRef idx="1">
+            <a:schemeClr val="accent1"/>
+          </a:fillRef>
+          <a:effectRef idx="0">
+            <a:schemeClr val="accent1"/>
+          </a:effectRef>
+          <a:fontRef idx="minor">
+            <a:schemeClr val="lt1"/>
+          </a:fontRef>
+        </p:style>
+        <p:txBody>
+          <a:bodyPr rtlCol="0" anchor="ctr"/>
+          <a:lstStyle/>
+          <a:p>
+            <a:pPr algn="ctr"/>
+            <a:endParaRPr lang="en-DE"/>
+          </a:p>
+        </p:txBody>
+      </p:sp>
+      <p:cxnSp>
+        <p:nvCxnSpPr>
+          <p:cNvPr id="21" name="Straight Arrow Connector 20">
+            <a:extLst>
+              <a:ext uri="{FF2B5EF4-FFF2-40B4-BE49-F238E27FC236}">
+                <a16:creationId xmlns:a16="http://schemas.microsoft.com/office/drawing/2014/main" id="{28DA3264-FEB9-393F-FF62-6E163238EE0A}"/>
+              </a:ext>
+            </a:extLst>
+          </p:cNvPr>
+          <p:cNvCxnSpPr>
+            <a:cxnSpLocks/>
+          </p:cNvCxnSpPr>
+          <p:nvPr/>
+        </p:nvCxnSpPr>
+        <p:spPr>
+          <a:xfrm>
+            <a:off x="3825442" y="3749332"/>
+            <a:ext cx="2945247" cy="0"/>
+          </a:xfrm>
+          <a:prstGeom prst="straightConnector1">
+            <a:avLst/>
+          </a:prstGeom>
+          <a:ln w="38100">
+            <a:tailEnd type="triangle"/>
+          </a:ln>
+        </p:spPr>
+        <p:style>
+          <a:lnRef idx="1">
+            <a:schemeClr val="accent1"/>
+          </a:lnRef>
+          <a:fillRef idx="0">
+            <a:schemeClr val="accent1"/>
+          </a:fillRef>
+          <a:effectRef idx="0">
+            <a:schemeClr val="accent1"/>
+          </a:effectRef>
+          <a:fontRef idx="minor">
+            <a:schemeClr val="tx1"/>
+          </a:fontRef>
+        </p:style>
+      </p:cxnSp>
+      <p:cxnSp>
+        <p:nvCxnSpPr>
+          <p:cNvPr id="22" name="Straight Arrow Connector 21">
+            <a:extLst>
+              <a:ext uri="{FF2B5EF4-FFF2-40B4-BE49-F238E27FC236}">
+                <a16:creationId xmlns:a16="http://schemas.microsoft.com/office/drawing/2014/main" id="{26E8E471-7BF4-E07A-48D7-240F124087D6}"/>
+              </a:ext>
+            </a:extLst>
+          </p:cNvPr>
+          <p:cNvCxnSpPr/>
+          <p:nvPr/>
+        </p:nvCxnSpPr>
+        <p:spPr>
+          <a:xfrm flipV="1">
+            <a:off x="3929715" y="1992722"/>
+            <a:ext cx="0" cy="1868905"/>
+          </a:xfrm>
+          <a:prstGeom prst="straightConnector1">
+            <a:avLst/>
+          </a:prstGeom>
+          <a:ln w="38100">
+            <a:tailEnd type="triangle"/>
+          </a:ln>
+        </p:spPr>
+        <p:style>
+          <a:lnRef idx="1">
+            <a:schemeClr val="accent1"/>
+          </a:lnRef>
+          <a:fillRef idx="0">
+            <a:schemeClr val="accent1"/>
+          </a:fillRef>
+          <a:effectRef idx="0">
+            <a:schemeClr val="accent1"/>
+          </a:effectRef>
+          <a:fontRef idx="minor">
+            <a:schemeClr val="tx1"/>
+          </a:fontRef>
+        </p:style>
+      </p:cxnSp>
+      <p:sp>
+        <p:nvSpPr>
+          <p:cNvPr id="23" name="TextBox 22">
+            <a:extLst>
+              <a:ext uri="{FF2B5EF4-FFF2-40B4-BE49-F238E27FC236}">
+                <a16:creationId xmlns:a16="http://schemas.microsoft.com/office/drawing/2014/main" id="{22C5754D-6BE0-2BA5-6096-93E9BD59C4C3}"/>
+              </a:ext>
+            </a:extLst>
+          </p:cNvPr>
+          <p:cNvSpPr txBox="1"/>
+          <p:nvPr/>
+        </p:nvSpPr>
+        <p:spPr>
+          <a:xfrm>
+            <a:off x="3929716" y="3749332"/>
+            <a:ext cx="2780013" cy="369332"/>
+          </a:xfrm>
+          <a:prstGeom prst="rect">
+            <a:avLst/>
+          </a:prstGeom>
+          <a:noFill/>
+        </p:spPr>
+        <p:txBody>
+          <a:bodyPr wrap="square" rtlCol="0">
+            <a:spAutoFit/>
+          </a:bodyPr>
+          <a:lstStyle/>
+          <a:p>
+            <a:pPr algn="ctr"/>
+            <a:r>
+              <a:rPr lang="en-US" dirty="0"/>
+              <a:t>X</a:t>
+            </a:r>
+            <a:endParaRPr lang="en-DE" dirty="0"/>
+          </a:p>
+        </p:txBody>
+      </p:sp>
+      <p:sp>
+        <p:nvSpPr>
+          <p:cNvPr id="24" name="TextBox 23">
+            <a:extLst>
+              <a:ext uri="{FF2B5EF4-FFF2-40B4-BE49-F238E27FC236}">
+                <a16:creationId xmlns:a16="http://schemas.microsoft.com/office/drawing/2014/main" id="{0550A978-22D3-859E-65A7-98C8E37ED2D5}"/>
+              </a:ext>
+            </a:extLst>
+          </p:cNvPr>
+          <p:cNvSpPr txBox="1"/>
+          <p:nvPr/>
+        </p:nvSpPr>
+        <p:spPr>
+          <a:xfrm rot="16200000">
+            <a:off x="2726248" y="2722509"/>
+            <a:ext cx="1684313" cy="369332"/>
+          </a:xfrm>
+          <a:prstGeom prst="rect">
+            <a:avLst/>
+          </a:prstGeom>
+          <a:noFill/>
+        </p:spPr>
+        <p:txBody>
+          <a:bodyPr wrap="square" rtlCol="0">
+            <a:spAutoFit/>
+          </a:bodyPr>
+          <a:lstStyle/>
+          <a:p>
+            <a:pPr algn="ctr"/>
+            <a:r>
+              <a:rPr lang="en-US" dirty="0"/>
+              <a:t>Y</a:t>
+            </a:r>
+            <a:endParaRPr lang="en-DE" i="1" dirty="0"/>
+          </a:p>
+        </p:txBody>
+      </p:sp>
+      <p:cxnSp>
+        <p:nvCxnSpPr>
+          <p:cNvPr id="25" name="Straight Connector 24">
+            <a:extLst>
+              <a:ext uri="{FF2B5EF4-FFF2-40B4-BE49-F238E27FC236}">
+                <a16:creationId xmlns:a16="http://schemas.microsoft.com/office/drawing/2014/main" id="{41AC9FF5-06AD-1E91-B7BE-161E8E4415F0}"/>
+              </a:ext>
+            </a:extLst>
+          </p:cNvPr>
+          <p:cNvCxnSpPr>
+            <a:cxnSpLocks/>
+          </p:cNvCxnSpPr>
+          <p:nvPr/>
+        </p:nvCxnSpPr>
+        <p:spPr>
+          <a:xfrm flipV="1">
+            <a:off x="4251416" y="3309001"/>
+            <a:ext cx="570605" cy="157566"/>
+          </a:xfrm>
+          <a:prstGeom prst="line">
+            <a:avLst/>
+          </a:prstGeom>
+          <a:ln w="38100">
+            <a:solidFill>
+              <a:schemeClr val="tx1"/>
+            </a:solidFill>
+          </a:ln>
+        </p:spPr>
+        <p:style>
+          <a:lnRef idx="1">
+            <a:schemeClr val="accent1"/>
+          </a:lnRef>
+          <a:fillRef idx="0">
+            <a:schemeClr val="accent1"/>
+          </a:fillRef>
+          <a:effectRef idx="0">
+            <a:schemeClr val="accent1"/>
+          </a:effectRef>
+          <a:fontRef idx="minor">
+            <a:schemeClr val="tx1"/>
+          </a:fontRef>
+        </p:style>
+      </p:cxnSp>
+      <p:cxnSp>
+        <p:nvCxnSpPr>
+          <p:cNvPr id="26" name="Straight Connector 25">
+            <a:extLst>
+              <a:ext uri="{FF2B5EF4-FFF2-40B4-BE49-F238E27FC236}">
+                <a16:creationId xmlns:a16="http://schemas.microsoft.com/office/drawing/2014/main" id="{AD7643E9-B99C-AF06-2194-119CB360ECEE}"/>
+              </a:ext>
+            </a:extLst>
+          </p:cNvPr>
+          <p:cNvCxnSpPr>
+            <a:cxnSpLocks/>
+          </p:cNvCxnSpPr>
+          <p:nvPr/>
+        </p:nvCxnSpPr>
+        <p:spPr>
+          <a:xfrm flipH="1">
+            <a:off x="4822021" y="2259219"/>
+            <a:ext cx="1528641" cy="1049782"/>
+          </a:xfrm>
+          <a:prstGeom prst="line">
+            <a:avLst/>
+          </a:prstGeom>
+          <a:ln w="38100">
+            <a:solidFill>
+              <a:schemeClr val="tx1"/>
+            </a:solidFill>
+          </a:ln>
+        </p:spPr>
+        <p:style>
+          <a:lnRef idx="1">
+            <a:schemeClr val="accent1"/>
+          </a:lnRef>
+          <a:fillRef idx="0">
+            <a:schemeClr val="accent1"/>
+          </a:fillRef>
+          <a:effectRef idx="0">
+            <a:schemeClr val="accent1"/>
+          </a:effectRef>
+          <a:fontRef idx="minor">
+            <a:schemeClr val="tx1"/>
+          </a:fontRef>
+        </p:style>
+      </p:cxnSp>
+      <p:sp>
+        <p:nvSpPr>
+          <p:cNvPr id="27" name="Oval 26">
+            <a:extLst>
+              <a:ext uri="{FF2B5EF4-FFF2-40B4-BE49-F238E27FC236}">
+                <a16:creationId xmlns:a16="http://schemas.microsoft.com/office/drawing/2014/main" id="{B1EAB288-7343-66D8-57C5-CB8A3F724DAB}"/>
+              </a:ext>
+            </a:extLst>
+          </p:cNvPr>
+          <p:cNvSpPr/>
+          <p:nvPr/>
+        </p:nvSpPr>
+        <p:spPr>
+          <a:xfrm>
+            <a:off x="6297277" y="2211602"/>
+            <a:ext cx="96203" cy="95236"/>
+          </a:xfrm>
+          <a:prstGeom prst="ellipse">
+            <a:avLst/>
+          </a:prstGeom>
+          <a:solidFill>
+            <a:schemeClr val="accent4"/>
+          </a:solidFill>
+        </p:spPr>
+        <p:style>
+          <a:lnRef idx="2">
+            <a:schemeClr val="accent1">
+              <a:shade val="15000"/>
+            </a:schemeClr>
+          </a:lnRef>
+          <a:fillRef idx="1">
+            <a:schemeClr val="accent1"/>
+          </a:fillRef>
+          <a:effectRef idx="0">
+            <a:schemeClr val="accent1"/>
+          </a:effectRef>
+          <a:fontRef idx="minor">
+            <a:schemeClr val="lt1"/>
+          </a:fontRef>
+        </p:style>
+        <p:txBody>
+          <a:bodyPr rtlCol="0" anchor="ctr"/>
+          <a:lstStyle/>
+          <a:p>
+            <a:pPr algn="ctr"/>
+            <a:endParaRPr lang="en-DE"/>
+          </a:p>
+        </p:txBody>
+      </p:sp>
+      <p:sp>
+        <p:nvSpPr>
+          <p:cNvPr id="28" name="Oval 27">
+            <a:extLst>
+              <a:ext uri="{FF2B5EF4-FFF2-40B4-BE49-F238E27FC236}">
+                <a16:creationId xmlns:a16="http://schemas.microsoft.com/office/drawing/2014/main" id="{3A243FC6-FF5C-3AE7-9FE7-95A3D287B87C}"/>
+              </a:ext>
+            </a:extLst>
+          </p:cNvPr>
+          <p:cNvSpPr/>
+          <p:nvPr/>
+        </p:nvSpPr>
+        <p:spPr>
+          <a:xfrm>
+            <a:off x="4232311" y="3417616"/>
+            <a:ext cx="96203" cy="95236"/>
+          </a:xfrm>
+          <a:prstGeom prst="ellipse">
+            <a:avLst/>
+          </a:prstGeom>
+          <a:solidFill>
+            <a:schemeClr val="accent4"/>
+          </a:solidFill>
+        </p:spPr>
+        <p:style>
+          <a:lnRef idx="2">
+            <a:schemeClr val="accent1">
+              <a:shade val="15000"/>
+            </a:schemeClr>
+          </a:lnRef>
+          <a:fillRef idx="1">
+            <a:schemeClr val="accent1"/>
+          </a:fillRef>
+          <a:effectRef idx="0">
+            <a:schemeClr val="accent1"/>
+          </a:effectRef>
+          <a:fontRef idx="minor">
+            <a:schemeClr val="lt1"/>
+          </a:fontRef>
+        </p:style>
+        <p:txBody>
+          <a:bodyPr rtlCol="0" anchor="ctr"/>
+          <a:lstStyle/>
+          <a:p>
+            <a:pPr algn="ctr"/>
+            <a:endParaRPr lang="en-DE"/>
+          </a:p>
+        </p:txBody>
+      </p:sp>
+      <p:sp>
+        <p:nvSpPr>
+          <p:cNvPr id="29" name="Oval 28">
+            <a:extLst>
+              <a:ext uri="{FF2B5EF4-FFF2-40B4-BE49-F238E27FC236}">
+                <a16:creationId xmlns:a16="http://schemas.microsoft.com/office/drawing/2014/main" id="{CF2E15BC-AC78-F5D4-3B68-1D08388F277D}"/>
+              </a:ext>
+            </a:extLst>
+          </p:cNvPr>
+          <p:cNvSpPr/>
+          <p:nvPr/>
+        </p:nvSpPr>
+        <p:spPr>
+          <a:xfrm>
+            <a:off x="4793024" y="3244930"/>
+            <a:ext cx="96203" cy="95236"/>
+          </a:xfrm>
+          <a:prstGeom prst="ellipse">
+            <a:avLst/>
+          </a:prstGeom>
+          <a:solidFill>
+            <a:schemeClr val="accent4"/>
+          </a:solidFill>
+        </p:spPr>
+        <p:style>
+          <a:lnRef idx="2">
+            <a:schemeClr val="accent1">
+              <a:shade val="15000"/>
+            </a:schemeClr>
+          </a:lnRef>
+          <a:fillRef idx="1">
+            <a:schemeClr val="accent1"/>
+          </a:fillRef>
+          <a:effectRef idx="0">
+            <a:schemeClr val="accent1"/>
+          </a:effectRef>
+          <a:fontRef idx="minor">
+            <a:schemeClr val="lt1"/>
+          </a:fontRef>
+        </p:style>
+        <p:txBody>
+          <a:bodyPr rtlCol="0" anchor="ctr"/>
+          <a:lstStyle/>
+          <a:p>
+            <a:pPr algn="ctr"/>
+            <a:endParaRPr lang="en-DE"/>
+          </a:p>
+        </p:txBody>
+      </p:sp>
+    </p:spTree>
+    <p:extLst>
+      <p:ext uri="{BB962C8B-B14F-4D97-AF65-F5344CB8AC3E}">
+        <p14:creationId xmlns:p14="http://schemas.microsoft.com/office/powerpoint/2010/main" val="2114363463"/>
       </p:ext>
     </p:extLst>
   </p:cSld>

</xml_diff>

<commit_message>
stuffenergy und reach in the maing
</commit_message>
<xml_diff>
--- a/Latex/figures/images.pptx
+++ b/Latex/figures/images.pptx
@@ -21,6 +21,9 @@
     <p:sldId id="267" r:id="rId15"/>
     <p:sldId id="270" r:id="rId16"/>
     <p:sldId id="271" r:id="rId17"/>
+    <p:sldId id="272" r:id="rId18"/>
+    <p:sldId id="273" r:id="rId19"/>
+    <p:sldId id="274" r:id="rId20"/>
   </p:sldIdLst>
   <p:sldSz cx="12192000" cy="6858000"/>
   <p:notesSz cx="6858000" cy="9144000"/>
@@ -127,6 +130,713 @@
 </p:presentation>
 </file>
 
+<file path=ppt/ink/ink1.xml><?xml version="1.0" encoding="utf-8"?>
+<inkml:ink xmlns:inkml="http://www.w3.org/2003/InkML">
+  <inkml:definitions>
+    <inkml:context xml:id="ctx0">
+      <inkml:inkSource xml:id="inkSrc0">
+        <inkml:traceFormat>
+          <inkml:channel name="X" type="integer" min="-2.14748E9" max="2.14748E9" units="cm"/>
+          <inkml:channel name="Y" type="integer" min="-2.14748E9" max="2.14748E9" units="cm"/>
+          <inkml:channel name="F" type="integer" max="32767" units="dev"/>
+        </inkml:traceFormat>
+        <inkml:channelProperties>
+          <inkml:channelProperty channel="X" name="resolution" value="1000" units="1/cm"/>
+          <inkml:channelProperty channel="Y" name="resolution" value="1000" units="1/cm"/>
+          <inkml:channelProperty channel="F" name="resolution" value="0" units="1/dev"/>
+        </inkml:channelProperties>
+      </inkml:inkSource>
+      <inkml:timestamp xml:id="ts0" timeString="2023-11-22T13:39:26.963"/>
+    </inkml:context>
+    <inkml:brush xml:id="br0">
+      <inkml:brushProperty name="width" value="0.35" units="cm"/>
+      <inkml:brushProperty name="height" value="0.35" units="cm"/>
+    </inkml:brush>
+  </inkml:definitions>
+  <inkml:trace contextRef="#ctx0" brushRef="#br0">1 0 24575</inkml:trace>
+</inkml:ink>
+</file>
+
+<file path=ppt/ink/ink10.xml><?xml version="1.0" encoding="utf-8"?>
+<inkml:ink xmlns:inkml="http://www.w3.org/2003/InkML">
+  <inkml:definitions>
+    <inkml:context xml:id="ctx0">
+      <inkml:inkSource xml:id="inkSrc0">
+        <inkml:traceFormat>
+          <inkml:channel name="X" type="integer" min="-2.14748E9" max="2.14748E9" units="cm"/>
+          <inkml:channel name="Y" type="integer" min="-2.14748E9" max="2.14748E9" units="cm"/>
+          <inkml:channel name="F" type="integer" max="32767" units="dev"/>
+        </inkml:traceFormat>
+        <inkml:channelProperties>
+          <inkml:channelProperty channel="X" name="resolution" value="1000" units="1/cm"/>
+          <inkml:channelProperty channel="Y" name="resolution" value="1000" units="1/cm"/>
+          <inkml:channelProperty channel="F" name="resolution" value="0" units="1/dev"/>
+        </inkml:channelProperties>
+      </inkml:inkSource>
+      <inkml:timestamp xml:id="ts0" timeString="2023-11-22T13:39:31.258"/>
+    </inkml:context>
+    <inkml:brush xml:id="br0">
+      <inkml:brushProperty name="width" value="0.35" units="cm"/>
+      <inkml:brushProperty name="height" value="0.35" units="cm"/>
+    </inkml:brush>
+  </inkml:definitions>
+  <inkml:trace contextRef="#ctx0" brushRef="#br0">1 0 24575</inkml:trace>
+</inkml:ink>
+</file>
+
+<file path=ppt/ink/ink11.xml><?xml version="1.0" encoding="utf-8"?>
+<inkml:ink xmlns:inkml="http://www.w3.org/2003/InkML">
+  <inkml:definitions>
+    <inkml:context xml:id="ctx0">
+      <inkml:inkSource xml:id="inkSrc0">
+        <inkml:traceFormat>
+          <inkml:channel name="X" type="integer" min="-2.14748E9" max="2.14748E9" units="cm"/>
+          <inkml:channel name="Y" type="integer" min="-2.14748E9" max="2.14748E9" units="cm"/>
+          <inkml:channel name="F" type="integer" max="32767" units="dev"/>
+        </inkml:traceFormat>
+        <inkml:channelProperties>
+          <inkml:channelProperty channel="X" name="resolution" value="1000" units="1/cm"/>
+          <inkml:channelProperty channel="Y" name="resolution" value="1000" units="1/cm"/>
+          <inkml:channelProperty channel="F" name="resolution" value="0" units="1/dev"/>
+        </inkml:channelProperties>
+      </inkml:inkSource>
+      <inkml:timestamp xml:id="ts0" timeString="2023-11-22T13:39:31.641"/>
+    </inkml:context>
+    <inkml:brush xml:id="br0">
+      <inkml:brushProperty name="width" value="0.35" units="cm"/>
+      <inkml:brushProperty name="height" value="0.35" units="cm"/>
+    </inkml:brush>
+  </inkml:definitions>
+  <inkml:trace contextRef="#ctx0" brushRef="#br0">0 0 24575</inkml:trace>
+</inkml:ink>
+</file>
+
+<file path=ppt/ink/ink12.xml><?xml version="1.0" encoding="utf-8"?>
+<inkml:ink xmlns:inkml="http://www.w3.org/2003/InkML">
+  <inkml:definitions>
+    <inkml:context xml:id="ctx0">
+      <inkml:inkSource xml:id="inkSrc0">
+        <inkml:traceFormat>
+          <inkml:channel name="X" type="integer" min="-2.14748E9" max="2.14748E9" units="cm"/>
+          <inkml:channel name="Y" type="integer" min="-2.14748E9" max="2.14748E9" units="cm"/>
+          <inkml:channel name="F" type="integer" max="32767" units="dev"/>
+        </inkml:traceFormat>
+        <inkml:channelProperties>
+          <inkml:channelProperty channel="X" name="resolution" value="1000" units="1/cm"/>
+          <inkml:channelProperty channel="Y" name="resolution" value="1000" units="1/cm"/>
+          <inkml:channelProperty channel="F" name="resolution" value="0" units="1/dev"/>
+        </inkml:channelProperties>
+      </inkml:inkSource>
+      <inkml:timestamp xml:id="ts0" timeString="2023-11-22T13:39:31.990"/>
+    </inkml:context>
+    <inkml:brush xml:id="br0">
+      <inkml:brushProperty name="width" value="0.35" units="cm"/>
+      <inkml:brushProperty name="height" value="0.35" units="cm"/>
+    </inkml:brush>
+  </inkml:definitions>
+  <inkml:trace contextRef="#ctx0" brushRef="#br0">0 1 24575</inkml:trace>
+</inkml:ink>
+</file>
+
+<file path=ppt/ink/ink13.xml><?xml version="1.0" encoding="utf-8"?>
+<inkml:ink xmlns:inkml="http://www.w3.org/2003/InkML">
+  <inkml:definitions>
+    <inkml:context xml:id="ctx0">
+      <inkml:inkSource xml:id="inkSrc0">
+        <inkml:traceFormat>
+          <inkml:channel name="X" type="integer" min="-2.14748E9" max="2.14748E9" units="cm"/>
+          <inkml:channel name="Y" type="integer" min="-2.14748E9" max="2.14748E9" units="cm"/>
+          <inkml:channel name="F" type="integer" max="32767" units="dev"/>
+        </inkml:traceFormat>
+        <inkml:channelProperties>
+          <inkml:channelProperty channel="X" name="resolution" value="1000" units="1/cm"/>
+          <inkml:channelProperty channel="Y" name="resolution" value="1000" units="1/cm"/>
+          <inkml:channelProperty channel="F" name="resolution" value="0" units="1/dev"/>
+        </inkml:channelProperties>
+      </inkml:inkSource>
+      <inkml:timestamp xml:id="ts0" timeString="2023-11-22T13:39:32.336"/>
+    </inkml:context>
+    <inkml:brush xml:id="br0">
+      <inkml:brushProperty name="width" value="0.35" units="cm"/>
+      <inkml:brushProperty name="height" value="0.35" units="cm"/>
+    </inkml:brush>
+  </inkml:definitions>
+  <inkml:trace contextRef="#ctx0" brushRef="#br0">1 1 24575</inkml:trace>
+</inkml:ink>
+</file>
+
+<file path=ppt/ink/ink14.xml><?xml version="1.0" encoding="utf-8"?>
+<inkml:ink xmlns:inkml="http://www.w3.org/2003/InkML">
+  <inkml:definitions>
+    <inkml:context xml:id="ctx0">
+      <inkml:inkSource xml:id="inkSrc0">
+        <inkml:traceFormat>
+          <inkml:channel name="X" type="integer" min="-2.14748E9" max="2.14748E9" units="cm"/>
+          <inkml:channel name="Y" type="integer" min="-2.14748E9" max="2.14748E9" units="cm"/>
+          <inkml:channel name="F" type="integer" max="32767" units="dev"/>
+        </inkml:traceFormat>
+        <inkml:channelProperties>
+          <inkml:channelProperty channel="X" name="resolution" value="1000" units="1/cm"/>
+          <inkml:channelProperty channel="Y" name="resolution" value="1000" units="1/cm"/>
+          <inkml:channelProperty channel="F" name="resolution" value="0" units="1/dev"/>
+        </inkml:channelProperties>
+      </inkml:inkSource>
+      <inkml:timestamp xml:id="ts0" timeString="2023-11-22T13:39:32.691"/>
+    </inkml:context>
+    <inkml:brush xml:id="br0">
+      <inkml:brushProperty name="width" value="0.35" units="cm"/>
+      <inkml:brushProperty name="height" value="0.35" units="cm"/>
+    </inkml:brush>
+  </inkml:definitions>
+  <inkml:trace contextRef="#ctx0" brushRef="#br0">1 2 24575,'0'-1'0</inkml:trace>
+</inkml:ink>
+</file>
+
+<file path=ppt/ink/ink15.xml><?xml version="1.0" encoding="utf-8"?>
+<inkml:ink xmlns:inkml="http://www.w3.org/2003/InkML">
+  <inkml:definitions>
+    <inkml:context xml:id="ctx0">
+      <inkml:inkSource xml:id="inkSrc0">
+        <inkml:traceFormat>
+          <inkml:channel name="X" type="integer" min="-2.14748E9" max="2.14748E9" units="cm"/>
+          <inkml:channel name="Y" type="integer" min="-2.14748E9" max="2.14748E9" units="cm"/>
+          <inkml:channel name="F" type="integer" max="32767" units="dev"/>
+        </inkml:traceFormat>
+        <inkml:channelProperties>
+          <inkml:channelProperty channel="X" name="resolution" value="1000" units="1/cm"/>
+          <inkml:channelProperty channel="Y" name="resolution" value="1000" units="1/cm"/>
+          <inkml:channelProperty channel="F" name="resolution" value="0" units="1/dev"/>
+        </inkml:channelProperties>
+      </inkml:inkSource>
+      <inkml:timestamp xml:id="ts0" timeString="2023-11-22T13:39:33.113"/>
+    </inkml:context>
+    <inkml:brush xml:id="br0">
+      <inkml:brushProperty name="width" value="0.35" units="cm"/>
+      <inkml:brushProperty name="height" value="0.35" units="cm"/>
+    </inkml:brush>
+  </inkml:definitions>
+  <inkml:trace contextRef="#ctx0" brushRef="#br0">0 4 24575,'1'-3'0</inkml:trace>
+</inkml:ink>
+</file>
+
+<file path=ppt/ink/ink16.xml><?xml version="1.0" encoding="utf-8"?>
+<inkml:ink xmlns:inkml="http://www.w3.org/2003/InkML">
+  <inkml:definitions>
+    <inkml:context xml:id="ctx0">
+      <inkml:inkSource xml:id="inkSrc0">
+        <inkml:traceFormat>
+          <inkml:channel name="X" type="integer" min="-2.14748E9" max="2.14748E9" units="cm"/>
+          <inkml:channel name="Y" type="integer" min="-2.14748E9" max="2.14748E9" units="cm"/>
+          <inkml:channel name="F" type="integer" max="32767" units="dev"/>
+        </inkml:traceFormat>
+        <inkml:channelProperties>
+          <inkml:channelProperty channel="X" name="resolution" value="1000" units="1/cm"/>
+          <inkml:channelProperty channel="Y" name="resolution" value="1000" units="1/cm"/>
+          <inkml:channelProperty channel="F" name="resolution" value="0" units="1/dev"/>
+        </inkml:channelProperties>
+      </inkml:inkSource>
+      <inkml:timestamp xml:id="ts0" timeString="2023-11-22T13:39:33.492"/>
+    </inkml:context>
+    <inkml:brush xml:id="br0">
+      <inkml:brushProperty name="width" value="0.35" units="cm"/>
+      <inkml:brushProperty name="height" value="0.35" units="cm"/>
+    </inkml:brush>
+  </inkml:definitions>
+  <inkml:trace contextRef="#ctx0" brushRef="#br0">7 97 24575</inkml:trace>
+  <inkml:trace contextRef="#ctx0" brushRef="#br0" timeOffset="1">7 4 24575,'-1'0'0,"-4"-4"0</inkml:trace>
+</inkml:ink>
+</file>
+
+<file path=ppt/ink/ink17.xml><?xml version="1.0" encoding="utf-8"?>
+<inkml:ink xmlns:inkml="http://www.w3.org/2003/InkML">
+  <inkml:definitions>
+    <inkml:context xml:id="ctx0">
+      <inkml:inkSource xml:id="inkSrc0">
+        <inkml:traceFormat>
+          <inkml:channel name="X" type="integer" min="-2.14748E9" max="2.14748E9" units="cm"/>
+          <inkml:channel name="Y" type="integer" min="-2.14748E9" max="2.14748E9" units="cm"/>
+          <inkml:channel name="F" type="integer" max="32767" units="dev"/>
+        </inkml:traceFormat>
+        <inkml:channelProperties>
+          <inkml:channelProperty channel="X" name="resolution" value="1000" units="1/cm"/>
+          <inkml:channelProperty channel="Y" name="resolution" value="1000" units="1/cm"/>
+          <inkml:channelProperty channel="F" name="resolution" value="0" units="1/dev"/>
+        </inkml:channelProperties>
+      </inkml:inkSource>
+      <inkml:timestamp xml:id="ts0" timeString="2023-11-22T13:39:33.846"/>
+    </inkml:context>
+    <inkml:brush xml:id="br0">
+      <inkml:brushProperty name="width" value="0.35" units="cm"/>
+      <inkml:brushProperty name="height" value="0.35" units="cm"/>
+    </inkml:brush>
+  </inkml:definitions>
+  <inkml:trace contextRef="#ctx0" brushRef="#br0">2 0 24575,'-1'0'0</inkml:trace>
+</inkml:ink>
+</file>
+
+<file path=ppt/ink/ink18.xml><?xml version="1.0" encoding="utf-8"?>
+<inkml:ink xmlns:inkml="http://www.w3.org/2003/InkML">
+  <inkml:definitions>
+    <inkml:context xml:id="ctx0">
+      <inkml:inkSource xml:id="inkSrc0">
+        <inkml:traceFormat>
+          <inkml:channel name="X" type="integer" min="-2.14748E9" max="2.14748E9" units="cm"/>
+          <inkml:channel name="Y" type="integer" min="-2.14748E9" max="2.14748E9" units="cm"/>
+          <inkml:channel name="F" type="integer" max="32767" units="dev"/>
+        </inkml:traceFormat>
+        <inkml:channelProperties>
+          <inkml:channelProperty channel="X" name="resolution" value="1000" units="1/cm"/>
+          <inkml:channelProperty channel="Y" name="resolution" value="1000" units="1/cm"/>
+          <inkml:channelProperty channel="F" name="resolution" value="0" units="1/dev"/>
+        </inkml:channelProperties>
+      </inkml:inkSource>
+      <inkml:timestamp xml:id="ts0" timeString="2023-11-22T13:39:34.184"/>
+    </inkml:context>
+    <inkml:brush xml:id="br0">
+      <inkml:brushProperty name="width" value="0.35" units="cm"/>
+      <inkml:brushProperty name="height" value="0.35" units="cm"/>
+    </inkml:brush>
+  </inkml:definitions>
+  <inkml:trace contextRef="#ctx0" brushRef="#br0">21 7 24575,'-1'0'0,"-2"0"0,0-1 0,0-1 0,-2 1 0,0-2 0</inkml:trace>
+</inkml:ink>
+</file>
+
+<file path=ppt/ink/ink19.xml><?xml version="1.0" encoding="utf-8"?>
+<inkml:ink xmlns:inkml="http://www.w3.org/2003/InkML">
+  <inkml:definitions>
+    <inkml:context xml:id="ctx0">
+      <inkml:inkSource xml:id="inkSrc0">
+        <inkml:traceFormat>
+          <inkml:channel name="X" type="integer" min="-2.14748E9" max="2.14748E9" units="cm"/>
+          <inkml:channel name="Y" type="integer" min="-2.14748E9" max="2.14748E9" units="cm"/>
+          <inkml:channel name="F" type="integer" max="32767" units="dev"/>
+        </inkml:traceFormat>
+        <inkml:channelProperties>
+          <inkml:channelProperty channel="X" name="resolution" value="1000" units="1/cm"/>
+          <inkml:channelProperty channel="Y" name="resolution" value="1000" units="1/cm"/>
+          <inkml:channelProperty channel="F" name="resolution" value="0" units="1/dev"/>
+        </inkml:channelProperties>
+      </inkml:inkSource>
+      <inkml:timestamp xml:id="ts0" timeString="2023-11-22T13:39:34.715"/>
+    </inkml:context>
+    <inkml:brush xml:id="br0">
+      <inkml:brushProperty name="width" value="0.35" units="cm"/>
+      <inkml:brushProperty name="height" value="0.35" units="cm"/>
+    </inkml:brush>
+  </inkml:definitions>
+  <inkml:trace contextRef="#ctx0" brushRef="#br0">1 1 24575</inkml:trace>
+</inkml:ink>
+</file>
+
+<file path=ppt/ink/ink2.xml><?xml version="1.0" encoding="utf-8"?>
+<inkml:ink xmlns:inkml="http://www.w3.org/2003/InkML">
+  <inkml:definitions>
+    <inkml:context xml:id="ctx0">
+      <inkml:inkSource xml:id="inkSrc0">
+        <inkml:traceFormat>
+          <inkml:channel name="X" type="integer" min="-2.14748E9" max="2.14748E9" units="cm"/>
+          <inkml:channel name="Y" type="integer" min="-2.14748E9" max="2.14748E9" units="cm"/>
+          <inkml:channel name="F" type="integer" max="32767" units="dev"/>
+        </inkml:traceFormat>
+        <inkml:channelProperties>
+          <inkml:channelProperty channel="X" name="resolution" value="1000" units="1/cm"/>
+          <inkml:channelProperty channel="Y" name="resolution" value="1000" units="1/cm"/>
+          <inkml:channelProperty channel="F" name="resolution" value="0" units="1/dev"/>
+        </inkml:channelProperties>
+      </inkml:inkSource>
+      <inkml:timestamp xml:id="ts0" timeString="2023-11-22T13:39:27.605"/>
+    </inkml:context>
+    <inkml:brush xml:id="br0">
+      <inkml:brushProperty name="width" value="0.35" units="cm"/>
+      <inkml:brushProperty name="height" value="0.35" units="cm"/>
+    </inkml:brush>
+  </inkml:definitions>
+  <inkml:trace contextRef="#ctx0" brushRef="#br0">0 0 24575</inkml:trace>
+</inkml:ink>
+</file>
+
+<file path=ppt/ink/ink20.xml><?xml version="1.0" encoding="utf-8"?>
+<inkml:ink xmlns:inkml="http://www.w3.org/2003/InkML">
+  <inkml:definitions>
+    <inkml:context xml:id="ctx0">
+      <inkml:inkSource xml:id="inkSrc0">
+        <inkml:traceFormat>
+          <inkml:channel name="X" type="integer" min="-2.14748E9" max="2.14748E9" units="cm"/>
+          <inkml:channel name="Y" type="integer" min="-2.14748E9" max="2.14748E9" units="cm"/>
+          <inkml:channel name="F" type="integer" max="32767" units="dev"/>
+        </inkml:traceFormat>
+        <inkml:channelProperties>
+          <inkml:channelProperty channel="X" name="resolution" value="1000" units="1/cm"/>
+          <inkml:channelProperty channel="Y" name="resolution" value="1000" units="1/cm"/>
+          <inkml:channelProperty channel="F" name="resolution" value="0" units="1/dev"/>
+        </inkml:channelProperties>
+      </inkml:inkSource>
+      <inkml:timestamp xml:id="ts0" timeString="2023-11-22T13:39:35.447"/>
+    </inkml:context>
+    <inkml:brush xml:id="br0">
+      <inkml:brushProperty name="width" value="0.35" units="cm"/>
+      <inkml:brushProperty name="height" value="0.35" units="cm"/>
+    </inkml:brush>
+  </inkml:definitions>
+  <inkml:trace contextRef="#ctx0" brushRef="#br0">1 0 24575</inkml:trace>
+</inkml:ink>
+</file>
+
+<file path=ppt/ink/ink21.xml><?xml version="1.0" encoding="utf-8"?>
+<inkml:ink xmlns:inkml="http://www.w3.org/2003/InkML">
+  <inkml:definitions>
+    <inkml:context xml:id="ctx0">
+      <inkml:inkSource xml:id="inkSrc0">
+        <inkml:traceFormat>
+          <inkml:channel name="X" type="integer" min="-2.14748E9" max="2.14748E9" units="cm"/>
+          <inkml:channel name="Y" type="integer" min="-2.14748E9" max="2.14748E9" units="cm"/>
+          <inkml:channel name="F" type="integer" max="32767" units="dev"/>
+        </inkml:traceFormat>
+        <inkml:channelProperties>
+          <inkml:channelProperty channel="X" name="resolution" value="1000" units="1/cm"/>
+          <inkml:channelProperty channel="Y" name="resolution" value="1000" units="1/cm"/>
+          <inkml:channelProperty channel="F" name="resolution" value="0" units="1/dev"/>
+        </inkml:channelProperties>
+      </inkml:inkSource>
+      <inkml:timestamp xml:id="ts0" timeString="2023-11-22T13:39:35.817"/>
+    </inkml:context>
+    <inkml:brush xml:id="br0">
+      <inkml:brushProperty name="width" value="0.35" units="cm"/>
+      <inkml:brushProperty name="height" value="0.35" units="cm"/>
+    </inkml:brush>
+  </inkml:definitions>
+  <inkml:trace contextRef="#ctx0" brushRef="#br0">1 0 24575</inkml:trace>
+</inkml:ink>
+</file>
+
+<file path=ppt/ink/ink22.xml><?xml version="1.0" encoding="utf-8"?>
+<inkml:ink xmlns:inkml="http://www.w3.org/2003/InkML">
+  <inkml:definitions>
+    <inkml:context xml:id="ctx0">
+      <inkml:inkSource xml:id="inkSrc0">
+        <inkml:traceFormat>
+          <inkml:channel name="X" type="integer" min="-2.14748E9" max="2.14748E9" units="cm"/>
+          <inkml:channel name="Y" type="integer" min="-2.14748E9" max="2.14748E9" units="cm"/>
+          <inkml:channel name="F" type="integer" max="32767" units="dev"/>
+        </inkml:traceFormat>
+        <inkml:channelProperties>
+          <inkml:channelProperty channel="X" name="resolution" value="1000" units="1/cm"/>
+          <inkml:channelProperty channel="Y" name="resolution" value="1000" units="1/cm"/>
+          <inkml:channelProperty channel="F" name="resolution" value="0" units="1/dev"/>
+        </inkml:channelProperties>
+      </inkml:inkSource>
+      <inkml:timestamp xml:id="ts0" timeString="2023-11-22T13:39:36.171"/>
+    </inkml:context>
+    <inkml:brush xml:id="br0">
+      <inkml:brushProperty name="width" value="0.35" units="cm"/>
+      <inkml:brushProperty name="height" value="0.35" units="cm"/>
+    </inkml:brush>
+  </inkml:definitions>
+  <inkml:trace contextRef="#ctx0" brushRef="#br0">1 1 24575</inkml:trace>
+</inkml:ink>
+</file>
+
+<file path=ppt/ink/ink23.xml><?xml version="1.0" encoding="utf-8"?>
+<inkml:ink xmlns:inkml="http://www.w3.org/2003/InkML">
+  <inkml:definitions>
+    <inkml:context xml:id="ctx0">
+      <inkml:inkSource xml:id="inkSrc0">
+        <inkml:traceFormat>
+          <inkml:channel name="X" type="integer" min="-2.14748E9" max="2.14748E9" units="cm"/>
+          <inkml:channel name="Y" type="integer" min="-2.14748E9" max="2.14748E9" units="cm"/>
+          <inkml:channel name="F" type="integer" max="32767" units="dev"/>
+        </inkml:traceFormat>
+        <inkml:channelProperties>
+          <inkml:channelProperty channel="X" name="resolution" value="1000" units="1/cm"/>
+          <inkml:channelProperty channel="Y" name="resolution" value="1000" units="1/cm"/>
+          <inkml:channelProperty channel="F" name="resolution" value="0" units="1/dev"/>
+        </inkml:channelProperties>
+      </inkml:inkSource>
+      <inkml:timestamp xml:id="ts0" timeString="2023-11-22T13:39:36.550"/>
+    </inkml:context>
+    <inkml:brush xml:id="br0">
+      <inkml:brushProperty name="width" value="0.35" units="cm"/>
+      <inkml:brushProperty name="height" value="0.35" units="cm"/>
+    </inkml:brush>
+  </inkml:definitions>
+  <inkml:trace contextRef="#ctx0" brushRef="#br0">0 1 24575,'1'0'0</inkml:trace>
+</inkml:ink>
+</file>
+
+<file path=ppt/ink/ink24.xml><?xml version="1.0" encoding="utf-8"?>
+<inkml:ink xmlns:inkml="http://www.w3.org/2003/InkML">
+  <inkml:definitions>
+    <inkml:context xml:id="ctx0">
+      <inkml:inkSource xml:id="inkSrc0">
+        <inkml:traceFormat>
+          <inkml:channel name="X" type="integer" min="-2.14748E9" max="2.14748E9" units="cm"/>
+          <inkml:channel name="Y" type="integer" min="-2.14748E9" max="2.14748E9" units="cm"/>
+          <inkml:channel name="F" type="integer" max="32767" units="dev"/>
+        </inkml:traceFormat>
+        <inkml:channelProperties>
+          <inkml:channelProperty channel="X" name="resolution" value="1000" units="1/cm"/>
+          <inkml:channelProperty channel="Y" name="resolution" value="1000" units="1/cm"/>
+          <inkml:channelProperty channel="F" name="resolution" value="0" units="1/dev"/>
+        </inkml:channelProperties>
+      </inkml:inkSource>
+      <inkml:timestamp xml:id="ts0" timeString="2023-11-22T14:01:27.565"/>
+    </inkml:context>
+    <inkml:brush xml:id="br0">
+      <inkml:brushProperty name="width" value="0.21167" units="cm"/>
+      <inkml:brushProperty name="height" value="0.21167" units="cm"/>
+      <inkml:brushProperty name="color" value="#F6630D"/>
+    </inkml:brush>
+  </inkml:definitions>
+  <inkml:trace contextRef="#ctx0" brushRef="#br0">278 1 24575,'-2'0'0,"0"1"0,-1 0 0,1 0 0,0 0 0,0 0 0,0 0 0,0 0 0,0 1 0,0-1 0,0 1 0,0-1 0,0 1 0,1 0 0,-1 0 0,1 0 0,-1-1 0,1 2 0,0-1 0,-1 0 0,0 4 0,-20 47 0,17-40 0,1-1 0,0 1 0,1-1 0,1 1 0,0 0 0,1 0 0,0 0 0,1 0 0,0 0 0,1 0 0,1 0 0,0 0 0,0 0 0,6 15 0,24 88 0,-11-60 0,-8-27 0,-1 1 0,-2 0 0,-1 0 0,-1 1 0,-2 1 0,-1-1 0,0 35 0,-6-50 0,-1-1 0,-1 1 0,0-1 0,-1 0 0,-8 17 0,-2 13 0,5-18 0,-2 0 0,-1-1 0,-17 29 0,-7 14 0,23-44 0,-2 0 0,-30 38 0,28-40 0,1-1 0,1 2 0,-12 26 0,18-29 0,1 1 0,1 0 0,0 0 0,2 1 0,1 0 0,1-1 0,1 2 0,0-1 0,2 0 0,1 0 0,1 0 0,1 0 0,0 0 0,14 44 0,-1-13 0,24 70 0,-13-55 0,33 75 0,-40-100 0,-13-28 0,0 1 0,1-2 0,1 1 0,0-2 0,17 21 0,-19-25 0,0 1 0,0-1 0,-1 1 0,-1 1 0,6 14 0,20 36 0,-24-47 0,0 0 0,-1 0 0,-1 0 0,0 1 0,-1 0 0,3 21 0,5 19 0,-9-37 0,0 0 0,-2 0 0,0 1 0,-4 38 0,0 0 0,4-39 0,-2-1 0,0 1 0,-2-1 0,0 1 0,-1-1 0,0 0 0,-2 0 0,0 0 0,-1-1 0,-14 26 0,17-36 0,1 0 0,0 0 0,1 0 0,0 0 0,0 0 0,0 1 0,-1 13 0,2-12 0,0 0 0,-1 0 0,0 0 0,-1 0 0,-4 11 0,-1-6 0,1 1 0,0 0 0,1 1 0,1-1 0,1 1 0,0 0 0,-2 21 0,-10 41 93,11-64-385,2 0 1,0 1-1,0 0 1,0 21-1</inkml:trace>
+</inkml:ink>
+</file>
+
+<file path=ppt/ink/ink25.xml><?xml version="1.0" encoding="utf-8"?>
+<inkml:ink xmlns:inkml="http://www.w3.org/2003/InkML">
+  <inkml:definitions>
+    <inkml:context xml:id="ctx0">
+      <inkml:inkSource xml:id="inkSrc0">
+        <inkml:traceFormat>
+          <inkml:channel name="X" type="integer" min="-2.14748E9" max="2.14748E9" units="cm"/>
+          <inkml:channel name="Y" type="integer" min="-2.14748E9" max="2.14748E9" units="cm"/>
+          <inkml:channel name="F" type="integer" max="32767" units="dev"/>
+        </inkml:traceFormat>
+        <inkml:channelProperties>
+          <inkml:channelProperty channel="X" name="resolution" value="1000" units="1/cm"/>
+          <inkml:channelProperty channel="Y" name="resolution" value="1000" units="1/cm"/>
+          <inkml:channelProperty channel="F" name="resolution" value="0" units="1/dev"/>
+        </inkml:channelProperties>
+      </inkml:inkSource>
+      <inkml:timestamp xml:id="ts0" timeString="2023-11-22T13:59:19.205"/>
+    </inkml:context>
+    <inkml:brush xml:id="br0">
+      <inkml:brushProperty name="width" value="0.35" units="cm"/>
+      <inkml:brushProperty name="height" value="0.35" units="cm"/>
+      <inkml:brushProperty name="color" value="#E71224"/>
+    </inkml:brush>
+  </inkml:definitions>
+  <inkml:trace contextRef="#ctx0" brushRef="#br0">0 1 24575</inkml:trace>
+</inkml:ink>
+</file>
+
+<file path=ppt/ink/ink26.xml><?xml version="1.0" encoding="utf-8"?>
+<inkml:ink xmlns:inkml="http://www.w3.org/2003/InkML">
+  <inkml:definitions>
+    <inkml:context xml:id="ctx0">
+      <inkml:inkSource xml:id="inkSrc0">
+        <inkml:traceFormat>
+          <inkml:channel name="X" type="integer" min="-2.14748E9" max="2.14748E9" units="cm"/>
+          <inkml:channel name="Y" type="integer" min="-2.14748E9" max="2.14748E9" units="cm"/>
+          <inkml:channel name="F" type="integer" max="32767" units="dev"/>
+        </inkml:traceFormat>
+        <inkml:channelProperties>
+          <inkml:channelProperty channel="X" name="resolution" value="1000" units="1/cm"/>
+          <inkml:channelProperty channel="Y" name="resolution" value="1000" units="1/cm"/>
+          <inkml:channelProperty channel="F" name="resolution" value="0" units="1/dev"/>
+        </inkml:channelProperties>
+      </inkml:inkSource>
+      <inkml:timestamp xml:id="ts0" timeString="2023-11-22T14:01:07.419"/>
+    </inkml:context>
+    <inkml:brush xml:id="br0">
+      <inkml:brushProperty name="width" value="0.35" units="cm"/>
+      <inkml:brushProperty name="height" value="0.35" units="cm"/>
+      <inkml:brushProperty name="color" value="#E71224"/>
+    </inkml:brush>
+  </inkml:definitions>
+  <inkml:trace contextRef="#ctx0" brushRef="#br0">72 20 24575,'0'0'0,"0"-1"0,0 0 0,0 0 0,-1 0 0,1 0 0,0 0 0,0 0 0,-1 1 0,1-1 0,-1 0 0,1 0 0,-1 1 0,1-1 0,-1 0 0,1 0 0,-1 1 0,1-1 0,-1 1 0,0-1 0,1 0 0,-1 1 0,0-1 0,0 1 0,0 0 0,1-1 0,-1 1 0,0 0 0,0-1 0,0 1 0,0 0 0,0 0 0,1 0 0,-1-1 0,0 1 0,0 0 0,0 0 0,0 1 0,0-1 0,0 0 0,0 0 0,1 0 0,-1 1 0,-1-1 0,0 1 0,-1-1 0,1 1 0,0-1 0,0 1 0,0 0 0,0 0 0,-1 0 0,1 0 0,1 0 0,-1 1 0,0-1 0,0 0 0,0 1 0,1-1 0,-1 1 0,1 0 0,-2 2 0,2-2 0,0 1 0,0 0 0,0 0 0,0 0 0,1 0 0,-1-1 0,1 1 0,0 0 0,0 0 0,0 0 0,0 0 0,1 0 0,-1 0 0,1 0 0,0 0 0,-1-1 0,1 1 0,1 0 0,-1-1 0,0 1 0,1 0 0,-1-1 0,1 0 0,0 1 0,0-1 0,0 0 0,0 0 0,0 0 0,0 0 0,0 0 0,1 0 0,-1-1 0,1 1 0,-1-1 0,1 0 0,0 0 0,-1 0 0,1 0 0,4 1 0,-4-1 0,-1 0 0,1 0 0,0 0 0,-1 0 0,1-1 0,0 1 0,-1-1 0,1 0 0,0 0 0,0 0 0,-1 0 0,1 0 0,0 0 0,-1-1 0,1 1 0,0-1 0,-1 0 0,1 0 0,0 0 0,-1 0 0,0 0 0,1-1 0,-1 1 0,0-1 0,1 1 0,-1-1 0,0 0 0,0 0 0,0 0 0,-1 0 0,1 0 0,0 0 0,-1-1 0,0 1 0,1-1 0,-1 1 0,0-1 0,0 1 0,0-1 0,0-3 0,-1 4 6,0 0-1,0 0 1,0 0-1,0 0 0,0 0 1,0 0-1,-1 0 1,1 0-1,-1 0 1,0 1-1,1-1 1,-1 0-1,0 0 0,0 1 1,0-1-1,0 0 1,-1 1-1,1-1 1,0 1-1,-1 0 1,-2-3-1,-36-20-1490</inkml:trace>
+</inkml:ink>
+</file>
+
+<file path=ppt/ink/ink3.xml><?xml version="1.0" encoding="utf-8"?>
+<inkml:ink xmlns:inkml="http://www.w3.org/2003/InkML">
+  <inkml:definitions>
+    <inkml:context xml:id="ctx0">
+      <inkml:inkSource xml:id="inkSrc0">
+        <inkml:traceFormat>
+          <inkml:channel name="X" type="integer" min="-2.14748E9" max="2.14748E9" units="cm"/>
+          <inkml:channel name="Y" type="integer" min="-2.14748E9" max="2.14748E9" units="cm"/>
+          <inkml:channel name="F" type="integer" max="32767" units="dev"/>
+        </inkml:traceFormat>
+        <inkml:channelProperties>
+          <inkml:channelProperty channel="X" name="resolution" value="1000" units="1/cm"/>
+          <inkml:channelProperty channel="Y" name="resolution" value="1000" units="1/cm"/>
+          <inkml:channelProperty channel="F" name="resolution" value="0" units="1/dev"/>
+        </inkml:channelProperties>
+      </inkml:inkSource>
+      <inkml:timestamp xml:id="ts0" timeString="2023-11-22T13:39:27.980"/>
+    </inkml:context>
+    <inkml:brush xml:id="br0">
+      <inkml:brushProperty name="width" value="0.35" units="cm"/>
+      <inkml:brushProperty name="height" value="0.35" units="cm"/>
+    </inkml:brush>
+  </inkml:definitions>
+  <inkml:trace contextRef="#ctx0" brushRef="#br0">5 0 24575,'-2'0'0,"0"0"0</inkml:trace>
+</inkml:ink>
+</file>
+
+<file path=ppt/ink/ink4.xml><?xml version="1.0" encoding="utf-8"?>
+<inkml:ink xmlns:inkml="http://www.w3.org/2003/InkML">
+  <inkml:definitions>
+    <inkml:context xml:id="ctx0">
+      <inkml:inkSource xml:id="inkSrc0">
+        <inkml:traceFormat>
+          <inkml:channel name="X" type="integer" min="-2.14748E9" max="2.14748E9" units="cm"/>
+          <inkml:channel name="Y" type="integer" min="-2.14748E9" max="2.14748E9" units="cm"/>
+          <inkml:channel name="F" type="integer" max="32767" units="dev"/>
+        </inkml:traceFormat>
+        <inkml:channelProperties>
+          <inkml:channelProperty channel="X" name="resolution" value="1000" units="1/cm"/>
+          <inkml:channelProperty channel="Y" name="resolution" value="1000" units="1/cm"/>
+          <inkml:channelProperty channel="F" name="resolution" value="0" units="1/dev"/>
+        </inkml:channelProperties>
+      </inkml:inkSource>
+      <inkml:timestamp xml:id="ts0" timeString="2023-11-22T13:39:28.334"/>
+    </inkml:context>
+    <inkml:brush xml:id="br0">
+      <inkml:brushProperty name="width" value="0.35" units="cm"/>
+      <inkml:brushProperty name="height" value="0.35" units="cm"/>
+    </inkml:brush>
+  </inkml:definitions>
+  <inkml:trace contextRef="#ctx0" brushRef="#br0">4 0 24575,'-3'6'0</inkml:trace>
+</inkml:ink>
+</file>
+
+<file path=ppt/ink/ink5.xml><?xml version="1.0" encoding="utf-8"?>
+<inkml:ink xmlns:inkml="http://www.w3.org/2003/InkML">
+  <inkml:definitions>
+    <inkml:context xml:id="ctx0">
+      <inkml:inkSource xml:id="inkSrc0">
+        <inkml:traceFormat>
+          <inkml:channel name="X" type="integer" min="-2.14748E9" max="2.14748E9" units="cm"/>
+          <inkml:channel name="Y" type="integer" min="-2.14748E9" max="2.14748E9" units="cm"/>
+          <inkml:channel name="F" type="integer" max="32767" units="dev"/>
+        </inkml:traceFormat>
+        <inkml:channelProperties>
+          <inkml:channelProperty channel="X" name="resolution" value="1000" units="1/cm"/>
+          <inkml:channelProperty channel="Y" name="resolution" value="1000" units="1/cm"/>
+          <inkml:channelProperty channel="F" name="resolution" value="0" units="1/dev"/>
+        </inkml:channelProperties>
+      </inkml:inkSource>
+      <inkml:timestamp xml:id="ts0" timeString="2023-11-22T13:39:28.685"/>
+    </inkml:context>
+    <inkml:brush xml:id="br0">
+      <inkml:brushProperty name="width" value="0.35" units="cm"/>
+      <inkml:brushProperty name="height" value="0.35" units="cm"/>
+    </inkml:brush>
+  </inkml:definitions>
+  <inkml:trace contextRef="#ctx0" brushRef="#br0">93 1 24575,'0'1'0,"-1"0"0</inkml:trace>
+  <inkml:trace contextRef="#ctx0" brushRef="#br0" timeOffset="1">0 113 24575</inkml:trace>
+</inkml:ink>
+</file>
+
+<file path=ppt/ink/ink6.xml><?xml version="1.0" encoding="utf-8"?>
+<inkml:ink xmlns:inkml="http://www.w3.org/2003/InkML">
+  <inkml:definitions>
+    <inkml:context xml:id="ctx0">
+      <inkml:inkSource xml:id="inkSrc0">
+        <inkml:traceFormat>
+          <inkml:channel name="X" type="integer" min="-2.14748E9" max="2.14748E9" units="cm"/>
+          <inkml:channel name="Y" type="integer" min="-2.14748E9" max="2.14748E9" units="cm"/>
+          <inkml:channel name="F" type="integer" max="32767" units="dev"/>
+        </inkml:traceFormat>
+        <inkml:channelProperties>
+          <inkml:channelProperty channel="X" name="resolution" value="1000" units="1/cm"/>
+          <inkml:channelProperty channel="Y" name="resolution" value="1000" units="1/cm"/>
+          <inkml:channelProperty channel="F" name="resolution" value="0" units="1/dev"/>
+        </inkml:channelProperties>
+      </inkml:inkSource>
+      <inkml:timestamp xml:id="ts0" timeString="2023-11-22T13:39:29.037"/>
+    </inkml:context>
+    <inkml:brush xml:id="br0">
+      <inkml:brushProperty name="width" value="0.35" units="cm"/>
+      <inkml:brushProperty name="height" value="0.35" units="cm"/>
+    </inkml:brush>
+  </inkml:definitions>
+  <inkml:trace contextRef="#ctx0" brushRef="#br0">1 0 24575</inkml:trace>
+</inkml:ink>
+</file>
+
+<file path=ppt/ink/ink7.xml><?xml version="1.0" encoding="utf-8"?>
+<inkml:ink xmlns:inkml="http://www.w3.org/2003/InkML">
+  <inkml:definitions>
+    <inkml:context xml:id="ctx0">
+      <inkml:inkSource xml:id="inkSrc0">
+        <inkml:traceFormat>
+          <inkml:channel name="X" type="integer" min="-2.14748E9" max="2.14748E9" units="cm"/>
+          <inkml:channel name="Y" type="integer" min="-2.14748E9" max="2.14748E9" units="cm"/>
+          <inkml:channel name="F" type="integer" max="32767" units="dev"/>
+        </inkml:traceFormat>
+        <inkml:channelProperties>
+          <inkml:channelProperty channel="X" name="resolution" value="1000" units="1/cm"/>
+          <inkml:channelProperty channel="Y" name="resolution" value="1000" units="1/cm"/>
+          <inkml:channelProperty channel="F" name="resolution" value="0" units="1/dev"/>
+        </inkml:channelProperties>
+      </inkml:inkSource>
+      <inkml:timestamp xml:id="ts0" timeString="2023-11-22T13:39:29.368"/>
+    </inkml:context>
+    <inkml:brush xml:id="br0">
+      <inkml:brushProperty name="width" value="0.35" units="cm"/>
+      <inkml:brushProperty name="height" value="0.35" units="cm"/>
+    </inkml:brush>
+  </inkml:definitions>
+  <inkml:trace contextRef="#ctx0" brushRef="#br0">1 0 24575</inkml:trace>
+</inkml:ink>
+</file>
+
+<file path=ppt/ink/ink8.xml><?xml version="1.0" encoding="utf-8"?>
+<inkml:ink xmlns:inkml="http://www.w3.org/2003/InkML">
+  <inkml:definitions>
+    <inkml:context xml:id="ctx0">
+      <inkml:inkSource xml:id="inkSrc0">
+        <inkml:traceFormat>
+          <inkml:channel name="X" type="integer" min="-2.14748E9" max="2.14748E9" units="cm"/>
+          <inkml:channel name="Y" type="integer" min="-2.14748E9" max="2.14748E9" units="cm"/>
+          <inkml:channel name="F" type="integer" max="32767" units="dev"/>
+        </inkml:traceFormat>
+        <inkml:channelProperties>
+          <inkml:channelProperty channel="X" name="resolution" value="1000" units="1/cm"/>
+          <inkml:channelProperty channel="Y" name="resolution" value="1000" units="1/cm"/>
+          <inkml:channelProperty channel="F" name="resolution" value="0" units="1/dev"/>
+        </inkml:channelProperties>
+      </inkml:inkSource>
+      <inkml:timestamp xml:id="ts0" timeString="2023-11-22T13:39:29.721"/>
+    </inkml:context>
+    <inkml:brush xml:id="br0">
+      <inkml:brushProperty name="width" value="0.35" units="cm"/>
+      <inkml:brushProperty name="height" value="0.35" units="cm"/>
+    </inkml:brush>
+  </inkml:definitions>
+  <inkml:trace contextRef="#ctx0" brushRef="#br0">1 0 24575</inkml:trace>
+</inkml:ink>
+</file>
+
+<file path=ppt/ink/ink9.xml><?xml version="1.0" encoding="utf-8"?>
+<inkml:ink xmlns:inkml="http://www.w3.org/2003/InkML">
+  <inkml:definitions>
+    <inkml:context xml:id="ctx0">
+      <inkml:inkSource xml:id="inkSrc0">
+        <inkml:traceFormat>
+          <inkml:channel name="X" type="integer" min="-2.14748E9" max="2.14748E9" units="cm"/>
+          <inkml:channel name="Y" type="integer" min="-2.14748E9" max="2.14748E9" units="cm"/>
+          <inkml:channel name="F" type="integer" max="32767" units="dev"/>
+        </inkml:traceFormat>
+        <inkml:channelProperties>
+          <inkml:channelProperty channel="X" name="resolution" value="1000" units="1/cm"/>
+          <inkml:channelProperty channel="Y" name="resolution" value="1000" units="1/cm"/>
+          <inkml:channelProperty channel="F" name="resolution" value="0" units="1/dev"/>
+        </inkml:channelProperties>
+      </inkml:inkSource>
+      <inkml:timestamp xml:id="ts0" timeString="2023-11-22T13:39:30.692"/>
+    </inkml:context>
+    <inkml:brush xml:id="br0">
+      <inkml:brushProperty name="width" value="0.35" units="cm"/>
+      <inkml:brushProperty name="height" value="0.35" units="cm"/>
+    </inkml:brush>
+  </inkml:definitions>
+  <inkml:trace contextRef="#ctx0" brushRef="#br0">0 0 24575</inkml:trace>
+</inkml:ink>
+</file>
+
 <file path=ppt/slideLayouts/slideLayout1.xml><?xml version="1.0" encoding="utf-8"?>
 <p:sldLayout xmlns:a="http://schemas.openxmlformats.org/drawingml/2006/main" xmlns:r="http://schemas.openxmlformats.org/officeDocument/2006/relationships" xmlns:p="http://schemas.openxmlformats.org/presentationml/2006/main" type="title" preserve="1">
   <p:cSld name="Title Slide">
@@ -276,7 +986,7 @@
           <a:p>
             <a:fld id="{A2EF96EC-B110-4427-9456-97730D7A221B}" type="datetimeFigureOut">
               <a:rPr lang="en-DE" smtClean="0"/>
-              <a:t>21/11/2023</a:t>
+              <a:t>22/11/2023</a:t>
             </a:fld>
             <a:endParaRPr lang="en-DE"/>
           </a:p>
@@ -476,7 +1186,7 @@
           <a:p>
             <a:fld id="{A2EF96EC-B110-4427-9456-97730D7A221B}" type="datetimeFigureOut">
               <a:rPr lang="en-DE" smtClean="0"/>
-              <a:t>21/11/2023</a:t>
+              <a:t>22/11/2023</a:t>
             </a:fld>
             <a:endParaRPr lang="en-DE"/>
           </a:p>
@@ -686,7 +1396,7 @@
           <a:p>
             <a:fld id="{A2EF96EC-B110-4427-9456-97730D7A221B}" type="datetimeFigureOut">
               <a:rPr lang="en-DE" smtClean="0"/>
-              <a:t>21/11/2023</a:t>
+              <a:t>22/11/2023</a:t>
             </a:fld>
             <a:endParaRPr lang="en-DE"/>
           </a:p>
@@ -886,7 +1596,7 @@
           <a:p>
             <a:fld id="{A2EF96EC-B110-4427-9456-97730D7A221B}" type="datetimeFigureOut">
               <a:rPr lang="en-DE" smtClean="0"/>
-              <a:t>21/11/2023</a:t>
+              <a:t>22/11/2023</a:t>
             </a:fld>
             <a:endParaRPr lang="en-DE"/>
           </a:p>
@@ -1162,7 +1872,7 @@
           <a:p>
             <a:fld id="{A2EF96EC-B110-4427-9456-97730D7A221B}" type="datetimeFigureOut">
               <a:rPr lang="en-DE" smtClean="0"/>
-              <a:t>21/11/2023</a:t>
+              <a:t>22/11/2023</a:t>
             </a:fld>
             <a:endParaRPr lang="en-DE"/>
           </a:p>
@@ -1430,7 +2140,7 @@
           <a:p>
             <a:fld id="{A2EF96EC-B110-4427-9456-97730D7A221B}" type="datetimeFigureOut">
               <a:rPr lang="en-DE" smtClean="0"/>
-              <a:t>21/11/2023</a:t>
+              <a:t>22/11/2023</a:t>
             </a:fld>
             <a:endParaRPr lang="en-DE"/>
           </a:p>
@@ -1845,7 +2555,7 @@
           <a:p>
             <a:fld id="{A2EF96EC-B110-4427-9456-97730D7A221B}" type="datetimeFigureOut">
               <a:rPr lang="en-DE" smtClean="0"/>
-              <a:t>21/11/2023</a:t>
+              <a:t>22/11/2023</a:t>
             </a:fld>
             <a:endParaRPr lang="en-DE"/>
           </a:p>
@@ -1987,7 +2697,7 @@
           <a:p>
             <a:fld id="{A2EF96EC-B110-4427-9456-97730D7A221B}" type="datetimeFigureOut">
               <a:rPr lang="en-DE" smtClean="0"/>
-              <a:t>21/11/2023</a:t>
+              <a:t>22/11/2023</a:t>
             </a:fld>
             <a:endParaRPr lang="en-DE"/>
           </a:p>
@@ -2100,7 +2810,7 @@
           <a:p>
             <a:fld id="{A2EF96EC-B110-4427-9456-97730D7A221B}" type="datetimeFigureOut">
               <a:rPr lang="en-DE" smtClean="0"/>
-              <a:t>21/11/2023</a:t>
+              <a:t>22/11/2023</a:t>
             </a:fld>
             <a:endParaRPr lang="en-DE"/>
           </a:p>
@@ -2413,7 +3123,7 @@
           <a:p>
             <a:fld id="{A2EF96EC-B110-4427-9456-97730D7A221B}" type="datetimeFigureOut">
               <a:rPr lang="en-DE" smtClean="0"/>
-              <a:t>21/11/2023</a:t>
+              <a:t>22/11/2023</a:t>
             </a:fld>
             <a:endParaRPr lang="en-DE"/>
           </a:p>
@@ -2702,7 +3412,7 @@
           <a:p>
             <a:fld id="{A2EF96EC-B110-4427-9456-97730D7A221B}" type="datetimeFigureOut">
               <a:rPr lang="en-DE" smtClean="0"/>
-              <a:t>21/11/2023</a:t>
+              <a:t>22/11/2023</a:t>
             </a:fld>
             <a:endParaRPr lang="en-DE"/>
           </a:p>
@@ -2945,7 +3655,7 @@
           <a:p>
             <a:fld id="{A2EF96EC-B110-4427-9456-97730D7A221B}" type="datetimeFigureOut">
               <a:rPr lang="en-DE" smtClean="0"/>
-              <a:t>21/11/2023</a:t>
+              <a:t>22/11/2023</a:t>
             </a:fld>
             <a:endParaRPr lang="en-DE"/>
           </a:p>
@@ -10951,6 +11661,3356 @@
     <p:extLst>
       <p:ext uri="{BB962C8B-B14F-4D97-AF65-F5344CB8AC3E}">
         <p14:creationId xmlns:p14="http://schemas.microsoft.com/office/powerpoint/2010/main" val="2114363463"/>
+      </p:ext>
+    </p:extLst>
+  </p:cSld>
+  <p:clrMapOvr>
+    <a:masterClrMapping/>
+  </p:clrMapOvr>
+</p:sld>
+</file>
+
+<file path=ppt/slides/slide17.xml><?xml version="1.0" encoding="utf-8"?>
+<p:sld xmlns:a="http://schemas.openxmlformats.org/drawingml/2006/main" xmlns:r="http://schemas.openxmlformats.org/officeDocument/2006/relationships" xmlns:p="http://schemas.openxmlformats.org/presentationml/2006/main">
+  <p:cSld>
+    <p:spTree>
+      <p:nvGrpSpPr>
+        <p:cNvPr id="1" name=""/>
+        <p:cNvGrpSpPr/>
+        <p:nvPr/>
+      </p:nvGrpSpPr>
+      <p:grpSpPr>
+        <a:xfrm>
+          <a:off x="0" y="0"/>
+          <a:ext cx="0" cy="0"/>
+          <a:chOff x="0" y="0"/>
+          <a:chExt cx="0" cy="0"/>
+        </a:xfrm>
+      </p:grpSpPr>
+      <p:sp>
+        <p:nvSpPr>
+          <p:cNvPr id="4" name="Rectangle 3">
+            <a:extLst>
+              <a:ext uri="{FF2B5EF4-FFF2-40B4-BE49-F238E27FC236}">
+                <a16:creationId xmlns:a16="http://schemas.microsoft.com/office/drawing/2014/main" id="{90EFCB7A-745B-7891-7E60-714733DF73A0}"/>
+              </a:ext>
+            </a:extLst>
+          </p:cNvPr>
+          <p:cNvSpPr/>
+          <p:nvPr/>
+        </p:nvSpPr>
+        <p:spPr>
+          <a:xfrm>
+            <a:off x="5141068" y="1268436"/>
+            <a:ext cx="2177568" cy="597159"/>
+          </a:xfrm>
+          <a:prstGeom prst="rect">
+            <a:avLst/>
+          </a:prstGeom>
+        </p:spPr>
+        <p:style>
+          <a:lnRef idx="2">
+            <a:schemeClr val="accent1">
+              <a:shade val="15000"/>
+            </a:schemeClr>
+          </a:lnRef>
+          <a:fillRef idx="1">
+            <a:schemeClr val="accent1"/>
+          </a:fillRef>
+          <a:effectRef idx="0">
+            <a:schemeClr val="accent1"/>
+          </a:effectRef>
+          <a:fontRef idx="minor">
+            <a:schemeClr val="lt1"/>
+          </a:fontRef>
+        </p:style>
+        <p:txBody>
+          <a:bodyPr rtlCol="0" anchor="ctr"/>
+          <a:lstStyle/>
+          <a:p>
+            <a:pPr algn="ctr"/>
+            <a:r>
+              <a:rPr lang="en-US" dirty="0"/>
+              <a:t>Average scaling factor</a:t>
+            </a:r>
+            <a:endParaRPr lang="en-DE" dirty="0"/>
+          </a:p>
+        </p:txBody>
+      </p:sp>
+      <p:sp>
+        <p:nvSpPr>
+          <p:cNvPr id="5" name="Rectangle 4">
+            <a:extLst>
+              <a:ext uri="{FF2B5EF4-FFF2-40B4-BE49-F238E27FC236}">
+                <a16:creationId xmlns:a16="http://schemas.microsoft.com/office/drawing/2014/main" id="{62A3FCFB-013D-4A96-D4EF-4D449113E704}"/>
+              </a:ext>
+            </a:extLst>
+          </p:cNvPr>
+          <p:cNvSpPr/>
+          <p:nvPr/>
+        </p:nvSpPr>
+        <p:spPr>
+          <a:xfrm>
+            <a:off x="5141068" y="3041753"/>
+            <a:ext cx="2177568" cy="597159"/>
+          </a:xfrm>
+          <a:prstGeom prst="rect">
+            <a:avLst/>
+          </a:prstGeom>
+        </p:spPr>
+        <p:style>
+          <a:lnRef idx="2">
+            <a:schemeClr val="accent1">
+              <a:shade val="15000"/>
+            </a:schemeClr>
+          </a:lnRef>
+          <a:fillRef idx="1">
+            <a:schemeClr val="accent1"/>
+          </a:fillRef>
+          <a:effectRef idx="0">
+            <a:schemeClr val="accent1"/>
+          </a:effectRef>
+          <a:fontRef idx="minor">
+            <a:schemeClr val="lt1"/>
+          </a:fontRef>
+        </p:style>
+        <p:txBody>
+          <a:bodyPr rtlCol="0" anchor="ctr"/>
+          <a:lstStyle/>
+          <a:p>
+            <a:pPr algn="ctr"/>
+            <a:r>
+              <a:rPr lang="en-US" dirty="0"/>
+              <a:t>Multi-Body simulation</a:t>
+            </a:r>
+            <a:endParaRPr lang="en-DE" dirty="0"/>
+          </a:p>
+        </p:txBody>
+      </p:sp>
+      <p:sp>
+        <p:nvSpPr>
+          <p:cNvPr id="6" name="Rectangle 5">
+            <a:extLst>
+              <a:ext uri="{FF2B5EF4-FFF2-40B4-BE49-F238E27FC236}">
+                <a16:creationId xmlns:a16="http://schemas.microsoft.com/office/drawing/2014/main" id="{0442FE3B-E217-F38B-1EEA-F52B5067B64A}"/>
+              </a:ext>
+            </a:extLst>
+          </p:cNvPr>
+          <p:cNvSpPr/>
+          <p:nvPr/>
+        </p:nvSpPr>
+        <p:spPr>
+          <a:xfrm>
+            <a:off x="5141069" y="5113649"/>
+            <a:ext cx="2177567" cy="597159"/>
+          </a:xfrm>
+          <a:prstGeom prst="rect">
+            <a:avLst/>
+          </a:prstGeom>
+        </p:spPr>
+        <p:style>
+          <a:lnRef idx="2">
+            <a:schemeClr val="accent1">
+              <a:shade val="15000"/>
+            </a:schemeClr>
+          </a:lnRef>
+          <a:fillRef idx="1">
+            <a:schemeClr val="accent1"/>
+          </a:fillRef>
+          <a:effectRef idx="0">
+            <a:schemeClr val="accent1"/>
+          </a:effectRef>
+          <a:fontRef idx="minor">
+            <a:schemeClr val="lt1"/>
+          </a:fontRef>
+        </p:style>
+        <p:txBody>
+          <a:bodyPr rtlCol="0" anchor="ctr"/>
+          <a:lstStyle/>
+          <a:p>
+            <a:pPr algn="ctr"/>
+            <a:r>
+              <a:rPr lang="en-US" dirty="0"/>
+              <a:t>Machine learning</a:t>
+            </a:r>
+            <a:endParaRPr lang="en-DE" dirty="0"/>
+          </a:p>
+        </p:txBody>
+      </p:sp>
+      <p:sp>
+        <p:nvSpPr>
+          <p:cNvPr id="7" name="Rectangle 6">
+            <a:extLst>
+              <a:ext uri="{FF2B5EF4-FFF2-40B4-BE49-F238E27FC236}">
+                <a16:creationId xmlns:a16="http://schemas.microsoft.com/office/drawing/2014/main" id="{E0E8DA2C-286C-846B-7FD9-806E561D3904}"/>
+              </a:ext>
+            </a:extLst>
+          </p:cNvPr>
+          <p:cNvSpPr/>
+          <p:nvPr/>
+        </p:nvSpPr>
+        <p:spPr>
+          <a:xfrm>
+            <a:off x="8526226" y="3041752"/>
+            <a:ext cx="2253941" cy="597159"/>
+          </a:xfrm>
+          <a:prstGeom prst="rect">
+            <a:avLst/>
+          </a:prstGeom>
+        </p:spPr>
+        <p:style>
+          <a:lnRef idx="2">
+            <a:schemeClr val="accent6">
+              <a:shade val="15000"/>
+            </a:schemeClr>
+          </a:lnRef>
+          <a:fillRef idx="1">
+            <a:schemeClr val="accent6"/>
+          </a:fillRef>
+          <a:effectRef idx="0">
+            <a:schemeClr val="accent6"/>
+          </a:effectRef>
+          <a:fontRef idx="minor">
+            <a:schemeClr val="lt1"/>
+          </a:fontRef>
+        </p:style>
+        <p:txBody>
+          <a:bodyPr rtlCol="0" anchor="ctr"/>
+          <a:lstStyle/>
+          <a:p>
+            <a:pPr algn="ctr"/>
+            <a:r>
+              <a:rPr lang="en-US" dirty="0">
+                <a:ln w="0"/>
+                <a:solidFill>
+                  <a:schemeClr val="tx1"/>
+                </a:solidFill>
+                <a:effectLst>
+                  <a:outerShdw blurRad="38100" dist="19050" dir="2700000" algn="tl" rotWithShape="0">
+                    <a:schemeClr val="dk1">
+                      <a:alpha val="40000"/>
+                    </a:schemeClr>
+                  </a:outerShdw>
+                </a:effectLst>
+              </a:rPr>
+              <a:t>Energy consumption</a:t>
+            </a:r>
+            <a:endParaRPr lang="en-DE" dirty="0">
+              <a:ln w="0"/>
+              <a:solidFill>
+                <a:schemeClr val="tx1"/>
+              </a:solidFill>
+              <a:effectLst>
+                <a:outerShdw blurRad="38100" dist="19050" dir="2700000" algn="tl" rotWithShape="0">
+                  <a:schemeClr val="dk1">
+                    <a:alpha val="40000"/>
+                  </a:schemeClr>
+                </a:outerShdw>
+              </a:effectLst>
+            </a:endParaRPr>
+          </a:p>
+        </p:txBody>
+      </p:sp>
+      <p:sp>
+        <p:nvSpPr>
+          <p:cNvPr id="9" name="Rectangle 8">
+            <a:extLst>
+              <a:ext uri="{FF2B5EF4-FFF2-40B4-BE49-F238E27FC236}">
+                <a16:creationId xmlns:a16="http://schemas.microsoft.com/office/drawing/2014/main" id="{2DFA57A7-0B1D-C2FA-CB67-7A7602D32ED2}"/>
+              </a:ext>
+            </a:extLst>
+          </p:cNvPr>
+          <p:cNvSpPr/>
+          <p:nvPr/>
+        </p:nvSpPr>
+        <p:spPr>
+          <a:xfrm>
+            <a:off x="1705839" y="3054220"/>
+            <a:ext cx="2373138" cy="597159"/>
+          </a:xfrm>
+          <a:prstGeom prst="rect">
+            <a:avLst/>
+          </a:prstGeom>
+          <a:solidFill>
+            <a:srgbClr val="FFC000"/>
+          </a:solidFill>
+        </p:spPr>
+        <p:style>
+          <a:lnRef idx="2">
+            <a:schemeClr val="accent6">
+              <a:shade val="15000"/>
+            </a:schemeClr>
+          </a:lnRef>
+          <a:fillRef idx="1">
+            <a:schemeClr val="accent6"/>
+          </a:fillRef>
+          <a:effectRef idx="0">
+            <a:schemeClr val="accent6"/>
+          </a:effectRef>
+          <a:fontRef idx="minor">
+            <a:schemeClr val="lt1"/>
+          </a:fontRef>
+        </p:style>
+        <p:txBody>
+          <a:bodyPr rtlCol="0" anchor="ctr"/>
+          <a:lstStyle/>
+          <a:p>
+            <a:pPr algn="ctr"/>
+            <a:r>
+              <a:rPr lang="en-US" dirty="0">
+                <a:ln w="0"/>
+                <a:solidFill>
+                  <a:schemeClr val="tx1"/>
+                </a:solidFill>
+                <a:effectLst>
+                  <a:outerShdw blurRad="38100" dist="19050" dir="2700000" algn="tl" rotWithShape="0">
+                    <a:schemeClr val="dk1">
+                      <a:alpha val="40000"/>
+                    </a:schemeClr>
+                  </a:outerShdw>
+                </a:effectLst>
+              </a:rPr>
+              <a:t>Angular velocity</a:t>
+            </a:r>
+            <a:endParaRPr lang="en-DE" dirty="0">
+              <a:ln w="0"/>
+              <a:solidFill>
+                <a:schemeClr val="tx1"/>
+              </a:solidFill>
+              <a:effectLst>
+                <a:outerShdw blurRad="38100" dist="19050" dir="2700000" algn="tl" rotWithShape="0">
+                  <a:schemeClr val="dk1">
+                    <a:alpha val="40000"/>
+                  </a:schemeClr>
+                </a:outerShdw>
+              </a:effectLst>
+            </a:endParaRPr>
+          </a:p>
+        </p:txBody>
+      </p:sp>
+      <p:sp>
+        <p:nvSpPr>
+          <p:cNvPr id="10" name="Rectangle 9">
+            <a:extLst>
+              <a:ext uri="{FF2B5EF4-FFF2-40B4-BE49-F238E27FC236}">
+                <a16:creationId xmlns:a16="http://schemas.microsoft.com/office/drawing/2014/main" id="{FEBC2807-71A6-36A3-9C1B-E900ED239E33}"/>
+              </a:ext>
+            </a:extLst>
+          </p:cNvPr>
+          <p:cNvSpPr/>
+          <p:nvPr/>
+        </p:nvSpPr>
+        <p:spPr>
+          <a:xfrm>
+            <a:off x="1705839" y="3961124"/>
+            <a:ext cx="2373138" cy="597159"/>
+          </a:xfrm>
+          <a:prstGeom prst="rect">
+            <a:avLst/>
+          </a:prstGeom>
+          <a:solidFill>
+            <a:srgbClr val="FFC000"/>
+          </a:solidFill>
+        </p:spPr>
+        <p:style>
+          <a:lnRef idx="2">
+            <a:schemeClr val="accent6">
+              <a:shade val="15000"/>
+            </a:schemeClr>
+          </a:lnRef>
+          <a:fillRef idx="1">
+            <a:schemeClr val="accent6"/>
+          </a:fillRef>
+          <a:effectRef idx="0">
+            <a:schemeClr val="accent6"/>
+          </a:effectRef>
+          <a:fontRef idx="minor">
+            <a:schemeClr val="lt1"/>
+          </a:fontRef>
+        </p:style>
+        <p:txBody>
+          <a:bodyPr rtlCol="0" anchor="ctr"/>
+          <a:lstStyle/>
+          <a:p>
+            <a:pPr algn="ctr"/>
+            <a:r>
+              <a:rPr lang="en-US" dirty="0">
+                <a:ln w="0"/>
+                <a:solidFill>
+                  <a:schemeClr val="tx1"/>
+                </a:solidFill>
+                <a:effectLst>
+                  <a:outerShdw blurRad="38100" dist="19050" dir="2700000" algn="tl" rotWithShape="0">
+                    <a:schemeClr val="dk1">
+                      <a:alpha val="40000"/>
+                    </a:schemeClr>
+                  </a:outerShdw>
+                </a:effectLst>
+              </a:rPr>
+              <a:t>Angular acceleration</a:t>
+            </a:r>
+            <a:endParaRPr lang="en-DE" dirty="0">
+              <a:ln w="0"/>
+              <a:solidFill>
+                <a:schemeClr val="tx1"/>
+              </a:solidFill>
+              <a:effectLst>
+                <a:outerShdw blurRad="38100" dist="19050" dir="2700000" algn="tl" rotWithShape="0">
+                  <a:schemeClr val="dk1">
+                    <a:alpha val="40000"/>
+                  </a:schemeClr>
+                </a:outerShdw>
+              </a:effectLst>
+            </a:endParaRPr>
+          </a:p>
+        </p:txBody>
+      </p:sp>
+      <p:sp>
+        <p:nvSpPr>
+          <p:cNvPr id="11" name="Rectangle 10">
+            <a:extLst>
+              <a:ext uri="{FF2B5EF4-FFF2-40B4-BE49-F238E27FC236}">
+                <a16:creationId xmlns:a16="http://schemas.microsoft.com/office/drawing/2014/main" id="{10A8A9F2-2882-803C-663D-C60535DDBAA5}"/>
+              </a:ext>
+            </a:extLst>
+          </p:cNvPr>
+          <p:cNvSpPr/>
+          <p:nvPr/>
+        </p:nvSpPr>
+        <p:spPr>
+          <a:xfrm>
+            <a:off x="1705839" y="2147315"/>
+            <a:ext cx="2373138" cy="597159"/>
+          </a:xfrm>
+          <a:prstGeom prst="rect">
+            <a:avLst/>
+          </a:prstGeom>
+          <a:solidFill>
+            <a:srgbClr val="FFC000"/>
+          </a:solidFill>
+        </p:spPr>
+        <p:style>
+          <a:lnRef idx="2">
+            <a:schemeClr val="accent6">
+              <a:shade val="15000"/>
+            </a:schemeClr>
+          </a:lnRef>
+          <a:fillRef idx="1">
+            <a:schemeClr val="accent6"/>
+          </a:fillRef>
+          <a:effectRef idx="0">
+            <a:schemeClr val="accent6"/>
+          </a:effectRef>
+          <a:fontRef idx="minor">
+            <a:schemeClr val="lt1"/>
+          </a:fontRef>
+        </p:style>
+        <p:txBody>
+          <a:bodyPr rtlCol="0" anchor="ctr"/>
+          <a:lstStyle/>
+          <a:p>
+            <a:pPr algn="ctr"/>
+            <a:r>
+              <a:rPr lang="en-US" dirty="0">
+                <a:ln w="0"/>
+                <a:solidFill>
+                  <a:schemeClr val="tx1"/>
+                </a:solidFill>
+                <a:effectLst>
+                  <a:outerShdw blurRad="38100" dist="19050" dir="2700000" algn="tl" rotWithShape="0">
+                    <a:schemeClr val="dk1">
+                      <a:alpha val="40000"/>
+                    </a:schemeClr>
+                  </a:outerShdw>
+                </a:effectLst>
+              </a:rPr>
+              <a:t>Angular velocity</a:t>
+            </a:r>
+            <a:endParaRPr lang="en-DE" dirty="0">
+              <a:ln w="0"/>
+              <a:solidFill>
+                <a:schemeClr val="tx1"/>
+              </a:solidFill>
+              <a:effectLst>
+                <a:outerShdw blurRad="38100" dist="19050" dir="2700000" algn="tl" rotWithShape="0">
+                  <a:schemeClr val="dk1">
+                    <a:alpha val="40000"/>
+                  </a:schemeClr>
+                </a:outerShdw>
+              </a:effectLst>
+            </a:endParaRPr>
+          </a:p>
+        </p:txBody>
+      </p:sp>
+      <p:sp>
+        <p:nvSpPr>
+          <p:cNvPr id="13" name="Right Brace 12">
+            <a:extLst>
+              <a:ext uri="{FF2B5EF4-FFF2-40B4-BE49-F238E27FC236}">
+                <a16:creationId xmlns:a16="http://schemas.microsoft.com/office/drawing/2014/main" id="{6EEFCE0A-1539-7FE5-9E98-6ADDFF815847}"/>
+              </a:ext>
+            </a:extLst>
+          </p:cNvPr>
+          <p:cNvSpPr/>
+          <p:nvPr/>
+        </p:nvSpPr>
+        <p:spPr>
+          <a:xfrm>
+            <a:off x="4143126" y="1924985"/>
+            <a:ext cx="359764" cy="2855627"/>
+          </a:xfrm>
+          <a:prstGeom prst="rightBrace">
+            <a:avLst/>
+          </a:prstGeom>
+          <a:ln w="28575"/>
+        </p:spPr>
+        <p:style>
+          <a:lnRef idx="1">
+            <a:schemeClr val="accent1"/>
+          </a:lnRef>
+          <a:fillRef idx="0">
+            <a:schemeClr val="accent1"/>
+          </a:fillRef>
+          <a:effectRef idx="0">
+            <a:schemeClr val="accent1"/>
+          </a:effectRef>
+          <a:fontRef idx="minor">
+            <a:schemeClr val="tx1"/>
+          </a:fontRef>
+        </p:style>
+        <p:txBody>
+          <a:bodyPr rtlCol="0" anchor="ctr"/>
+          <a:lstStyle/>
+          <a:p>
+            <a:pPr algn="ctr"/>
+            <a:endParaRPr lang="en-DE"/>
+          </a:p>
+        </p:txBody>
+      </p:sp>
+      <p:cxnSp>
+        <p:nvCxnSpPr>
+          <p:cNvPr id="16" name="Straight Arrow Connector 15">
+            <a:extLst>
+              <a:ext uri="{FF2B5EF4-FFF2-40B4-BE49-F238E27FC236}">
+                <a16:creationId xmlns:a16="http://schemas.microsoft.com/office/drawing/2014/main" id="{F7D1BCBC-3970-5AFE-D733-47A914665F12}"/>
+              </a:ext>
+            </a:extLst>
+          </p:cNvPr>
+          <p:cNvCxnSpPr>
+            <a:cxnSpLocks/>
+            <a:stCxn id="13" idx="1"/>
+            <a:endCxn id="5" idx="1"/>
+          </p:cNvCxnSpPr>
+          <p:nvPr/>
+        </p:nvCxnSpPr>
+        <p:spPr>
+          <a:xfrm flipV="1">
+            <a:off x="4502890" y="3340333"/>
+            <a:ext cx="638178" cy="12466"/>
+          </a:xfrm>
+          <a:prstGeom prst="straightConnector1">
+            <a:avLst/>
+          </a:prstGeom>
+          <a:ln w="38100">
+            <a:tailEnd type="triangle"/>
+          </a:ln>
+        </p:spPr>
+        <p:style>
+          <a:lnRef idx="1">
+            <a:schemeClr val="accent1"/>
+          </a:lnRef>
+          <a:fillRef idx="0">
+            <a:schemeClr val="accent1"/>
+          </a:fillRef>
+          <a:effectRef idx="0">
+            <a:schemeClr val="accent1"/>
+          </a:effectRef>
+          <a:fontRef idx="minor">
+            <a:schemeClr val="tx1"/>
+          </a:fontRef>
+        </p:style>
+      </p:cxnSp>
+      <p:cxnSp>
+        <p:nvCxnSpPr>
+          <p:cNvPr id="26" name="Straight Arrow Connector 25">
+            <a:extLst>
+              <a:ext uri="{FF2B5EF4-FFF2-40B4-BE49-F238E27FC236}">
+                <a16:creationId xmlns:a16="http://schemas.microsoft.com/office/drawing/2014/main" id="{54A1E0D5-7989-2766-E2BD-71DF3BA5E39A}"/>
+              </a:ext>
+            </a:extLst>
+          </p:cNvPr>
+          <p:cNvCxnSpPr>
+            <a:cxnSpLocks/>
+            <a:stCxn id="5" idx="3"/>
+            <a:endCxn id="7" idx="1"/>
+          </p:cNvCxnSpPr>
+          <p:nvPr/>
+        </p:nvCxnSpPr>
+        <p:spPr>
+          <a:xfrm flipV="1">
+            <a:off x="7318636" y="3340332"/>
+            <a:ext cx="1207590" cy="1"/>
+          </a:xfrm>
+          <a:prstGeom prst="straightConnector1">
+            <a:avLst/>
+          </a:prstGeom>
+          <a:ln w="38100">
+            <a:tailEnd type="triangle"/>
+          </a:ln>
+        </p:spPr>
+        <p:style>
+          <a:lnRef idx="1">
+            <a:schemeClr val="accent1"/>
+          </a:lnRef>
+          <a:fillRef idx="0">
+            <a:schemeClr val="accent1"/>
+          </a:fillRef>
+          <a:effectRef idx="0">
+            <a:schemeClr val="accent1"/>
+          </a:effectRef>
+          <a:fontRef idx="minor">
+            <a:schemeClr val="tx1"/>
+          </a:fontRef>
+        </p:style>
+      </p:cxnSp>
+      <p:cxnSp>
+        <p:nvCxnSpPr>
+          <p:cNvPr id="33" name="Connector: Elbow 32">
+            <a:extLst>
+              <a:ext uri="{FF2B5EF4-FFF2-40B4-BE49-F238E27FC236}">
+                <a16:creationId xmlns:a16="http://schemas.microsoft.com/office/drawing/2014/main" id="{CEB39818-AE9C-52C4-3E5A-47B7BD79B92E}"/>
+              </a:ext>
+            </a:extLst>
+          </p:cNvPr>
+          <p:cNvCxnSpPr>
+            <a:stCxn id="4" idx="3"/>
+            <a:endCxn id="7" idx="1"/>
+          </p:cNvCxnSpPr>
+          <p:nvPr/>
+        </p:nvCxnSpPr>
+        <p:spPr>
+          <a:xfrm>
+            <a:off x="7318636" y="1567016"/>
+            <a:ext cx="1207590" cy="1773316"/>
+          </a:xfrm>
+          <a:prstGeom prst="bentConnector3">
+            <a:avLst/>
+          </a:prstGeom>
+          <a:ln w="38100">
+            <a:tailEnd type="triangle"/>
+          </a:ln>
+        </p:spPr>
+        <p:style>
+          <a:lnRef idx="1">
+            <a:schemeClr val="accent1"/>
+          </a:lnRef>
+          <a:fillRef idx="0">
+            <a:schemeClr val="accent1"/>
+          </a:fillRef>
+          <a:effectRef idx="0">
+            <a:schemeClr val="accent1"/>
+          </a:effectRef>
+          <a:fontRef idx="minor">
+            <a:schemeClr val="tx1"/>
+          </a:fontRef>
+        </p:style>
+      </p:cxnSp>
+      <p:cxnSp>
+        <p:nvCxnSpPr>
+          <p:cNvPr id="34" name="Connector: Elbow 33">
+            <a:extLst>
+              <a:ext uri="{FF2B5EF4-FFF2-40B4-BE49-F238E27FC236}">
+                <a16:creationId xmlns:a16="http://schemas.microsoft.com/office/drawing/2014/main" id="{E59845B9-D59A-AE45-3607-7044DD0E6312}"/>
+              </a:ext>
+            </a:extLst>
+          </p:cNvPr>
+          <p:cNvCxnSpPr>
+            <a:cxnSpLocks/>
+            <a:stCxn id="6" idx="3"/>
+            <a:endCxn id="7" idx="1"/>
+          </p:cNvCxnSpPr>
+          <p:nvPr/>
+        </p:nvCxnSpPr>
+        <p:spPr>
+          <a:xfrm flipV="1">
+            <a:off x="7318636" y="3340332"/>
+            <a:ext cx="1207590" cy="2071897"/>
+          </a:xfrm>
+          <a:prstGeom prst="bentConnector3">
+            <a:avLst/>
+          </a:prstGeom>
+          <a:ln w="38100">
+            <a:tailEnd type="triangle"/>
+          </a:ln>
+        </p:spPr>
+        <p:style>
+          <a:lnRef idx="1">
+            <a:schemeClr val="accent1"/>
+          </a:lnRef>
+          <a:fillRef idx="0">
+            <a:schemeClr val="accent1"/>
+          </a:fillRef>
+          <a:effectRef idx="0">
+            <a:schemeClr val="accent1"/>
+          </a:effectRef>
+          <a:fontRef idx="minor">
+            <a:schemeClr val="tx1"/>
+          </a:fontRef>
+        </p:style>
+      </p:cxnSp>
+      <p:cxnSp>
+        <p:nvCxnSpPr>
+          <p:cNvPr id="43" name="Connector: Elbow 42">
+            <a:extLst>
+              <a:ext uri="{FF2B5EF4-FFF2-40B4-BE49-F238E27FC236}">
+                <a16:creationId xmlns:a16="http://schemas.microsoft.com/office/drawing/2014/main" id="{70F3BBB0-CFF0-C6AB-1B19-F0D69C81AAD6}"/>
+              </a:ext>
+            </a:extLst>
+          </p:cNvPr>
+          <p:cNvCxnSpPr>
+            <a:stCxn id="13" idx="1"/>
+            <a:endCxn id="4" idx="1"/>
+          </p:cNvCxnSpPr>
+          <p:nvPr/>
+        </p:nvCxnSpPr>
+        <p:spPr>
+          <a:xfrm rot="10800000" flipH="1">
+            <a:off x="4502890" y="1567017"/>
+            <a:ext cx="638178" cy="1785783"/>
+          </a:xfrm>
+          <a:prstGeom prst="bentConnector3">
+            <a:avLst>
+              <a:gd name="adj1" fmla="val 43626"/>
+            </a:avLst>
+          </a:prstGeom>
+          <a:ln w="38100">
+            <a:tailEnd type="triangle"/>
+          </a:ln>
+        </p:spPr>
+        <p:style>
+          <a:lnRef idx="1">
+            <a:schemeClr val="accent1"/>
+          </a:lnRef>
+          <a:fillRef idx="0">
+            <a:schemeClr val="accent1"/>
+          </a:fillRef>
+          <a:effectRef idx="0">
+            <a:schemeClr val="accent1"/>
+          </a:effectRef>
+          <a:fontRef idx="minor">
+            <a:schemeClr val="tx1"/>
+          </a:fontRef>
+        </p:style>
+      </p:cxnSp>
+      <p:cxnSp>
+        <p:nvCxnSpPr>
+          <p:cNvPr id="46" name="Connector: Elbow 45">
+            <a:extLst>
+              <a:ext uri="{FF2B5EF4-FFF2-40B4-BE49-F238E27FC236}">
+                <a16:creationId xmlns:a16="http://schemas.microsoft.com/office/drawing/2014/main" id="{B1382C2A-E8B8-7973-5A0A-383760F324A4}"/>
+              </a:ext>
+            </a:extLst>
+          </p:cNvPr>
+          <p:cNvCxnSpPr>
+            <a:cxnSpLocks/>
+            <a:stCxn id="13" idx="1"/>
+            <a:endCxn id="6" idx="1"/>
+          </p:cNvCxnSpPr>
+          <p:nvPr/>
+        </p:nvCxnSpPr>
+        <p:spPr>
+          <a:xfrm rot="10800000" flipH="1" flipV="1">
+            <a:off x="4502889" y="3352799"/>
+            <a:ext cx="638179" cy="2059430"/>
+          </a:xfrm>
+          <a:prstGeom prst="bentConnector3">
+            <a:avLst>
+              <a:gd name="adj1" fmla="val 42133"/>
+            </a:avLst>
+          </a:prstGeom>
+          <a:ln w="38100">
+            <a:tailEnd type="triangle"/>
+          </a:ln>
+        </p:spPr>
+        <p:style>
+          <a:lnRef idx="1">
+            <a:schemeClr val="accent1"/>
+          </a:lnRef>
+          <a:fillRef idx="0">
+            <a:schemeClr val="accent1"/>
+          </a:fillRef>
+          <a:effectRef idx="0">
+            <a:schemeClr val="accent1"/>
+          </a:effectRef>
+          <a:fontRef idx="minor">
+            <a:schemeClr val="tx1"/>
+          </a:fontRef>
+        </p:style>
+      </p:cxnSp>
+      <p:sp>
+        <p:nvSpPr>
+          <p:cNvPr id="56" name="Rectangle 55">
+            <a:extLst>
+              <a:ext uri="{FF2B5EF4-FFF2-40B4-BE49-F238E27FC236}">
+                <a16:creationId xmlns:a16="http://schemas.microsoft.com/office/drawing/2014/main" id="{0A3272AD-A118-953E-B3A1-CE74B36F92A2}"/>
+              </a:ext>
+            </a:extLst>
+          </p:cNvPr>
+          <p:cNvSpPr/>
+          <p:nvPr/>
+        </p:nvSpPr>
+        <p:spPr>
+          <a:xfrm>
+            <a:off x="5408758" y="397633"/>
+            <a:ext cx="1642188" cy="597159"/>
+          </a:xfrm>
+          <a:prstGeom prst="rect">
+            <a:avLst/>
+          </a:prstGeom>
+        </p:spPr>
+        <p:style>
+          <a:lnRef idx="2">
+            <a:schemeClr val="accent2">
+              <a:shade val="15000"/>
+            </a:schemeClr>
+          </a:lnRef>
+          <a:fillRef idx="1">
+            <a:schemeClr val="accent2"/>
+          </a:fillRef>
+          <a:effectRef idx="0">
+            <a:schemeClr val="accent2"/>
+          </a:effectRef>
+          <a:fontRef idx="minor">
+            <a:schemeClr val="lt1"/>
+          </a:fontRef>
+        </p:style>
+        <p:txBody>
+          <a:bodyPr rtlCol="0" anchor="ctr"/>
+          <a:lstStyle/>
+          <a:p>
+            <a:pPr algn="ctr"/>
+            <a:r>
+              <a:rPr lang="en-US" dirty="0">
+                <a:ln w="0"/>
+                <a:solidFill>
+                  <a:schemeClr val="tx1"/>
+                </a:solidFill>
+                <a:effectLst>
+                  <a:outerShdw blurRad="38100" dist="19050" dir="2700000" algn="tl" rotWithShape="0">
+                    <a:schemeClr val="dk1">
+                      <a:alpha val="40000"/>
+                    </a:schemeClr>
+                  </a:outerShdw>
+                </a:effectLst>
+              </a:rPr>
+              <a:t>Extensive Measurements</a:t>
+            </a:r>
+            <a:endParaRPr lang="en-DE" dirty="0">
+              <a:ln w="0"/>
+              <a:solidFill>
+                <a:schemeClr val="tx1"/>
+              </a:solidFill>
+              <a:effectLst>
+                <a:outerShdw blurRad="38100" dist="19050" dir="2700000" algn="tl" rotWithShape="0">
+                  <a:schemeClr val="dk1">
+                    <a:alpha val="40000"/>
+                  </a:schemeClr>
+                </a:outerShdw>
+              </a:effectLst>
+            </a:endParaRPr>
+          </a:p>
+        </p:txBody>
+      </p:sp>
+      <p:sp>
+        <p:nvSpPr>
+          <p:cNvPr id="57" name="Rectangle 56">
+            <a:extLst>
+              <a:ext uri="{FF2B5EF4-FFF2-40B4-BE49-F238E27FC236}">
+                <a16:creationId xmlns:a16="http://schemas.microsoft.com/office/drawing/2014/main" id="{BB5AC9AE-4B3B-9154-06BA-44189C5A7313}"/>
+              </a:ext>
+            </a:extLst>
+          </p:cNvPr>
+          <p:cNvSpPr/>
+          <p:nvPr/>
+        </p:nvSpPr>
+        <p:spPr>
+          <a:xfrm>
+            <a:off x="5408758" y="2191473"/>
+            <a:ext cx="1642188" cy="597159"/>
+          </a:xfrm>
+          <a:prstGeom prst="rect">
+            <a:avLst/>
+          </a:prstGeom>
+        </p:spPr>
+        <p:style>
+          <a:lnRef idx="2">
+            <a:schemeClr val="accent2">
+              <a:shade val="15000"/>
+            </a:schemeClr>
+          </a:lnRef>
+          <a:fillRef idx="1">
+            <a:schemeClr val="accent2"/>
+          </a:fillRef>
+          <a:effectRef idx="0">
+            <a:schemeClr val="accent2"/>
+          </a:effectRef>
+          <a:fontRef idx="minor">
+            <a:schemeClr val="lt1"/>
+          </a:fontRef>
+        </p:style>
+        <p:txBody>
+          <a:bodyPr rtlCol="0" anchor="ctr"/>
+          <a:lstStyle/>
+          <a:p>
+            <a:pPr algn="ctr"/>
+            <a:r>
+              <a:rPr lang="en-US" dirty="0">
+                <a:ln w="0"/>
+                <a:solidFill>
+                  <a:schemeClr val="tx1"/>
+                </a:solidFill>
+                <a:effectLst>
+                  <a:outerShdw blurRad="38100" dist="19050" dir="2700000" algn="tl" rotWithShape="0">
+                    <a:schemeClr val="dk1">
+                      <a:alpha val="40000"/>
+                    </a:schemeClr>
+                  </a:outerShdw>
+                </a:effectLst>
+              </a:rPr>
+              <a:t>Accurate Modeling</a:t>
+            </a:r>
+            <a:endParaRPr lang="en-DE" dirty="0">
+              <a:ln w="0"/>
+              <a:solidFill>
+                <a:schemeClr val="tx1"/>
+              </a:solidFill>
+              <a:effectLst>
+                <a:outerShdw blurRad="38100" dist="19050" dir="2700000" algn="tl" rotWithShape="0">
+                  <a:schemeClr val="dk1">
+                    <a:alpha val="40000"/>
+                  </a:schemeClr>
+                </a:outerShdw>
+              </a:effectLst>
+            </a:endParaRPr>
+          </a:p>
+        </p:txBody>
+      </p:sp>
+      <p:sp>
+        <p:nvSpPr>
+          <p:cNvPr id="58" name="Rectangle 57">
+            <a:extLst>
+              <a:ext uri="{FF2B5EF4-FFF2-40B4-BE49-F238E27FC236}">
+                <a16:creationId xmlns:a16="http://schemas.microsoft.com/office/drawing/2014/main" id="{B0F4D502-85C0-F2B7-7C61-713250297A4F}"/>
+              </a:ext>
+            </a:extLst>
+          </p:cNvPr>
+          <p:cNvSpPr/>
+          <p:nvPr/>
+        </p:nvSpPr>
+        <p:spPr>
+          <a:xfrm>
+            <a:off x="5408758" y="4259703"/>
+            <a:ext cx="1642188" cy="597159"/>
+          </a:xfrm>
+          <a:prstGeom prst="rect">
+            <a:avLst/>
+          </a:prstGeom>
+        </p:spPr>
+        <p:style>
+          <a:lnRef idx="2">
+            <a:schemeClr val="accent2">
+              <a:shade val="15000"/>
+            </a:schemeClr>
+          </a:lnRef>
+          <a:fillRef idx="1">
+            <a:schemeClr val="accent2"/>
+          </a:fillRef>
+          <a:effectRef idx="0">
+            <a:schemeClr val="accent2"/>
+          </a:effectRef>
+          <a:fontRef idx="minor">
+            <a:schemeClr val="lt1"/>
+          </a:fontRef>
+        </p:style>
+        <p:txBody>
+          <a:bodyPr rtlCol="0" anchor="ctr"/>
+          <a:lstStyle/>
+          <a:p>
+            <a:pPr algn="ctr"/>
+            <a:r>
+              <a:rPr lang="en-US" dirty="0">
+                <a:ln w="0"/>
+                <a:solidFill>
+                  <a:schemeClr val="tx1"/>
+                </a:solidFill>
+                <a:effectLst>
+                  <a:outerShdw blurRad="38100" dist="19050" dir="2700000" algn="tl" rotWithShape="0">
+                    <a:schemeClr val="dk1">
+                      <a:alpha val="40000"/>
+                    </a:schemeClr>
+                  </a:outerShdw>
+                </a:effectLst>
+              </a:rPr>
+              <a:t>Training Data</a:t>
+            </a:r>
+            <a:endParaRPr lang="en-DE" dirty="0">
+              <a:ln w="0"/>
+              <a:solidFill>
+                <a:schemeClr val="tx1"/>
+              </a:solidFill>
+              <a:effectLst>
+                <a:outerShdw blurRad="38100" dist="19050" dir="2700000" algn="tl" rotWithShape="0">
+                  <a:schemeClr val="dk1">
+                    <a:alpha val="40000"/>
+                  </a:schemeClr>
+                </a:outerShdw>
+              </a:effectLst>
+            </a:endParaRPr>
+          </a:p>
+        </p:txBody>
+      </p:sp>
+      <p:sp>
+        <p:nvSpPr>
+          <p:cNvPr id="59" name="Rectangle 58">
+            <a:extLst>
+              <a:ext uri="{FF2B5EF4-FFF2-40B4-BE49-F238E27FC236}">
+                <a16:creationId xmlns:a16="http://schemas.microsoft.com/office/drawing/2014/main" id="{C80AD8C5-1A2B-A005-ACDA-0F60CE2E9156}"/>
+              </a:ext>
+            </a:extLst>
+          </p:cNvPr>
+          <p:cNvSpPr/>
+          <p:nvPr/>
+        </p:nvSpPr>
+        <p:spPr>
+          <a:xfrm>
+            <a:off x="5408759" y="5967595"/>
+            <a:ext cx="1642188" cy="597159"/>
+          </a:xfrm>
+          <a:prstGeom prst="rect">
+            <a:avLst/>
+          </a:prstGeom>
+        </p:spPr>
+        <p:style>
+          <a:lnRef idx="2">
+            <a:schemeClr val="accent2">
+              <a:shade val="15000"/>
+            </a:schemeClr>
+          </a:lnRef>
+          <a:fillRef idx="1">
+            <a:schemeClr val="accent2"/>
+          </a:fillRef>
+          <a:effectRef idx="0">
+            <a:schemeClr val="accent2"/>
+          </a:effectRef>
+          <a:fontRef idx="minor">
+            <a:schemeClr val="lt1"/>
+          </a:fontRef>
+        </p:style>
+        <p:txBody>
+          <a:bodyPr rtlCol="0" anchor="ctr"/>
+          <a:lstStyle/>
+          <a:p>
+            <a:pPr algn="ctr"/>
+            <a:r>
+              <a:rPr lang="en-US" dirty="0">
+                <a:ln w="0"/>
+                <a:solidFill>
+                  <a:schemeClr val="tx1"/>
+                </a:solidFill>
+                <a:effectLst>
+                  <a:outerShdw blurRad="38100" dist="19050" dir="2700000" algn="tl" rotWithShape="0">
+                    <a:schemeClr val="dk1">
+                      <a:alpha val="40000"/>
+                    </a:schemeClr>
+                  </a:outerShdw>
+                </a:effectLst>
+              </a:rPr>
+              <a:t>Training Time</a:t>
+            </a:r>
+            <a:endParaRPr lang="en-DE" dirty="0">
+              <a:ln w="0"/>
+              <a:solidFill>
+                <a:schemeClr val="tx1"/>
+              </a:solidFill>
+              <a:effectLst>
+                <a:outerShdw blurRad="38100" dist="19050" dir="2700000" algn="tl" rotWithShape="0">
+                  <a:schemeClr val="dk1">
+                    <a:alpha val="40000"/>
+                  </a:schemeClr>
+                </a:outerShdw>
+              </a:effectLst>
+            </a:endParaRPr>
+          </a:p>
+        </p:txBody>
+      </p:sp>
+      <p:cxnSp>
+        <p:nvCxnSpPr>
+          <p:cNvPr id="61" name="Straight Arrow Connector 60">
+            <a:extLst>
+              <a:ext uri="{FF2B5EF4-FFF2-40B4-BE49-F238E27FC236}">
+                <a16:creationId xmlns:a16="http://schemas.microsoft.com/office/drawing/2014/main" id="{0BE0F7FE-E9E6-804D-E3F9-524122A527B5}"/>
+              </a:ext>
+            </a:extLst>
+          </p:cNvPr>
+          <p:cNvCxnSpPr>
+            <a:stCxn id="56" idx="2"/>
+            <a:endCxn id="4" idx="0"/>
+          </p:cNvCxnSpPr>
+          <p:nvPr/>
+        </p:nvCxnSpPr>
+        <p:spPr>
+          <a:xfrm>
+            <a:off x="6229852" y="994792"/>
+            <a:ext cx="0" cy="273644"/>
+          </a:xfrm>
+          <a:prstGeom prst="straightConnector1">
+            <a:avLst/>
+          </a:prstGeom>
+          <a:ln>
+            <a:tailEnd type="triangle"/>
+          </a:ln>
+        </p:spPr>
+        <p:style>
+          <a:lnRef idx="1">
+            <a:schemeClr val="accent1"/>
+          </a:lnRef>
+          <a:fillRef idx="0">
+            <a:schemeClr val="accent1"/>
+          </a:fillRef>
+          <a:effectRef idx="0">
+            <a:schemeClr val="accent1"/>
+          </a:effectRef>
+          <a:fontRef idx="minor">
+            <a:schemeClr val="tx1"/>
+          </a:fontRef>
+        </p:style>
+      </p:cxnSp>
+      <p:cxnSp>
+        <p:nvCxnSpPr>
+          <p:cNvPr id="63" name="Straight Arrow Connector 62">
+            <a:extLst>
+              <a:ext uri="{FF2B5EF4-FFF2-40B4-BE49-F238E27FC236}">
+                <a16:creationId xmlns:a16="http://schemas.microsoft.com/office/drawing/2014/main" id="{E6E626CF-82DE-D8D8-AA33-95BBDDF2FB56}"/>
+              </a:ext>
+            </a:extLst>
+          </p:cNvPr>
+          <p:cNvCxnSpPr>
+            <a:stCxn id="57" idx="2"/>
+            <a:endCxn id="5" idx="0"/>
+          </p:cNvCxnSpPr>
+          <p:nvPr/>
+        </p:nvCxnSpPr>
+        <p:spPr>
+          <a:xfrm>
+            <a:off x="6229852" y="2788632"/>
+            <a:ext cx="0" cy="253121"/>
+          </a:xfrm>
+          <a:prstGeom prst="straightConnector1">
+            <a:avLst/>
+          </a:prstGeom>
+          <a:ln>
+            <a:tailEnd type="triangle"/>
+          </a:ln>
+        </p:spPr>
+        <p:style>
+          <a:lnRef idx="1">
+            <a:schemeClr val="accent1"/>
+          </a:lnRef>
+          <a:fillRef idx="0">
+            <a:schemeClr val="accent1"/>
+          </a:fillRef>
+          <a:effectRef idx="0">
+            <a:schemeClr val="accent1"/>
+          </a:effectRef>
+          <a:fontRef idx="minor">
+            <a:schemeClr val="tx1"/>
+          </a:fontRef>
+        </p:style>
+      </p:cxnSp>
+      <p:cxnSp>
+        <p:nvCxnSpPr>
+          <p:cNvPr id="67" name="Straight Arrow Connector 66">
+            <a:extLst>
+              <a:ext uri="{FF2B5EF4-FFF2-40B4-BE49-F238E27FC236}">
+                <a16:creationId xmlns:a16="http://schemas.microsoft.com/office/drawing/2014/main" id="{83149A6B-0570-E398-3608-311200C813B2}"/>
+              </a:ext>
+            </a:extLst>
+          </p:cNvPr>
+          <p:cNvCxnSpPr>
+            <a:stCxn id="58" idx="2"/>
+            <a:endCxn id="6" idx="0"/>
+          </p:cNvCxnSpPr>
+          <p:nvPr/>
+        </p:nvCxnSpPr>
+        <p:spPr>
+          <a:xfrm>
+            <a:off x="6229852" y="4856862"/>
+            <a:ext cx="1" cy="256787"/>
+          </a:xfrm>
+          <a:prstGeom prst="straightConnector1">
+            <a:avLst/>
+          </a:prstGeom>
+          <a:ln>
+            <a:tailEnd type="triangle"/>
+          </a:ln>
+        </p:spPr>
+        <p:style>
+          <a:lnRef idx="1">
+            <a:schemeClr val="accent1"/>
+          </a:lnRef>
+          <a:fillRef idx="0">
+            <a:schemeClr val="accent1"/>
+          </a:fillRef>
+          <a:effectRef idx="0">
+            <a:schemeClr val="accent1"/>
+          </a:effectRef>
+          <a:fontRef idx="minor">
+            <a:schemeClr val="tx1"/>
+          </a:fontRef>
+        </p:style>
+      </p:cxnSp>
+      <p:cxnSp>
+        <p:nvCxnSpPr>
+          <p:cNvPr id="69" name="Straight Arrow Connector 68">
+            <a:extLst>
+              <a:ext uri="{FF2B5EF4-FFF2-40B4-BE49-F238E27FC236}">
+                <a16:creationId xmlns:a16="http://schemas.microsoft.com/office/drawing/2014/main" id="{B0D78C9A-9EA0-DE4E-E4AF-2A1AD8E7072D}"/>
+              </a:ext>
+            </a:extLst>
+          </p:cNvPr>
+          <p:cNvCxnSpPr>
+            <a:stCxn id="59" idx="0"/>
+            <a:endCxn id="6" idx="2"/>
+          </p:cNvCxnSpPr>
+          <p:nvPr/>
+        </p:nvCxnSpPr>
+        <p:spPr>
+          <a:xfrm flipV="1">
+            <a:off x="6229853" y="5710808"/>
+            <a:ext cx="0" cy="256787"/>
+          </a:xfrm>
+          <a:prstGeom prst="straightConnector1">
+            <a:avLst/>
+          </a:prstGeom>
+          <a:ln>
+            <a:tailEnd type="triangle"/>
+          </a:ln>
+        </p:spPr>
+        <p:style>
+          <a:lnRef idx="1">
+            <a:schemeClr val="accent1"/>
+          </a:lnRef>
+          <a:fillRef idx="0">
+            <a:schemeClr val="accent1"/>
+          </a:fillRef>
+          <a:effectRef idx="0">
+            <a:schemeClr val="accent1"/>
+          </a:effectRef>
+          <a:fontRef idx="minor">
+            <a:schemeClr val="tx1"/>
+          </a:fontRef>
+        </p:style>
+      </p:cxnSp>
+    </p:spTree>
+    <p:extLst>
+      <p:ext uri="{BB962C8B-B14F-4D97-AF65-F5344CB8AC3E}">
+        <p14:creationId xmlns:p14="http://schemas.microsoft.com/office/powerpoint/2010/main" val="1954589247"/>
+      </p:ext>
+    </p:extLst>
+  </p:cSld>
+  <p:clrMapOvr>
+    <a:masterClrMapping/>
+  </p:clrMapOvr>
+</p:sld>
+</file>
+
+<file path=ppt/slides/slide18.xml><?xml version="1.0" encoding="utf-8"?>
+<p:sld xmlns:a="http://schemas.openxmlformats.org/drawingml/2006/main" xmlns:r="http://schemas.openxmlformats.org/officeDocument/2006/relationships" xmlns:p="http://schemas.openxmlformats.org/presentationml/2006/main">
+  <p:cSld>
+    <p:spTree>
+      <p:nvGrpSpPr>
+        <p:cNvPr id="1" name=""/>
+        <p:cNvGrpSpPr/>
+        <p:nvPr/>
+      </p:nvGrpSpPr>
+      <p:grpSpPr>
+        <a:xfrm>
+          <a:off x="0" y="0"/>
+          <a:ext cx="0" cy="0"/>
+          <a:chOff x="0" y="0"/>
+          <a:chExt cx="0" cy="0"/>
+        </a:xfrm>
+      </p:grpSpPr>
+      <p:grpSp>
+        <p:nvGrpSpPr>
+          <p:cNvPr id="30" name="Group 29">
+            <a:extLst>
+              <a:ext uri="{FF2B5EF4-FFF2-40B4-BE49-F238E27FC236}">
+                <a16:creationId xmlns:a16="http://schemas.microsoft.com/office/drawing/2014/main" id="{4BF041E5-9CBC-A163-3E13-8CBDD6FCDA7F}"/>
+              </a:ext>
+            </a:extLst>
+          </p:cNvPr>
+          <p:cNvGrpSpPr/>
+          <p:nvPr/>
+        </p:nvGrpSpPr>
+        <p:grpSpPr>
+          <a:xfrm>
+            <a:off x="2858882" y="1275080"/>
+            <a:ext cx="6148977" cy="5162550"/>
+            <a:chOff x="2917302" y="1276350"/>
+            <a:chExt cx="6148977" cy="5162550"/>
+          </a:xfrm>
+        </p:grpSpPr>
+        <p:pic>
+          <p:nvPicPr>
+            <p:cNvPr id="1026" name="Picture 2" descr="Welding Torch Icon 24599066 Vector Art at Vecteezy">
+              <a:extLst>
+                <a:ext uri="{FF2B5EF4-FFF2-40B4-BE49-F238E27FC236}">
+                  <a16:creationId xmlns:a16="http://schemas.microsoft.com/office/drawing/2014/main" id="{5B944A39-64F2-C343-7C46-03FE4E900870}"/>
+                </a:ext>
+              </a:extLst>
+            </p:cNvPr>
+            <p:cNvPicPr>
+              <a:picLocks noChangeAspect="1" noChangeArrowheads="1"/>
+            </p:cNvPicPr>
+            <p:nvPr/>
+          </p:nvPicPr>
+          <p:blipFill rotWithShape="1">
+            <a:blip r:embed="rId2">
+              <a:clrChange>
+                <a:clrFrom>
+                  <a:srgbClr val="FFFFFF"/>
+                </a:clrFrom>
+                <a:clrTo>
+                  <a:srgbClr val="FFFFFF">
+                    <a:alpha val="0"/>
+                  </a:srgbClr>
+                </a:clrTo>
+              </a:clrChange>
+              <a:extLst>
+                <a:ext uri="{28A0092B-C50C-407E-A947-70E740481C1C}">
+                  <a14:useLocalDpi xmlns:a14="http://schemas.microsoft.com/office/drawing/2010/main" val="0"/>
+                </a:ext>
+              </a:extLst>
+            </a:blip>
+            <a:srcRect l="18900" t="20092" r="36544" b="46398"/>
+            <a:stretch/>
+          </p:blipFill>
+          <p:spPr bwMode="auto">
+            <a:xfrm rot="14862826">
+              <a:off x="2674271" y="2566384"/>
+              <a:ext cx="1960689" cy="1474627"/>
+            </a:xfrm>
+            <a:prstGeom prst="rect">
+              <a:avLst/>
+            </a:prstGeom>
+            <a:noFill/>
+            <a:extLst>
+              <a:ext uri="{909E8E84-426E-40DD-AFC4-6F175D3DCCD1}">
+                <a14:hiddenFill xmlns:a14="http://schemas.microsoft.com/office/drawing/2010/main">
+                  <a:solidFill>
+                    <a:srgbClr val="FFFFFF"/>
+                  </a:solidFill>
+                </a14:hiddenFill>
+              </a:ext>
+            </a:extLst>
+          </p:spPr>
+        </p:pic>
+        <p:pic>
+          <p:nvPicPr>
+            <p:cNvPr id="1028" name="Picture 4" descr="Industry robot icons Royalty Free Vector Image">
+              <a:extLst>
+                <a:ext uri="{FF2B5EF4-FFF2-40B4-BE49-F238E27FC236}">
+                  <a16:creationId xmlns:a16="http://schemas.microsoft.com/office/drawing/2014/main" id="{D5944FC0-4E0C-0100-DC34-08F30A63AE7D}"/>
+                </a:ext>
+              </a:extLst>
+            </p:cNvPr>
+            <p:cNvPicPr>
+              <a:picLocks noChangeAspect="1" noChangeArrowheads="1"/>
+            </p:cNvPicPr>
+            <p:nvPr/>
+          </p:nvPicPr>
+          <p:blipFill rotWithShape="1">
+            <a:blip r:embed="rId3">
+              <a:clrChange>
+                <a:clrFrom>
+                  <a:srgbClr val="FFFFFF"/>
+                </a:clrFrom>
+                <a:clrTo>
+                  <a:srgbClr val="FFFFFF">
+                    <a:alpha val="0"/>
+                  </a:srgbClr>
+                </a:clrTo>
+              </a:clrChange>
+              <a:extLst>
+                <a:ext uri="{28A0092B-C50C-407E-A947-70E740481C1C}">
+                  <a14:useLocalDpi xmlns:a14="http://schemas.microsoft.com/office/drawing/2010/main" val="0"/>
+                </a:ext>
+              </a:extLst>
+            </a:blip>
+            <a:srcRect l="4100" t="8611" r="3949" b="16111"/>
+            <a:stretch/>
+          </p:blipFill>
+          <p:spPr bwMode="auto">
+            <a:xfrm>
+              <a:off x="3227454" y="1276350"/>
+              <a:ext cx="5838825" cy="5162550"/>
+            </a:xfrm>
+            <a:prstGeom prst="rect">
+              <a:avLst/>
+            </a:prstGeom>
+            <a:noFill/>
+            <a:extLst>
+              <a:ext uri="{909E8E84-426E-40DD-AFC4-6F175D3DCCD1}">
+                <a14:hiddenFill xmlns:a14="http://schemas.microsoft.com/office/drawing/2010/main">
+                  <a:solidFill>
+                    <a:srgbClr val="FFFFFF"/>
+                  </a:solidFill>
+                </a14:hiddenFill>
+              </a:ext>
+            </a:extLst>
+          </p:spPr>
+        </p:pic>
+        <p:grpSp>
+          <p:nvGrpSpPr>
+            <p:cNvPr id="29" name="Group 28">
+              <a:extLst>
+                <a:ext uri="{FF2B5EF4-FFF2-40B4-BE49-F238E27FC236}">
+                  <a16:creationId xmlns:a16="http://schemas.microsoft.com/office/drawing/2014/main" id="{534DAC88-E13F-C7FD-6078-E76853B279DB}"/>
+                </a:ext>
+              </a:extLst>
+            </p:cNvPr>
+            <p:cNvGrpSpPr/>
+            <p:nvPr/>
+          </p:nvGrpSpPr>
+          <p:grpSpPr>
+            <a:xfrm>
+              <a:off x="3416959" y="2466664"/>
+              <a:ext cx="385920" cy="412560"/>
+              <a:chOff x="3416959" y="2466664"/>
+              <a:chExt cx="385920" cy="412560"/>
+            </a:xfrm>
+          </p:grpSpPr>
+          <mc:AlternateContent xmlns:mc="http://schemas.openxmlformats.org/markup-compatibility/2006">
+            <mc:Choice xmlns:p14="http://schemas.microsoft.com/office/powerpoint/2010/main" Requires="p14">
+              <p:contentPart p14:bwMode="auto" r:id="rId4">
+                <p14:nvContentPartPr>
+                  <p14:cNvPr id="5" name="Ink 4">
+                    <a:extLst>
+                      <a:ext uri="{FF2B5EF4-FFF2-40B4-BE49-F238E27FC236}">
+                        <a16:creationId xmlns:a16="http://schemas.microsoft.com/office/drawing/2014/main" id="{82AFFDB6-1BD3-415C-025C-CE66ADA3A304}"/>
+                      </a:ext>
+                    </a:extLst>
+                  </p14:cNvPr>
+                  <p14:cNvContentPartPr/>
+                  <p14:nvPr/>
+                </p14:nvContentPartPr>
+                <p14:xfrm>
+                  <a:off x="3585799" y="2542984"/>
+                  <a:ext cx="360" cy="360"/>
+                </p14:xfrm>
+              </p:contentPart>
+            </mc:Choice>
+            <mc:Fallback>
+              <p:pic>
+                <p:nvPicPr>
+                  <p:cNvPr id="5" name="Ink 4">
+                    <a:extLst>
+                      <a:ext uri="{FF2B5EF4-FFF2-40B4-BE49-F238E27FC236}">
+                        <a16:creationId xmlns:a16="http://schemas.microsoft.com/office/drawing/2014/main" id="{82AFFDB6-1BD3-415C-025C-CE66ADA3A304}"/>
+                      </a:ext>
+                    </a:extLst>
+                  </p:cNvPr>
+                  <p:cNvPicPr/>
+                  <p:nvPr/>
+                </p:nvPicPr>
+                <p:blipFill>
+                  <a:blip r:embed="rId5"/>
+                  <a:stretch>
+                    <a:fillRect/>
+                  </a:stretch>
+                </p:blipFill>
+                <p:spPr>
+                  <a:xfrm>
+                    <a:off x="3523159" y="2479984"/>
+                    <a:ext cx="126000" cy="126000"/>
+                  </a:xfrm>
+                  <a:prstGeom prst="rect">
+                    <a:avLst/>
+                  </a:prstGeom>
+                </p:spPr>
+              </p:pic>
+            </mc:Fallback>
+          </mc:AlternateContent>
+          <mc:AlternateContent xmlns:mc="http://schemas.openxmlformats.org/markup-compatibility/2006">
+            <mc:Choice xmlns:p14="http://schemas.microsoft.com/office/powerpoint/2010/main" Requires="p14">
+              <p:contentPart p14:bwMode="auto" r:id="rId6">
+                <p14:nvContentPartPr>
+                  <p14:cNvPr id="6" name="Ink 5">
+                    <a:extLst>
+                      <a:ext uri="{FF2B5EF4-FFF2-40B4-BE49-F238E27FC236}">
+                        <a16:creationId xmlns:a16="http://schemas.microsoft.com/office/drawing/2014/main" id="{76C24CDF-45BF-AF4B-E70A-342B89FAC1B1}"/>
+                      </a:ext>
+                    </a:extLst>
+                  </p14:cNvPr>
+                  <p14:cNvContentPartPr/>
+                  <p14:nvPr/>
+                </p14:nvContentPartPr>
+                <p14:xfrm>
+                  <a:off x="3552679" y="2557384"/>
+                  <a:ext cx="360" cy="360"/>
+                </p14:xfrm>
+              </p:contentPart>
+            </mc:Choice>
+            <mc:Fallback>
+              <p:pic>
+                <p:nvPicPr>
+                  <p:cNvPr id="6" name="Ink 5">
+                    <a:extLst>
+                      <a:ext uri="{FF2B5EF4-FFF2-40B4-BE49-F238E27FC236}">
+                        <a16:creationId xmlns:a16="http://schemas.microsoft.com/office/drawing/2014/main" id="{76C24CDF-45BF-AF4B-E70A-342B89FAC1B1}"/>
+                      </a:ext>
+                    </a:extLst>
+                  </p:cNvPr>
+                  <p:cNvPicPr/>
+                  <p:nvPr/>
+                </p:nvPicPr>
+                <p:blipFill>
+                  <a:blip r:embed="rId5"/>
+                  <a:stretch>
+                    <a:fillRect/>
+                  </a:stretch>
+                </p:blipFill>
+                <p:spPr>
+                  <a:xfrm>
+                    <a:off x="3489679" y="2494384"/>
+                    <a:ext cx="126000" cy="126000"/>
+                  </a:xfrm>
+                  <a:prstGeom prst="rect">
+                    <a:avLst/>
+                  </a:prstGeom>
+                </p:spPr>
+              </p:pic>
+            </mc:Fallback>
+          </mc:AlternateContent>
+          <mc:AlternateContent xmlns:mc="http://schemas.openxmlformats.org/markup-compatibility/2006">
+            <mc:Choice xmlns:p14="http://schemas.microsoft.com/office/powerpoint/2010/main" Requires="p14">
+              <p:contentPart p14:bwMode="auto" r:id="rId7">
+                <p14:nvContentPartPr>
+                  <p14:cNvPr id="7" name="Ink 6">
+                    <a:extLst>
+                      <a:ext uri="{FF2B5EF4-FFF2-40B4-BE49-F238E27FC236}">
+                        <a16:creationId xmlns:a16="http://schemas.microsoft.com/office/drawing/2014/main" id="{B41D579C-B915-3830-73DA-205BD2209DC9}"/>
+                      </a:ext>
+                    </a:extLst>
+                  </p14:cNvPr>
+                  <p14:cNvContentPartPr/>
+                  <p14:nvPr/>
+                </p14:nvContentPartPr>
+                <p14:xfrm>
+                  <a:off x="3544039" y="2576464"/>
+                  <a:ext cx="1800" cy="360"/>
+                </p14:xfrm>
+              </p:contentPart>
+            </mc:Choice>
+            <mc:Fallback>
+              <p:pic>
+                <p:nvPicPr>
+                  <p:cNvPr id="7" name="Ink 6">
+                    <a:extLst>
+                      <a:ext uri="{FF2B5EF4-FFF2-40B4-BE49-F238E27FC236}">
+                        <a16:creationId xmlns:a16="http://schemas.microsoft.com/office/drawing/2014/main" id="{B41D579C-B915-3830-73DA-205BD2209DC9}"/>
+                      </a:ext>
+                    </a:extLst>
+                  </p:cNvPr>
+                  <p:cNvPicPr/>
+                  <p:nvPr/>
+                </p:nvPicPr>
+                <p:blipFill>
+                  <a:blip r:embed="rId8"/>
+                  <a:stretch>
+                    <a:fillRect/>
+                  </a:stretch>
+                </p:blipFill>
+                <p:spPr>
+                  <a:xfrm>
+                    <a:off x="3481399" y="2513464"/>
+                    <a:ext cx="127440" cy="126000"/>
+                  </a:xfrm>
+                  <a:prstGeom prst="rect">
+                    <a:avLst/>
+                  </a:prstGeom>
+                </p:spPr>
+              </p:pic>
+            </mc:Fallback>
+          </mc:AlternateContent>
+          <mc:AlternateContent xmlns:mc="http://schemas.openxmlformats.org/markup-compatibility/2006">
+            <mc:Choice xmlns:p14="http://schemas.microsoft.com/office/powerpoint/2010/main" Requires="p14">
+              <p:contentPart p14:bwMode="auto" r:id="rId9">
+                <p14:nvContentPartPr>
+                  <p14:cNvPr id="8" name="Ink 7">
+                    <a:extLst>
+                      <a:ext uri="{FF2B5EF4-FFF2-40B4-BE49-F238E27FC236}">
+                        <a16:creationId xmlns:a16="http://schemas.microsoft.com/office/drawing/2014/main" id="{2C165E50-66ED-B8E2-BEC4-EF441459200A}"/>
+                      </a:ext>
+                    </a:extLst>
+                  </p14:cNvPr>
+                  <p14:cNvContentPartPr/>
+                  <p14:nvPr/>
+                </p14:nvContentPartPr>
+                <p14:xfrm>
+                  <a:off x="3496519" y="2593024"/>
+                  <a:ext cx="1440" cy="2520"/>
+                </p14:xfrm>
+              </p:contentPart>
+            </mc:Choice>
+            <mc:Fallback>
+              <p:pic>
+                <p:nvPicPr>
+                  <p:cNvPr id="8" name="Ink 7">
+                    <a:extLst>
+                      <a:ext uri="{FF2B5EF4-FFF2-40B4-BE49-F238E27FC236}">
+                        <a16:creationId xmlns:a16="http://schemas.microsoft.com/office/drawing/2014/main" id="{2C165E50-66ED-B8E2-BEC4-EF441459200A}"/>
+                      </a:ext>
+                    </a:extLst>
+                  </p:cNvPr>
+                  <p:cNvPicPr/>
+                  <p:nvPr/>
+                </p:nvPicPr>
+                <p:blipFill>
+                  <a:blip r:embed="rId10"/>
+                  <a:stretch>
+                    <a:fillRect/>
+                  </a:stretch>
+                </p:blipFill>
+                <p:spPr>
+                  <a:xfrm>
+                    <a:off x="3433879" y="2530024"/>
+                    <a:ext cx="127080" cy="128160"/>
+                  </a:xfrm>
+                  <a:prstGeom prst="rect">
+                    <a:avLst/>
+                  </a:prstGeom>
+                </p:spPr>
+              </p:pic>
+            </mc:Fallback>
+          </mc:AlternateContent>
+          <mc:AlternateContent xmlns:mc="http://schemas.openxmlformats.org/markup-compatibility/2006">
+            <mc:Choice xmlns:p14="http://schemas.microsoft.com/office/powerpoint/2010/main" Requires="p14">
+              <p:contentPart p14:bwMode="auto" r:id="rId11">
+                <p14:nvContentPartPr>
+                  <p14:cNvPr id="9" name="Ink 8">
+                    <a:extLst>
+                      <a:ext uri="{FF2B5EF4-FFF2-40B4-BE49-F238E27FC236}">
+                        <a16:creationId xmlns:a16="http://schemas.microsoft.com/office/drawing/2014/main" id="{D393F2F1-17E0-8994-EF0A-B1F897395D36}"/>
+                      </a:ext>
+                    </a:extLst>
+                  </p14:cNvPr>
+                  <p14:cNvContentPartPr/>
+                  <p14:nvPr/>
+                </p14:nvContentPartPr>
+                <p14:xfrm>
+                  <a:off x="3416959" y="2659624"/>
+                  <a:ext cx="33840" cy="41040"/>
+                </p14:xfrm>
+              </p:contentPart>
+            </mc:Choice>
+            <mc:Fallback>
+              <p:pic>
+                <p:nvPicPr>
+                  <p:cNvPr id="9" name="Ink 8">
+                    <a:extLst>
+                      <a:ext uri="{FF2B5EF4-FFF2-40B4-BE49-F238E27FC236}">
+                        <a16:creationId xmlns:a16="http://schemas.microsoft.com/office/drawing/2014/main" id="{D393F2F1-17E0-8994-EF0A-B1F897395D36}"/>
+                      </a:ext>
+                    </a:extLst>
+                  </p:cNvPr>
+                  <p:cNvPicPr/>
+                  <p:nvPr/>
+                </p:nvPicPr>
+                <p:blipFill>
+                  <a:blip r:embed="rId12"/>
+                  <a:stretch>
+                    <a:fillRect/>
+                  </a:stretch>
+                </p:blipFill>
+                <p:spPr>
+                  <a:xfrm>
+                    <a:off x="3353959" y="2596984"/>
+                    <a:ext cx="159480" cy="166680"/>
+                  </a:xfrm>
+                  <a:prstGeom prst="rect">
+                    <a:avLst/>
+                  </a:prstGeom>
+                </p:spPr>
+              </p:pic>
+            </mc:Fallback>
+          </mc:AlternateContent>
+          <mc:AlternateContent xmlns:mc="http://schemas.openxmlformats.org/markup-compatibility/2006">
+            <mc:Choice xmlns:p14="http://schemas.microsoft.com/office/powerpoint/2010/main" Requires="p14">
+              <p:contentPart p14:bwMode="auto" r:id="rId13">
+                <p14:nvContentPartPr>
+                  <p14:cNvPr id="10" name="Ink 9">
+                    <a:extLst>
+                      <a:ext uri="{FF2B5EF4-FFF2-40B4-BE49-F238E27FC236}">
+                        <a16:creationId xmlns:a16="http://schemas.microsoft.com/office/drawing/2014/main" id="{1FB70C0A-9EA5-447B-25AD-75C1756CAF5A}"/>
+                      </a:ext>
+                    </a:extLst>
+                  </p14:cNvPr>
+                  <p14:cNvContentPartPr/>
+                  <p14:nvPr/>
+                </p14:nvContentPartPr>
+                <p14:xfrm>
+                  <a:off x="3421639" y="2771584"/>
+                  <a:ext cx="360" cy="360"/>
+                </p14:xfrm>
+              </p:contentPart>
+            </mc:Choice>
+            <mc:Fallback>
+              <p:pic>
+                <p:nvPicPr>
+                  <p:cNvPr id="10" name="Ink 9">
+                    <a:extLst>
+                      <a:ext uri="{FF2B5EF4-FFF2-40B4-BE49-F238E27FC236}">
+                        <a16:creationId xmlns:a16="http://schemas.microsoft.com/office/drawing/2014/main" id="{1FB70C0A-9EA5-447B-25AD-75C1756CAF5A}"/>
+                      </a:ext>
+                    </a:extLst>
+                  </p:cNvPr>
+                  <p:cNvPicPr/>
+                  <p:nvPr/>
+                </p:nvPicPr>
+                <p:blipFill>
+                  <a:blip r:embed="rId5"/>
+                  <a:stretch>
+                    <a:fillRect/>
+                  </a:stretch>
+                </p:blipFill>
+                <p:spPr>
+                  <a:xfrm>
+                    <a:off x="3358999" y="2708584"/>
+                    <a:ext cx="126000" cy="126000"/>
+                  </a:xfrm>
+                  <a:prstGeom prst="rect">
+                    <a:avLst/>
+                  </a:prstGeom>
+                </p:spPr>
+              </p:pic>
+            </mc:Fallback>
+          </mc:AlternateContent>
+          <mc:AlternateContent xmlns:mc="http://schemas.openxmlformats.org/markup-compatibility/2006">
+            <mc:Choice xmlns:p14="http://schemas.microsoft.com/office/powerpoint/2010/main" Requires="p14">
+              <p:contentPart p14:bwMode="auto" r:id="rId14">
+                <p14:nvContentPartPr>
+                  <p14:cNvPr id="11" name="Ink 10">
+                    <a:extLst>
+                      <a:ext uri="{FF2B5EF4-FFF2-40B4-BE49-F238E27FC236}">
+                        <a16:creationId xmlns:a16="http://schemas.microsoft.com/office/drawing/2014/main" id="{D49E2DA8-02DF-AC0A-5AA8-7533B0B65184}"/>
+                      </a:ext>
+                    </a:extLst>
+                  </p14:cNvPr>
+                  <p14:cNvContentPartPr/>
+                  <p14:nvPr/>
+                </p14:nvContentPartPr>
+                <p14:xfrm>
+                  <a:off x="3421639" y="2809744"/>
+                  <a:ext cx="360" cy="360"/>
+                </p14:xfrm>
+              </p:contentPart>
+            </mc:Choice>
+            <mc:Fallback>
+              <p:pic>
+                <p:nvPicPr>
+                  <p:cNvPr id="11" name="Ink 10">
+                    <a:extLst>
+                      <a:ext uri="{FF2B5EF4-FFF2-40B4-BE49-F238E27FC236}">
+                        <a16:creationId xmlns:a16="http://schemas.microsoft.com/office/drawing/2014/main" id="{D49E2DA8-02DF-AC0A-5AA8-7533B0B65184}"/>
+                      </a:ext>
+                    </a:extLst>
+                  </p:cNvPr>
+                  <p:cNvPicPr/>
+                  <p:nvPr/>
+                </p:nvPicPr>
+                <p:blipFill>
+                  <a:blip r:embed="rId5"/>
+                  <a:stretch>
+                    <a:fillRect/>
+                  </a:stretch>
+                </p:blipFill>
+                <p:spPr>
+                  <a:xfrm>
+                    <a:off x="3358999" y="2746744"/>
+                    <a:ext cx="126000" cy="126000"/>
+                  </a:xfrm>
+                  <a:prstGeom prst="rect">
+                    <a:avLst/>
+                  </a:prstGeom>
+                </p:spPr>
+              </p:pic>
+            </mc:Fallback>
+          </mc:AlternateContent>
+          <mc:AlternateContent xmlns:mc="http://schemas.openxmlformats.org/markup-compatibility/2006">
+            <mc:Choice xmlns:p14="http://schemas.microsoft.com/office/powerpoint/2010/main" Requires="p14">
+              <p:contentPart p14:bwMode="auto" r:id="rId15">
+                <p14:nvContentPartPr>
+                  <p14:cNvPr id="12" name="Ink 11">
+                    <a:extLst>
+                      <a:ext uri="{FF2B5EF4-FFF2-40B4-BE49-F238E27FC236}">
+                        <a16:creationId xmlns:a16="http://schemas.microsoft.com/office/drawing/2014/main" id="{D1B40964-782B-4575-4BDB-C69193E34DFD}"/>
+                      </a:ext>
+                    </a:extLst>
+                  </p14:cNvPr>
+                  <p14:cNvContentPartPr/>
+                  <p14:nvPr/>
+                </p14:nvContentPartPr>
+                <p14:xfrm>
+                  <a:off x="3421639" y="2828824"/>
+                  <a:ext cx="360" cy="360"/>
+                </p14:xfrm>
+              </p:contentPart>
+            </mc:Choice>
+            <mc:Fallback>
+              <p:pic>
+                <p:nvPicPr>
+                  <p:cNvPr id="12" name="Ink 11">
+                    <a:extLst>
+                      <a:ext uri="{FF2B5EF4-FFF2-40B4-BE49-F238E27FC236}">
+                        <a16:creationId xmlns:a16="http://schemas.microsoft.com/office/drawing/2014/main" id="{D1B40964-782B-4575-4BDB-C69193E34DFD}"/>
+                      </a:ext>
+                    </a:extLst>
+                  </p:cNvPr>
+                  <p:cNvPicPr/>
+                  <p:nvPr/>
+                </p:nvPicPr>
+                <p:blipFill>
+                  <a:blip r:embed="rId5"/>
+                  <a:stretch>
+                    <a:fillRect/>
+                  </a:stretch>
+                </p:blipFill>
+                <p:spPr>
+                  <a:xfrm>
+                    <a:off x="3358999" y="2765824"/>
+                    <a:ext cx="126000" cy="126000"/>
+                  </a:xfrm>
+                  <a:prstGeom prst="rect">
+                    <a:avLst/>
+                  </a:prstGeom>
+                </p:spPr>
+              </p:pic>
+            </mc:Fallback>
+          </mc:AlternateContent>
+          <mc:AlternateContent xmlns:mc="http://schemas.openxmlformats.org/markup-compatibility/2006">
+            <mc:Choice xmlns:p14="http://schemas.microsoft.com/office/powerpoint/2010/main" Requires="p14">
+              <p:contentPart p14:bwMode="auto" r:id="rId16">
+                <p14:nvContentPartPr>
+                  <p14:cNvPr id="14" name="Ink 13">
+                    <a:extLst>
+                      <a:ext uri="{FF2B5EF4-FFF2-40B4-BE49-F238E27FC236}">
+                        <a16:creationId xmlns:a16="http://schemas.microsoft.com/office/drawing/2014/main" id="{E5BD8EC1-18CC-85DE-E54D-91D87C06D0CD}"/>
+                      </a:ext>
+                    </a:extLst>
+                  </p14:cNvPr>
+                  <p14:cNvContentPartPr/>
+                  <p14:nvPr/>
+                </p14:nvContentPartPr>
+                <p14:xfrm>
+                  <a:off x="3502639" y="2878864"/>
+                  <a:ext cx="360" cy="360"/>
+                </p14:xfrm>
+              </p:contentPart>
+            </mc:Choice>
+            <mc:Fallback>
+              <p:pic>
+                <p:nvPicPr>
+                  <p:cNvPr id="14" name="Ink 13">
+                    <a:extLst>
+                      <a:ext uri="{FF2B5EF4-FFF2-40B4-BE49-F238E27FC236}">
+                        <a16:creationId xmlns:a16="http://schemas.microsoft.com/office/drawing/2014/main" id="{E5BD8EC1-18CC-85DE-E54D-91D87C06D0CD}"/>
+                      </a:ext>
+                    </a:extLst>
+                  </p:cNvPr>
+                  <p:cNvPicPr/>
+                  <p:nvPr/>
+                </p:nvPicPr>
+                <p:blipFill>
+                  <a:blip r:embed="rId5"/>
+                  <a:stretch>
+                    <a:fillRect/>
+                  </a:stretch>
+                </p:blipFill>
+                <p:spPr>
+                  <a:xfrm>
+                    <a:off x="3439639" y="2815864"/>
+                    <a:ext cx="126000" cy="126000"/>
+                  </a:xfrm>
+                  <a:prstGeom prst="rect">
+                    <a:avLst/>
+                  </a:prstGeom>
+                </p:spPr>
+              </p:pic>
+            </mc:Fallback>
+          </mc:AlternateContent>
+          <mc:AlternateContent xmlns:mc="http://schemas.openxmlformats.org/markup-compatibility/2006">
+            <mc:Choice xmlns:p14="http://schemas.microsoft.com/office/powerpoint/2010/main" Requires="p14">
+              <p:contentPart p14:bwMode="auto" r:id="rId17">
+                <p14:nvContentPartPr>
+                  <p14:cNvPr id="15" name="Ink 14">
+                    <a:extLst>
+                      <a:ext uri="{FF2B5EF4-FFF2-40B4-BE49-F238E27FC236}">
+                        <a16:creationId xmlns:a16="http://schemas.microsoft.com/office/drawing/2014/main" id="{8C529FF3-9F31-2423-B2B0-FCC700264AA5}"/>
+                      </a:ext>
+                    </a:extLst>
+                  </p14:cNvPr>
+                  <p14:cNvContentPartPr/>
+                  <p14:nvPr/>
+                </p14:nvContentPartPr>
+                <p14:xfrm>
+                  <a:off x="3562039" y="2878864"/>
+                  <a:ext cx="360" cy="360"/>
+                </p14:xfrm>
+              </p:contentPart>
+            </mc:Choice>
+            <mc:Fallback>
+              <p:pic>
+                <p:nvPicPr>
+                  <p:cNvPr id="15" name="Ink 14">
+                    <a:extLst>
+                      <a:ext uri="{FF2B5EF4-FFF2-40B4-BE49-F238E27FC236}">
+                        <a16:creationId xmlns:a16="http://schemas.microsoft.com/office/drawing/2014/main" id="{8C529FF3-9F31-2423-B2B0-FCC700264AA5}"/>
+                      </a:ext>
+                    </a:extLst>
+                  </p:cNvPr>
+                  <p:cNvPicPr/>
+                  <p:nvPr/>
+                </p:nvPicPr>
+                <p:blipFill>
+                  <a:blip r:embed="rId5"/>
+                  <a:stretch>
+                    <a:fillRect/>
+                  </a:stretch>
+                </p:blipFill>
+                <p:spPr>
+                  <a:xfrm>
+                    <a:off x="3499399" y="2815864"/>
+                    <a:ext cx="126000" cy="126000"/>
+                  </a:xfrm>
+                  <a:prstGeom prst="rect">
+                    <a:avLst/>
+                  </a:prstGeom>
+                </p:spPr>
+              </p:pic>
+            </mc:Fallback>
+          </mc:AlternateContent>
+          <mc:AlternateContent xmlns:mc="http://schemas.openxmlformats.org/markup-compatibility/2006">
+            <mc:Choice xmlns:p14="http://schemas.microsoft.com/office/powerpoint/2010/main" Requires="p14">
+              <p:contentPart p14:bwMode="auto" r:id="rId18">
+                <p14:nvContentPartPr>
+                  <p14:cNvPr id="16" name="Ink 15">
+                    <a:extLst>
+                      <a:ext uri="{FF2B5EF4-FFF2-40B4-BE49-F238E27FC236}">
+                        <a16:creationId xmlns:a16="http://schemas.microsoft.com/office/drawing/2014/main" id="{04ABAB88-E52B-CB6F-DD05-502D5B5BBCA1}"/>
+                      </a:ext>
+                    </a:extLst>
+                  </p14:cNvPr>
+                  <p14:cNvContentPartPr/>
+                  <p14:nvPr/>
+                </p14:nvContentPartPr>
+                <p14:xfrm>
+                  <a:off x="3609919" y="2864464"/>
+                  <a:ext cx="360" cy="360"/>
+                </p14:xfrm>
+              </p:contentPart>
+            </mc:Choice>
+            <mc:Fallback>
+              <p:pic>
+                <p:nvPicPr>
+                  <p:cNvPr id="16" name="Ink 15">
+                    <a:extLst>
+                      <a:ext uri="{FF2B5EF4-FFF2-40B4-BE49-F238E27FC236}">
+                        <a16:creationId xmlns:a16="http://schemas.microsoft.com/office/drawing/2014/main" id="{04ABAB88-E52B-CB6F-DD05-502D5B5BBCA1}"/>
+                      </a:ext>
+                    </a:extLst>
+                  </p:cNvPr>
+                  <p:cNvPicPr/>
+                  <p:nvPr/>
+                </p:nvPicPr>
+                <p:blipFill>
+                  <a:blip r:embed="rId5"/>
+                  <a:stretch>
+                    <a:fillRect/>
+                  </a:stretch>
+                </p:blipFill>
+                <p:spPr>
+                  <a:xfrm>
+                    <a:off x="3546919" y="2801464"/>
+                    <a:ext cx="126000" cy="126000"/>
+                  </a:xfrm>
+                  <a:prstGeom prst="rect">
+                    <a:avLst/>
+                  </a:prstGeom>
+                </p:spPr>
+              </p:pic>
+            </mc:Fallback>
+          </mc:AlternateContent>
+          <mc:AlternateContent xmlns:mc="http://schemas.openxmlformats.org/markup-compatibility/2006">
+            <mc:Choice xmlns:p14="http://schemas.microsoft.com/office/powerpoint/2010/main" Requires="p14">
+              <p:contentPart p14:bwMode="auto" r:id="rId19">
+                <p14:nvContentPartPr>
+                  <p14:cNvPr id="17" name="Ink 16">
+                    <a:extLst>
+                      <a:ext uri="{FF2B5EF4-FFF2-40B4-BE49-F238E27FC236}">
+                        <a16:creationId xmlns:a16="http://schemas.microsoft.com/office/drawing/2014/main" id="{C0FC77F2-F577-18B4-A783-C02B7C7B6575}"/>
+                      </a:ext>
+                    </a:extLst>
+                  </p14:cNvPr>
+                  <p14:cNvContentPartPr/>
+                  <p14:nvPr/>
+                </p14:nvContentPartPr>
+                <p14:xfrm>
+                  <a:off x="3645559" y="2838184"/>
+                  <a:ext cx="360" cy="360"/>
+                </p14:xfrm>
+              </p:contentPart>
+            </mc:Choice>
+            <mc:Fallback>
+              <p:pic>
+                <p:nvPicPr>
+                  <p:cNvPr id="17" name="Ink 16">
+                    <a:extLst>
+                      <a:ext uri="{FF2B5EF4-FFF2-40B4-BE49-F238E27FC236}">
+                        <a16:creationId xmlns:a16="http://schemas.microsoft.com/office/drawing/2014/main" id="{C0FC77F2-F577-18B4-A783-C02B7C7B6575}"/>
+                      </a:ext>
+                    </a:extLst>
+                  </p:cNvPr>
+                  <p:cNvPicPr/>
+                  <p:nvPr/>
+                </p:nvPicPr>
+                <p:blipFill>
+                  <a:blip r:embed="rId5"/>
+                  <a:stretch>
+                    <a:fillRect/>
+                  </a:stretch>
+                </p:blipFill>
+                <p:spPr>
+                  <a:xfrm>
+                    <a:off x="3582559" y="2775544"/>
+                    <a:ext cx="126000" cy="126000"/>
+                  </a:xfrm>
+                  <a:prstGeom prst="rect">
+                    <a:avLst/>
+                  </a:prstGeom>
+                </p:spPr>
+              </p:pic>
+            </mc:Fallback>
+          </mc:AlternateContent>
+          <mc:AlternateContent xmlns:mc="http://schemas.openxmlformats.org/markup-compatibility/2006">
+            <mc:Choice xmlns:p14="http://schemas.microsoft.com/office/powerpoint/2010/main" Requires="p14">
+              <p:contentPart p14:bwMode="auto" r:id="rId20">
+                <p14:nvContentPartPr>
+                  <p14:cNvPr id="18" name="Ink 17">
+                    <a:extLst>
+                      <a:ext uri="{FF2B5EF4-FFF2-40B4-BE49-F238E27FC236}">
+                        <a16:creationId xmlns:a16="http://schemas.microsoft.com/office/drawing/2014/main" id="{F45637C1-3A12-56B1-FB83-D60DBE9B6994}"/>
+                      </a:ext>
+                    </a:extLst>
+                  </p14:cNvPr>
+                  <p14:cNvContentPartPr/>
+                  <p14:nvPr/>
+                </p14:nvContentPartPr>
+                <p14:xfrm>
+                  <a:off x="3728719" y="2776264"/>
+                  <a:ext cx="360" cy="360"/>
+                </p14:xfrm>
+              </p:contentPart>
+            </mc:Choice>
+            <mc:Fallback>
+              <p:pic>
+                <p:nvPicPr>
+                  <p:cNvPr id="18" name="Ink 17">
+                    <a:extLst>
+                      <a:ext uri="{FF2B5EF4-FFF2-40B4-BE49-F238E27FC236}">
+                        <a16:creationId xmlns:a16="http://schemas.microsoft.com/office/drawing/2014/main" id="{F45637C1-3A12-56B1-FB83-D60DBE9B6994}"/>
+                      </a:ext>
+                    </a:extLst>
+                  </p:cNvPr>
+                  <p:cNvPicPr/>
+                  <p:nvPr/>
+                </p:nvPicPr>
+                <p:blipFill>
+                  <a:blip r:embed="rId5"/>
+                  <a:stretch>
+                    <a:fillRect/>
+                  </a:stretch>
+                </p:blipFill>
+                <p:spPr>
+                  <a:xfrm>
+                    <a:off x="3666079" y="2713624"/>
+                    <a:ext cx="126000" cy="126000"/>
+                  </a:xfrm>
+                  <a:prstGeom prst="rect">
+                    <a:avLst/>
+                  </a:prstGeom>
+                </p:spPr>
+              </p:pic>
+            </mc:Fallback>
+          </mc:AlternateContent>
+          <mc:AlternateContent xmlns:mc="http://schemas.openxmlformats.org/markup-compatibility/2006">
+            <mc:Choice xmlns:p14="http://schemas.microsoft.com/office/powerpoint/2010/main" Requires="p14">
+              <p:contentPart p14:bwMode="auto" r:id="rId21">
+                <p14:nvContentPartPr>
+                  <p14:cNvPr id="19" name="Ink 18">
+                    <a:extLst>
+                      <a:ext uri="{FF2B5EF4-FFF2-40B4-BE49-F238E27FC236}">
+                        <a16:creationId xmlns:a16="http://schemas.microsoft.com/office/drawing/2014/main" id="{5D2807B8-6466-A5A4-DF02-B264559FD247}"/>
+                      </a:ext>
+                    </a:extLst>
+                  </p14:cNvPr>
+                  <p14:cNvContentPartPr/>
+                  <p14:nvPr/>
+                </p14:nvContentPartPr>
+                <p14:xfrm>
+                  <a:off x="3747799" y="2737744"/>
+                  <a:ext cx="360" cy="720"/>
+                </p14:xfrm>
+              </p:contentPart>
+            </mc:Choice>
+            <mc:Fallback>
+              <p:pic>
+                <p:nvPicPr>
+                  <p:cNvPr id="19" name="Ink 18">
+                    <a:extLst>
+                      <a:ext uri="{FF2B5EF4-FFF2-40B4-BE49-F238E27FC236}">
+                        <a16:creationId xmlns:a16="http://schemas.microsoft.com/office/drawing/2014/main" id="{5D2807B8-6466-A5A4-DF02-B264559FD247}"/>
+                      </a:ext>
+                    </a:extLst>
+                  </p:cNvPr>
+                  <p:cNvPicPr/>
+                  <p:nvPr/>
+                </p:nvPicPr>
+                <p:blipFill>
+                  <a:blip r:embed="rId22"/>
+                  <a:stretch>
+                    <a:fillRect/>
+                  </a:stretch>
+                </p:blipFill>
+                <p:spPr>
+                  <a:xfrm>
+                    <a:off x="3685159" y="2675104"/>
+                    <a:ext cx="126000" cy="126360"/>
+                  </a:xfrm>
+                  <a:prstGeom prst="rect">
+                    <a:avLst/>
+                  </a:prstGeom>
+                </p:spPr>
+              </p:pic>
+            </mc:Fallback>
+          </mc:AlternateContent>
+          <mc:AlternateContent xmlns:mc="http://schemas.openxmlformats.org/markup-compatibility/2006">
+            <mc:Choice xmlns:p14="http://schemas.microsoft.com/office/powerpoint/2010/main" Requires="p14">
+              <p:contentPart p14:bwMode="auto" r:id="rId23">
+                <p14:nvContentPartPr>
+                  <p14:cNvPr id="20" name="Ink 19">
+                    <a:extLst>
+                      <a:ext uri="{FF2B5EF4-FFF2-40B4-BE49-F238E27FC236}">
+                        <a16:creationId xmlns:a16="http://schemas.microsoft.com/office/drawing/2014/main" id="{A5E15E86-662F-3444-8C99-ADBCB28286BC}"/>
+                      </a:ext>
+                    </a:extLst>
+                  </p14:cNvPr>
+                  <p14:cNvContentPartPr/>
+                  <p14:nvPr/>
+                </p14:nvContentPartPr>
+                <p14:xfrm>
+                  <a:off x="3769399" y="2698864"/>
+                  <a:ext cx="720" cy="1440"/>
+                </p14:xfrm>
+              </p:contentPart>
+            </mc:Choice>
+            <mc:Fallback>
+              <p:pic>
+                <p:nvPicPr>
+                  <p:cNvPr id="20" name="Ink 19">
+                    <a:extLst>
+                      <a:ext uri="{FF2B5EF4-FFF2-40B4-BE49-F238E27FC236}">
+                        <a16:creationId xmlns:a16="http://schemas.microsoft.com/office/drawing/2014/main" id="{A5E15E86-662F-3444-8C99-ADBCB28286BC}"/>
+                      </a:ext>
+                    </a:extLst>
+                  </p:cNvPr>
+                  <p:cNvPicPr/>
+                  <p:nvPr/>
+                </p:nvPicPr>
+                <p:blipFill>
+                  <a:blip r:embed="rId24"/>
+                  <a:stretch>
+                    <a:fillRect/>
+                  </a:stretch>
+                </p:blipFill>
+                <p:spPr>
+                  <a:xfrm>
+                    <a:off x="3706399" y="2636224"/>
+                    <a:ext cx="126360" cy="127080"/>
+                  </a:xfrm>
+                  <a:prstGeom prst="rect">
+                    <a:avLst/>
+                  </a:prstGeom>
+                </p:spPr>
+              </p:pic>
+            </mc:Fallback>
+          </mc:AlternateContent>
+          <mc:AlternateContent xmlns:mc="http://schemas.openxmlformats.org/markup-compatibility/2006">
+            <mc:Choice xmlns:p14="http://schemas.microsoft.com/office/powerpoint/2010/main" Requires="p14">
+              <p:contentPart p14:bwMode="auto" r:id="rId25">
+                <p14:nvContentPartPr>
+                  <p14:cNvPr id="21" name="Ink 20">
+                    <a:extLst>
+                      <a:ext uri="{FF2B5EF4-FFF2-40B4-BE49-F238E27FC236}">
+                        <a16:creationId xmlns:a16="http://schemas.microsoft.com/office/drawing/2014/main" id="{3FDB1D8C-AD45-11FA-5BA5-CFAB2DA8C37E}"/>
+                      </a:ext>
+                    </a:extLst>
+                  </p14:cNvPr>
+                  <p14:cNvContentPartPr/>
+                  <p14:nvPr/>
+                </p14:nvContentPartPr>
+                <p14:xfrm>
+                  <a:off x="3800359" y="2613184"/>
+                  <a:ext cx="2520" cy="34920"/>
+                </p14:xfrm>
+              </p:contentPart>
+            </mc:Choice>
+            <mc:Fallback>
+              <p:pic>
+                <p:nvPicPr>
+                  <p:cNvPr id="21" name="Ink 20">
+                    <a:extLst>
+                      <a:ext uri="{FF2B5EF4-FFF2-40B4-BE49-F238E27FC236}">
+                        <a16:creationId xmlns:a16="http://schemas.microsoft.com/office/drawing/2014/main" id="{3FDB1D8C-AD45-11FA-5BA5-CFAB2DA8C37E}"/>
+                      </a:ext>
+                    </a:extLst>
+                  </p:cNvPr>
+                  <p:cNvPicPr/>
+                  <p:nvPr/>
+                </p:nvPicPr>
+                <p:blipFill>
+                  <a:blip r:embed="rId26"/>
+                  <a:stretch>
+                    <a:fillRect/>
+                  </a:stretch>
+                </p:blipFill>
+                <p:spPr>
+                  <a:xfrm>
+                    <a:off x="3737719" y="2550184"/>
+                    <a:ext cx="128160" cy="160560"/>
+                  </a:xfrm>
+                  <a:prstGeom prst="rect">
+                    <a:avLst/>
+                  </a:prstGeom>
+                </p:spPr>
+              </p:pic>
+            </mc:Fallback>
+          </mc:AlternateContent>
+          <mc:AlternateContent xmlns:mc="http://schemas.openxmlformats.org/markup-compatibility/2006">
+            <mc:Choice xmlns:p14="http://schemas.microsoft.com/office/powerpoint/2010/main" Requires="p14">
+              <p:contentPart p14:bwMode="auto" r:id="rId27">
+                <p14:nvContentPartPr>
+                  <p14:cNvPr id="22" name="Ink 21">
+                    <a:extLst>
+                      <a:ext uri="{FF2B5EF4-FFF2-40B4-BE49-F238E27FC236}">
+                        <a16:creationId xmlns:a16="http://schemas.microsoft.com/office/drawing/2014/main" id="{F0403F9D-6432-6FDC-B205-C885A4931110}"/>
+                      </a:ext>
+                    </a:extLst>
+                  </p14:cNvPr>
+                  <p14:cNvContentPartPr/>
+                  <p14:nvPr/>
+                </p14:nvContentPartPr>
+                <p14:xfrm>
+                  <a:off x="3697399" y="2569264"/>
+                  <a:ext cx="720" cy="360"/>
+                </p14:xfrm>
+              </p:contentPart>
+            </mc:Choice>
+            <mc:Fallback>
+              <p:pic>
+                <p:nvPicPr>
+                  <p:cNvPr id="22" name="Ink 21">
+                    <a:extLst>
+                      <a:ext uri="{FF2B5EF4-FFF2-40B4-BE49-F238E27FC236}">
+                        <a16:creationId xmlns:a16="http://schemas.microsoft.com/office/drawing/2014/main" id="{F0403F9D-6432-6FDC-B205-C885A4931110}"/>
+                      </a:ext>
+                    </a:extLst>
+                  </p:cNvPr>
+                  <p:cNvPicPr/>
+                  <p:nvPr/>
+                </p:nvPicPr>
+                <p:blipFill>
+                  <a:blip r:embed="rId28"/>
+                  <a:stretch>
+                    <a:fillRect/>
+                  </a:stretch>
+                </p:blipFill>
+                <p:spPr>
+                  <a:xfrm>
+                    <a:off x="3634759" y="2506264"/>
+                    <a:ext cx="126360" cy="126000"/>
+                  </a:xfrm>
+                  <a:prstGeom prst="rect">
+                    <a:avLst/>
+                  </a:prstGeom>
+                </p:spPr>
+              </p:pic>
+            </mc:Fallback>
+          </mc:AlternateContent>
+          <mc:AlternateContent xmlns:mc="http://schemas.openxmlformats.org/markup-compatibility/2006">
+            <mc:Choice xmlns:p14="http://schemas.microsoft.com/office/powerpoint/2010/main" Requires="p14">
+              <p:contentPart p14:bwMode="auto" r:id="rId29">
+                <p14:nvContentPartPr>
+                  <p14:cNvPr id="23" name="Ink 22">
+                    <a:extLst>
+                      <a:ext uri="{FF2B5EF4-FFF2-40B4-BE49-F238E27FC236}">
+                        <a16:creationId xmlns:a16="http://schemas.microsoft.com/office/drawing/2014/main" id="{002A4578-8FD9-FE2F-9468-05EB72317905}"/>
+                      </a:ext>
+                    </a:extLst>
+                  </p14:cNvPr>
+                  <p14:cNvContentPartPr/>
+                  <p14:nvPr/>
+                </p14:nvContentPartPr>
+                <p14:xfrm>
+                  <a:off x="3633319" y="2526424"/>
+                  <a:ext cx="7560" cy="2520"/>
+                </p14:xfrm>
+              </p:contentPart>
+            </mc:Choice>
+            <mc:Fallback>
+              <p:pic>
+                <p:nvPicPr>
+                  <p:cNvPr id="23" name="Ink 22">
+                    <a:extLst>
+                      <a:ext uri="{FF2B5EF4-FFF2-40B4-BE49-F238E27FC236}">
+                        <a16:creationId xmlns:a16="http://schemas.microsoft.com/office/drawing/2014/main" id="{002A4578-8FD9-FE2F-9468-05EB72317905}"/>
+                      </a:ext>
+                    </a:extLst>
+                  </p:cNvPr>
+                  <p:cNvPicPr/>
+                  <p:nvPr/>
+                </p:nvPicPr>
+                <p:blipFill>
+                  <a:blip r:embed="rId30"/>
+                  <a:stretch>
+                    <a:fillRect/>
+                  </a:stretch>
+                </p:blipFill>
+                <p:spPr>
+                  <a:xfrm>
+                    <a:off x="3570679" y="2463424"/>
+                    <a:ext cx="133200" cy="128160"/>
+                  </a:xfrm>
+                  <a:prstGeom prst="rect">
+                    <a:avLst/>
+                  </a:prstGeom>
+                </p:spPr>
+              </p:pic>
+            </mc:Fallback>
+          </mc:AlternateContent>
+          <mc:AlternateContent xmlns:mc="http://schemas.openxmlformats.org/markup-compatibility/2006">
+            <mc:Choice xmlns:p14="http://schemas.microsoft.com/office/powerpoint/2010/main" Requires="p14">
+              <p:contentPart p14:bwMode="auto" r:id="rId31">
+                <p14:nvContentPartPr>
+                  <p14:cNvPr id="24" name="Ink 23">
+                    <a:extLst>
+                      <a:ext uri="{FF2B5EF4-FFF2-40B4-BE49-F238E27FC236}">
+                        <a16:creationId xmlns:a16="http://schemas.microsoft.com/office/drawing/2014/main" id="{5CBA1788-D147-F615-F917-9CF99A60018A}"/>
+                      </a:ext>
+                    </a:extLst>
+                  </p14:cNvPr>
+                  <p14:cNvContentPartPr/>
+                  <p14:nvPr/>
+                </p14:nvContentPartPr>
+                <p14:xfrm>
+                  <a:off x="3588319" y="2466664"/>
+                  <a:ext cx="360" cy="360"/>
+                </p14:xfrm>
+              </p:contentPart>
+            </mc:Choice>
+            <mc:Fallback>
+              <p:pic>
+                <p:nvPicPr>
+                  <p:cNvPr id="24" name="Ink 23">
+                    <a:extLst>
+                      <a:ext uri="{FF2B5EF4-FFF2-40B4-BE49-F238E27FC236}">
+                        <a16:creationId xmlns:a16="http://schemas.microsoft.com/office/drawing/2014/main" id="{5CBA1788-D147-F615-F917-9CF99A60018A}"/>
+                      </a:ext>
+                    </a:extLst>
+                  </p:cNvPr>
+                  <p:cNvPicPr/>
+                  <p:nvPr/>
+                </p:nvPicPr>
+                <p:blipFill>
+                  <a:blip r:embed="rId5"/>
+                  <a:stretch>
+                    <a:fillRect/>
+                  </a:stretch>
+                </p:blipFill>
+                <p:spPr>
+                  <a:xfrm>
+                    <a:off x="3525679" y="2404024"/>
+                    <a:ext cx="126000" cy="126000"/>
+                  </a:xfrm>
+                  <a:prstGeom prst="rect">
+                    <a:avLst/>
+                  </a:prstGeom>
+                </p:spPr>
+              </p:pic>
+            </mc:Fallback>
+          </mc:AlternateContent>
+          <mc:AlternateContent xmlns:mc="http://schemas.openxmlformats.org/markup-compatibility/2006">
+            <mc:Choice xmlns:p14="http://schemas.microsoft.com/office/powerpoint/2010/main" Requires="p14">
+              <p:contentPart p14:bwMode="auto" r:id="rId32">
+                <p14:nvContentPartPr>
+                  <p14:cNvPr id="25" name="Ink 24">
+                    <a:extLst>
+                      <a:ext uri="{FF2B5EF4-FFF2-40B4-BE49-F238E27FC236}">
+                        <a16:creationId xmlns:a16="http://schemas.microsoft.com/office/drawing/2014/main" id="{5AD90799-617F-2C0B-D96A-114D6AF894B4}"/>
+                      </a:ext>
+                    </a:extLst>
+                  </p14:cNvPr>
+                  <p14:cNvContentPartPr/>
+                  <p14:nvPr/>
+                </p14:nvContentPartPr>
+                <p14:xfrm>
+                  <a:off x="3545479" y="2619304"/>
+                  <a:ext cx="360" cy="360"/>
+                </p14:xfrm>
+              </p:contentPart>
+            </mc:Choice>
+            <mc:Fallback>
+              <p:pic>
+                <p:nvPicPr>
+                  <p:cNvPr id="25" name="Ink 24">
+                    <a:extLst>
+                      <a:ext uri="{FF2B5EF4-FFF2-40B4-BE49-F238E27FC236}">
+                        <a16:creationId xmlns:a16="http://schemas.microsoft.com/office/drawing/2014/main" id="{5AD90799-617F-2C0B-D96A-114D6AF894B4}"/>
+                      </a:ext>
+                    </a:extLst>
+                  </p:cNvPr>
+                  <p:cNvPicPr/>
+                  <p:nvPr/>
+                </p:nvPicPr>
+                <p:blipFill>
+                  <a:blip r:embed="rId5"/>
+                  <a:stretch>
+                    <a:fillRect/>
+                  </a:stretch>
+                </p:blipFill>
+                <p:spPr>
+                  <a:xfrm>
+                    <a:off x="3482839" y="2556304"/>
+                    <a:ext cx="126000" cy="126000"/>
+                  </a:xfrm>
+                  <a:prstGeom prst="rect">
+                    <a:avLst/>
+                  </a:prstGeom>
+                </p:spPr>
+              </p:pic>
+            </mc:Fallback>
+          </mc:AlternateContent>
+          <mc:AlternateContent xmlns:mc="http://schemas.openxmlformats.org/markup-compatibility/2006">
+            <mc:Choice xmlns:p14="http://schemas.microsoft.com/office/powerpoint/2010/main" Requires="p14">
+              <p:contentPart p14:bwMode="auto" r:id="rId33">
+                <p14:nvContentPartPr>
+                  <p14:cNvPr id="26" name="Ink 25">
+                    <a:extLst>
+                      <a:ext uri="{FF2B5EF4-FFF2-40B4-BE49-F238E27FC236}">
+                        <a16:creationId xmlns:a16="http://schemas.microsoft.com/office/drawing/2014/main" id="{0B3FED7E-BCA1-FA75-B921-26F7A35768DA}"/>
+                      </a:ext>
+                    </a:extLst>
+                  </p14:cNvPr>
+                  <p14:cNvContentPartPr/>
+                  <p14:nvPr/>
+                </p14:nvContentPartPr>
+                <p14:xfrm>
+                  <a:off x="3557359" y="2766904"/>
+                  <a:ext cx="360" cy="360"/>
+                </p14:xfrm>
+              </p:contentPart>
+            </mc:Choice>
+            <mc:Fallback>
+              <p:pic>
+                <p:nvPicPr>
+                  <p:cNvPr id="26" name="Ink 25">
+                    <a:extLst>
+                      <a:ext uri="{FF2B5EF4-FFF2-40B4-BE49-F238E27FC236}">
+                        <a16:creationId xmlns:a16="http://schemas.microsoft.com/office/drawing/2014/main" id="{0B3FED7E-BCA1-FA75-B921-26F7A35768DA}"/>
+                      </a:ext>
+                    </a:extLst>
+                  </p:cNvPr>
+                  <p:cNvPicPr/>
+                  <p:nvPr/>
+                </p:nvPicPr>
+                <p:blipFill>
+                  <a:blip r:embed="rId5"/>
+                  <a:stretch>
+                    <a:fillRect/>
+                  </a:stretch>
+                </p:blipFill>
+                <p:spPr>
+                  <a:xfrm>
+                    <a:off x="3494719" y="2703904"/>
+                    <a:ext cx="126000" cy="126000"/>
+                  </a:xfrm>
+                  <a:prstGeom prst="rect">
+                    <a:avLst/>
+                  </a:prstGeom>
+                </p:spPr>
+              </p:pic>
+            </mc:Fallback>
+          </mc:AlternateContent>
+          <mc:AlternateContent xmlns:mc="http://schemas.openxmlformats.org/markup-compatibility/2006">
+            <mc:Choice xmlns:p14="http://schemas.microsoft.com/office/powerpoint/2010/main" Requires="p14">
+              <p:contentPart p14:bwMode="auto" r:id="rId34">
+                <p14:nvContentPartPr>
+                  <p14:cNvPr id="27" name="Ink 26">
+                    <a:extLst>
+                      <a:ext uri="{FF2B5EF4-FFF2-40B4-BE49-F238E27FC236}">
+                        <a16:creationId xmlns:a16="http://schemas.microsoft.com/office/drawing/2014/main" id="{B0E887C4-8625-F537-8798-2EC2D158EDDC}"/>
+                      </a:ext>
+                    </a:extLst>
+                  </p14:cNvPr>
+                  <p14:cNvContentPartPr/>
+                  <p14:nvPr/>
+                </p14:nvContentPartPr>
+                <p14:xfrm>
+                  <a:off x="3697759" y="2690584"/>
+                  <a:ext cx="360" cy="360"/>
+                </p14:xfrm>
+              </p:contentPart>
+            </mc:Choice>
+            <mc:Fallback>
+              <p:pic>
+                <p:nvPicPr>
+                  <p:cNvPr id="27" name="Ink 26">
+                    <a:extLst>
+                      <a:ext uri="{FF2B5EF4-FFF2-40B4-BE49-F238E27FC236}">
+                        <a16:creationId xmlns:a16="http://schemas.microsoft.com/office/drawing/2014/main" id="{B0E887C4-8625-F537-8798-2EC2D158EDDC}"/>
+                      </a:ext>
+                    </a:extLst>
+                  </p:cNvPr>
+                  <p:cNvPicPr/>
+                  <p:nvPr/>
+                </p:nvPicPr>
+                <p:blipFill>
+                  <a:blip r:embed="rId5"/>
+                  <a:stretch>
+                    <a:fillRect/>
+                  </a:stretch>
+                </p:blipFill>
+                <p:spPr>
+                  <a:xfrm>
+                    <a:off x="3635119" y="2627944"/>
+                    <a:ext cx="126000" cy="126000"/>
+                  </a:xfrm>
+                  <a:prstGeom prst="rect">
+                    <a:avLst/>
+                  </a:prstGeom>
+                </p:spPr>
+              </p:pic>
+            </mc:Fallback>
+          </mc:AlternateContent>
+          <mc:AlternateContent xmlns:mc="http://schemas.openxmlformats.org/markup-compatibility/2006">
+            <mc:Choice xmlns:p14="http://schemas.microsoft.com/office/powerpoint/2010/main" Requires="p14">
+              <p:contentPart p14:bwMode="auto" r:id="rId35">
+                <p14:nvContentPartPr>
+                  <p14:cNvPr id="28" name="Ink 27">
+                    <a:extLst>
+                      <a:ext uri="{FF2B5EF4-FFF2-40B4-BE49-F238E27FC236}">
+                        <a16:creationId xmlns:a16="http://schemas.microsoft.com/office/drawing/2014/main" id="{70EBD530-DBAB-FC2E-F21A-4F792BA4090F}"/>
+                      </a:ext>
+                    </a:extLst>
+                  </p14:cNvPr>
+                  <p14:cNvContentPartPr/>
+                  <p14:nvPr/>
+                </p14:nvContentPartPr>
+                <p14:xfrm>
+                  <a:off x="3695599" y="2652424"/>
+                  <a:ext cx="720" cy="360"/>
+                </p14:xfrm>
+              </p:contentPart>
+            </mc:Choice>
+            <mc:Fallback>
+              <p:pic>
+                <p:nvPicPr>
+                  <p:cNvPr id="28" name="Ink 27">
+                    <a:extLst>
+                      <a:ext uri="{FF2B5EF4-FFF2-40B4-BE49-F238E27FC236}">
+                        <a16:creationId xmlns:a16="http://schemas.microsoft.com/office/drawing/2014/main" id="{70EBD530-DBAB-FC2E-F21A-4F792BA4090F}"/>
+                      </a:ext>
+                    </a:extLst>
+                  </p:cNvPr>
+                  <p:cNvPicPr/>
+                  <p:nvPr/>
+                </p:nvPicPr>
+                <p:blipFill>
+                  <a:blip r:embed="rId28"/>
+                  <a:stretch>
+                    <a:fillRect/>
+                  </a:stretch>
+                </p:blipFill>
+                <p:spPr>
+                  <a:xfrm>
+                    <a:off x="3632599" y="2589784"/>
+                    <a:ext cx="126360" cy="126000"/>
+                  </a:xfrm>
+                  <a:prstGeom prst="rect">
+                    <a:avLst/>
+                  </a:prstGeom>
+                </p:spPr>
+              </p:pic>
+            </mc:Fallback>
+          </mc:AlternateContent>
+        </p:grpSp>
+      </p:grpSp>
+      <p:cxnSp>
+        <p:nvCxnSpPr>
+          <p:cNvPr id="1029" name="Straight Connector 1028">
+            <a:extLst>
+              <a:ext uri="{FF2B5EF4-FFF2-40B4-BE49-F238E27FC236}">
+                <a16:creationId xmlns:a16="http://schemas.microsoft.com/office/drawing/2014/main" id="{EB8E1066-9AF0-E61B-2F4C-1BE8DB576E16}"/>
+              </a:ext>
+            </a:extLst>
+          </p:cNvPr>
+          <p:cNvCxnSpPr/>
+          <p:nvPr/>
+        </p:nvCxnSpPr>
+        <p:spPr>
+          <a:xfrm flipV="1">
+            <a:off x="2679729" y="779529"/>
+            <a:ext cx="2019300" cy="2560094"/>
+          </a:xfrm>
+          <a:prstGeom prst="line">
+            <a:avLst/>
+          </a:prstGeom>
+          <a:ln w="76200">
+            <a:prstDash val="sysDot"/>
+          </a:ln>
+        </p:spPr>
+        <p:style>
+          <a:lnRef idx="1">
+            <a:schemeClr val="accent1"/>
+          </a:lnRef>
+          <a:fillRef idx="0">
+            <a:schemeClr val="accent1"/>
+          </a:fillRef>
+          <a:effectRef idx="0">
+            <a:schemeClr val="accent1"/>
+          </a:effectRef>
+          <a:fontRef idx="minor">
+            <a:schemeClr val="tx1"/>
+          </a:fontRef>
+        </p:style>
+      </p:cxnSp>
+      <p:sp>
+        <p:nvSpPr>
+          <p:cNvPr id="1024" name="Freeform: Shape 1023">
+            <a:extLst>
+              <a:ext uri="{FF2B5EF4-FFF2-40B4-BE49-F238E27FC236}">
+                <a16:creationId xmlns:a16="http://schemas.microsoft.com/office/drawing/2014/main" id="{9C2D061B-5889-3D6A-176C-51F4DC9F8F57}"/>
+              </a:ext>
+            </a:extLst>
+          </p:cNvPr>
+          <p:cNvSpPr/>
+          <p:nvPr/>
+        </p:nvSpPr>
+        <p:spPr>
+          <a:xfrm>
+            <a:off x="3505200" y="1002792"/>
+            <a:ext cx="6070600" cy="4673662"/>
+          </a:xfrm>
+          <a:custGeom>
+            <a:avLst/>
+            <a:gdLst>
+              <a:gd name="connsiteX0" fmla="*/ 0 w 6070600"/>
+              <a:gd name="connsiteY0" fmla="*/ 1295908 h 4673662"/>
+              <a:gd name="connsiteX1" fmla="*/ 317500 w 6070600"/>
+              <a:gd name="connsiteY1" fmla="*/ 775208 h 4673662"/>
+              <a:gd name="connsiteX2" fmla="*/ 431800 w 6070600"/>
+              <a:gd name="connsiteY2" fmla="*/ 267208 h 4673662"/>
+              <a:gd name="connsiteX3" fmla="*/ 787400 w 6070600"/>
+              <a:gd name="connsiteY3" fmla="*/ 178308 h 4673662"/>
+              <a:gd name="connsiteX4" fmla="*/ 1079500 w 6070600"/>
+              <a:gd name="connsiteY4" fmla="*/ 495808 h 4673662"/>
+              <a:gd name="connsiteX5" fmla="*/ 1930400 w 6070600"/>
+              <a:gd name="connsiteY5" fmla="*/ 419608 h 4673662"/>
+              <a:gd name="connsiteX6" fmla="*/ 2489200 w 6070600"/>
+              <a:gd name="connsiteY6" fmla="*/ 330708 h 4673662"/>
+              <a:gd name="connsiteX7" fmla="*/ 3098800 w 6070600"/>
+              <a:gd name="connsiteY7" fmla="*/ 508 h 4673662"/>
+              <a:gd name="connsiteX8" fmla="*/ 3263900 w 6070600"/>
+              <a:gd name="connsiteY8" fmla="*/ 267208 h 4673662"/>
+              <a:gd name="connsiteX9" fmla="*/ 3225800 w 6070600"/>
+              <a:gd name="connsiteY9" fmla="*/ 724408 h 4673662"/>
+              <a:gd name="connsiteX10" fmla="*/ 3568700 w 6070600"/>
+              <a:gd name="connsiteY10" fmla="*/ 1118108 h 4673662"/>
+              <a:gd name="connsiteX11" fmla="*/ 3924300 w 6070600"/>
+              <a:gd name="connsiteY11" fmla="*/ 1511808 h 4673662"/>
+              <a:gd name="connsiteX12" fmla="*/ 4432300 w 6070600"/>
+              <a:gd name="connsiteY12" fmla="*/ 2172208 h 4673662"/>
+              <a:gd name="connsiteX13" fmla="*/ 5080000 w 6070600"/>
+              <a:gd name="connsiteY13" fmla="*/ 2388108 h 4673662"/>
+              <a:gd name="connsiteX14" fmla="*/ 5397500 w 6070600"/>
+              <a:gd name="connsiteY14" fmla="*/ 2934208 h 4673662"/>
+              <a:gd name="connsiteX15" fmla="*/ 5384800 w 6070600"/>
+              <a:gd name="connsiteY15" fmla="*/ 3670808 h 4673662"/>
+              <a:gd name="connsiteX16" fmla="*/ 5461000 w 6070600"/>
+              <a:gd name="connsiteY16" fmla="*/ 4534408 h 4673662"/>
+              <a:gd name="connsiteX17" fmla="*/ 6070600 w 6070600"/>
+              <a:gd name="connsiteY17" fmla="*/ 4661408 h 4673662"/>
+            </a:gdLst>
+            <a:ahLst/>
+            <a:cxnLst>
+              <a:cxn ang="0">
+                <a:pos x="connsiteX0" y="connsiteY0"/>
+              </a:cxn>
+              <a:cxn ang="0">
+                <a:pos x="connsiteX1" y="connsiteY1"/>
+              </a:cxn>
+              <a:cxn ang="0">
+                <a:pos x="connsiteX2" y="connsiteY2"/>
+              </a:cxn>
+              <a:cxn ang="0">
+                <a:pos x="connsiteX3" y="connsiteY3"/>
+              </a:cxn>
+              <a:cxn ang="0">
+                <a:pos x="connsiteX4" y="connsiteY4"/>
+              </a:cxn>
+              <a:cxn ang="0">
+                <a:pos x="connsiteX5" y="connsiteY5"/>
+              </a:cxn>
+              <a:cxn ang="0">
+                <a:pos x="connsiteX6" y="connsiteY6"/>
+              </a:cxn>
+              <a:cxn ang="0">
+                <a:pos x="connsiteX7" y="connsiteY7"/>
+              </a:cxn>
+              <a:cxn ang="0">
+                <a:pos x="connsiteX8" y="connsiteY8"/>
+              </a:cxn>
+              <a:cxn ang="0">
+                <a:pos x="connsiteX9" y="connsiteY9"/>
+              </a:cxn>
+              <a:cxn ang="0">
+                <a:pos x="connsiteX10" y="connsiteY10"/>
+              </a:cxn>
+              <a:cxn ang="0">
+                <a:pos x="connsiteX11" y="connsiteY11"/>
+              </a:cxn>
+              <a:cxn ang="0">
+                <a:pos x="connsiteX12" y="connsiteY12"/>
+              </a:cxn>
+              <a:cxn ang="0">
+                <a:pos x="connsiteX13" y="connsiteY13"/>
+              </a:cxn>
+              <a:cxn ang="0">
+                <a:pos x="connsiteX14" y="connsiteY14"/>
+              </a:cxn>
+              <a:cxn ang="0">
+                <a:pos x="connsiteX15" y="connsiteY15"/>
+              </a:cxn>
+              <a:cxn ang="0">
+                <a:pos x="connsiteX16" y="connsiteY16"/>
+              </a:cxn>
+              <a:cxn ang="0">
+                <a:pos x="connsiteX17" y="connsiteY17"/>
+              </a:cxn>
+            </a:cxnLst>
+            <a:rect l="l" t="t" r="r" b="b"/>
+            <a:pathLst>
+              <a:path w="6070600" h="4673662">
+                <a:moveTo>
+                  <a:pt x="0" y="1295908"/>
+                </a:moveTo>
+                <a:cubicBezTo>
+                  <a:pt x="122766" y="1121283"/>
+                  <a:pt x="245533" y="946658"/>
+                  <a:pt x="317500" y="775208"/>
+                </a:cubicBezTo>
+                <a:cubicBezTo>
+                  <a:pt x="389467" y="603758"/>
+                  <a:pt x="353483" y="366691"/>
+                  <a:pt x="431800" y="267208"/>
+                </a:cubicBezTo>
+                <a:cubicBezTo>
+                  <a:pt x="510117" y="167725"/>
+                  <a:pt x="679450" y="140208"/>
+                  <a:pt x="787400" y="178308"/>
+                </a:cubicBezTo>
+                <a:cubicBezTo>
+                  <a:pt x="895350" y="216408"/>
+                  <a:pt x="889000" y="455591"/>
+                  <a:pt x="1079500" y="495808"/>
+                </a:cubicBezTo>
+                <a:cubicBezTo>
+                  <a:pt x="1270000" y="536025"/>
+                  <a:pt x="1695450" y="447125"/>
+                  <a:pt x="1930400" y="419608"/>
+                </a:cubicBezTo>
+                <a:cubicBezTo>
+                  <a:pt x="2165350" y="392091"/>
+                  <a:pt x="2294467" y="400558"/>
+                  <a:pt x="2489200" y="330708"/>
+                </a:cubicBezTo>
+                <a:cubicBezTo>
+                  <a:pt x="2683933" y="260858"/>
+                  <a:pt x="2969683" y="11091"/>
+                  <a:pt x="3098800" y="508"/>
+                </a:cubicBezTo>
+                <a:cubicBezTo>
+                  <a:pt x="3227917" y="-10075"/>
+                  <a:pt x="3242733" y="146558"/>
+                  <a:pt x="3263900" y="267208"/>
+                </a:cubicBezTo>
+                <a:cubicBezTo>
+                  <a:pt x="3285067" y="387858"/>
+                  <a:pt x="3175000" y="582591"/>
+                  <a:pt x="3225800" y="724408"/>
+                </a:cubicBezTo>
+                <a:cubicBezTo>
+                  <a:pt x="3276600" y="866225"/>
+                  <a:pt x="3452283" y="986875"/>
+                  <a:pt x="3568700" y="1118108"/>
+                </a:cubicBezTo>
+                <a:cubicBezTo>
+                  <a:pt x="3685117" y="1249341"/>
+                  <a:pt x="3780367" y="1336125"/>
+                  <a:pt x="3924300" y="1511808"/>
+                </a:cubicBezTo>
+                <a:cubicBezTo>
+                  <a:pt x="4068233" y="1687491"/>
+                  <a:pt x="4239683" y="2026158"/>
+                  <a:pt x="4432300" y="2172208"/>
+                </a:cubicBezTo>
+                <a:cubicBezTo>
+                  <a:pt x="4624917" y="2318258"/>
+                  <a:pt x="4919133" y="2261108"/>
+                  <a:pt x="5080000" y="2388108"/>
+                </a:cubicBezTo>
+                <a:cubicBezTo>
+                  <a:pt x="5240867" y="2515108"/>
+                  <a:pt x="5346700" y="2720425"/>
+                  <a:pt x="5397500" y="2934208"/>
+                </a:cubicBezTo>
+                <a:cubicBezTo>
+                  <a:pt x="5448300" y="3147991"/>
+                  <a:pt x="5374217" y="3404108"/>
+                  <a:pt x="5384800" y="3670808"/>
+                </a:cubicBezTo>
+                <a:cubicBezTo>
+                  <a:pt x="5395383" y="3937508"/>
+                  <a:pt x="5346700" y="4369308"/>
+                  <a:pt x="5461000" y="4534408"/>
+                </a:cubicBezTo>
+                <a:cubicBezTo>
+                  <a:pt x="5575300" y="4699508"/>
+                  <a:pt x="5822950" y="4680458"/>
+                  <a:pt x="6070600" y="4661408"/>
+                </a:cubicBezTo>
+              </a:path>
+            </a:pathLst>
+          </a:custGeom>
+          <a:noFill/>
+          <a:ln w="76200">
+            <a:solidFill>
+              <a:srgbClr val="FF0000"/>
+            </a:solidFill>
+          </a:ln>
+        </p:spPr>
+        <p:style>
+          <a:lnRef idx="2">
+            <a:schemeClr val="accent1">
+              <a:shade val="15000"/>
+            </a:schemeClr>
+          </a:lnRef>
+          <a:fillRef idx="1">
+            <a:schemeClr val="accent1"/>
+          </a:fillRef>
+          <a:effectRef idx="0">
+            <a:schemeClr val="accent1"/>
+          </a:effectRef>
+          <a:fontRef idx="minor">
+            <a:schemeClr val="lt1"/>
+          </a:fontRef>
+        </p:style>
+        <p:txBody>
+          <a:bodyPr rtlCol="0" anchor="ctr"/>
+          <a:lstStyle/>
+          <a:p>
+            <a:pPr algn="ctr"/>
+            <a:endParaRPr lang="en-DE"/>
+          </a:p>
+        </p:txBody>
+      </p:sp>
+      <p:sp>
+        <p:nvSpPr>
+          <p:cNvPr id="1025" name="Rectangle 1024">
+            <a:extLst>
+              <a:ext uri="{FF2B5EF4-FFF2-40B4-BE49-F238E27FC236}">
+                <a16:creationId xmlns:a16="http://schemas.microsoft.com/office/drawing/2014/main" id="{274C485A-F66D-56FA-C38E-2C752BC01753}"/>
+              </a:ext>
+            </a:extLst>
+          </p:cNvPr>
+          <p:cNvSpPr/>
+          <p:nvPr/>
+        </p:nvSpPr>
+        <p:spPr>
+          <a:xfrm>
+            <a:off x="9344024" y="4838700"/>
+            <a:ext cx="2428875" cy="1485900"/>
+          </a:xfrm>
+          <a:prstGeom prst="rect">
+            <a:avLst/>
+          </a:prstGeom>
+        </p:spPr>
+        <p:style>
+          <a:lnRef idx="2">
+            <a:schemeClr val="accent1">
+              <a:shade val="15000"/>
+            </a:schemeClr>
+          </a:lnRef>
+          <a:fillRef idx="1">
+            <a:schemeClr val="accent1"/>
+          </a:fillRef>
+          <a:effectRef idx="0">
+            <a:schemeClr val="accent1"/>
+          </a:effectRef>
+          <a:fontRef idx="minor">
+            <a:schemeClr val="lt1"/>
+          </a:fontRef>
+        </p:style>
+        <p:txBody>
+          <a:bodyPr rtlCol="0" anchor="ctr"/>
+          <a:lstStyle/>
+          <a:p>
+            <a:pPr algn="ctr"/>
+            <a:r>
+              <a:rPr lang="en-US" sz="2400" dirty="0"/>
+              <a:t>Power-supply</a:t>
+            </a:r>
+          </a:p>
+          <a:p>
+            <a:pPr algn="ctr"/>
+            <a:r>
+              <a:rPr lang="en-US" sz="2400" dirty="0"/>
+              <a:t>&amp;</a:t>
+            </a:r>
+          </a:p>
+          <a:p>
+            <a:pPr algn="ctr"/>
+            <a:r>
+              <a:rPr lang="en-US" sz="2400" dirty="0" err="1"/>
+              <a:t>Wirefeed</a:t>
+            </a:r>
+            <a:r>
+              <a:rPr lang="en-US" sz="2400" dirty="0"/>
+              <a:t>-system</a:t>
+            </a:r>
+            <a:endParaRPr lang="en-DE" sz="2400" dirty="0"/>
+          </a:p>
+        </p:txBody>
+      </p:sp>
+    </p:spTree>
+    <p:extLst>
+      <p:ext uri="{BB962C8B-B14F-4D97-AF65-F5344CB8AC3E}">
+        <p14:creationId xmlns:p14="http://schemas.microsoft.com/office/powerpoint/2010/main" val="142798186"/>
+      </p:ext>
+    </p:extLst>
+  </p:cSld>
+  <p:clrMapOvr>
+    <a:masterClrMapping/>
+  </p:clrMapOvr>
+</p:sld>
+</file>
+
+<file path=ppt/slides/slide19.xml><?xml version="1.0" encoding="utf-8"?>
+<p:sld xmlns:a="http://schemas.openxmlformats.org/drawingml/2006/main" xmlns:r="http://schemas.openxmlformats.org/officeDocument/2006/relationships" xmlns:p="http://schemas.openxmlformats.org/presentationml/2006/main">
+  <p:cSld>
+    <p:spTree>
+      <p:nvGrpSpPr>
+        <p:cNvPr id="1" name=""/>
+        <p:cNvGrpSpPr/>
+        <p:nvPr/>
+      </p:nvGrpSpPr>
+      <p:grpSpPr>
+        <a:xfrm>
+          <a:off x="0" y="0"/>
+          <a:ext cx="0" cy="0"/>
+          <a:chOff x="0" y="0"/>
+          <a:chExt cx="0" cy="0"/>
+        </a:xfrm>
+      </p:grpSpPr>
+      <mc:AlternateContent xmlns:mc="http://schemas.openxmlformats.org/markup-compatibility/2006">
+        <mc:Choice xmlns:p14="http://schemas.microsoft.com/office/powerpoint/2010/main" Requires="p14">
+          <p:contentPart p14:bwMode="auto" r:id="rId2">
+            <p14:nvContentPartPr>
+              <p14:cNvPr id="21" name="Ink 20">
+                <a:extLst>
+                  <a:ext uri="{FF2B5EF4-FFF2-40B4-BE49-F238E27FC236}">
+                    <a16:creationId xmlns:a16="http://schemas.microsoft.com/office/drawing/2014/main" id="{3216FFFD-66DB-21D1-A208-622E7DCB380F}"/>
+                  </a:ext>
+                </a:extLst>
+              </p14:cNvPr>
+              <p14:cNvContentPartPr/>
+              <p14:nvPr/>
+            </p14:nvContentPartPr>
+            <p14:xfrm>
+              <a:off x="7891170" y="535519"/>
+              <a:ext cx="140760" cy="1248120"/>
+            </p14:xfrm>
+          </p:contentPart>
+        </mc:Choice>
+        <mc:Fallback>
+          <p:pic>
+            <p:nvPicPr>
+              <p:cNvPr id="21" name="Ink 20">
+                <a:extLst>
+                  <a:ext uri="{FF2B5EF4-FFF2-40B4-BE49-F238E27FC236}">
+                    <a16:creationId xmlns:a16="http://schemas.microsoft.com/office/drawing/2014/main" id="{3216FFFD-66DB-21D1-A208-622E7DCB380F}"/>
+                  </a:ext>
+                </a:extLst>
+              </p:cNvPr>
+              <p:cNvPicPr/>
+              <p:nvPr/>
+            </p:nvPicPr>
+            <p:blipFill>
+              <a:blip r:embed="rId3"/>
+              <a:stretch>
+                <a:fillRect/>
+              </a:stretch>
+            </p:blipFill>
+            <p:spPr>
+              <a:xfrm>
+                <a:off x="7853010" y="497719"/>
+                <a:ext cx="216360" cy="1324080"/>
+              </a:xfrm>
+              <a:prstGeom prst="rect">
+                <a:avLst/>
+              </a:prstGeom>
+            </p:spPr>
+          </p:pic>
+        </mc:Fallback>
+      </mc:AlternateContent>
+      <p:cxnSp>
+        <p:nvCxnSpPr>
+          <p:cNvPr id="16" name="Straight Connector 15">
+            <a:extLst>
+              <a:ext uri="{FF2B5EF4-FFF2-40B4-BE49-F238E27FC236}">
+                <a16:creationId xmlns:a16="http://schemas.microsoft.com/office/drawing/2014/main" id="{E5ED3680-DBF0-41B7-C936-2B3CEF9630B6}"/>
+              </a:ext>
+            </a:extLst>
+          </p:cNvPr>
+          <p:cNvCxnSpPr>
+            <a:cxnSpLocks/>
+          </p:cNvCxnSpPr>
+          <p:nvPr/>
+        </p:nvCxnSpPr>
+        <p:spPr>
+          <a:xfrm flipV="1">
+            <a:off x="6845300" y="418320"/>
+            <a:ext cx="1142980" cy="3950480"/>
+          </a:xfrm>
+          <a:prstGeom prst="line">
+            <a:avLst/>
+          </a:prstGeom>
+          <a:ln w="38100">
+            <a:prstDash val="sysDot"/>
+          </a:ln>
+        </p:spPr>
+        <p:style>
+          <a:lnRef idx="1">
+            <a:schemeClr val="accent1"/>
+          </a:lnRef>
+          <a:fillRef idx="0">
+            <a:schemeClr val="accent1"/>
+          </a:fillRef>
+          <a:effectRef idx="0">
+            <a:schemeClr val="accent1"/>
+          </a:effectRef>
+          <a:fontRef idx="minor">
+            <a:schemeClr val="tx1"/>
+          </a:fontRef>
+        </p:style>
+      </p:cxnSp>
+      <p:pic>
+        <p:nvPicPr>
+          <p:cNvPr id="3074" name="Picture 2" descr="Industrial robot Special Lineal icon">
+            <a:extLst>
+              <a:ext uri="{FF2B5EF4-FFF2-40B4-BE49-F238E27FC236}">
+                <a16:creationId xmlns:a16="http://schemas.microsoft.com/office/drawing/2014/main" id="{EA55E610-E93A-F916-A375-6BD69FF3700E}"/>
+              </a:ext>
+            </a:extLst>
+          </p:cNvPr>
+          <p:cNvPicPr>
+            <a:picLocks noChangeAspect="1" noChangeArrowheads="1"/>
+          </p:cNvPicPr>
+          <p:nvPr/>
+        </p:nvPicPr>
+        <p:blipFill>
+          <a:blip r:embed="rId4">
+            <a:extLst>
+              <a:ext uri="{28A0092B-C50C-407E-A947-70E740481C1C}">
+                <a14:useLocalDpi xmlns:a14="http://schemas.microsoft.com/office/drawing/2010/main" val="0"/>
+              </a:ext>
+            </a:extLst>
+          </a:blip>
+          <a:srcRect/>
+          <a:stretch>
+            <a:fillRect/>
+          </a:stretch>
+        </p:blipFill>
+        <p:spPr bwMode="auto">
+          <a:xfrm>
+            <a:off x="3657600" y="1739900"/>
+            <a:ext cx="4876800" cy="4876800"/>
+          </a:xfrm>
+          <a:prstGeom prst="rect">
+            <a:avLst/>
+          </a:prstGeom>
+          <a:noFill/>
+          <a:extLst>
+            <a:ext uri="{909E8E84-426E-40DD-AFC4-6F175D3DCCD1}">
+              <a14:hiddenFill xmlns:a14="http://schemas.microsoft.com/office/drawing/2010/main">
+                <a:solidFill>
+                  <a:srgbClr val="FFFFFF"/>
+                </a:solidFill>
+              </a14:hiddenFill>
+            </a:ext>
+          </a:extLst>
+        </p:spPr>
+      </p:pic>
+      <p:cxnSp>
+        <p:nvCxnSpPr>
+          <p:cNvPr id="4" name="Straight Connector 3">
+            <a:extLst>
+              <a:ext uri="{FF2B5EF4-FFF2-40B4-BE49-F238E27FC236}">
+                <a16:creationId xmlns:a16="http://schemas.microsoft.com/office/drawing/2014/main" id="{F33F3538-8AB9-93CD-AE9F-7188954BBBB2}"/>
+              </a:ext>
+            </a:extLst>
+          </p:cNvPr>
+          <p:cNvCxnSpPr>
+            <a:cxnSpLocks/>
+          </p:cNvCxnSpPr>
+          <p:nvPr/>
+        </p:nvCxnSpPr>
+        <p:spPr>
+          <a:xfrm flipV="1">
+            <a:off x="7975600" y="444500"/>
+            <a:ext cx="0" cy="4064000"/>
+          </a:xfrm>
+          <a:prstGeom prst="line">
+            <a:avLst/>
+          </a:prstGeom>
+          <a:ln w="38100">
+            <a:prstDash val="sysDot"/>
+          </a:ln>
+        </p:spPr>
+        <p:style>
+          <a:lnRef idx="1">
+            <a:schemeClr val="accent1"/>
+          </a:lnRef>
+          <a:fillRef idx="0">
+            <a:schemeClr val="accent1"/>
+          </a:fillRef>
+          <a:effectRef idx="0">
+            <a:schemeClr val="accent1"/>
+          </a:effectRef>
+          <a:fontRef idx="minor">
+            <a:schemeClr val="tx1"/>
+          </a:fontRef>
+        </p:style>
+      </p:cxnSp>
+      <mc:AlternateContent xmlns:mc="http://schemas.openxmlformats.org/markup-compatibility/2006">
+        <mc:Choice xmlns:p14="http://schemas.microsoft.com/office/powerpoint/2010/main" Requires="p14">
+          <p:contentPart p14:bwMode="auto" r:id="rId5">
+            <p14:nvContentPartPr>
+              <p14:cNvPr id="8" name="Ink 7">
+                <a:extLst>
+                  <a:ext uri="{FF2B5EF4-FFF2-40B4-BE49-F238E27FC236}">
+                    <a16:creationId xmlns:a16="http://schemas.microsoft.com/office/drawing/2014/main" id="{E87B7033-5E61-E2C1-FE47-DFFF4C77C1CD}"/>
+                  </a:ext>
+                </a:extLst>
+              </p14:cNvPr>
+              <p14:cNvContentPartPr/>
+              <p14:nvPr/>
+            </p14:nvContentPartPr>
+            <p14:xfrm>
+              <a:off x="7988280" y="418320"/>
+              <a:ext cx="360" cy="360"/>
+            </p14:xfrm>
+          </p:contentPart>
+        </mc:Choice>
+        <mc:Fallback>
+          <p:pic>
+            <p:nvPicPr>
+              <p:cNvPr id="8" name="Ink 7">
+                <a:extLst>
+                  <a:ext uri="{FF2B5EF4-FFF2-40B4-BE49-F238E27FC236}">
+                    <a16:creationId xmlns:a16="http://schemas.microsoft.com/office/drawing/2014/main" id="{E87B7033-5E61-E2C1-FE47-DFFF4C77C1CD}"/>
+                  </a:ext>
+                </a:extLst>
+              </p:cNvPr>
+              <p:cNvPicPr/>
+              <p:nvPr/>
+            </p:nvPicPr>
+            <p:blipFill>
+              <a:blip r:embed="rId6"/>
+              <a:stretch>
+                <a:fillRect/>
+              </a:stretch>
+            </p:blipFill>
+            <p:spPr>
+              <a:xfrm>
+                <a:off x="7925280" y="355680"/>
+                <a:ext cx="126000" cy="126000"/>
+              </a:xfrm>
+              <a:prstGeom prst="rect">
+                <a:avLst/>
+              </a:prstGeom>
+            </p:spPr>
+          </p:pic>
+        </mc:Fallback>
+      </mc:AlternateContent>
+      <p:cxnSp>
+        <p:nvCxnSpPr>
+          <p:cNvPr id="10" name="Straight Connector 9">
+            <a:extLst>
+              <a:ext uri="{FF2B5EF4-FFF2-40B4-BE49-F238E27FC236}">
+                <a16:creationId xmlns:a16="http://schemas.microsoft.com/office/drawing/2014/main" id="{63E55B69-0CF3-E403-D4E6-93626E31967D}"/>
+              </a:ext>
+            </a:extLst>
+          </p:cNvPr>
+          <p:cNvCxnSpPr>
+            <a:cxnSpLocks/>
+          </p:cNvCxnSpPr>
+          <p:nvPr/>
+        </p:nvCxnSpPr>
+        <p:spPr>
+          <a:xfrm flipH="1" flipV="1">
+            <a:off x="7988280" y="444500"/>
+            <a:ext cx="1130320" cy="3924300"/>
+          </a:xfrm>
+          <a:prstGeom prst="line">
+            <a:avLst/>
+          </a:prstGeom>
+          <a:ln w="38100">
+            <a:prstDash val="sysDot"/>
+          </a:ln>
+        </p:spPr>
+        <p:style>
+          <a:lnRef idx="1">
+            <a:schemeClr val="accent1"/>
+          </a:lnRef>
+          <a:fillRef idx="0">
+            <a:schemeClr val="accent1"/>
+          </a:fillRef>
+          <a:effectRef idx="0">
+            <a:schemeClr val="accent1"/>
+          </a:effectRef>
+          <a:fontRef idx="minor">
+            <a:schemeClr val="tx1"/>
+          </a:fontRef>
+        </p:style>
+      </p:cxnSp>
+      <p:cxnSp>
+        <p:nvCxnSpPr>
+          <p:cNvPr id="13" name="Straight Connector 12">
+            <a:extLst>
+              <a:ext uri="{FF2B5EF4-FFF2-40B4-BE49-F238E27FC236}">
+                <a16:creationId xmlns:a16="http://schemas.microsoft.com/office/drawing/2014/main" id="{E7EA840B-0FB4-D2B3-63AC-DBBE2DDA4208}"/>
+              </a:ext>
+            </a:extLst>
+          </p:cNvPr>
+          <p:cNvCxnSpPr>
+            <a:cxnSpLocks/>
+          </p:cNvCxnSpPr>
+          <p:nvPr/>
+        </p:nvCxnSpPr>
+        <p:spPr>
+          <a:xfrm flipH="1" flipV="1">
+            <a:off x="7988280" y="418320"/>
+            <a:ext cx="2019320" cy="3340880"/>
+          </a:xfrm>
+          <a:prstGeom prst="line">
+            <a:avLst/>
+          </a:prstGeom>
+          <a:ln w="38100">
+            <a:prstDash val="sysDot"/>
+          </a:ln>
+        </p:spPr>
+        <p:style>
+          <a:lnRef idx="1">
+            <a:schemeClr val="accent1"/>
+          </a:lnRef>
+          <a:fillRef idx="0">
+            <a:schemeClr val="accent1"/>
+          </a:fillRef>
+          <a:effectRef idx="0">
+            <a:schemeClr val="accent1"/>
+          </a:effectRef>
+          <a:fontRef idx="minor">
+            <a:schemeClr val="tx1"/>
+          </a:fontRef>
+        </p:style>
+      </p:cxnSp>
+      <mc:AlternateContent xmlns:mc="http://schemas.openxmlformats.org/markup-compatibility/2006">
+        <mc:Choice xmlns:p14="http://schemas.microsoft.com/office/powerpoint/2010/main" Requires="p14">
+          <p:contentPart p14:bwMode="auto" r:id="rId7">
+            <p14:nvContentPartPr>
+              <p14:cNvPr id="20" name="Ink 19">
+                <a:extLst>
+                  <a:ext uri="{FF2B5EF4-FFF2-40B4-BE49-F238E27FC236}">
+                    <a16:creationId xmlns:a16="http://schemas.microsoft.com/office/drawing/2014/main" id="{D31F85CF-1696-79D0-3F53-FCC4EA411345}"/>
+                  </a:ext>
+                </a:extLst>
+              </p14:cNvPr>
+              <p14:cNvContentPartPr/>
+              <p14:nvPr/>
+            </p14:nvContentPartPr>
+            <p14:xfrm>
+              <a:off x="7963731" y="400911"/>
+              <a:ext cx="52560" cy="45000"/>
+            </p14:xfrm>
+          </p:contentPart>
+        </mc:Choice>
+        <mc:Fallback>
+          <p:pic>
+            <p:nvPicPr>
+              <p:cNvPr id="20" name="Ink 19">
+                <a:extLst>
+                  <a:ext uri="{FF2B5EF4-FFF2-40B4-BE49-F238E27FC236}">
+                    <a16:creationId xmlns:a16="http://schemas.microsoft.com/office/drawing/2014/main" id="{D31F85CF-1696-79D0-3F53-FCC4EA411345}"/>
+                  </a:ext>
+                </a:extLst>
+              </p:cNvPr>
+              <p:cNvPicPr/>
+              <p:nvPr/>
+            </p:nvPicPr>
+            <p:blipFill>
+              <a:blip r:embed="rId8"/>
+              <a:stretch>
+                <a:fillRect/>
+              </a:stretch>
+            </p:blipFill>
+            <p:spPr>
+              <a:xfrm>
+                <a:off x="7901091" y="337911"/>
+                <a:ext cx="178200" cy="170640"/>
+              </a:xfrm>
+              <a:prstGeom prst="rect">
+                <a:avLst/>
+              </a:prstGeom>
+            </p:spPr>
+          </p:pic>
+        </mc:Fallback>
+      </mc:AlternateContent>
+    </p:spTree>
+    <p:extLst>
+      <p:ext uri="{BB962C8B-B14F-4D97-AF65-F5344CB8AC3E}">
+        <p14:creationId xmlns:p14="http://schemas.microsoft.com/office/powerpoint/2010/main" val="2179946251"/>
       </p:ext>
     </p:extLst>
   </p:cSld>
@@ -20932,4 +24992,10 @@
     </a:ext>
   </a:extLst>
 </a:theme>
+</file>
+
+<file path=docMetadata/LabelInfo.xml><?xml version="1.0" encoding="utf-8"?>
+<clbl:labelList xmlns:clbl="http://schemas.microsoft.com/office/2020/mipLabelMetadata">
+  <clbl:label id="{9d258917-277f-42cd-a3cd-14c4e9ee58bc}" enabled="1" method="Standard" siteId="{38ae3bcd-9579-4fd4-adda-b42e1495d55a}" contentBits="0" removed="0"/>
+</clbl:labelList>
 </file>
</xml_diff>

<commit_message>
swarm is left tp do
</commit_message>
<xml_diff>
--- a/Latex/figures/images.pptx
+++ b/Latex/figures/images.pptx
@@ -993,7 +993,7 @@
           <a:p>
             <a:fld id="{A2EF96EC-B110-4427-9456-97730D7A221B}" type="datetimeFigureOut">
               <a:rPr lang="en-DE" smtClean="0"/>
-              <a:t>04/12/2023</a:t>
+              <a:t>09/12/2023</a:t>
             </a:fld>
             <a:endParaRPr lang="en-DE"/>
           </a:p>
@@ -1193,7 +1193,7 @@
           <a:p>
             <a:fld id="{A2EF96EC-B110-4427-9456-97730D7A221B}" type="datetimeFigureOut">
               <a:rPr lang="en-DE" smtClean="0"/>
-              <a:t>04/12/2023</a:t>
+              <a:t>09/12/2023</a:t>
             </a:fld>
             <a:endParaRPr lang="en-DE"/>
           </a:p>
@@ -1403,7 +1403,7 @@
           <a:p>
             <a:fld id="{A2EF96EC-B110-4427-9456-97730D7A221B}" type="datetimeFigureOut">
               <a:rPr lang="en-DE" smtClean="0"/>
-              <a:t>04/12/2023</a:t>
+              <a:t>09/12/2023</a:t>
             </a:fld>
             <a:endParaRPr lang="en-DE"/>
           </a:p>
@@ -1603,7 +1603,7 @@
           <a:p>
             <a:fld id="{A2EF96EC-B110-4427-9456-97730D7A221B}" type="datetimeFigureOut">
               <a:rPr lang="en-DE" smtClean="0"/>
-              <a:t>04/12/2023</a:t>
+              <a:t>09/12/2023</a:t>
             </a:fld>
             <a:endParaRPr lang="en-DE"/>
           </a:p>
@@ -1879,7 +1879,7 @@
           <a:p>
             <a:fld id="{A2EF96EC-B110-4427-9456-97730D7A221B}" type="datetimeFigureOut">
               <a:rPr lang="en-DE" smtClean="0"/>
-              <a:t>04/12/2023</a:t>
+              <a:t>09/12/2023</a:t>
             </a:fld>
             <a:endParaRPr lang="en-DE"/>
           </a:p>
@@ -2147,7 +2147,7 @@
           <a:p>
             <a:fld id="{A2EF96EC-B110-4427-9456-97730D7A221B}" type="datetimeFigureOut">
               <a:rPr lang="en-DE" smtClean="0"/>
-              <a:t>04/12/2023</a:t>
+              <a:t>09/12/2023</a:t>
             </a:fld>
             <a:endParaRPr lang="en-DE"/>
           </a:p>
@@ -2562,7 +2562,7 @@
           <a:p>
             <a:fld id="{A2EF96EC-B110-4427-9456-97730D7A221B}" type="datetimeFigureOut">
               <a:rPr lang="en-DE" smtClean="0"/>
-              <a:t>04/12/2023</a:t>
+              <a:t>09/12/2023</a:t>
             </a:fld>
             <a:endParaRPr lang="en-DE"/>
           </a:p>
@@ -2704,7 +2704,7 @@
           <a:p>
             <a:fld id="{A2EF96EC-B110-4427-9456-97730D7A221B}" type="datetimeFigureOut">
               <a:rPr lang="en-DE" smtClean="0"/>
-              <a:t>04/12/2023</a:t>
+              <a:t>09/12/2023</a:t>
             </a:fld>
             <a:endParaRPr lang="en-DE"/>
           </a:p>
@@ -2817,7 +2817,7 @@
           <a:p>
             <a:fld id="{A2EF96EC-B110-4427-9456-97730D7A221B}" type="datetimeFigureOut">
               <a:rPr lang="en-DE" smtClean="0"/>
-              <a:t>04/12/2023</a:t>
+              <a:t>09/12/2023</a:t>
             </a:fld>
             <a:endParaRPr lang="en-DE"/>
           </a:p>
@@ -3130,7 +3130,7 @@
           <a:p>
             <a:fld id="{A2EF96EC-B110-4427-9456-97730D7A221B}" type="datetimeFigureOut">
               <a:rPr lang="en-DE" smtClean="0"/>
-              <a:t>04/12/2023</a:t>
+              <a:t>09/12/2023</a:t>
             </a:fld>
             <a:endParaRPr lang="en-DE"/>
           </a:p>
@@ -3419,7 +3419,7 @@
           <a:p>
             <a:fld id="{A2EF96EC-B110-4427-9456-97730D7A221B}" type="datetimeFigureOut">
               <a:rPr lang="en-DE" smtClean="0"/>
-              <a:t>04/12/2023</a:t>
+              <a:t>09/12/2023</a:t>
             </a:fld>
             <a:endParaRPr lang="en-DE"/>
           </a:p>
@@ -3662,7 +3662,7 @@
           <a:p>
             <a:fld id="{A2EF96EC-B110-4427-9456-97730D7A221B}" type="datetimeFigureOut">
               <a:rPr lang="en-DE" smtClean="0"/>
-              <a:t>04/12/2023</a:t>
+              <a:t>09/12/2023</a:t>
             </a:fld>
             <a:endParaRPr lang="en-DE"/>
           </a:p>
@@ -24358,10 +24358,10 @@
       </p:grpSpPr>
       <p:cxnSp>
         <p:nvCxnSpPr>
-          <p:cNvPr id="68" name="Straight Arrow Connector 67">
-            <a:extLst>
-              <a:ext uri="{FF2B5EF4-FFF2-40B4-BE49-F238E27FC236}">
-                <a16:creationId xmlns:a16="http://schemas.microsoft.com/office/drawing/2014/main" id="{EB599CF4-7257-1142-238C-45C654B967DD}"/>
+          <p:cNvPr id="63" name="Straight Arrow Connector 62">
+            <a:extLst>
+              <a:ext uri="{FF2B5EF4-FFF2-40B4-BE49-F238E27FC236}">
+                <a16:creationId xmlns:a16="http://schemas.microsoft.com/office/drawing/2014/main" id="{B1482C46-4F7F-742B-4590-A0D66D028636}"/>
               </a:ext>
             </a:extLst>
           </p:cNvPr>
@@ -24372,8 +24372,52 @@
         </p:nvCxnSpPr>
         <p:spPr>
           <a:xfrm>
-            <a:off x="6893907" y="4397362"/>
-            <a:ext cx="573762" cy="480013"/>
+            <a:off x="6952262" y="5312019"/>
+            <a:ext cx="1284950" cy="0"/>
+          </a:xfrm>
+          <a:prstGeom prst="straightConnector1">
+            <a:avLst/>
+          </a:prstGeom>
+          <a:ln w="76200">
+            <a:solidFill>
+              <a:srgbClr val="FF0000"/>
+            </a:solidFill>
+            <a:tailEnd type="triangle"/>
+          </a:ln>
+        </p:spPr>
+        <p:style>
+          <a:lnRef idx="1">
+            <a:schemeClr val="accent1"/>
+          </a:lnRef>
+          <a:fillRef idx="0">
+            <a:schemeClr val="accent1"/>
+          </a:fillRef>
+          <a:effectRef idx="0">
+            <a:schemeClr val="accent1"/>
+          </a:effectRef>
+          <a:fontRef idx="minor">
+            <a:schemeClr val="tx1"/>
+          </a:fontRef>
+        </p:style>
+      </p:cxnSp>
+      <p:cxnSp>
+        <p:nvCxnSpPr>
+          <p:cNvPr id="68" name="Straight Arrow Connector 67">
+            <a:extLst>
+              <a:ext uri="{FF2B5EF4-FFF2-40B4-BE49-F238E27FC236}">
+                <a16:creationId xmlns:a16="http://schemas.microsoft.com/office/drawing/2014/main" id="{EB599CF4-7257-1142-238C-45C654B967DD}"/>
+              </a:ext>
+            </a:extLst>
+          </p:cNvPr>
+          <p:cNvCxnSpPr>
+            <a:cxnSpLocks/>
+          </p:cNvCxnSpPr>
+          <p:nvPr/>
+        </p:nvCxnSpPr>
+        <p:spPr>
+          <a:xfrm flipV="1">
+            <a:off x="6841197" y="4249868"/>
+            <a:ext cx="0" cy="1024630"/>
           </a:xfrm>
           <a:prstGeom prst="straightConnector1">
             <a:avLst/>
@@ -25291,7 +25335,7 @@
         </p:nvCxnSpPr>
         <p:spPr>
           <a:xfrm flipV="1">
-            <a:off x="6848690" y="4427808"/>
+            <a:off x="6839001" y="4833614"/>
             <a:ext cx="0" cy="449567"/>
           </a:xfrm>
           <a:prstGeom prst="line">
@@ -25328,7 +25372,7 @@
         </p:nvSpPr>
         <p:spPr>
           <a:xfrm>
-            <a:off x="6686054" y="4191000"/>
+            <a:off x="6659944" y="5168914"/>
             <a:ext cx="325271" cy="286210"/>
           </a:xfrm>
           <a:prstGeom prst="ellipse">
@@ -25365,51 +25409,6 @@
       </p:sp>
       <p:cxnSp>
         <p:nvCxnSpPr>
-          <p:cNvPr id="63" name="Straight Arrow Connector 62">
-            <a:extLst>
-              <a:ext uri="{FF2B5EF4-FFF2-40B4-BE49-F238E27FC236}">
-                <a16:creationId xmlns:a16="http://schemas.microsoft.com/office/drawing/2014/main" id="{B1482C46-4F7F-742B-4590-A0D66D028636}"/>
-              </a:ext>
-            </a:extLst>
-          </p:cNvPr>
-          <p:cNvCxnSpPr>
-            <a:cxnSpLocks/>
-            <a:stCxn id="61" idx="6"/>
-          </p:cNvCxnSpPr>
-          <p:nvPr/>
-        </p:nvCxnSpPr>
-        <p:spPr>
-          <a:xfrm>
-            <a:off x="7011325" y="4334105"/>
-            <a:ext cx="1284950" cy="0"/>
-          </a:xfrm>
-          <a:prstGeom prst="straightConnector1">
-            <a:avLst/>
-          </a:prstGeom>
-          <a:ln w="76200">
-            <a:solidFill>
-              <a:srgbClr val="FF0000"/>
-            </a:solidFill>
-            <a:tailEnd type="triangle"/>
-          </a:ln>
-        </p:spPr>
-        <p:style>
-          <a:lnRef idx="1">
-            <a:schemeClr val="accent1"/>
-          </a:lnRef>
-          <a:fillRef idx="0">
-            <a:schemeClr val="accent1"/>
-          </a:fillRef>
-          <a:effectRef idx="0">
-            <a:schemeClr val="accent1"/>
-          </a:effectRef>
-          <a:fontRef idx="minor">
-            <a:schemeClr val="tx1"/>
-          </a:fontRef>
-        </p:style>
-      </p:cxnSp>
-      <p:cxnSp>
-        <p:nvCxnSpPr>
           <p:cNvPr id="65" name="Straight Arrow Connector 64">
             <a:extLst>
               <a:ext uri="{FF2B5EF4-FFF2-40B4-BE49-F238E27FC236}">
@@ -25423,9 +25422,9 @@
           <p:nvPr/>
         </p:nvCxnSpPr>
         <p:spPr>
-          <a:xfrm flipH="1">
-            <a:off x="6808382" y="5009135"/>
-            <a:ext cx="6756" cy="1005903"/>
+          <a:xfrm>
+            <a:off x="6829335" y="5307803"/>
+            <a:ext cx="7100" cy="470905"/>
           </a:xfrm>
           <a:prstGeom prst="straightConnector1">
             <a:avLst/>
@@ -25466,7 +25465,7 @@
         </p:nvSpPr>
         <p:spPr>
           <a:xfrm>
-            <a:off x="8284236" y="4150195"/>
+            <a:off x="8168751" y="5028099"/>
             <a:ext cx="370614" cy="523220"/>
           </a:xfrm>
           <a:prstGeom prst="rect">
@@ -25502,7 +25501,7 @@
         </p:nvSpPr>
         <p:spPr>
           <a:xfrm>
-            <a:off x="7415040" y="4755965"/>
+            <a:off x="6647848" y="3807632"/>
             <a:ext cx="359394" cy="523220"/>
           </a:xfrm>
           <a:prstGeom prst="rect">
@@ -25538,7 +25537,7 @@
         </p:nvSpPr>
         <p:spPr>
           <a:xfrm>
-            <a:off x="6659944" y="5997503"/>
+            <a:off x="6659944" y="5785649"/>
             <a:ext cx="352982" cy="523220"/>
           </a:xfrm>
           <a:prstGeom prst="rect">

</xml_diff>

<commit_message>
version 1  and spindel simulation
</commit_message>
<xml_diff>
--- a/Latex/figures/images.pptx
+++ b/Latex/figures/images.pptx
@@ -938,7 +938,7 @@
           <a:p>
             <a:fld id="{A2EF96EC-B110-4427-9456-97730D7A221B}" type="datetimeFigureOut">
               <a:rPr lang="en-DE" smtClean="0"/>
-              <a:t>05/01/2024</a:t>
+              <a:t>08/01/2024</a:t>
             </a:fld>
             <a:endParaRPr lang="en-DE"/>
           </a:p>
@@ -1138,7 +1138,7 @@
           <a:p>
             <a:fld id="{A2EF96EC-B110-4427-9456-97730D7A221B}" type="datetimeFigureOut">
               <a:rPr lang="en-DE" smtClean="0"/>
-              <a:t>05/01/2024</a:t>
+              <a:t>08/01/2024</a:t>
             </a:fld>
             <a:endParaRPr lang="en-DE"/>
           </a:p>
@@ -1348,7 +1348,7 @@
           <a:p>
             <a:fld id="{A2EF96EC-B110-4427-9456-97730D7A221B}" type="datetimeFigureOut">
               <a:rPr lang="en-DE" smtClean="0"/>
-              <a:t>05/01/2024</a:t>
+              <a:t>08/01/2024</a:t>
             </a:fld>
             <a:endParaRPr lang="en-DE"/>
           </a:p>
@@ -1548,7 +1548,7 @@
           <a:p>
             <a:fld id="{A2EF96EC-B110-4427-9456-97730D7A221B}" type="datetimeFigureOut">
               <a:rPr lang="en-DE" smtClean="0"/>
-              <a:t>05/01/2024</a:t>
+              <a:t>08/01/2024</a:t>
             </a:fld>
             <a:endParaRPr lang="en-DE"/>
           </a:p>
@@ -1824,7 +1824,7 @@
           <a:p>
             <a:fld id="{A2EF96EC-B110-4427-9456-97730D7A221B}" type="datetimeFigureOut">
               <a:rPr lang="en-DE" smtClean="0"/>
-              <a:t>05/01/2024</a:t>
+              <a:t>08/01/2024</a:t>
             </a:fld>
             <a:endParaRPr lang="en-DE"/>
           </a:p>
@@ -2092,7 +2092,7 @@
           <a:p>
             <a:fld id="{A2EF96EC-B110-4427-9456-97730D7A221B}" type="datetimeFigureOut">
               <a:rPr lang="en-DE" smtClean="0"/>
-              <a:t>05/01/2024</a:t>
+              <a:t>08/01/2024</a:t>
             </a:fld>
             <a:endParaRPr lang="en-DE"/>
           </a:p>
@@ -2507,7 +2507,7 @@
           <a:p>
             <a:fld id="{A2EF96EC-B110-4427-9456-97730D7A221B}" type="datetimeFigureOut">
               <a:rPr lang="en-DE" smtClean="0"/>
-              <a:t>05/01/2024</a:t>
+              <a:t>08/01/2024</a:t>
             </a:fld>
             <a:endParaRPr lang="en-DE"/>
           </a:p>
@@ -2649,7 +2649,7 @@
           <a:p>
             <a:fld id="{A2EF96EC-B110-4427-9456-97730D7A221B}" type="datetimeFigureOut">
               <a:rPr lang="en-DE" smtClean="0"/>
-              <a:t>05/01/2024</a:t>
+              <a:t>08/01/2024</a:t>
             </a:fld>
             <a:endParaRPr lang="en-DE"/>
           </a:p>
@@ -2762,7 +2762,7 @@
           <a:p>
             <a:fld id="{A2EF96EC-B110-4427-9456-97730D7A221B}" type="datetimeFigureOut">
               <a:rPr lang="en-DE" smtClean="0"/>
-              <a:t>05/01/2024</a:t>
+              <a:t>08/01/2024</a:t>
             </a:fld>
             <a:endParaRPr lang="en-DE"/>
           </a:p>
@@ -3075,7 +3075,7 @@
           <a:p>
             <a:fld id="{A2EF96EC-B110-4427-9456-97730D7A221B}" type="datetimeFigureOut">
               <a:rPr lang="en-DE" smtClean="0"/>
-              <a:t>05/01/2024</a:t>
+              <a:t>08/01/2024</a:t>
             </a:fld>
             <a:endParaRPr lang="en-DE"/>
           </a:p>
@@ -3364,7 +3364,7 @@
           <a:p>
             <a:fld id="{A2EF96EC-B110-4427-9456-97730D7A221B}" type="datetimeFigureOut">
               <a:rPr lang="en-DE" smtClean="0"/>
-              <a:t>05/01/2024</a:t>
+              <a:t>08/01/2024</a:t>
             </a:fld>
             <a:endParaRPr lang="en-DE"/>
           </a:p>
@@ -3607,7 +3607,7 @@
           <a:p>
             <a:fld id="{A2EF96EC-B110-4427-9456-97730D7A221B}" type="datetimeFigureOut">
               <a:rPr lang="en-DE" smtClean="0"/>
-              <a:t>05/01/2024</a:t>
+              <a:t>08/01/2024</a:t>
             </a:fld>
             <a:endParaRPr lang="en-DE"/>
           </a:p>
@@ -12925,7 +12925,7 @@
         </p:nvGrpSpPr>
         <p:grpSpPr>
           <a:xfrm>
-            <a:off x="2858882" y="1275080"/>
+            <a:off x="1502522" y="1364457"/>
             <a:ext cx="6148977" cy="5162550"/>
             <a:chOff x="2917302" y="1276350"/>
             <a:chExt cx="6148977" cy="5162550"/>
@@ -14250,7 +14250,7 @@
         </p:nvCxnSpPr>
         <p:spPr>
           <a:xfrm flipV="1">
-            <a:off x="2679729" y="779529"/>
+            <a:off x="1323369" y="868906"/>
             <a:ext cx="2019300" cy="2560094"/>
           </a:xfrm>
           <a:prstGeom prst="line">
@@ -14292,7 +14292,7 @@
         </p:nvSpPr>
         <p:spPr>
           <a:xfrm>
-            <a:off x="3505200" y="1002792"/>
+            <a:off x="2148840" y="1092169"/>
             <a:ext cx="6070600" cy="4673662"/>
           </a:xfrm>
           <a:custGeom>
@@ -14532,8 +14532,8 @@
         </p:nvSpPr>
         <p:spPr>
           <a:xfrm>
-            <a:off x="9344024" y="4838700"/>
-            <a:ext cx="2428875" cy="1485900"/>
+            <a:off x="7987664" y="4578533"/>
+            <a:ext cx="3163961" cy="1835444"/>
           </a:xfrm>
           <a:prstGeom prst="rect">
             <a:avLst/>
@@ -14564,10 +14564,10 @@
           <a:p>
             <a:pPr algn="ctr"/>
             <a:r>
-              <a:rPr lang="en-US" sz="2400" dirty="0">
-                <a:latin typeface="CMU Concrete" panose="02000603000000000000" pitchFamily="2" charset="0"/>
-                <a:ea typeface="CMU Concrete" panose="02000603000000000000" pitchFamily="2" charset="0"/>
-                <a:cs typeface="CMU Concrete" panose="02000603000000000000" pitchFamily="2" charset="0"/>
+              <a:rPr lang="en-US" sz="3200" dirty="0">
+                <a:latin typeface="CMU Serif" panose="02000603000000000000" pitchFamily="2" charset="0"/>
+                <a:ea typeface="CMU Serif" panose="02000603000000000000" pitchFamily="2" charset="0"/>
+                <a:cs typeface="CMU Serif" panose="02000603000000000000" pitchFamily="2" charset="0"/>
               </a:rPr>
               <a:t>Power-supply</a:t>
             </a:r>
@@ -14575,36 +14575,17 @@
           <a:p>
             <a:pPr algn="ctr"/>
             <a:r>
-              <a:rPr lang="en-US" sz="2400" dirty="0">
-                <a:latin typeface="CMU Concrete" panose="02000603000000000000" pitchFamily="2" charset="0"/>
-                <a:ea typeface="CMU Concrete" panose="02000603000000000000" pitchFamily="2" charset="0"/>
-                <a:cs typeface="CMU Concrete" panose="02000603000000000000" pitchFamily="2" charset="0"/>
+              <a:rPr lang="en-US" sz="3200" dirty="0">
+                <a:latin typeface="CMU Serif" panose="02000603000000000000" pitchFamily="2" charset="0"/>
+                <a:ea typeface="CMU Serif" panose="02000603000000000000" pitchFamily="2" charset="0"/>
+                <a:cs typeface="CMU Serif" panose="02000603000000000000" pitchFamily="2" charset="0"/>
               </a:rPr>
-              <a:t>&amp;</a:t>
+              <a:t>&amp; Wire-feed-system</a:t>
             </a:r>
-          </a:p>
-          <a:p>
-            <a:pPr algn="ctr"/>
-            <a:r>
-              <a:rPr lang="en-US" sz="2400" dirty="0" err="1">
-                <a:latin typeface="CMU Concrete" panose="02000603000000000000" pitchFamily="2" charset="0"/>
-                <a:ea typeface="CMU Concrete" panose="02000603000000000000" pitchFamily="2" charset="0"/>
-                <a:cs typeface="CMU Concrete" panose="02000603000000000000" pitchFamily="2" charset="0"/>
-              </a:rPr>
-              <a:t>Wirefeed</a:t>
-            </a:r>
-            <a:r>
-              <a:rPr lang="en-US" sz="2400" dirty="0">
-                <a:latin typeface="CMU Concrete" panose="02000603000000000000" pitchFamily="2" charset="0"/>
-                <a:ea typeface="CMU Concrete" panose="02000603000000000000" pitchFamily="2" charset="0"/>
-                <a:cs typeface="CMU Concrete" panose="02000603000000000000" pitchFamily="2" charset="0"/>
-              </a:rPr>
-              <a:t>-system</a:t>
-            </a:r>
-            <a:endParaRPr lang="en-DE" sz="2400" dirty="0">
-              <a:latin typeface="CMU Concrete" panose="02000603000000000000" pitchFamily="2" charset="0"/>
-              <a:ea typeface="CMU Concrete" panose="02000603000000000000" pitchFamily="2" charset="0"/>
-              <a:cs typeface="CMU Concrete" panose="02000603000000000000" pitchFamily="2" charset="0"/>
+            <a:endParaRPr lang="en-DE" sz="3200" dirty="0">
+              <a:latin typeface="CMU Serif" panose="02000603000000000000" pitchFamily="2" charset="0"/>
+              <a:ea typeface="CMU Serif" panose="02000603000000000000" pitchFamily="2" charset="0"/>
+              <a:cs typeface="CMU Serif" panose="02000603000000000000" pitchFamily="2" charset="0"/>
             </a:endParaRPr>
           </a:p>
         </p:txBody>

</xml_diff>

<commit_message>
fast 3 bilder fertig
</commit_message>
<xml_diff>
--- a/Latex/figures/images.pptx
+++ b/Latex/figures/images.pptx
@@ -938,7 +938,7 @@
           <a:p>
             <a:fld id="{A2EF96EC-B110-4427-9456-97730D7A221B}" type="datetimeFigureOut">
               <a:rPr lang="en-DE" smtClean="0"/>
-              <a:t>08/01/2024</a:t>
+              <a:t>12/01/2024</a:t>
             </a:fld>
             <a:endParaRPr lang="en-DE"/>
           </a:p>
@@ -1138,7 +1138,7 @@
           <a:p>
             <a:fld id="{A2EF96EC-B110-4427-9456-97730D7A221B}" type="datetimeFigureOut">
               <a:rPr lang="en-DE" smtClean="0"/>
-              <a:t>08/01/2024</a:t>
+              <a:t>12/01/2024</a:t>
             </a:fld>
             <a:endParaRPr lang="en-DE"/>
           </a:p>
@@ -1348,7 +1348,7 @@
           <a:p>
             <a:fld id="{A2EF96EC-B110-4427-9456-97730D7A221B}" type="datetimeFigureOut">
               <a:rPr lang="en-DE" smtClean="0"/>
-              <a:t>08/01/2024</a:t>
+              <a:t>12/01/2024</a:t>
             </a:fld>
             <a:endParaRPr lang="en-DE"/>
           </a:p>
@@ -1548,7 +1548,7 @@
           <a:p>
             <a:fld id="{A2EF96EC-B110-4427-9456-97730D7A221B}" type="datetimeFigureOut">
               <a:rPr lang="en-DE" smtClean="0"/>
-              <a:t>08/01/2024</a:t>
+              <a:t>12/01/2024</a:t>
             </a:fld>
             <a:endParaRPr lang="en-DE"/>
           </a:p>
@@ -1824,7 +1824,7 @@
           <a:p>
             <a:fld id="{A2EF96EC-B110-4427-9456-97730D7A221B}" type="datetimeFigureOut">
               <a:rPr lang="en-DE" smtClean="0"/>
-              <a:t>08/01/2024</a:t>
+              <a:t>12/01/2024</a:t>
             </a:fld>
             <a:endParaRPr lang="en-DE"/>
           </a:p>
@@ -2092,7 +2092,7 @@
           <a:p>
             <a:fld id="{A2EF96EC-B110-4427-9456-97730D7A221B}" type="datetimeFigureOut">
               <a:rPr lang="en-DE" smtClean="0"/>
-              <a:t>08/01/2024</a:t>
+              <a:t>12/01/2024</a:t>
             </a:fld>
             <a:endParaRPr lang="en-DE"/>
           </a:p>
@@ -2507,7 +2507,7 @@
           <a:p>
             <a:fld id="{A2EF96EC-B110-4427-9456-97730D7A221B}" type="datetimeFigureOut">
               <a:rPr lang="en-DE" smtClean="0"/>
-              <a:t>08/01/2024</a:t>
+              <a:t>12/01/2024</a:t>
             </a:fld>
             <a:endParaRPr lang="en-DE"/>
           </a:p>
@@ -2649,7 +2649,7 @@
           <a:p>
             <a:fld id="{A2EF96EC-B110-4427-9456-97730D7A221B}" type="datetimeFigureOut">
               <a:rPr lang="en-DE" smtClean="0"/>
-              <a:t>08/01/2024</a:t>
+              <a:t>12/01/2024</a:t>
             </a:fld>
             <a:endParaRPr lang="en-DE"/>
           </a:p>
@@ -2762,7 +2762,7 @@
           <a:p>
             <a:fld id="{A2EF96EC-B110-4427-9456-97730D7A221B}" type="datetimeFigureOut">
               <a:rPr lang="en-DE" smtClean="0"/>
-              <a:t>08/01/2024</a:t>
+              <a:t>12/01/2024</a:t>
             </a:fld>
             <a:endParaRPr lang="en-DE"/>
           </a:p>
@@ -3075,7 +3075,7 @@
           <a:p>
             <a:fld id="{A2EF96EC-B110-4427-9456-97730D7A221B}" type="datetimeFigureOut">
               <a:rPr lang="en-DE" smtClean="0"/>
-              <a:t>08/01/2024</a:t>
+              <a:t>12/01/2024</a:t>
             </a:fld>
             <a:endParaRPr lang="en-DE"/>
           </a:p>
@@ -3364,7 +3364,7 @@
           <a:p>
             <a:fld id="{A2EF96EC-B110-4427-9456-97730D7A221B}" type="datetimeFigureOut">
               <a:rPr lang="en-DE" smtClean="0"/>
-              <a:t>08/01/2024</a:t>
+              <a:t>12/01/2024</a:t>
             </a:fld>
             <a:endParaRPr lang="en-DE"/>
           </a:p>
@@ -3607,7 +3607,7 @@
           <a:p>
             <a:fld id="{A2EF96EC-B110-4427-9456-97730D7A221B}" type="datetimeFigureOut">
               <a:rPr lang="en-DE" smtClean="0"/>
-              <a:t>08/01/2024</a:t>
+              <a:t>12/01/2024</a:t>
             </a:fld>
             <a:endParaRPr lang="en-DE"/>
           </a:p>
@@ -18466,7 +18466,7 @@
         </p:nvCxnSpPr>
         <p:spPr>
           <a:xfrm>
-            <a:off x="6890798" y="2013323"/>
+            <a:off x="7995698" y="2013323"/>
             <a:ext cx="0" cy="4305300"/>
           </a:xfrm>
           <a:prstGeom prst="line">
@@ -18510,7 +18510,7 @@
         </p:nvCxnSpPr>
         <p:spPr>
           <a:xfrm flipH="1">
-            <a:off x="6734423" y="1847308"/>
+            <a:off x="7839323" y="1847308"/>
             <a:ext cx="1540897" cy="4110859"/>
           </a:xfrm>
           <a:prstGeom prst="line">
@@ -18552,7 +18552,7 @@
         </p:nvCxnSpPr>
         <p:spPr>
           <a:xfrm>
-            <a:off x="1889760" y="1878199"/>
+            <a:off x="3518535" y="1906774"/>
             <a:ext cx="0" cy="4305300"/>
           </a:xfrm>
           <a:prstGeom prst="line">
@@ -18594,7 +18594,7 @@
         </p:nvGrpSpPr>
         <p:grpSpPr>
           <a:xfrm>
-            <a:off x="1516032" y="1903335"/>
+            <a:off x="3144807" y="1931910"/>
             <a:ext cx="3126712" cy="3509352"/>
             <a:chOff x="1516032" y="1903335"/>
             <a:chExt cx="3126712" cy="3509352"/>
@@ -18719,7 +18719,7 @@
         </p:nvGrpSpPr>
         <p:grpSpPr>
           <a:xfrm rot="1257933">
-            <a:off x="7116732" y="2448525"/>
+            <a:off x="8221632" y="2448525"/>
             <a:ext cx="3126712" cy="3509352"/>
             <a:chOff x="1516032" y="1903335"/>
             <a:chExt cx="3126712" cy="3509352"/>
@@ -18844,7 +18844,7 @@
         </p:nvSpPr>
         <p:spPr>
           <a:xfrm rot="19586307">
-            <a:off x="6640443" y="2230050"/>
+            <a:off x="7745343" y="2230050"/>
             <a:ext cx="1426816" cy="1409600"/>
           </a:xfrm>
           <a:prstGeom prst="arc">
@@ -18893,7 +18893,7 @@
         </p:nvCxnSpPr>
         <p:spPr>
           <a:xfrm>
-            <a:off x="1889760" y="1878199"/>
+            <a:off x="3518535" y="1906774"/>
             <a:ext cx="0" cy="1087542"/>
           </a:xfrm>
           <a:prstGeom prst="straightConnector1">
@@ -18935,7 +18935,7 @@
         </p:nvSpPr>
         <p:spPr>
           <a:xfrm>
-            <a:off x="1652355" y="1047202"/>
+            <a:off x="3281130" y="1075777"/>
             <a:ext cx="492443" cy="830997"/>
           </a:xfrm>
           <a:prstGeom prst="rect">
@@ -18979,7 +18979,7 @@
         </p:nvCxnSpPr>
         <p:spPr>
           <a:xfrm>
-            <a:off x="6890798" y="1994125"/>
+            <a:off x="7995698" y="1994125"/>
             <a:ext cx="0" cy="1087542"/>
           </a:xfrm>
           <a:prstGeom prst="straightConnector1">
@@ -19021,7 +19021,7 @@
         </p:nvSpPr>
         <p:spPr>
           <a:xfrm>
-            <a:off x="6632960" y="1102469"/>
+            <a:off x="7737860" y="1102469"/>
             <a:ext cx="492443" cy="830997"/>
           </a:xfrm>
           <a:prstGeom prst="rect">
@@ -19047,6 +19047,316 @@
               <a:latin typeface="CMU Concrete" panose="02000603000000000000" pitchFamily="2" charset="0"/>
               <a:ea typeface="CMU Concrete" panose="02000603000000000000" pitchFamily="2" charset="0"/>
               <a:cs typeface="CMU Concrete" panose="02000603000000000000" pitchFamily="2" charset="0"/>
+            </a:endParaRPr>
+          </a:p>
+        </p:txBody>
+      </p:sp>
+      <p:cxnSp>
+        <p:nvCxnSpPr>
+          <p:cNvPr id="3" name="Straight Arrow Connector 2">
+            <a:extLst>
+              <a:ext uri="{FF2B5EF4-FFF2-40B4-BE49-F238E27FC236}">
+                <a16:creationId xmlns:a16="http://schemas.microsoft.com/office/drawing/2014/main" id="{846862E5-2D52-935B-A8EC-2CAFFB8B42B9}"/>
+              </a:ext>
+            </a:extLst>
+          </p:cNvPr>
+          <p:cNvCxnSpPr/>
+          <p:nvPr/>
+        </p:nvCxnSpPr>
+        <p:spPr>
+          <a:xfrm>
+            <a:off x="514350" y="6284621"/>
+            <a:ext cx="1562100" cy="0"/>
+          </a:xfrm>
+          <a:prstGeom prst="straightConnector1">
+            <a:avLst/>
+          </a:prstGeom>
+          <a:ln w="34925">
+            <a:solidFill>
+              <a:schemeClr val="tx1"/>
+            </a:solidFill>
+            <a:tailEnd type="triangle" w="lg" len="lg"/>
+          </a:ln>
+        </p:spPr>
+        <p:style>
+          <a:lnRef idx="1">
+            <a:schemeClr val="accent1"/>
+          </a:lnRef>
+          <a:fillRef idx="0">
+            <a:schemeClr val="accent1"/>
+          </a:fillRef>
+          <a:effectRef idx="0">
+            <a:schemeClr val="accent1"/>
+          </a:effectRef>
+          <a:fontRef idx="minor">
+            <a:schemeClr val="tx1"/>
+          </a:fontRef>
+        </p:style>
+      </p:cxnSp>
+      <p:cxnSp>
+        <p:nvCxnSpPr>
+          <p:cNvPr id="9" name="Straight Arrow Connector 8">
+            <a:extLst>
+              <a:ext uri="{FF2B5EF4-FFF2-40B4-BE49-F238E27FC236}">
+                <a16:creationId xmlns:a16="http://schemas.microsoft.com/office/drawing/2014/main" id="{B734E4F7-C24E-E12D-B753-7D57DF34EAC7}"/>
+              </a:ext>
+            </a:extLst>
+          </p:cNvPr>
+          <p:cNvCxnSpPr>
+            <a:cxnSpLocks/>
+          </p:cNvCxnSpPr>
+          <p:nvPr/>
+        </p:nvCxnSpPr>
+        <p:spPr>
+          <a:xfrm flipV="1">
+            <a:off x="619125" y="4872947"/>
+            <a:ext cx="0" cy="1531646"/>
+          </a:xfrm>
+          <a:prstGeom prst="straightConnector1">
+            <a:avLst/>
+          </a:prstGeom>
+          <a:ln w="34925">
+            <a:solidFill>
+              <a:schemeClr val="tx1"/>
+            </a:solidFill>
+            <a:tailEnd type="triangle" w="lg" len="lg"/>
+          </a:ln>
+        </p:spPr>
+        <p:style>
+          <a:lnRef idx="1">
+            <a:schemeClr val="accent1"/>
+          </a:lnRef>
+          <a:fillRef idx="0">
+            <a:schemeClr val="accent1"/>
+          </a:fillRef>
+          <a:effectRef idx="0">
+            <a:schemeClr val="accent1"/>
+          </a:effectRef>
+          <a:fontRef idx="minor">
+            <a:schemeClr val="tx1"/>
+          </a:fontRef>
+        </p:style>
+      </p:cxnSp>
+      <p:cxnSp>
+        <p:nvCxnSpPr>
+          <p:cNvPr id="13" name="Straight Arrow Connector 12">
+            <a:extLst>
+              <a:ext uri="{FF2B5EF4-FFF2-40B4-BE49-F238E27FC236}">
+                <a16:creationId xmlns:a16="http://schemas.microsoft.com/office/drawing/2014/main" id="{705DCB45-2E77-BCC4-2EC7-9C41E21DEB57}"/>
+              </a:ext>
+            </a:extLst>
+          </p:cNvPr>
+          <p:cNvCxnSpPr>
+            <a:cxnSpLocks/>
+          </p:cNvCxnSpPr>
+          <p:nvPr/>
+        </p:nvCxnSpPr>
+        <p:spPr>
+          <a:xfrm flipV="1">
+            <a:off x="525578" y="5326972"/>
+            <a:ext cx="1003300" cy="1071271"/>
+          </a:xfrm>
+          <a:prstGeom prst="straightConnector1">
+            <a:avLst/>
+          </a:prstGeom>
+          <a:ln w="34925">
+            <a:solidFill>
+              <a:schemeClr val="tx1"/>
+            </a:solidFill>
+            <a:tailEnd type="triangle" w="lg" len="lg"/>
+          </a:ln>
+        </p:spPr>
+        <p:style>
+          <a:lnRef idx="1">
+            <a:schemeClr val="accent1"/>
+          </a:lnRef>
+          <a:fillRef idx="0">
+            <a:schemeClr val="accent1"/>
+          </a:fillRef>
+          <a:effectRef idx="0">
+            <a:schemeClr val="accent1"/>
+          </a:effectRef>
+          <a:fontRef idx="minor">
+            <a:schemeClr val="tx1"/>
+          </a:fontRef>
+        </p:style>
+      </p:cxnSp>
+      <p:sp>
+        <p:nvSpPr>
+          <p:cNvPr id="16" name="TextBox 15">
+            <a:extLst>
+              <a:ext uri="{FF2B5EF4-FFF2-40B4-BE49-F238E27FC236}">
+                <a16:creationId xmlns:a16="http://schemas.microsoft.com/office/drawing/2014/main" id="{C1D4D6C9-224C-9A2B-CDB1-ADED5816A16A}"/>
+              </a:ext>
+            </a:extLst>
+          </p:cNvPr>
+          <p:cNvSpPr txBox="1"/>
+          <p:nvPr/>
+        </p:nvSpPr>
+        <p:spPr>
+          <a:xfrm>
+            <a:off x="1930074" y="5862607"/>
+            <a:ext cx="639919" cy="830997"/>
+          </a:xfrm>
+          <a:prstGeom prst="rect">
+            <a:avLst/>
+          </a:prstGeom>
+          <a:noFill/>
+        </p:spPr>
+        <p:txBody>
+          <a:bodyPr wrap="none" rtlCol="0">
+            <a:spAutoFit/>
+          </a:bodyPr>
+          <a:lstStyle/>
+          <a:p>
+            <a:r>
+              <a:rPr lang="en-US" sz="4800" dirty="0">
+                <a:latin typeface="CMU Concrete" panose="02000603000000000000" pitchFamily="2" charset="0"/>
+                <a:ea typeface="CMU Concrete" panose="02000603000000000000" pitchFamily="2" charset="0"/>
+                <a:cs typeface="CMU Concrete" panose="02000603000000000000" pitchFamily="2" charset="0"/>
+              </a:rPr>
+              <a:t>X</a:t>
+            </a:r>
+            <a:endParaRPr lang="en-DE" sz="4800" dirty="0">
+              <a:latin typeface="CMU Concrete" panose="02000603000000000000" pitchFamily="2" charset="0"/>
+              <a:ea typeface="CMU Concrete" panose="02000603000000000000" pitchFamily="2" charset="0"/>
+              <a:cs typeface="CMU Concrete" panose="02000603000000000000" pitchFamily="2" charset="0"/>
+            </a:endParaRPr>
+          </a:p>
+        </p:txBody>
+      </p:sp>
+      <p:sp>
+        <p:nvSpPr>
+          <p:cNvPr id="17" name="TextBox 16">
+            <a:extLst>
+              <a:ext uri="{FF2B5EF4-FFF2-40B4-BE49-F238E27FC236}">
+                <a16:creationId xmlns:a16="http://schemas.microsoft.com/office/drawing/2014/main" id="{E2E91707-9983-1193-5939-7954B3905619}"/>
+              </a:ext>
+            </a:extLst>
+          </p:cNvPr>
+          <p:cNvSpPr txBox="1"/>
+          <p:nvPr/>
+        </p:nvSpPr>
+        <p:spPr>
+          <a:xfrm>
+            <a:off x="366561" y="4035600"/>
+            <a:ext cx="561372" cy="830997"/>
+          </a:xfrm>
+          <a:prstGeom prst="rect">
+            <a:avLst/>
+          </a:prstGeom>
+          <a:noFill/>
+        </p:spPr>
+        <p:txBody>
+          <a:bodyPr wrap="none" rtlCol="0">
+            <a:spAutoFit/>
+          </a:bodyPr>
+          <a:lstStyle/>
+          <a:p>
+            <a:r>
+              <a:rPr lang="en-US" sz="4800" dirty="0">
+                <a:latin typeface="CMU Concrete" panose="02000603000000000000" pitchFamily="2" charset="0"/>
+                <a:ea typeface="CMU Concrete" panose="02000603000000000000" pitchFamily="2" charset="0"/>
+                <a:cs typeface="CMU Concrete" panose="02000603000000000000" pitchFamily="2" charset="0"/>
+              </a:rPr>
+              <a:t>Z</a:t>
+            </a:r>
+            <a:endParaRPr lang="en-DE" sz="4800" dirty="0">
+              <a:latin typeface="CMU Concrete" panose="02000603000000000000" pitchFamily="2" charset="0"/>
+              <a:ea typeface="CMU Concrete" panose="02000603000000000000" pitchFamily="2" charset="0"/>
+              <a:cs typeface="CMU Concrete" panose="02000603000000000000" pitchFamily="2" charset="0"/>
+            </a:endParaRPr>
+          </a:p>
+        </p:txBody>
+      </p:sp>
+      <p:sp>
+        <p:nvSpPr>
+          <p:cNvPr id="18" name="TextBox 17">
+            <a:extLst>
+              <a:ext uri="{FF2B5EF4-FFF2-40B4-BE49-F238E27FC236}">
+                <a16:creationId xmlns:a16="http://schemas.microsoft.com/office/drawing/2014/main" id="{3D562B0F-FCF3-E6B9-6334-1767345EA1E7}"/>
+              </a:ext>
+            </a:extLst>
+          </p:cNvPr>
+          <p:cNvSpPr txBox="1"/>
+          <p:nvPr/>
+        </p:nvSpPr>
+        <p:spPr>
+          <a:xfrm>
+            <a:off x="1383778" y="4801422"/>
+            <a:ext cx="638316" cy="830997"/>
+          </a:xfrm>
+          <a:prstGeom prst="rect">
+            <a:avLst/>
+          </a:prstGeom>
+          <a:noFill/>
+        </p:spPr>
+        <p:txBody>
+          <a:bodyPr wrap="none" rtlCol="0">
+            <a:spAutoFit/>
+          </a:bodyPr>
+          <a:lstStyle/>
+          <a:p>
+            <a:r>
+              <a:rPr lang="en-US" sz="4800" dirty="0">
+                <a:latin typeface="CMU Concrete" panose="02000603000000000000" pitchFamily="2" charset="0"/>
+                <a:ea typeface="CMU Concrete" panose="02000603000000000000" pitchFamily="2" charset="0"/>
+                <a:cs typeface="CMU Concrete" panose="02000603000000000000" pitchFamily="2" charset="0"/>
+              </a:rPr>
+              <a:t>Y</a:t>
+            </a:r>
+            <a:endParaRPr lang="en-DE" sz="4800" dirty="0">
+              <a:latin typeface="CMU Concrete" panose="02000603000000000000" pitchFamily="2" charset="0"/>
+              <a:ea typeface="CMU Concrete" panose="02000603000000000000" pitchFamily="2" charset="0"/>
+              <a:cs typeface="CMU Concrete" panose="02000603000000000000" pitchFamily="2" charset="0"/>
+            </a:endParaRPr>
+          </a:p>
+        </p:txBody>
+      </p:sp>
+      <p:sp>
+        <p:nvSpPr>
+          <p:cNvPr id="25" name="TextBox 24">
+            <a:extLst>
+              <a:ext uri="{FF2B5EF4-FFF2-40B4-BE49-F238E27FC236}">
+                <a16:creationId xmlns:a16="http://schemas.microsoft.com/office/drawing/2014/main" id="{552DC67D-DFC1-3875-5B6C-0ADF0D5CF9C0}"/>
+              </a:ext>
+            </a:extLst>
+          </p:cNvPr>
+          <p:cNvSpPr txBox="1"/>
+          <p:nvPr/>
+        </p:nvSpPr>
+        <p:spPr>
+          <a:xfrm>
+            <a:off x="8192230" y="2039308"/>
+            <a:ext cx="6096000" cy="769441"/>
+          </a:xfrm>
+          <a:prstGeom prst="rect">
+            <a:avLst/>
+          </a:prstGeom>
+          <a:noFill/>
+        </p:spPr>
+        <p:txBody>
+          <a:bodyPr wrap="square">
+            <a:spAutoFit/>
+          </a:bodyPr>
+          <a:lstStyle/>
+          <a:p>
+            <a:r>
+              <a:rPr lang="el-GR" sz="4400" b="1" i="0" dirty="0">
+                <a:solidFill>
+                  <a:srgbClr val="202124"/>
+                </a:solidFill>
+                <a:effectLst/>
+                <a:latin typeface="+mj-lt"/>
+                <a:ea typeface="CMU Serif" panose="02000603000000000000" pitchFamily="2" charset="0"/>
+                <a:cs typeface="CMU Serif" panose="02000603000000000000" pitchFamily="2" charset="0"/>
+              </a:rPr>
+              <a:t>α</a:t>
+            </a:r>
+            <a:endParaRPr lang="en-DE" sz="4400" b="1" dirty="0">
+              <a:latin typeface="+mj-lt"/>
+              <a:ea typeface="CMU Serif" panose="02000603000000000000" pitchFamily="2" charset="0"/>
+              <a:cs typeface="CMU Serif" panose="02000603000000000000" pitchFamily="2" charset="0"/>
             </a:endParaRPr>
           </a:p>
         </p:txBody>

</xml_diff>

<commit_message>
added spindle in Code - plz kill me
</commit_message>
<xml_diff>
--- a/Latex/figures/images.pptx
+++ b/Latex/figures/images.pptx
@@ -938,7 +938,7 @@
           <a:p>
             <a:fld id="{A2EF96EC-B110-4427-9456-97730D7A221B}" type="datetimeFigureOut">
               <a:rPr lang="en-DE" smtClean="0"/>
-              <a:t>12/01/2024</a:t>
+              <a:t>13/01/2024</a:t>
             </a:fld>
             <a:endParaRPr lang="en-DE"/>
           </a:p>
@@ -1138,7 +1138,7 @@
           <a:p>
             <a:fld id="{A2EF96EC-B110-4427-9456-97730D7A221B}" type="datetimeFigureOut">
               <a:rPr lang="en-DE" smtClean="0"/>
-              <a:t>12/01/2024</a:t>
+              <a:t>13/01/2024</a:t>
             </a:fld>
             <a:endParaRPr lang="en-DE"/>
           </a:p>
@@ -1348,7 +1348,7 @@
           <a:p>
             <a:fld id="{A2EF96EC-B110-4427-9456-97730D7A221B}" type="datetimeFigureOut">
               <a:rPr lang="en-DE" smtClean="0"/>
-              <a:t>12/01/2024</a:t>
+              <a:t>13/01/2024</a:t>
             </a:fld>
             <a:endParaRPr lang="en-DE"/>
           </a:p>
@@ -1548,7 +1548,7 @@
           <a:p>
             <a:fld id="{A2EF96EC-B110-4427-9456-97730D7A221B}" type="datetimeFigureOut">
               <a:rPr lang="en-DE" smtClean="0"/>
-              <a:t>12/01/2024</a:t>
+              <a:t>13/01/2024</a:t>
             </a:fld>
             <a:endParaRPr lang="en-DE"/>
           </a:p>
@@ -1824,7 +1824,7 @@
           <a:p>
             <a:fld id="{A2EF96EC-B110-4427-9456-97730D7A221B}" type="datetimeFigureOut">
               <a:rPr lang="en-DE" smtClean="0"/>
-              <a:t>12/01/2024</a:t>
+              <a:t>13/01/2024</a:t>
             </a:fld>
             <a:endParaRPr lang="en-DE"/>
           </a:p>
@@ -2092,7 +2092,7 @@
           <a:p>
             <a:fld id="{A2EF96EC-B110-4427-9456-97730D7A221B}" type="datetimeFigureOut">
               <a:rPr lang="en-DE" smtClean="0"/>
-              <a:t>12/01/2024</a:t>
+              <a:t>13/01/2024</a:t>
             </a:fld>
             <a:endParaRPr lang="en-DE"/>
           </a:p>
@@ -2507,7 +2507,7 @@
           <a:p>
             <a:fld id="{A2EF96EC-B110-4427-9456-97730D7A221B}" type="datetimeFigureOut">
               <a:rPr lang="en-DE" smtClean="0"/>
-              <a:t>12/01/2024</a:t>
+              <a:t>13/01/2024</a:t>
             </a:fld>
             <a:endParaRPr lang="en-DE"/>
           </a:p>
@@ -2649,7 +2649,7 @@
           <a:p>
             <a:fld id="{A2EF96EC-B110-4427-9456-97730D7A221B}" type="datetimeFigureOut">
               <a:rPr lang="en-DE" smtClean="0"/>
-              <a:t>12/01/2024</a:t>
+              <a:t>13/01/2024</a:t>
             </a:fld>
             <a:endParaRPr lang="en-DE"/>
           </a:p>
@@ -2762,7 +2762,7 @@
           <a:p>
             <a:fld id="{A2EF96EC-B110-4427-9456-97730D7A221B}" type="datetimeFigureOut">
               <a:rPr lang="en-DE" smtClean="0"/>
-              <a:t>12/01/2024</a:t>
+              <a:t>13/01/2024</a:t>
             </a:fld>
             <a:endParaRPr lang="en-DE"/>
           </a:p>
@@ -3075,7 +3075,7 @@
           <a:p>
             <a:fld id="{A2EF96EC-B110-4427-9456-97730D7A221B}" type="datetimeFigureOut">
               <a:rPr lang="en-DE" smtClean="0"/>
-              <a:t>12/01/2024</a:t>
+              <a:t>13/01/2024</a:t>
             </a:fld>
             <a:endParaRPr lang="en-DE"/>
           </a:p>
@@ -3364,7 +3364,7 @@
           <a:p>
             <a:fld id="{A2EF96EC-B110-4427-9456-97730D7A221B}" type="datetimeFigureOut">
               <a:rPr lang="en-DE" smtClean="0"/>
-              <a:t>12/01/2024</a:t>
+              <a:t>13/01/2024</a:t>
             </a:fld>
             <a:endParaRPr lang="en-DE"/>
           </a:p>
@@ -3607,7 +3607,7 @@
           <a:p>
             <a:fld id="{A2EF96EC-B110-4427-9456-97730D7A221B}" type="datetimeFigureOut">
               <a:rPr lang="en-DE" smtClean="0"/>
-              <a:t>12/01/2024</a:t>
+              <a:t>13/01/2024</a:t>
             </a:fld>
             <a:endParaRPr lang="en-DE"/>
           </a:p>
@@ -18474,7 +18474,7 @@
           </a:prstGeom>
           <a:ln w="76200">
             <a:solidFill>
-              <a:srgbClr val="5E94D4"/>
+              <a:schemeClr val="tx2"/>
             </a:solidFill>
             <a:prstDash val="sysDash"/>
           </a:ln>
@@ -18518,7 +18518,7 @@
           </a:prstGeom>
           <a:ln w="76200">
             <a:solidFill>
-              <a:srgbClr val="EA7237"/>
+              <a:schemeClr val="tx1"/>
             </a:solidFill>
             <a:prstDash val="sysDash"/>
           </a:ln>
@@ -18560,7 +18560,7 @@
           </a:prstGeom>
           <a:ln w="76200">
             <a:solidFill>
-              <a:srgbClr val="5E94D4"/>
+              <a:schemeClr val="tx1"/>
             </a:solidFill>
             <a:prstDash val="sysDash"/>
           </a:ln>
@@ -18901,7 +18901,7 @@
           </a:prstGeom>
           <a:ln w="76200">
             <a:solidFill>
-              <a:srgbClr val="9FBA36"/>
+              <a:schemeClr val="tx1"/>
             </a:solidFill>
             <a:tailEnd type="triangle"/>
           </a:ln>
@@ -18936,7 +18936,7 @@
         <p:spPr>
           <a:xfrm>
             <a:off x="3281130" y="1075777"/>
-            <a:ext cx="492443" cy="830997"/>
+            <a:ext cx="466794" cy="769441"/>
           </a:xfrm>
           <a:prstGeom prst="rect">
             <a:avLst/>
@@ -18950,14 +18950,14 @@
           <a:lstStyle/>
           <a:p>
             <a:r>
-              <a:rPr lang="en-US" sz="4800" dirty="0">
+              <a:rPr lang="en-US" sz="4400" dirty="0">
                 <a:latin typeface="CMU Concrete" panose="02000603000000000000" pitchFamily="2" charset="0"/>
                 <a:ea typeface="CMU Concrete" panose="02000603000000000000" pitchFamily="2" charset="0"/>
                 <a:cs typeface="CMU Concrete" panose="02000603000000000000" pitchFamily="2" charset="0"/>
               </a:rPr>
               <a:t>g</a:t>
             </a:r>
-            <a:endParaRPr lang="en-DE" sz="4800" dirty="0">
+            <a:endParaRPr lang="en-DE" sz="4400" dirty="0">
               <a:latin typeface="CMU Concrete" panose="02000603000000000000" pitchFamily="2" charset="0"/>
               <a:ea typeface="CMU Concrete" panose="02000603000000000000" pitchFamily="2" charset="0"/>
               <a:cs typeface="CMU Concrete" panose="02000603000000000000" pitchFamily="2" charset="0"/>
@@ -18987,7 +18987,7 @@
           </a:prstGeom>
           <a:ln w="76200">
             <a:solidFill>
-              <a:srgbClr val="9FBA36"/>
+              <a:schemeClr val="tx1"/>
             </a:solidFill>
             <a:tailEnd type="triangle"/>
           </a:ln>
@@ -19022,7 +19022,7 @@
         <p:spPr>
           <a:xfrm>
             <a:off x="7737860" y="1102469"/>
-            <a:ext cx="492443" cy="830997"/>
+            <a:ext cx="466794" cy="769441"/>
           </a:xfrm>
           <a:prstGeom prst="rect">
             <a:avLst/>
@@ -19036,14 +19036,14 @@
           <a:lstStyle/>
           <a:p>
             <a:r>
-              <a:rPr lang="en-US" sz="4800" dirty="0">
+              <a:rPr lang="en-US" sz="4400" dirty="0">
                 <a:latin typeface="CMU Concrete" panose="02000603000000000000" pitchFamily="2" charset="0"/>
                 <a:ea typeface="CMU Concrete" panose="02000603000000000000" pitchFamily="2" charset="0"/>
                 <a:cs typeface="CMU Concrete" panose="02000603000000000000" pitchFamily="2" charset="0"/>
               </a:rPr>
               <a:t>g</a:t>
             </a:r>
-            <a:endParaRPr lang="en-DE" sz="4800" dirty="0">
+            <a:endParaRPr lang="en-DE" sz="4400" dirty="0">
               <a:latin typeface="CMU Concrete" panose="02000603000000000000" pitchFamily="2" charset="0"/>
               <a:ea typeface="CMU Concrete" panose="02000603000000000000" pitchFamily="2" charset="0"/>
               <a:cs typeface="CMU Concrete" panose="02000603000000000000" pitchFamily="2" charset="0"/>
@@ -19196,7 +19196,7 @@
         <p:spPr>
           <a:xfrm>
             <a:off x="1930074" y="5862607"/>
-            <a:ext cx="639919" cy="830997"/>
+            <a:ext cx="562975" cy="707886"/>
           </a:xfrm>
           <a:prstGeom prst="rect">
             <a:avLst/>
@@ -19210,14 +19210,14 @@
           <a:lstStyle/>
           <a:p>
             <a:r>
-              <a:rPr lang="en-US" sz="4800" dirty="0">
+              <a:rPr lang="en-US" sz="4000" dirty="0">
                 <a:latin typeface="CMU Concrete" panose="02000603000000000000" pitchFamily="2" charset="0"/>
                 <a:ea typeface="CMU Concrete" panose="02000603000000000000" pitchFamily="2" charset="0"/>
                 <a:cs typeface="CMU Concrete" panose="02000603000000000000" pitchFamily="2" charset="0"/>
               </a:rPr>
               <a:t>X</a:t>
             </a:r>
-            <a:endParaRPr lang="en-DE" sz="4800" dirty="0">
+            <a:endParaRPr lang="en-DE" sz="4000" dirty="0">
               <a:latin typeface="CMU Concrete" panose="02000603000000000000" pitchFamily="2" charset="0"/>
               <a:ea typeface="CMU Concrete" panose="02000603000000000000" pitchFamily="2" charset="0"/>
               <a:cs typeface="CMU Concrete" panose="02000603000000000000" pitchFamily="2" charset="0"/>
@@ -19240,7 +19240,7 @@
         <p:spPr>
           <a:xfrm>
             <a:off x="366561" y="4035600"/>
-            <a:ext cx="561372" cy="830997"/>
+            <a:ext cx="498855" cy="707886"/>
           </a:xfrm>
           <a:prstGeom prst="rect">
             <a:avLst/>
@@ -19254,14 +19254,14 @@
           <a:lstStyle/>
           <a:p>
             <a:r>
-              <a:rPr lang="en-US" sz="4800" dirty="0">
+              <a:rPr lang="en-US" sz="4000" dirty="0">
                 <a:latin typeface="CMU Concrete" panose="02000603000000000000" pitchFamily="2" charset="0"/>
                 <a:ea typeface="CMU Concrete" panose="02000603000000000000" pitchFamily="2" charset="0"/>
                 <a:cs typeface="CMU Concrete" panose="02000603000000000000" pitchFamily="2" charset="0"/>
               </a:rPr>
               <a:t>Z</a:t>
             </a:r>
-            <a:endParaRPr lang="en-DE" sz="4800" dirty="0">
+            <a:endParaRPr lang="en-DE" sz="4000" dirty="0">
               <a:latin typeface="CMU Concrete" panose="02000603000000000000" pitchFamily="2" charset="0"/>
               <a:ea typeface="CMU Concrete" panose="02000603000000000000" pitchFamily="2" charset="0"/>
               <a:cs typeface="CMU Concrete" panose="02000603000000000000" pitchFamily="2" charset="0"/>
@@ -19284,7 +19284,7 @@
         <p:spPr>
           <a:xfrm>
             <a:off x="1383778" y="4801422"/>
-            <a:ext cx="638316" cy="830997"/>
+            <a:ext cx="562975" cy="707886"/>
           </a:xfrm>
           <a:prstGeom prst="rect">
             <a:avLst/>
@@ -19298,14 +19298,14 @@
           <a:lstStyle/>
           <a:p>
             <a:r>
-              <a:rPr lang="en-US" sz="4800" dirty="0">
+              <a:rPr lang="en-US" sz="4000" dirty="0">
                 <a:latin typeface="CMU Concrete" panose="02000603000000000000" pitchFamily="2" charset="0"/>
                 <a:ea typeface="CMU Concrete" panose="02000603000000000000" pitchFamily="2" charset="0"/>
                 <a:cs typeface="CMU Concrete" panose="02000603000000000000" pitchFamily="2" charset="0"/>
               </a:rPr>
               <a:t>Y</a:t>
             </a:r>
-            <a:endParaRPr lang="en-DE" sz="4800" dirty="0">
+            <a:endParaRPr lang="en-DE" sz="4000" dirty="0">
               <a:latin typeface="CMU Concrete" panose="02000603000000000000" pitchFamily="2" charset="0"/>
               <a:ea typeface="CMU Concrete" panose="02000603000000000000" pitchFamily="2" charset="0"/>
               <a:cs typeface="CMU Concrete" panose="02000603000000000000" pitchFamily="2" charset="0"/>
@@ -19327,7 +19327,7 @@
         </p:nvSpPr>
         <p:spPr>
           <a:xfrm>
-            <a:off x="8192230" y="2039308"/>
+            <a:off x="8254875" y="2050935"/>
             <a:ext cx="6096000" cy="769441"/>
           </a:xfrm>
           <a:prstGeom prst="rect">
@@ -24805,9 +24805,9 @@
           <p:nvPr/>
         </p:nvCxnSpPr>
         <p:spPr>
-          <a:xfrm>
-            <a:off x="5790212" y="5188194"/>
-            <a:ext cx="1284950" cy="0"/>
+          <a:xfrm flipH="1">
+            <a:off x="3907108" y="4894775"/>
+            <a:ext cx="2247" cy="929763"/>
           </a:xfrm>
           <a:prstGeom prst="straightConnector1">
             <a:avLst/>
@@ -24850,8 +24850,8 @@
         </p:nvCxnSpPr>
         <p:spPr>
           <a:xfrm flipV="1">
-            <a:off x="5679147" y="4126043"/>
-            <a:ext cx="0" cy="1024630"/>
+            <a:off x="3909355" y="4296942"/>
+            <a:ext cx="546662" cy="597833"/>
           </a:xfrm>
           <a:prstGeom prst="straightConnector1">
             <a:avLst/>
@@ -24892,7 +24892,7 @@
         </p:nvSpPr>
         <p:spPr>
           <a:xfrm>
-            <a:off x="471878" y="5347585"/>
+            <a:off x="500453" y="4137910"/>
             <a:ext cx="1626433" cy="307298"/>
           </a:xfrm>
           <a:prstGeom prst="rect">
@@ -24941,7 +24941,7 @@
         </p:nvCxnSpPr>
         <p:spPr>
           <a:xfrm flipH="1" flipV="1">
-            <a:off x="1285093" y="4423036"/>
+            <a:off x="1313668" y="3213361"/>
             <a:ext cx="1" cy="924549"/>
           </a:xfrm>
           <a:prstGeom prst="line">
@@ -24978,7 +24978,7 @@
         </p:nvGrpSpPr>
         <p:grpSpPr>
           <a:xfrm>
-            <a:off x="1129518" y="3997794"/>
+            <a:off x="1158093" y="2788119"/>
             <a:ext cx="311150" cy="780842"/>
             <a:chOff x="2285219" y="4182152"/>
             <a:chExt cx="311150" cy="780842"/>
@@ -25097,7 +25097,7 @@
         </p:nvSpPr>
         <p:spPr>
           <a:xfrm>
-            <a:off x="1947106" y="3470847"/>
+            <a:off x="1975681" y="2261172"/>
             <a:ext cx="321039" cy="323850"/>
           </a:xfrm>
           <a:prstGeom prst="donut">
@@ -25152,7 +25152,7 @@
         </p:nvCxnSpPr>
         <p:spPr>
           <a:xfrm flipV="1">
-            <a:off x="1291442" y="3616325"/>
+            <a:off x="1320017" y="2406650"/>
             <a:ext cx="0" cy="509718"/>
           </a:xfrm>
           <a:prstGeom prst="line">
@@ -25191,7 +25191,7 @@
         </p:nvCxnSpPr>
         <p:spPr>
           <a:xfrm flipH="1">
-            <a:off x="1252824" y="3638049"/>
+            <a:off x="1281399" y="2428374"/>
             <a:ext cx="610492" cy="0"/>
           </a:xfrm>
           <a:prstGeom prst="line">
@@ -25229,9 +25229,9 @@
           <p:nvPr/>
         </p:nvCxnSpPr>
         <p:spPr>
-          <a:xfrm flipV="1">
-            <a:off x="2258619" y="3626528"/>
-            <a:ext cx="456889" cy="6244"/>
+          <a:xfrm>
+            <a:off x="2287194" y="2423097"/>
+            <a:ext cx="1034027" cy="5277"/>
           </a:xfrm>
           <a:prstGeom prst="line">
             <a:avLst/>
@@ -25267,7 +25267,7 @@
         </p:nvSpPr>
         <p:spPr>
           <a:xfrm>
-            <a:off x="2818797" y="3470847"/>
+            <a:off x="3441732" y="2261172"/>
             <a:ext cx="321039" cy="323850"/>
           </a:xfrm>
           <a:prstGeom prst="donut">
@@ -25317,13 +25317,14 @@
           </p:cNvPr>
           <p:cNvCxnSpPr>
             <a:cxnSpLocks/>
+            <a:endCxn id="27" idx="6"/>
           </p:cNvCxnSpPr>
           <p:nvPr/>
         </p:nvCxnSpPr>
         <p:spPr>
           <a:xfrm flipH="1">
-            <a:off x="3102257" y="3631315"/>
-            <a:ext cx="338736" cy="0"/>
+            <a:off x="3762771" y="2421640"/>
+            <a:ext cx="537377" cy="1457"/>
           </a:xfrm>
           <a:prstGeom prst="line">
             <a:avLst/>
@@ -25359,7 +25360,7 @@
         </p:nvGrpSpPr>
         <p:grpSpPr>
           <a:xfrm rot="16200000">
-            <a:off x="3589646" y="3239970"/>
+            <a:off x="4448801" y="2030295"/>
             <a:ext cx="311150" cy="780842"/>
             <a:chOff x="2285219" y="4182152"/>
             <a:chExt cx="311150" cy="780842"/>
@@ -25480,7 +25481,7 @@
         </p:nvCxnSpPr>
         <p:spPr>
           <a:xfrm flipH="1">
-            <a:off x="4089904" y="3625465"/>
+            <a:off x="4949059" y="2415790"/>
             <a:ext cx="8743" cy="801811"/>
           </a:xfrm>
           <a:prstGeom prst="line">
@@ -25517,7 +25518,7 @@
         </p:nvSpPr>
         <p:spPr>
           <a:xfrm rot="5400000">
-            <a:off x="3922532" y="4551394"/>
+            <a:off x="4781687" y="3341719"/>
             <a:ext cx="321039" cy="323850"/>
           </a:xfrm>
           <a:prstGeom prst="donut">
@@ -25571,9 +25572,9 @@
           <p:nvPr/>
         </p:nvCxnSpPr>
         <p:spPr>
-          <a:xfrm flipH="1">
-            <a:off x="4238627" y="4720939"/>
-            <a:ext cx="463246" cy="0"/>
+          <a:xfrm flipH="1" flipV="1">
+            <a:off x="4944912" y="3639785"/>
+            <a:ext cx="11187" cy="428464"/>
           </a:xfrm>
           <a:prstGeom prst="line">
             <a:avLst/>
@@ -25608,8 +25609,8 @@
           <p:nvPr/>
         </p:nvGrpSpPr>
         <p:grpSpPr>
-          <a:xfrm rot="5400000">
-            <a:off x="4851099" y="4329789"/>
+          <a:xfrm rot="10800000">
+            <a:off x="4792479" y="3835026"/>
             <a:ext cx="311150" cy="780842"/>
             <a:chOff x="2285219" y="4182152"/>
             <a:chExt cx="311150" cy="780842"/>
@@ -25730,7 +25731,7 @@
         </p:nvCxnSpPr>
         <p:spPr>
           <a:xfrm>
-            <a:off x="5290732" y="4718178"/>
+            <a:off x="4569908" y="4894775"/>
             <a:ext cx="424890" cy="0"/>
           </a:xfrm>
           <a:prstGeom prst="line">
@@ -25769,7 +25770,7 @@
         </p:nvCxnSpPr>
         <p:spPr>
           <a:xfrm flipV="1">
-            <a:off x="5676951" y="4709789"/>
+            <a:off x="4956099" y="4445208"/>
             <a:ext cx="0" cy="449567"/>
           </a:xfrm>
           <a:prstGeom prst="line">
@@ -25806,8 +25807,8 @@
         </p:nvSpPr>
         <p:spPr>
           <a:xfrm>
-            <a:off x="5497894" y="5045089"/>
-            <a:ext cx="325271" cy="286210"/>
+            <a:off x="3790969" y="4782926"/>
+            <a:ext cx="232278" cy="223698"/>
           </a:xfrm>
           <a:prstGeom prst="ellipse">
             <a:avLst/>
@@ -25857,8 +25858,8 @@
         </p:nvCxnSpPr>
         <p:spPr>
           <a:xfrm>
-            <a:off x="5667285" y="5183978"/>
-            <a:ext cx="7100" cy="470905"/>
+            <a:off x="3959346" y="4894775"/>
+            <a:ext cx="886339" cy="0"/>
           </a:xfrm>
           <a:prstGeom prst="straightConnector1">
             <a:avLst/>
@@ -25899,7 +25900,7 @@
         </p:nvSpPr>
         <p:spPr>
           <a:xfrm>
-            <a:off x="7006701" y="4904274"/>
+            <a:off x="3403543" y="5417995"/>
             <a:ext cx="453970" cy="523220"/>
           </a:xfrm>
           <a:prstGeom prst="rect">
@@ -25943,7 +25944,7 @@
         </p:nvSpPr>
         <p:spPr>
           <a:xfrm>
-            <a:off x="5409729" y="3587880"/>
+            <a:off x="4122109" y="3903753"/>
             <a:ext cx="453970" cy="523220"/>
           </a:xfrm>
           <a:prstGeom prst="rect">
@@ -25987,7 +25988,7 @@
         </p:nvSpPr>
         <p:spPr>
           <a:xfrm>
-            <a:off x="5497894" y="5661824"/>
+            <a:off x="4465088" y="4894775"/>
             <a:ext cx="404278" cy="523220"/>
           </a:xfrm>
           <a:prstGeom prst="rect">
@@ -26031,7 +26032,7 @@
         </p:nvSpPr>
         <p:spPr>
           <a:xfrm>
-            <a:off x="3818670" y="4395702"/>
+            <a:off x="4677825" y="3186027"/>
             <a:ext cx="556549" cy="522854"/>
           </a:xfrm>
           <a:prstGeom prst="blockArc">
@@ -26088,7 +26089,7 @@
         </p:nvSpPr>
         <p:spPr>
           <a:xfrm rot="16200000">
-            <a:off x="2681439" y="3379797"/>
+            <a:off x="3304374" y="2170122"/>
             <a:ext cx="556549" cy="522854"/>
           </a:xfrm>
           <a:prstGeom prst="blockArc">
@@ -26145,7 +26146,7 @@
         </p:nvSpPr>
         <p:spPr>
           <a:xfrm rot="16200000">
-            <a:off x="1816584" y="3371344"/>
+            <a:off x="1845159" y="2161669"/>
             <a:ext cx="556549" cy="522854"/>
           </a:xfrm>
           <a:prstGeom prst="blockArc">
@@ -26205,7 +26206,7 @@
         </p:nvCxnSpPr>
         <p:spPr>
           <a:xfrm flipV="1">
-            <a:off x="8636297" y="4316361"/>
+            <a:off x="6517873" y="2939832"/>
             <a:ext cx="0" cy="462275"/>
           </a:xfrm>
           <a:prstGeom prst="line">
@@ -26242,7 +26243,7 @@
         </p:nvGrpSpPr>
         <p:grpSpPr>
           <a:xfrm>
-            <a:off x="8480722" y="3891119"/>
+            <a:off x="6362298" y="2514590"/>
             <a:ext cx="311150" cy="780842"/>
             <a:chOff x="2285219" y="4182152"/>
             <a:chExt cx="311150" cy="780842"/>
@@ -26363,7 +26364,7 @@
         </p:nvCxnSpPr>
         <p:spPr>
           <a:xfrm flipV="1">
-            <a:off x="8642646" y="3794697"/>
+            <a:off x="6524222" y="2418168"/>
             <a:ext cx="0" cy="224671"/>
           </a:xfrm>
           <a:prstGeom prst="line">
@@ -26400,7 +26401,7 @@
         </p:nvSpPr>
         <p:spPr>
           <a:xfrm>
-            <a:off x="8927857" y="5016314"/>
+            <a:off x="6809433" y="3639785"/>
             <a:ext cx="2778325" cy="523220"/>
           </a:xfrm>
           <a:prstGeom prst="rect">
@@ -26444,7 +26445,7 @@
         </p:nvSpPr>
         <p:spPr>
           <a:xfrm>
-            <a:off x="8407952" y="5161440"/>
+            <a:off x="6289528" y="3784911"/>
             <a:ext cx="321039" cy="323850"/>
           </a:xfrm>
           <a:prstGeom prst="donut">
@@ -26499,7 +26500,7 @@
         </p:nvCxnSpPr>
         <p:spPr>
           <a:xfrm flipH="1">
-            <a:off x="8077200" y="5328642"/>
+            <a:off x="5958776" y="3952113"/>
             <a:ext cx="246962" cy="0"/>
           </a:xfrm>
           <a:prstGeom prst="line">
@@ -26538,7 +26539,7 @@
         </p:nvCxnSpPr>
         <p:spPr>
           <a:xfrm>
-            <a:off x="8719465" y="5323365"/>
+            <a:off x="6601041" y="3946836"/>
             <a:ext cx="154660" cy="0"/>
           </a:xfrm>
           <a:prstGeom prst="line">
@@ -26575,7 +26576,7 @@
         </p:nvSpPr>
         <p:spPr>
           <a:xfrm rot="16200000">
-            <a:off x="8277430" y="5061937"/>
+            <a:off x="6159006" y="3685408"/>
             <a:ext cx="556549" cy="522854"/>
           </a:xfrm>
           <a:prstGeom prst="blockArc">
@@ -26632,7 +26633,7 @@
         </p:nvSpPr>
         <p:spPr>
           <a:xfrm>
-            <a:off x="8927857" y="3970941"/>
+            <a:off x="6809433" y="2594412"/>
             <a:ext cx="3079689" cy="523220"/>
           </a:xfrm>
           <a:prstGeom prst="rect">

</xml_diff>